<commit_message>
added slide about named ports
</commit_message>
<xml_diff>
--- a/kubernetes/04_networking_services.pptx
+++ b/kubernetes/04_networking_services.pptx
@@ -5,10 +5,10 @@
     <p:sldMasterId id="2147483733" r:id="rId1"/>
   </p:sldMasterIdLst>
   <p:notesMasterIdLst>
-    <p:notesMasterId r:id="rId13"/>
+    <p:notesMasterId r:id="rId14"/>
   </p:notesMasterIdLst>
   <p:handoutMasterIdLst>
-    <p:handoutMasterId r:id="rId14"/>
+    <p:handoutMasterId r:id="rId15"/>
   </p:handoutMasterIdLst>
   <p:sldIdLst>
     <p:sldId id="433" r:id="rId2"/>
@@ -17,11 +17,12 @@
     <p:sldId id="446" r:id="rId5"/>
     <p:sldId id="442" r:id="rId6"/>
     <p:sldId id="447" r:id="rId7"/>
-    <p:sldId id="448" r:id="rId8"/>
-    <p:sldId id="452" r:id="rId9"/>
-    <p:sldId id="450" r:id="rId10"/>
-    <p:sldId id="451" r:id="rId11"/>
-    <p:sldId id="265" r:id="rId12"/>
+    <p:sldId id="453" r:id="rId8"/>
+    <p:sldId id="448" r:id="rId9"/>
+    <p:sldId id="452" r:id="rId10"/>
+    <p:sldId id="450" r:id="rId11"/>
+    <p:sldId id="451" r:id="rId12"/>
+    <p:sldId id="265" r:id="rId13"/>
   </p:sldIdLst>
   <p:sldSz cx="12195175" cy="6858000"/>
   <p:notesSz cx="6858000" cy="9144000"/>
@@ -976,69 +977,20 @@
           <a:p>
             <a:r>
               <a:rPr lang="en-US" dirty="0"/>
-              <a:t>Demo:</a:t>
-            </a:r>
-            <a:r>
-              <a:rPr lang="en-US" baseline="0" dirty="0"/>
-              <a:t> get a pod + shell session with “</a:t>
-            </a:r>
-            <a:r>
-              <a:rPr lang="en-US" baseline="0" dirty="0" err="1"/>
-              <a:t>kubectl</a:t>
-            </a:r>
-            <a:r>
-              <a:rPr lang="en-US" baseline="0" dirty="0"/>
-              <a:t> run --</a:t>
-            </a:r>
-            <a:r>
-              <a:rPr lang="en-US" baseline="0" dirty="0" err="1"/>
-              <a:t>rm</a:t>
-            </a:r>
-            <a:r>
-              <a:rPr lang="en-US" baseline="0" dirty="0"/>
-              <a:t> -</a:t>
-            </a:r>
-            <a:r>
-              <a:rPr lang="en-US" baseline="0" dirty="0" err="1"/>
-              <a:t>ti</a:t>
-            </a:r>
-            <a:r>
-              <a:rPr lang="en-US" baseline="0" dirty="0"/>
-              <a:t> --image=</a:t>
-            </a:r>
-            <a:r>
-              <a:rPr lang="en-US" baseline="0" dirty="0" err="1"/>
-              <a:t>busybox</a:t>
-            </a:r>
-            <a:r>
-              <a:rPr lang="en-US" baseline="0" dirty="0"/>
-              <a:t> /</a:t>
-            </a:r>
-            <a:r>
-              <a:rPr lang="en-US" baseline="0"/>
-              <a:t>bin/sh</a:t>
-            </a:r>
-            <a:r>
-              <a:rPr lang="en-US" baseline="0" dirty="0"/>
-              <a:t>”; use the DNS name of a service to download an index.html (i.e. “</a:t>
-            </a:r>
-            <a:r>
-              <a:rPr lang="en-US" baseline="0" dirty="0" err="1"/>
-              <a:t>wget</a:t>
-            </a:r>
-            <a:r>
-              <a:rPr lang="en-US" baseline="0" dirty="0"/>
-              <a:t> </a:t>
-            </a:r>
-            <a:r>
-              <a:rPr lang="en-US" baseline="0" dirty="0" err="1"/>
-              <a:t>nginx</a:t>
-            </a:r>
-            <a:r>
-              <a:rPr lang="en-US" baseline="0" dirty="0"/>
-              <a:t>”)</a:t>
-            </a:r>
-            <a:endParaRPr lang="en-US" dirty="0"/>
+              <a:t>Usually a port is referenced by its value – the port number. However the port can be considered an interface and interfaces might change over time.</a:t>
+            </a:r>
+          </a:p>
+          <a:p>
+            <a:r>
+              <a:rPr lang="en-US" dirty="0"/>
+              <a:t>K8s offers to give a (DNS) name to any port on container &amp; service level. The DNS name is available cluster internally only, as the cluster DNS usually does not connect with an external DNS server.</a:t>
+            </a:r>
+          </a:p>
+          <a:p>
+            <a:r>
+              <a:rPr lang="en-US" dirty="0"/>
+              <a:t>Once you name ports, you can reference them by name and the value might change over time without impacting the application. </a:t>
+            </a:r>
           </a:p>
         </p:txBody>
       </p:sp>
@@ -1060,7 +1012,7 @@
             <a:fld id="{7D8C2C35-2B8A-446E-BEC0-FD36716C29AC}" type="slidenum">
               <a:rPr lang="de-DE" smtClean="0"/>
               <a:pPr/>
-              <a:t>8</a:t>
+              <a:t>7</a:t>
             </a:fld>
             <a:endParaRPr lang="de-DE" dirty="0"/>
           </a:p>
@@ -1069,7 +1021,7 @@
     </p:spTree>
     <p:extLst>
       <p:ext uri="{BB962C8B-B14F-4D97-AF65-F5344CB8AC3E}">
-        <p14:creationId xmlns:p14="http://schemas.microsoft.com/office/powerpoint/2010/main" val="4218195921"/>
+        <p14:creationId xmlns:p14="http://schemas.microsoft.com/office/powerpoint/2010/main" val="809206432"/>
       </p:ext>
     </p:extLst>
   </p:cSld>
@@ -1125,27 +1077,67 @@
           <a:p>
             <a:r>
               <a:rPr lang="en-US" dirty="0"/>
-              <a:t>A </a:t>
-            </a:r>
-            <a:r>
-              <a:rPr lang="en-US" dirty="0" err="1"/>
-              <a:t>nodePort</a:t>
-            </a:r>
-            <a:r>
-              <a:rPr lang="en-US" dirty="0"/>
-              <a:t> is a port that is opened on every node of the cluster. It is associated with a service and any incoming traffic at this </a:t>
-            </a:r>
-            <a:r>
-              <a:rPr lang="en-US" dirty="0" err="1"/>
-              <a:t>nodePort</a:t>
-            </a:r>
-            <a:r>
-              <a:rPr lang="en-US" dirty="0"/>
-              <a:t> will be routed to the corresponding service. From there it will be forwarded to service’s pods, regardless on which node it they </a:t>
-            </a:r>
-            <a:r>
-              <a:rPr lang="en-US"/>
-              <a:t>actually run.</a:t>
+              <a:t>Demo:</a:t>
+            </a:r>
+            <a:r>
+              <a:rPr lang="en-US" baseline="0" dirty="0"/>
+              <a:t> get a pod + shell session with “</a:t>
+            </a:r>
+            <a:r>
+              <a:rPr lang="en-US" baseline="0" dirty="0" err="1"/>
+              <a:t>kubectl</a:t>
+            </a:r>
+            <a:r>
+              <a:rPr lang="en-US" baseline="0" dirty="0"/>
+              <a:t> run --</a:t>
+            </a:r>
+            <a:r>
+              <a:rPr lang="en-US" baseline="0" dirty="0" err="1"/>
+              <a:t>rm</a:t>
+            </a:r>
+            <a:r>
+              <a:rPr lang="en-US" baseline="0" dirty="0"/>
+              <a:t> -</a:t>
+            </a:r>
+            <a:r>
+              <a:rPr lang="en-US" baseline="0" dirty="0" err="1"/>
+              <a:t>ti</a:t>
+            </a:r>
+            <a:r>
+              <a:rPr lang="en-US" baseline="0" dirty="0"/>
+              <a:t> --image=</a:t>
+            </a:r>
+            <a:r>
+              <a:rPr lang="en-US" baseline="0" dirty="0" err="1"/>
+              <a:t>busybox</a:t>
+            </a:r>
+            <a:r>
+              <a:rPr lang="en-US" baseline="0" dirty="0"/>
+              <a:t> /</a:t>
+            </a:r>
+            <a:r>
+              <a:rPr lang="en-US" baseline="0"/>
+              <a:t>bin/sh</a:t>
+            </a:r>
+            <a:r>
+              <a:rPr lang="en-US" baseline="0" dirty="0"/>
+              <a:t>”; use the DNS name of a service to download an index.html (i.e. “</a:t>
+            </a:r>
+            <a:r>
+              <a:rPr lang="en-US" baseline="0" dirty="0" err="1"/>
+              <a:t>wget</a:t>
+            </a:r>
+            <a:r>
+              <a:rPr lang="en-US" baseline="0" dirty="0"/>
+              <a:t> </a:t>
+            </a:r>
+            <a:r>
+              <a:rPr lang="en-US" baseline="0" dirty="0" err="1"/>
+              <a:t>nginx</a:t>
+            </a:r>
+            <a:r>
+              <a:rPr lang="en-US" baseline="0" dirty="0"/>
+              <a:t>”)</a:t>
             </a:r>
             <a:endParaRPr lang="en-US" dirty="0"/>
           </a:p>
@@ -1178,6 +1170,115 @@
     </p:spTree>
     <p:extLst>
       <p:ext uri="{BB962C8B-B14F-4D97-AF65-F5344CB8AC3E}">
+        <p14:creationId xmlns:p14="http://schemas.microsoft.com/office/powerpoint/2010/main" val="4218195921"/>
+      </p:ext>
+    </p:extLst>
+  </p:cSld>
+  <p:clrMapOvr>
+    <a:masterClrMapping/>
+  </p:clrMapOvr>
+</p:notes>
+</file>
+
+<file path=ppt/notesSlides/notesSlide7.xml><?xml version="1.0" encoding="utf-8"?>
+<p:notes xmlns:a="http://schemas.openxmlformats.org/drawingml/2006/main" xmlns:r="http://schemas.openxmlformats.org/officeDocument/2006/relationships" xmlns:p="http://schemas.openxmlformats.org/presentationml/2006/main">
+  <p:cSld>
+    <p:spTree>
+      <p:nvGrpSpPr>
+        <p:cNvPr id="1" name=""/>
+        <p:cNvGrpSpPr/>
+        <p:nvPr/>
+      </p:nvGrpSpPr>
+      <p:grpSpPr>
+        <a:xfrm>
+          <a:off x="0" y="0"/>
+          <a:ext cx="0" cy="0"/>
+          <a:chOff x="0" y="0"/>
+          <a:chExt cx="0" cy="0"/>
+        </a:xfrm>
+      </p:grpSpPr>
+      <p:sp>
+        <p:nvSpPr>
+          <p:cNvPr id="2" name="Slide Image Placeholder 1"/>
+          <p:cNvSpPr>
+            <a:spLocks noGrp="1" noRot="1" noChangeAspect="1"/>
+          </p:cNvSpPr>
+          <p:nvPr>
+            <p:ph type="sldImg"/>
+          </p:nvPr>
+        </p:nvSpPr>
+        <p:spPr/>
+      </p:sp>
+      <p:sp>
+        <p:nvSpPr>
+          <p:cNvPr id="3" name="Notes Placeholder 2"/>
+          <p:cNvSpPr>
+            <a:spLocks noGrp="1"/>
+          </p:cNvSpPr>
+          <p:nvPr>
+            <p:ph type="body" idx="1"/>
+          </p:nvPr>
+        </p:nvSpPr>
+        <p:spPr/>
+        <p:txBody>
+          <a:bodyPr/>
+          <a:lstStyle/>
+          <a:p>
+            <a:r>
+              <a:rPr lang="en-US" dirty="0"/>
+              <a:t>A </a:t>
+            </a:r>
+            <a:r>
+              <a:rPr lang="en-US" dirty="0" err="1"/>
+              <a:t>nodePort</a:t>
+            </a:r>
+            <a:r>
+              <a:rPr lang="en-US" dirty="0"/>
+              <a:t> is a port that is opened on every node of the cluster. It is associated with a service and any incoming traffic at this </a:t>
+            </a:r>
+            <a:r>
+              <a:rPr lang="en-US" dirty="0" err="1"/>
+              <a:t>nodePort</a:t>
+            </a:r>
+            <a:r>
+              <a:rPr lang="en-US" dirty="0"/>
+              <a:t> will be routed to the corresponding service. From there it will be forwarded to service’s pods, regardless on which node it they </a:t>
+            </a:r>
+            <a:r>
+              <a:rPr lang="en-US"/>
+              <a:t>actually run.</a:t>
+            </a:r>
+            <a:endParaRPr lang="en-US" dirty="0"/>
+          </a:p>
+        </p:txBody>
+      </p:sp>
+      <p:sp>
+        <p:nvSpPr>
+          <p:cNvPr id="4" name="Slide Number Placeholder 3"/>
+          <p:cNvSpPr>
+            <a:spLocks noGrp="1"/>
+          </p:cNvSpPr>
+          <p:nvPr>
+            <p:ph type="sldNum" sz="quarter" idx="10"/>
+          </p:nvPr>
+        </p:nvSpPr>
+        <p:spPr/>
+        <p:txBody>
+          <a:bodyPr/>
+          <a:lstStyle/>
+          <a:p>
+            <a:fld id="{7D8C2C35-2B8A-446E-BEC0-FD36716C29AC}" type="slidenum">
+              <a:rPr lang="de-DE" smtClean="0"/>
+              <a:pPr/>
+              <a:t>10</a:t>
+            </a:fld>
+            <a:endParaRPr lang="de-DE" dirty="0"/>
+          </a:p>
+        </p:txBody>
+      </p:sp>
+    </p:spTree>
+    <p:extLst>
+      <p:ext uri="{BB962C8B-B14F-4D97-AF65-F5344CB8AC3E}">
         <p14:creationId xmlns:p14="http://schemas.microsoft.com/office/powerpoint/2010/main" val="589324095"/>
       </p:ext>
     </p:extLst>
@@ -1188,7 +1289,7 @@
 </p:notes>
 </file>
 
-<file path=ppt/notesSlides/notesSlide7.xml><?xml version="1.0" encoding="utf-8"?>
+<file path=ppt/notesSlides/notesSlide8.xml><?xml version="1.0" encoding="utf-8"?>
 <p:notes xmlns:a="http://schemas.openxmlformats.org/drawingml/2006/main" xmlns:r="http://schemas.openxmlformats.org/officeDocument/2006/relationships" xmlns:p="http://schemas.openxmlformats.org/presentationml/2006/main">
   <p:cSld>
     <p:spTree>
@@ -1223,7 +1324,7 @@
             <a:fld id="{7D8C2C35-2B8A-446E-BEC0-FD36716C29AC}" type="slidenum">
               <a:rPr lang="de-DE" smtClean="0"/>
               <a:pPr/>
-              <a:t>11</a:t>
+              <a:t>12</a:t>
             </a:fld>
             <a:endParaRPr lang="de-DE" dirty="0"/>
           </a:p>
@@ -8855,6 +8956,1487 @@
 </file>
 
 <file path=ppt/slides/slide10.xml><?xml version="1.0" encoding="utf-8"?>
+<p:sld xmlns:a="http://schemas.openxmlformats.org/drawingml/2006/main" xmlns:r="http://schemas.openxmlformats.org/officeDocument/2006/relationships" xmlns:p="http://schemas.openxmlformats.org/presentationml/2006/main">
+  <p:cSld>
+    <p:spTree>
+      <p:nvGrpSpPr>
+        <p:cNvPr id="1" name=""/>
+        <p:cNvGrpSpPr/>
+        <p:nvPr/>
+      </p:nvGrpSpPr>
+      <p:grpSpPr>
+        <a:xfrm>
+          <a:off x="0" y="0"/>
+          <a:ext cx="0" cy="0"/>
+          <a:chOff x="0" y="0"/>
+          <a:chExt cx="0" cy="0"/>
+        </a:xfrm>
+      </p:grpSpPr>
+      <p:sp>
+        <p:nvSpPr>
+          <p:cNvPr id="21" name="Rectangle 20"/>
+          <p:cNvSpPr/>
+          <p:nvPr/>
+        </p:nvSpPr>
+        <p:spPr bwMode="gray">
+          <a:xfrm>
+            <a:off x="6141720" y="3390899"/>
+            <a:ext cx="4960620" cy="2865121"/>
+          </a:xfrm>
+          <a:prstGeom prst="rect">
+            <a:avLst/>
+          </a:prstGeom>
+          <a:ln>
+            <a:headEnd/>
+            <a:tailEnd/>
+          </a:ln>
+        </p:spPr>
+        <p:style>
+          <a:lnRef idx="2">
+            <a:schemeClr val="accent2"/>
+          </a:lnRef>
+          <a:fillRef idx="1">
+            <a:schemeClr val="lt1"/>
+          </a:fillRef>
+          <a:effectRef idx="0">
+            <a:schemeClr val="accent2"/>
+          </a:effectRef>
+          <a:fontRef idx="minor">
+            <a:schemeClr val="dk1"/>
+          </a:fontRef>
+        </p:style>
+        <p:txBody>
+          <a:bodyPr lIns="90000" tIns="72000" rIns="90000" bIns="72000" rtlCol="0" anchor="t"/>
+          <a:lstStyle/>
+          <a:p>
+            <a:pPr marR="0" algn="ctr" defTabSz="914400" eaLnBrk="1" fontAlgn="base" latinLnBrk="0" hangingPunct="1">
+              <a:lnSpc>
+                <a:spcPct val="100000"/>
+              </a:lnSpc>
+              <a:spcBef>
+                <a:spcPct val="50000"/>
+              </a:spcBef>
+              <a:spcAft>
+                <a:spcPct val="0"/>
+              </a:spcAft>
+              <a:buClr>
+                <a:srgbClr val="F0AB00"/>
+              </a:buClr>
+              <a:buSzPct val="80000"/>
+              <a:tabLst/>
+            </a:pPr>
+            <a:r>
+              <a:rPr kumimoji="0" lang="en-US" sz="1800" b="1" i="0" u="none" strike="noStrike" kern="0" cap="none" spc="0" normalizeH="0" baseline="0" noProof="0" dirty="0">
+                <a:ln>
+                  <a:noFill/>
+                </a:ln>
+                <a:effectLst/>
+                <a:uLnTx/>
+                <a:uFillTx/>
+                <a:ea typeface="Arial Unicode MS" pitchFamily="34" charset="-128"/>
+                <a:cs typeface="Arial Unicode MS" pitchFamily="34" charset="-128"/>
+              </a:rPr>
+              <a:t>Node B</a:t>
+            </a:r>
+          </a:p>
+        </p:txBody>
+      </p:sp>
+      <p:sp>
+        <p:nvSpPr>
+          <p:cNvPr id="2" name="Title 1"/>
+          <p:cNvSpPr>
+            <a:spLocks noGrp="1"/>
+          </p:cNvSpPr>
+          <p:nvPr>
+            <p:ph type="title"/>
+          </p:nvPr>
+        </p:nvSpPr>
+        <p:spPr/>
+        <p:txBody>
+          <a:bodyPr/>
+          <a:lstStyle/>
+          <a:p>
+            <a:r>
+              <a:rPr lang="en-US" dirty="0"/>
+              <a:t>How </a:t>
+            </a:r>
+            <a:r>
+              <a:rPr lang="en-US" dirty="0" err="1"/>
+              <a:t>NodePorts</a:t>
+            </a:r>
+            <a:r>
+              <a:rPr lang="en-US" dirty="0"/>
+              <a:t> work</a:t>
+            </a:r>
+          </a:p>
+        </p:txBody>
+      </p:sp>
+      <p:sp>
+        <p:nvSpPr>
+          <p:cNvPr id="4" name="Rectangle 3"/>
+          <p:cNvSpPr/>
+          <p:nvPr/>
+        </p:nvSpPr>
+        <p:spPr bwMode="gray">
+          <a:xfrm>
+            <a:off x="952500" y="3390900"/>
+            <a:ext cx="4960620" cy="2865120"/>
+          </a:xfrm>
+          <a:prstGeom prst="rect">
+            <a:avLst/>
+          </a:prstGeom>
+          <a:ln>
+            <a:headEnd/>
+            <a:tailEnd/>
+          </a:ln>
+        </p:spPr>
+        <p:style>
+          <a:lnRef idx="2">
+            <a:schemeClr val="accent2"/>
+          </a:lnRef>
+          <a:fillRef idx="1">
+            <a:schemeClr val="lt1"/>
+          </a:fillRef>
+          <a:effectRef idx="0">
+            <a:schemeClr val="accent2"/>
+          </a:effectRef>
+          <a:fontRef idx="minor">
+            <a:schemeClr val="dk1"/>
+          </a:fontRef>
+        </p:style>
+        <p:txBody>
+          <a:bodyPr lIns="90000" tIns="72000" rIns="90000" bIns="72000" rtlCol="0" anchor="t"/>
+          <a:lstStyle/>
+          <a:p>
+            <a:pPr marR="0" algn="ctr" defTabSz="914400" eaLnBrk="1" fontAlgn="base" latinLnBrk="0" hangingPunct="1">
+              <a:lnSpc>
+                <a:spcPct val="100000"/>
+              </a:lnSpc>
+              <a:spcBef>
+                <a:spcPct val="50000"/>
+              </a:spcBef>
+              <a:spcAft>
+                <a:spcPct val="0"/>
+              </a:spcAft>
+              <a:buClr>
+                <a:srgbClr val="F0AB00"/>
+              </a:buClr>
+              <a:buSzPct val="80000"/>
+              <a:tabLst/>
+            </a:pPr>
+            <a:r>
+              <a:rPr kumimoji="0" lang="en-US" sz="1800" b="1" i="0" u="none" strike="noStrike" kern="0" cap="none" spc="0" normalizeH="0" baseline="0" noProof="0" dirty="0">
+                <a:ln>
+                  <a:noFill/>
+                </a:ln>
+                <a:effectLst/>
+                <a:uLnTx/>
+                <a:uFillTx/>
+                <a:ea typeface="Arial Unicode MS" pitchFamily="34" charset="-128"/>
+                <a:cs typeface="Arial Unicode MS" pitchFamily="34" charset="-128"/>
+              </a:rPr>
+              <a:t>Node A</a:t>
+            </a:r>
+          </a:p>
+        </p:txBody>
+      </p:sp>
+      <p:sp>
+        <p:nvSpPr>
+          <p:cNvPr id="6" name="Rectangle 5"/>
+          <p:cNvSpPr/>
+          <p:nvPr/>
+        </p:nvSpPr>
+        <p:spPr bwMode="gray">
+          <a:xfrm>
+            <a:off x="2337562" y="4439970"/>
+            <a:ext cx="1815338" cy="1160859"/>
+          </a:xfrm>
+          <a:prstGeom prst="rect">
+            <a:avLst/>
+          </a:prstGeom>
+          <a:ln>
+            <a:headEnd/>
+            <a:tailEnd/>
+          </a:ln>
+        </p:spPr>
+        <p:style>
+          <a:lnRef idx="2">
+            <a:schemeClr val="accent2">
+              <a:shade val="50000"/>
+            </a:schemeClr>
+          </a:lnRef>
+          <a:fillRef idx="1">
+            <a:schemeClr val="accent2"/>
+          </a:fillRef>
+          <a:effectRef idx="0">
+            <a:schemeClr val="accent2"/>
+          </a:effectRef>
+          <a:fontRef idx="minor">
+            <a:schemeClr val="lt1"/>
+          </a:fontRef>
+        </p:style>
+        <p:txBody>
+          <a:bodyPr lIns="90000" tIns="72000" rIns="90000" bIns="72000" rtlCol="0" anchor="ctr"/>
+          <a:lstStyle/>
+          <a:p>
+            <a:pPr marR="0" algn="ctr" defTabSz="914400" eaLnBrk="1" fontAlgn="base" latinLnBrk="0" hangingPunct="1">
+              <a:lnSpc>
+                <a:spcPct val="100000"/>
+              </a:lnSpc>
+              <a:spcBef>
+                <a:spcPct val="50000"/>
+              </a:spcBef>
+              <a:spcAft>
+                <a:spcPct val="0"/>
+              </a:spcAft>
+              <a:buClr>
+                <a:srgbClr val="F0AB00"/>
+              </a:buClr>
+              <a:buSzPct val="80000"/>
+              <a:tabLst/>
+            </a:pPr>
+            <a:r>
+              <a:rPr lang="de-DE" sz="1600" b="1" kern="0" noProof="0" dirty="0" err="1">
+                <a:ea typeface="Arial Unicode MS" pitchFamily="34" charset="-128"/>
+                <a:cs typeface="Arial Unicode MS" pitchFamily="34" charset="-128"/>
+              </a:rPr>
+              <a:t>Pod</a:t>
+            </a:r>
+            <a:endParaRPr kumimoji="0" lang="de-DE" sz="1600" b="1" i="0" u="none" strike="noStrike" kern="0" cap="none" spc="0" normalizeH="0" baseline="0" noProof="0" dirty="0">
+              <a:ln>
+                <a:noFill/>
+              </a:ln>
+              <a:effectLst/>
+              <a:uLnTx/>
+              <a:uFillTx/>
+              <a:ea typeface="Arial Unicode MS" pitchFamily="34" charset="-128"/>
+              <a:cs typeface="Arial Unicode MS" pitchFamily="34" charset="-128"/>
+            </a:endParaRPr>
+          </a:p>
+        </p:txBody>
+      </p:sp>
+      <p:sp>
+        <p:nvSpPr>
+          <p:cNvPr id="11" name="Rectangle 10"/>
+          <p:cNvSpPr/>
+          <p:nvPr/>
+        </p:nvSpPr>
+        <p:spPr bwMode="gray">
+          <a:xfrm>
+            <a:off x="2422271" y="4205839"/>
+            <a:ext cx="1645920" cy="365760"/>
+          </a:xfrm>
+          <a:prstGeom prst="rect">
+            <a:avLst/>
+          </a:prstGeom>
+          <a:ln>
+            <a:headEnd/>
+            <a:tailEnd/>
+          </a:ln>
+        </p:spPr>
+        <p:style>
+          <a:lnRef idx="2">
+            <a:schemeClr val="accent2"/>
+          </a:lnRef>
+          <a:fillRef idx="1">
+            <a:schemeClr val="lt1"/>
+          </a:fillRef>
+          <a:effectRef idx="0">
+            <a:schemeClr val="accent2"/>
+          </a:effectRef>
+          <a:fontRef idx="minor">
+            <a:schemeClr val="dk1"/>
+          </a:fontRef>
+        </p:style>
+        <p:txBody>
+          <a:bodyPr lIns="90000" tIns="72000" rIns="90000" bIns="72000" rtlCol="0" anchor="ctr"/>
+          <a:lstStyle/>
+          <a:p>
+            <a:pPr marR="0" algn="ctr" defTabSz="914400" eaLnBrk="1" fontAlgn="base" latinLnBrk="0" hangingPunct="1">
+              <a:lnSpc>
+                <a:spcPct val="100000"/>
+              </a:lnSpc>
+              <a:spcBef>
+                <a:spcPct val="50000"/>
+              </a:spcBef>
+              <a:spcAft>
+                <a:spcPct val="0"/>
+              </a:spcAft>
+              <a:buClr>
+                <a:srgbClr val="F0AB00"/>
+              </a:buClr>
+              <a:buSzPct val="80000"/>
+              <a:tabLst/>
+            </a:pPr>
+            <a:r>
+              <a:rPr kumimoji="0" lang="de-DE" sz="1800" b="0" i="0" u="none" strike="noStrike" kern="0" cap="none" spc="0" normalizeH="0" baseline="0" noProof="0" dirty="0">
+                <a:ln>
+                  <a:noFill/>
+                </a:ln>
+                <a:effectLst/>
+                <a:uLnTx/>
+                <a:uFillTx/>
+                <a:ea typeface="Arial Unicode MS" pitchFamily="34" charset="-128"/>
+                <a:cs typeface="Arial Unicode MS" pitchFamily="34" charset="-128"/>
+              </a:rPr>
+              <a:t>IP: 10.10.10.1</a:t>
+            </a:r>
+          </a:p>
+        </p:txBody>
+      </p:sp>
+      <p:sp>
+        <p:nvSpPr>
+          <p:cNvPr id="14" name="Rectangle: Single Corner Snipped 13"/>
+          <p:cNvSpPr/>
+          <p:nvPr/>
+        </p:nvSpPr>
+        <p:spPr bwMode="gray">
+          <a:xfrm>
+            <a:off x="4806733" y="2743200"/>
+            <a:ext cx="2474332" cy="2346559"/>
+          </a:xfrm>
+          <a:prstGeom prst="snip1Rect">
+            <a:avLst/>
+          </a:prstGeom>
+          <a:ln>
+            <a:headEnd/>
+            <a:tailEnd/>
+          </a:ln>
+        </p:spPr>
+        <p:style>
+          <a:lnRef idx="3">
+            <a:schemeClr val="lt1"/>
+          </a:lnRef>
+          <a:fillRef idx="1">
+            <a:schemeClr val="accent2"/>
+          </a:fillRef>
+          <a:effectRef idx="1">
+            <a:schemeClr val="accent2"/>
+          </a:effectRef>
+          <a:fontRef idx="minor">
+            <a:schemeClr val="lt1"/>
+          </a:fontRef>
+        </p:style>
+        <p:txBody>
+          <a:bodyPr lIns="90000" tIns="72000" rIns="90000" bIns="72000" rtlCol="0" anchor="ctr"/>
+          <a:lstStyle/>
+          <a:p>
+            <a:pPr marR="0" algn="ctr" defTabSz="914400" eaLnBrk="1" fontAlgn="base" latinLnBrk="0" hangingPunct="1">
+              <a:lnSpc>
+                <a:spcPct val="100000"/>
+              </a:lnSpc>
+              <a:spcBef>
+                <a:spcPct val="50000"/>
+              </a:spcBef>
+              <a:spcAft>
+                <a:spcPct val="0"/>
+              </a:spcAft>
+              <a:buClr>
+                <a:srgbClr val="F0AB00"/>
+              </a:buClr>
+              <a:buSzPct val="80000"/>
+              <a:tabLst/>
+            </a:pPr>
+            <a:r>
+              <a:rPr kumimoji="0" lang="en-US" sz="1800" b="0" i="0" u="none" strike="noStrike" kern="0" cap="none" spc="0" normalizeH="0" baseline="0" noProof="0" dirty="0">
+                <a:ln>
+                  <a:noFill/>
+                </a:ln>
+                <a:effectLst/>
+                <a:uLnTx/>
+                <a:uFillTx/>
+                <a:ea typeface="Arial Unicode MS" pitchFamily="34" charset="-128"/>
+                <a:cs typeface="Arial Unicode MS" pitchFamily="34" charset="-128"/>
+              </a:rPr>
+              <a:t>Service</a:t>
+            </a:r>
+          </a:p>
+          <a:p>
+            <a:pPr marR="0" algn="ctr" defTabSz="914400" eaLnBrk="1" fontAlgn="base" latinLnBrk="0" hangingPunct="1">
+              <a:lnSpc>
+                <a:spcPct val="100000"/>
+              </a:lnSpc>
+              <a:spcBef>
+                <a:spcPct val="50000"/>
+              </a:spcBef>
+              <a:spcAft>
+                <a:spcPct val="0"/>
+              </a:spcAft>
+              <a:buClr>
+                <a:srgbClr val="F0AB00"/>
+              </a:buClr>
+              <a:buSzPct val="80000"/>
+              <a:tabLst/>
+            </a:pPr>
+            <a:r>
+              <a:rPr lang="en-US" sz="1800" kern="0" dirty="0">
+                <a:ea typeface="Arial Unicode MS" pitchFamily="34" charset="-128"/>
+                <a:cs typeface="Arial Unicode MS" pitchFamily="34" charset="-128"/>
+              </a:rPr>
+              <a:t>Label: app= </a:t>
+            </a:r>
+            <a:r>
+              <a:rPr lang="en-US" sz="1800" kern="0" dirty="0" err="1">
+                <a:ea typeface="Arial Unicode MS" pitchFamily="34" charset="-128"/>
+                <a:cs typeface="Arial Unicode MS" pitchFamily="34" charset="-128"/>
+              </a:rPr>
+              <a:t>nginx</a:t>
+            </a:r>
+            <a:endParaRPr kumimoji="0" lang="en-US" sz="1800" b="0" i="0" u="none" strike="noStrike" kern="0" cap="none" spc="0" normalizeH="0" baseline="0" noProof="0" dirty="0">
+              <a:ln>
+                <a:noFill/>
+              </a:ln>
+              <a:effectLst/>
+              <a:uLnTx/>
+              <a:uFillTx/>
+              <a:ea typeface="Arial Unicode MS" pitchFamily="34" charset="-128"/>
+              <a:cs typeface="Arial Unicode MS" pitchFamily="34" charset="-128"/>
+            </a:endParaRPr>
+          </a:p>
+          <a:p>
+            <a:pPr marL="285750" marR="0" indent="-285750" defTabSz="914400" eaLnBrk="1" fontAlgn="base" latinLnBrk="0" hangingPunct="1">
+              <a:lnSpc>
+                <a:spcPct val="100000"/>
+              </a:lnSpc>
+              <a:spcBef>
+                <a:spcPct val="50000"/>
+              </a:spcBef>
+              <a:spcAft>
+                <a:spcPct val="0"/>
+              </a:spcAft>
+              <a:buClr>
+                <a:srgbClr val="F0AB00"/>
+              </a:buClr>
+              <a:buSzPct val="80000"/>
+              <a:buFontTx/>
+              <a:buChar char="-"/>
+              <a:tabLst/>
+            </a:pPr>
+            <a:r>
+              <a:rPr lang="en-US" sz="1800" kern="0" dirty="0" err="1">
+                <a:ea typeface="Arial Unicode MS" pitchFamily="34" charset="-128"/>
+                <a:cs typeface="Arial Unicode MS" pitchFamily="34" charset="-128"/>
+              </a:rPr>
+              <a:t>NodePort</a:t>
+            </a:r>
+            <a:r>
+              <a:rPr lang="en-US" sz="1800" kern="0" dirty="0">
+                <a:ea typeface="Arial Unicode MS" pitchFamily="34" charset="-128"/>
+                <a:cs typeface="Arial Unicode MS" pitchFamily="34" charset="-128"/>
+              </a:rPr>
+              <a:t>: 30021</a:t>
+            </a:r>
+          </a:p>
+          <a:p>
+            <a:pPr marL="285750" marR="0" indent="-285750" defTabSz="914400" eaLnBrk="1" fontAlgn="base" latinLnBrk="0" hangingPunct="1">
+              <a:lnSpc>
+                <a:spcPct val="100000"/>
+              </a:lnSpc>
+              <a:spcBef>
+                <a:spcPct val="50000"/>
+              </a:spcBef>
+              <a:spcAft>
+                <a:spcPct val="0"/>
+              </a:spcAft>
+              <a:buClr>
+                <a:srgbClr val="F0AB00"/>
+              </a:buClr>
+              <a:buSzPct val="80000"/>
+              <a:buFontTx/>
+              <a:buChar char="-"/>
+              <a:tabLst/>
+            </a:pPr>
+            <a:r>
+              <a:rPr lang="en-US" sz="1800" kern="0" dirty="0">
+                <a:ea typeface="Arial Unicode MS" pitchFamily="34" charset="-128"/>
+                <a:cs typeface="Arial Unicode MS" pitchFamily="34" charset="-128"/>
+              </a:rPr>
+              <a:t> </a:t>
+            </a:r>
+            <a:r>
+              <a:rPr lang="en-US" sz="1800" kern="0" dirty="0" err="1">
+                <a:ea typeface="Arial Unicode MS" pitchFamily="34" charset="-128"/>
+                <a:cs typeface="Arial Unicode MS" pitchFamily="34" charset="-128"/>
+              </a:rPr>
+              <a:t>TargetPort</a:t>
+            </a:r>
+            <a:r>
+              <a:rPr lang="en-US" sz="1800" kern="0" dirty="0">
+                <a:ea typeface="Arial Unicode MS" pitchFamily="34" charset="-128"/>
+                <a:cs typeface="Arial Unicode MS" pitchFamily="34" charset="-128"/>
+              </a:rPr>
+              <a:t>: 80</a:t>
+            </a:r>
+          </a:p>
+          <a:p>
+            <a:pPr marL="285750" marR="0" indent="-285750" defTabSz="914400" eaLnBrk="1" fontAlgn="base" latinLnBrk="0" hangingPunct="1">
+              <a:lnSpc>
+                <a:spcPct val="100000"/>
+              </a:lnSpc>
+              <a:spcBef>
+                <a:spcPct val="50000"/>
+              </a:spcBef>
+              <a:spcAft>
+                <a:spcPct val="0"/>
+              </a:spcAft>
+              <a:buClr>
+                <a:srgbClr val="F0AB00"/>
+              </a:buClr>
+              <a:buSzPct val="80000"/>
+              <a:buFontTx/>
+              <a:buChar char="-"/>
+              <a:tabLst/>
+            </a:pPr>
+            <a:r>
+              <a:rPr kumimoji="0" lang="en-US" sz="1800" b="0" i="0" u="none" strike="noStrike" kern="0" cap="none" spc="0" normalizeH="0" baseline="0" noProof="0" dirty="0">
+                <a:ln>
+                  <a:noFill/>
+                </a:ln>
+                <a:effectLst/>
+                <a:uLnTx/>
+                <a:uFillTx/>
+                <a:ea typeface="Arial Unicode MS" pitchFamily="34" charset="-128"/>
+                <a:cs typeface="Arial Unicode MS" pitchFamily="34" charset="-128"/>
+              </a:rPr>
+              <a:t>Port: 80</a:t>
+            </a:r>
+          </a:p>
+        </p:txBody>
+      </p:sp>
+      <p:sp>
+        <p:nvSpPr>
+          <p:cNvPr id="15" name="Rectangle 14"/>
+          <p:cNvSpPr/>
+          <p:nvPr/>
+        </p:nvSpPr>
+        <p:spPr bwMode="gray">
+          <a:xfrm>
+            <a:off x="1459043" y="5386537"/>
+            <a:ext cx="1319714" cy="428584"/>
+          </a:xfrm>
+          <a:prstGeom prst="rect">
+            <a:avLst/>
+          </a:prstGeom>
+          <a:solidFill>
+            <a:schemeClr val="accent1">
+              <a:lumMod val="40000"/>
+              <a:lumOff val="60000"/>
+            </a:schemeClr>
+          </a:solidFill>
+          <a:ln>
+            <a:headEnd/>
+            <a:tailEnd/>
+          </a:ln>
+        </p:spPr>
+        <p:style>
+          <a:lnRef idx="2">
+            <a:schemeClr val="accent2"/>
+          </a:lnRef>
+          <a:fillRef idx="1">
+            <a:schemeClr val="lt1"/>
+          </a:fillRef>
+          <a:effectRef idx="0">
+            <a:schemeClr val="accent2"/>
+          </a:effectRef>
+          <a:fontRef idx="minor">
+            <a:schemeClr val="dk1"/>
+          </a:fontRef>
+        </p:style>
+        <p:txBody>
+          <a:bodyPr lIns="90000" tIns="72000" rIns="90000" bIns="72000" rtlCol="0" anchor="ctr"/>
+          <a:lstStyle/>
+          <a:p>
+            <a:pPr marR="0" algn="ctr" defTabSz="914400" eaLnBrk="1" fontAlgn="base" latinLnBrk="0" hangingPunct="1">
+              <a:lnSpc>
+                <a:spcPct val="100000"/>
+              </a:lnSpc>
+              <a:spcBef>
+                <a:spcPct val="50000"/>
+              </a:spcBef>
+              <a:spcAft>
+                <a:spcPct val="0"/>
+              </a:spcAft>
+              <a:buClr>
+                <a:srgbClr val="F0AB00"/>
+              </a:buClr>
+              <a:buSzPct val="80000"/>
+              <a:tabLst/>
+            </a:pPr>
+            <a:r>
+              <a:rPr lang="de-DE" sz="1800" kern="0" dirty="0">
+                <a:ea typeface="Arial Unicode MS" pitchFamily="34" charset="-128"/>
+                <a:cs typeface="Arial Unicode MS" pitchFamily="34" charset="-128"/>
+              </a:rPr>
+              <a:t>a</a:t>
+            </a:r>
+            <a:r>
+              <a:rPr kumimoji="0" lang="de-DE" sz="1800" b="0" i="0" u="none" strike="noStrike" kern="0" cap="none" spc="0" normalizeH="0" baseline="0" noProof="0" dirty="0">
+                <a:ln>
+                  <a:noFill/>
+                </a:ln>
+                <a:effectLst/>
+                <a:uLnTx/>
+                <a:uFillTx/>
+                <a:ea typeface="Arial Unicode MS" pitchFamily="34" charset="-128"/>
+                <a:cs typeface="Arial Unicode MS" pitchFamily="34" charset="-128"/>
+              </a:rPr>
+              <a:t>pp=</a:t>
+            </a:r>
+            <a:r>
+              <a:rPr kumimoji="0" lang="de-DE" sz="1800" b="0" i="0" u="none" strike="noStrike" kern="0" cap="none" spc="0" normalizeH="0" baseline="0" noProof="0" dirty="0" err="1">
+                <a:ln>
+                  <a:noFill/>
+                </a:ln>
+                <a:effectLst/>
+                <a:uLnTx/>
+                <a:uFillTx/>
+                <a:ea typeface="Arial Unicode MS" pitchFamily="34" charset="-128"/>
+                <a:cs typeface="Arial Unicode MS" pitchFamily="34" charset="-128"/>
+              </a:rPr>
+              <a:t>nginx</a:t>
+            </a:r>
+            <a:endParaRPr kumimoji="0" lang="de-DE" sz="1800" b="0" i="0" u="none" strike="noStrike" kern="0" cap="none" spc="0" normalizeH="0" baseline="0" noProof="0" dirty="0">
+              <a:ln>
+                <a:noFill/>
+              </a:ln>
+              <a:effectLst/>
+              <a:uLnTx/>
+              <a:uFillTx/>
+              <a:ea typeface="Arial Unicode MS" pitchFamily="34" charset="-128"/>
+              <a:cs typeface="Arial Unicode MS" pitchFamily="34" charset="-128"/>
+            </a:endParaRPr>
+          </a:p>
+        </p:txBody>
+      </p:sp>
+      <p:sp>
+        <p:nvSpPr>
+          <p:cNvPr id="18" name="Rectangle 17"/>
+          <p:cNvSpPr/>
+          <p:nvPr/>
+        </p:nvSpPr>
+        <p:spPr bwMode="gray">
+          <a:xfrm>
+            <a:off x="8045976" y="4446544"/>
+            <a:ext cx="1815338" cy="1160859"/>
+          </a:xfrm>
+          <a:prstGeom prst="rect">
+            <a:avLst/>
+          </a:prstGeom>
+          <a:ln>
+            <a:headEnd/>
+            <a:tailEnd/>
+          </a:ln>
+        </p:spPr>
+        <p:style>
+          <a:lnRef idx="2">
+            <a:schemeClr val="accent2">
+              <a:shade val="50000"/>
+            </a:schemeClr>
+          </a:lnRef>
+          <a:fillRef idx="1">
+            <a:schemeClr val="accent2"/>
+          </a:fillRef>
+          <a:effectRef idx="0">
+            <a:schemeClr val="accent2"/>
+          </a:effectRef>
+          <a:fontRef idx="minor">
+            <a:schemeClr val="lt1"/>
+          </a:fontRef>
+        </p:style>
+        <p:txBody>
+          <a:bodyPr lIns="90000" tIns="72000" rIns="90000" bIns="72000" rtlCol="0" anchor="ctr"/>
+          <a:lstStyle/>
+          <a:p>
+            <a:pPr marR="0" algn="ctr" defTabSz="914400" eaLnBrk="1" fontAlgn="base" latinLnBrk="0" hangingPunct="1">
+              <a:lnSpc>
+                <a:spcPct val="100000"/>
+              </a:lnSpc>
+              <a:spcBef>
+                <a:spcPct val="50000"/>
+              </a:spcBef>
+              <a:spcAft>
+                <a:spcPct val="0"/>
+              </a:spcAft>
+              <a:buClr>
+                <a:srgbClr val="F0AB00"/>
+              </a:buClr>
+              <a:buSzPct val="80000"/>
+              <a:tabLst/>
+            </a:pPr>
+            <a:r>
+              <a:rPr lang="de-DE" sz="1600" b="1" kern="0" noProof="0" dirty="0" err="1">
+                <a:ea typeface="Arial Unicode MS" pitchFamily="34" charset="-128"/>
+                <a:cs typeface="Arial Unicode MS" pitchFamily="34" charset="-128"/>
+              </a:rPr>
+              <a:t>Pod</a:t>
+            </a:r>
+            <a:endParaRPr kumimoji="0" lang="de-DE" sz="1600" b="1" i="0" u="none" strike="noStrike" kern="0" cap="none" spc="0" normalizeH="0" baseline="0" noProof="0" dirty="0">
+              <a:ln>
+                <a:noFill/>
+              </a:ln>
+              <a:effectLst/>
+              <a:uLnTx/>
+              <a:uFillTx/>
+              <a:ea typeface="Arial Unicode MS" pitchFamily="34" charset="-128"/>
+              <a:cs typeface="Arial Unicode MS" pitchFamily="34" charset="-128"/>
+            </a:endParaRPr>
+          </a:p>
+        </p:txBody>
+      </p:sp>
+      <p:sp>
+        <p:nvSpPr>
+          <p:cNvPr id="19" name="Rectangle 18"/>
+          <p:cNvSpPr/>
+          <p:nvPr/>
+        </p:nvSpPr>
+        <p:spPr bwMode="gray">
+          <a:xfrm>
+            <a:off x="7208370" y="5386537"/>
+            <a:ext cx="1319714" cy="428584"/>
+          </a:xfrm>
+          <a:prstGeom prst="rect">
+            <a:avLst/>
+          </a:prstGeom>
+          <a:ln>
+            <a:headEnd/>
+            <a:tailEnd/>
+          </a:ln>
+        </p:spPr>
+        <p:style>
+          <a:lnRef idx="2">
+            <a:schemeClr val="accent2"/>
+          </a:lnRef>
+          <a:fillRef idx="1">
+            <a:schemeClr val="lt1"/>
+          </a:fillRef>
+          <a:effectRef idx="0">
+            <a:schemeClr val="accent2"/>
+          </a:effectRef>
+          <a:fontRef idx="minor">
+            <a:schemeClr val="dk1"/>
+          </a:fontRef>
+        </p:style>
+        <p:txBody>
+          <a:bodyPr lIns="90000" tIns="72000" rIns="90000" bIns="72000" rtlCol="0" anchor="ctr"/>
+          <a:lstStyle/>
+          <a:p>
+            <a:pPr marR="0" algn="ctr" defTabSz="914400" eaLnBrk="1" fontAlgn="base" latinLnBrk="0" hangingPunct="1">
+              <a:lnSpc>
+                <a:spcPct val="100000"/>
+              </a:lnSpc>
+              <a:spcBef>
+                <a:spcPct val="50000"/>
+              </a:spcBef>
+              <a:spcAft>
+                <a:spcPct val="0"/>
+              </a:spcAft>
+              <a:buClr>
+                <a:srgbClr val="F0AB00"/>
+              </a:buClr>
+              <a:buSzPct val="80000"/>
+              <a:tabLst/>
+            </a:pPr>
+            <a:r>
+              <a:rPr lang="de-DE" sz="1800" kern="0" dirty="0">
+                <a:ea typeface="Arial Unicode MS" pitchFamily="34" charset="-128"/>
+                <a:cs typeface="Arial Unicode MS" pitchFamily="34" charset="-128"/>
+              </a:rPr>
+              <a:t>a</a:t>
+            </a:r>
+            <a:r>
+              <a:rPr kumimoji="0" lang="de-DE" sz="1800" b="0" i="0" u="none" strike="noStrike" kern="0" cap="none" spc="0" normalizeH="0" baseline="0" noProof="0" dirty="0">
+                <a:ln>
+                  <a:noFill/>
+                </a:ln>
+                <a:effectLst/>
+                <a:uLnTx/>
+                <a:uFillTx/>
+                <a:ea typeface="Arial Unicode MS" pitchFamily="34" charset="-128"/>
+                <a:cs typeface="Arial Unicode MS" pitchFamily="34" charset="-128"/>
+              </a:rPr>
+              <a:t>pp=</a:t>
+            </a:r>
+            <a:r>
+              <a:rPr kumimoji="0" lang="de-DE" sz="1800" b="0" i="0" u="none" strike="noStrike" kern="0" cap="none" spc="0" normalizeH="0" baseline="0" noProof="0" dirty="0" err="1">
+                <a:ln>
+                  <a:noFill/>
+                </a:ln>
+                <a:effectLst/>
+                <a:uLnTx/>
+                <a:uFillTx/>
+                <a:ea typeface="Arial Unicode MS" pitchFamily="34" charset="-128"/>
+                <a:cs typeface="Arial Unicode MS" pitchFamily="34" charset="-128"/>
+              </a:rPr>
+              <a:t>client</a:t>
+            </a:r>
+            <a:endParaRPr kumimoji="0" lang="de-DE" sz="1800" b="0" i="0" u="none" strike="noStrike" kern="0" cap="none" spc="0" normalizeH="0" baseline="0" noProof="0" dirty="0">
+              <a:ln>
+                <a:noFill/>
+              </a:ln>
+              <a:effectLst/>
+              <a:uLnTx/>
+              <a:uFillTx/>
+              <a:ea typeface="Arial Unicode MS" pitchFamily="34" charset="-128"/>
+              <a:cs typeface="Arial Unicode MS" pitchFamily="34" charset="-128"/>
+            </a:endParaRPr>
+          </a:p>
+        </p:txBody>
+      </p:sp>
+      <p:sp>
+        <p:nvSpPr>
+          <p:cNvPr id="20" name="Rectangle 19"/>
+          <p:cNvSpPr/>
+          <p:nvPr/>
+        </p:nvSpPr>
+        <p:spPr bwMode="gray">
+          <a:xfrm>
+            <a:off x="9575331" y="5386537"/>
+            <a:ext cx="1073656" cy="428584"/>
+          </a:xfrm>
+          <a:prstGeom prst="rect">
+            <a:avLst/>
+          </a:prstGeom>
+          <a:ln>
+            <a:headEnd/>
+            <a:tailEnd/>
+          </a:ln>
+        </p:spPr>
+        <p:style>
+          <a:lnRef idx="2">
+            <a:schemeClr val="accent2"/>
+          </a:lnRef>
+          <a:fillRef idx="1">
+            <a:schemeClr val="lt1"/>
+          </a:fillRef>
+          <a:effectRef idx="0">
+            <a:schemeClr val="accent2"/>
+          </a:effectRef>
+          <a:fontRef idx="minor">
+            <a:schemeClr val="dk1"/>
+          </a:fontRef>
+        </p:style>
+        <p:txBody>
+          <a:bodyPr lIns="90000" tIns="72000" rIns="90000" bIns="72000" rtlCol="0" anchor="ctr"/>
+          <a:lstStyle/>
+          <a:p>
+            <a:pPr marR="0" algn="ctr" defTabSz="914400" eaLnBrk="1" fontAlgn="base" latinLnBrk="0" hangingPunct="1">
+              <a:lnSpc>
+                <a:spcPct val="100000"/>
+              </a:lnSpc>
+              <a:spcBef>
+                <a:spcPct val="50000"/>
+              </a:spcBef>
+              <a:spcAft>
+                <a:spcPct val="0"/>
+              </a:spcAft>
+              <a:buClr>
+                <a:srgbClr val="F0AB00"/>
+              </a:buClr>
+              <a:buSzPct val="80000"/>
+              <a:tabLst/>
+            </a:pPr>
+            <a:r>
+              <a:rPr lang="de-DE" sz="1800" kern="0" dirty="0">
+                <a:ea typeface="Arial Unicode MS" pitchFamily="34" charset="-128"/>
+                <a:cs typeface="Arial Unicode MS" pitchFamily="34" charset="-128"/>
+              </a:rPr>
+              <a:t>Port: 80</a:t>
+            </a:r>
+            <a:endParaRPr kumimoji="0" lang="de-DE" sz="1800" b="0" i="0" u="none" strike="noStrike" kern="0" cap="none" spc="0" normalizeH="0" baseline="0" noProof="0" dirty="0">
+              <a:ln>
+                <a:noFill/>
+              </a:ln>
+              <a:effectLst/>
+              <a:uLnTx/>
+              <a:uFillTx/>
+              <a:ea typeface="Arial Unicode MS" pitchFamily="34" charset="-128"/>
+              <a:cs typeface="Arial Unicode MS" pitchFamily="34" charset="-128"/>
+            </a:endParaRPr>
+          </a:p>
+        </p:txBody>
+      </p:sp>
+      <p:sp>
+        <p:nvSpPr>
+          <p:cNvPr id="17" name="Rectangle 16"/>
+          <p:cNvSpPr/>
+          <p:nvPr/>
+        </p:nvSpPr>
+        <p:spPr bwMode="gray">
+          <a:xfrm>
+            <a:off x="3826004" y="5386537"/>
+            <a:ext cx="1073656" cy="428584"/>
+          </a:xfrm>
+          <a:prstGeom prst="rect">
+            <a:avLst/>
+          </a:prstGeom>
+          <a:ln>
+            <a:headEnd/>
+            <a:tailEnd/>
+          </a:ln>
+        </p:spPr>
+        <p:style>
+          <a:lnRef idx="2">
+            <a:schemeClr val="accent2"/>
+          </a:lnRef>
+          <a:fillRef idx="1">
+            <a:schemeClr val="lt1"/>
+          </a:fillRef>
+          <a:effectRef idx="0">
+            <a:schemeClr val="accent2"/>
+          </a:effectRef>
+          <a:fontRef idx="minor">
+            <a:schemeClr val="dk1"/>
+          </a:fontRef>
+        </p:style>
+        <p:txBody>
+          <a:bodyPr lIns="90000" tIns="72000" rIns="90000" bIns="72000" rtlCol="0" anchor="ctr"/>
+          <a:lstStyle/>
+          <a:p>
+            <a:pPr marR="0" algn="ctr" defTabSz="914400" eaLnBrk="1" fontAlgn="base" latinLnBrk="0" hangingPunct="1">
+              <a:lnSpc>
+                <a:spcPct val="100000"/>
+              </a:lnSpc>
+              <a:spcBef>
+                <a:spcPct val="50000"/>
+              </a:spcBef>
+              <a:spcAft>
+                <a:spcPct val="0"/>
+              </a:spcAft>
+              <a:buClr>
+                <a:srgbClr val="F0AB00"/>
+              </a:buClr>
+              <a:buSzPct val="80000"/>
+              <a:tabLst/>
+            </a:pPr>
+            <a:r>
+              <a:rPr lang="de-DE" sz="1800" kern="0" dirty="0">
+                <a:ea typeface="Arial Unicode MS" pitchFamily="34" charset="-128"/>
+                <a:cs typeface="Arial Unicode MS" pitchFamily="34" charset="-128"/>
+              </a:rPr>
+              <a:t>Port: 80</a:t>
+            </a:r>
+            <a:endParaRPr kumimoji="0" lang="de-DE" sz="1800" b="0" i="0" u="none" strike="noStrike" kern="0" cap="none" spc="0" normalizeH="0" baseline="0" noProof="0" dirty="0">
+              <a:ln>
+                <a:noFill/>
+              </a:ln>
+              <a:effectLst/>
+              <a:uLnTx/>
+              <a:uFillTx/>
+              <a:ea typeface="Arial Unicode MS" pitchFamily="34" charset="-128"/>
+              <a:cs typeface="Arial Unicode MS" pitchFamily="34" charset="-128"/>
+            </a:endParaRPr>
+          </a:p>
+        </p:txBody>
+      </p:sp>
+      <p:sp>
+        <p:nvSpPr>
+          <p:cNvPr id="13" name="Rectangle 12"/>
+          <p:cNvSpPr/>
+          <p:nvPr/>
+        </p:nvSpPr>
+        <p:spPr bwMode="gray">
+          <a:xfrm>
+            <a:off x="8130685" y="4205839"/>
+            <a:ext cx="1645920" cy="365760"/>
+          </a:xfrm>
+          <a:prstGeom prst="rect">
+            <a:avLst/>
+          </a:prstGeom>
+          <a:ln>
+            <a:headEnd/>
+            <a:tailEnd/>
+          </a:ln>
+        </p:spPr>
+        <p:style>
+          <a:lnRef idx="2">
+            <a:schemeClr val="accent2"/>
+          </a:lnRef>
+          <a:fillRef idx="1">
+            <a:schemeClr val="lt1"/>
+          </a:fillRef>
+          <a:effectRef idx="0">
+            <a:schemeClr val="accent2"/>
+          </a:effectRef>
+          <a:fontRef idx="minor">
+            <a:schemeClr val="dk1"/>
+          </a:fontRef>
+        </p:style>
+        <p:txBody>
+          <a:bodyPr lIns="90000" tIns="72000" rIns="90000" bIns="72000" rtlCol="0" anchor="ctr"/>
+          <a:lstStyle/>
+          <a:p>
+            <a:pPr marR="0" algn="ctr" defTabSz="914400" eaLnBrk="1" fontAlgn="base" latinLnBrk="0" hangingPunct="1">
+              <a:lnSpc>
+                <a:spcPct val="100000"/>
+              </a:lnSpc>
+              <a:spcBef>
+                <a:spcPct val="50000"/>
+              </a:spcBef>
+              <a:spcAft>
+                <a:spcPct val="0"/>
+              </a:spcAft>
+              <a:buClr>
+                <a:srgbClr val="F0AB00"/>
+              </a:buClr>
+              <a:buSzPct val="80000"/>
+              <a:tabLst/>
+            </a:pPr>
+            <a:r>
+              <a:rPr kumimoji="0" lang="de-DE" sz="1800" b="0" i="0" u="none" strike="noStrike" kern="0" cap="none" spc="0" normalizeH="0" baseline="0" noProof="0" dirty="0">
+                <a:ln>
+                  <a:noFill/>
+                </a:ln>
+                <a:effectLst/>
+                <a:uLnTx/>
+                <a:uFillTx/>
+                <a:ea typeface="Arial Unicode MS" pitchFamily="34" charset="-128"/>
+                <a:cs typeface="Arial Unicode MS" pitchFamily="34" charset="-128"/>
+              </a:rPr>
+              <a:t>IP: 10.10.10.3</a:t>
+            </a:r>
+          </a:p>
+        </p:txBody>
+      </p:sp>
+      <p:sp>
+        <p:nvSpPr>
+          <p:cNvPr id="22" name="Rectangle 21"/>
+          <p:cNvSpPr/>
+          <p:nvPr/>
+        </p:nvSpPr>
+        <p:spPr bwMode="gray">
+          <a:xfrm>
+            <a:off x="341121" y="3227860"/>
+            <a:ext cx="2124327" cy="428584"/>
+          </a:xfrm>
+          <a:prstGeom prst="rect">
+            <a:avLst/>
+          </a:prstGeom>
+          <a:ln>
+            <a:headEnd/>
+            <a:tailEnd/>
+          </a:ln>
+        </p:spPr>
+        <p:style>
+          <a:lnRef idx="2">
+            <a:schemeClr val="accent5"/>
+          </a:lnRef>
+          <a:fillRef idx="1">
+            <a:schemeClr val="lt1"/>
+          </a:fillRef>
+          <a:effectRef idx="0">
+            <a:schemeClr val="accent5"/>
+          </a:effectRef>
+          <a:fontRef idx="minor">
+            <a:schemeClr val="dk1"/>
+          </a:fontRef>
+        </p:style>
+        <p:txBody>
+          <a:bodyPr lIns="90000" tIns="72000" rIns="90000" bIns="72000" rtlCol="0" anchor="ctr"/>
+          <a:lstStyle/>
+          <a:p>
+            <a:pPr marR="0" algn="ctr" defTabSz="914400" eaLnBrk="1" fontAlgn="base" latinLnBrk="0" hangingPunct="1">
+              <a:lnSpc>
+                <a:spcPct val="100000"/>
+              </a:lnSpc>
+              <a:spcBef>
+                <a:spcPct val="50000"/>
+              </a:spcBef>
+              <a:spcAft>
+                <a:spcPct val="0"/>
+              </a:spcAft>
+              <a:buClr>
+                <a:srgbClr val="F0AB00"/>
+              </a:buClr>
+              <a:buSzPct val="80000"/>
+              <a:tabLst/>
+            </a:pPr>
+            <a:r>
+              <a:rPr lang="de-DE" sz="1800" kern="0" dirty="0" err="1">
+                <a:ea typeface="Arial Unicode MS" pitchFamily="34" charset="-128"/>
+                <a:cs typeface="Arial Unicode MS" pitchFamily="34" charset="-128"/>
+              </a:rPr>
+              <a:t>NodePort</a:t>
+            </a:r>
+            <a:r>
+              <a:rPr lang="de-DE" sz="1800" kern="0" dirty="0">
+                <a:ea typeface="Arial Unicode MS" pitchFamily="34" charset="-128"/>
+                <a:cs typeface="Arial Unicode MS" pitchFamily="34" charset="-128"/>
+              </a:rPr>
+              <a:t>: 30021</a:t>
+            </a:r>
+            <a:endParaRPr kumimoji="0" lang="de-DE" sz="1800" b="0" i="0" u="none" strike="noStrike" kern="0" cap="none" spc="0" normalizeH="0" baseline="0" noProof="0" dirty="0">
+              <a:ln>
+                <a:noFill/>
+              </a:ln>
+              <a:effectLst/>
+              <a:uLnTx/>
+              <a:uFillTx/>
+              <a:ea typeface="Arial Unicode MS" pitchFamily="34" charset="-128"/>
+              <a:cs typeface="Arial Unicode MS" pitchFamily="34" charset="-128"/>
+            </a:endParaRPr>
+          </a:p>
+        </p:txBody>
+      </p:sp>
+      <p:sp>
+        <p:nvSpPr>
+          <p:cNvPr id="23" name="Rectangle 22"/>
+          <p:cNvSpPr/>
+          <p:nvPr/>
+        </p:nvSpPr>
+        <p:spPr bwMode="gray">
+          <a:xfrm>
+            <a:off x="9566150" y="3227860"/>
+            <a:ext cx="2124327" cy="428584"/>
+          </a:xfrm>
+          <a:prstGeom prst="rect">
+            <a:avLst/>
+          </a:prstGeom>
+          <a:ln>
+            <a:headEnd/>
+            <a:tailEnd/>
+          </a:ln>
+        </p:spPr>
+        <p:style>
+          <a:lnRef idx="2">
+            <a:schemeClr val="accent5"/>
+          </a:lnRef>
+          <a:fillRef idx="1">
+            <a:schemeClr val="lt1"/>
+          </a:fillRef>
+          <a:effectRef idx="0">
+            <a:schemeClr val="accent5"/>
+          </a:effectRef>
+          <a:fontRef idx="minor">
+            <a:schemeClr val="dk1"/>
+          </a:fontRef>
+        </p:style>
+        <p:txBody>
+          <a:bodyPr lIns="90000" tIns="72000" rIns="90000" bIns="72000" rtlCol="0" anchor="ctr"/>
+          <a:lstStyle/>
+          <a:p>
+            <a:pPr marR="0" algn="ctr" defTabSz="914400" eaLnBrk="1" fontAlgn="base" latinLnBrk="0" hangingPunct="1">
+              <a:lnSpc>
+                <a:spcPct val="100000"/>
+              </a:lnSpc>
+              <a:spcBef>
+                <a:spcPct val="50000"/>
+              </a:spcBef>
+              <a:spcAft>
+                <a:spcPct val="0"/>
+              </a:spcAft>
+              <a:buClr>
+                <a:srgbClr val="F0AB00"/>
+              </a:buClr>
+              <a:buSzPct val="80000"/>
+              <a:tabLst/>
+            </a:pPr>
+            <a:r>
+              <a:rPr lang="de-DE" sz="1800" kern="0" dirty="0" err="1">
+                <a:ea typeface="Arial Unicode MS" pitchFamily="34" charset="-128"/>
+                <a:cs typeface="Arial Unicode MS" pitchFamily="34" charset="-128"/>
+              </a:rPr>
+              <a:t>NodePort</a:t>
+            </a:r>
+            <a:r>
+              <a:rPr lang="de-DE" sz="1800" kern="0" dirty="0">
+                <a:ea typeface="Arial Unicode MS" pitchFamily="34" charset="-128"/>
+                <a:cs typeface="Arial Unicode MS" pitchFamily="34" charset="-128"/>
+              </a:rPr>
+              <a:t>: 30021</a:t>
+            </a:r>
+            <a:endParaRPr kumimoji="0" lang="de-DE" sz="1800" b="0" i="0" u="none" strike="noStrike" kern="0" cap="none" spc="0" normalizeH="0" baseline="0" noProof="0" dirty="0">
+              <a:ln>
+                <a:noFill/>
+              </a:ln>
+              <a:effectLst/>
+              <a:uLnTx/>
+              <a:uFillTx/>
+              <a:ea typeface="Arial Unicode MS" pitchFamily="34" charset="-128"/>
+              <a:cs typeface="Arial Unicode MS" pitchFamily="34" charset="-128"/>
+            </a:endParaRPr>
+          </a:p>
+        </p:txBody>
+      </p:sp>
+      <p:sp>
+        <p:nvSpPr>
+          <p:cNvPr id="24" name="Cloud 23"/>
+          <p:cNvSpPr/>
+          <p:nvPr/>
+        </p:nvSpPr>
+        <p:spPr bwMode="gray">
+          <a:xfrm>
+            <a:off x="4348821" y="1057695"/>
+            <a:ext cx="3496836" cy="1074420"/>
+          </a:xfrm>
+          <a:prstGeom prst="cloud">
+            <a:avLst/>
+          </a:prstGeom>
+          <a:solidFill>
+            <a:schemeClr val="accent1"/>
+          </a:solidFill>
+          <a:ln w="6350" algn="ctr">
+            <a:noFill/>
+            <a:miter lim="800000"/>
+            <a:headEnd/>
+            <a:tailEnd/>
+          </a:ln>
+        </p:spPr>
+        <p:txBody>
+          <a:bodyPr lIns="90000" tIns="72000" rIns="90000" bIns="72000" rtlCol="0" anchor="ctr"/>
+          <a:lstStyle/>
+          <a:p>
+            <a:pPr marR="0" algn="ctr" defTabSz="914400" eaLnBrk="1" fontAlgn="base" latinLnBrk="0" hangingPunct="1">
+              <a:lnSpc>
+                <a:spcPct val="100000"/>
+              </a:lnSpc>
+              <a:spcBef>
+                <a:spcPct val="50000"/>
+              </a:spcBef>
+              <a:spcAft>
+                <a:spcPct val="0"/>
+              </a:spcAft>
+              <a:buClr>
+                <a:srgbClr val="F0AB00"/>
+              </a:buClr>
+              <a:buSzPct val="80000"/>
+              <a:tabLst/>
+            </a:pPr>
+            <a:r>
+              <a:rPr lang="en-US" sz="1800" kern="0" dirty="0">
+                <a:ea typeface="Arial Unicode MS" pitchFamily="34" charset="-128"/>
+                <a:cs typeface="Arial Unicode MS" pitchFamily="34" charset="-128"/>
+              </a:rPr>
+              <a:t>GET: nginx:30021</a:t>
+            </a:r>
+            <a:endParaRPr kumimoji="0" lang="en-US" sz="1800" b="0" i="0" u="none" strike="noStrike" kern="0" cap="none" spc="0" normalizeH="0" baseline="0" noProof="0" dirty="0" err="1">
+              <a:ln>
+                <a:noFill/>
+              </a:ln>
+              <a:effectLst/>
+              <a:uLnTx/>
+              <a:uFillTx/>
+              <a:ea typeface="Arial Unicode MS" pitchFamily="34" charset="-128"/>
+              <a:cs typeface="Arial Unicode MS" pitchFamily="34" charset="-128"/>
+            </a:endParaRPr>
+          </a:p>
+        </p:txBody>
+      </p:sp>
+      <p:cxnSp>
+        <p:nvCxnSpPr>
+          <p:cNvPr id="26" name="Connector: Elbow 25"/>
+          <p:cNvCxnSpPr>
+            <a:stCxn id="24" idx="2"/>
+            <a:endCxn id="22" idx="0"/>
+          </p:cNvCxnSpPr>
+          <p:nvPr/>
+        </p:nvCxnSpPr>
+        <p:spPr>
+          <a:xfrm rot="10800000" flipV="1">
+            <a:off x="1403286" y="1594904"/>
+            <a:ext cx="2956383" cy="1632955"/>
+          </a:xfrm>
+          <a:prstGeom prst="bentConnector2">
+            <a:avLst/>
+          </a:prstGeom>
+          <a:ln w="57150">
+            <a:solidFill>
+              <a:schemeClr val="tx2"/>
+            </a:solidFill>
+            <a:headEnd type="none" w="med" len="med"/>
+            <a:tailEnd type="triangle"/>
+          </a:ln>
+        </p:spPr>
+        <p:style>
+          <a:lnRef idx="1">
+            <a:schemeClr val="accent1"/>
+          </a:lnRef>
+          <a:fillRef idx="0">
+            <a:schemeClr val="accent1"/>
+          </a:fillRef>
+          <a:effectRef idx="0">
+            <a:schemeClr val="accent1"/>
+          </a:effectRef>
+          <a:fontRef idx="minor">
+            <a:schemeClr val="tx1"/>
+          </a:fontRef>
+        </p:style>
+      </p:cxnSp>
+      <p:cxnSp>
+        <p:nvCxnSpPr>
+          <p:cNvPr id="27" name="Connector: Elbow 26"/>
+          <p:cNvCxnSpPr>
+            <a:stCxn id="24" idx="0"/>
+            <a:endCxn id="23" idx="0"/>
+          </p:cNvCxnSpPr>
+          <p:nvPr/>
+        </p:nvCxnSpPr>
+        <p:spPr>
+          <a:xfrm>
+            <a:off x="7842743" y="1594905"/>
+            <a:ext cx="2785571" cy="1632955"/>
+          </a:xfrm>
+          <a:prstGeom prst="bentConnector2">
+            <a:avLst/>
+          </a:prstGeom>
+          <a:ln w="57150">
+            <a:solidFill>
+              <a:schemeClr val="tx2"/>
+            </a:solidFill>
+            <a:headEnd type="none" w="med" len="med"/>
+            <a:tailEnd type="triangle"/>
+          </a:ln>
+        </p:spPr>
+        <p:style>
+          <a:lnRef idx="1">
+            <a:schemeClr val="accent1"/>
+          </a:lnRef>
+          <a:fillRef idx="0">
+            <a:schemeClr val="accent1"/>
+          </a:fillRef>
+          <a:effectRef idx="0">
+            <a:schemeClr val="accent1"/>
+          </a:effectRef>
+          <a:fontRef idx="minor">
+            <a:schemeClr val="tx1"/>
+          </a:fontRef>
+        </p:style>
+      </p:cxnSp>
+      <p:cxnSp>
+        <p:nvCxnSpPr>
+          <p:cNvPr id="30" name="Connector: Elbow 29"/>
+          <p:cNvCxnSpPr>
+            <a:stCxn id="23" idx="2"/>
+            <a:endCxn id="14" idx="0"/>
+          </p:cNvCxnSpPr>
+          <p:nvPr/>
+        </p:nvCxnSpPr>
+        <p:spPr>
+          <a:xfrm rot="5400000">
+            <a:off x="8824672" y="2112838"/>
+            <a:ext cx="260036" cy="3347249"/>
+          </a:xfrm>
+          <a:prstGeom prst="bentConnector2">
+            <a:avLst/>
+          </a:prstGeom>
+          <a:ln w="57150">
+            <a:solidFill>
+              <a:schemeClr val="tx2"/>
+            </a:solidFill>
+            <a:headEnd type="none" w="med" len="med"/>
+            <a:tailEnd type="triangle"/>
+          </a:ln>
+        </p:spPr>
+        <p:style>
+          <a:lnRef idx="1">
+            <a:schemeClr val="accent1"/>
+          </a:lnRef>
+          <a:fillRef idx="0">
+            <a:schemeClr val="accent1"/>
+          </a:fillRef>
+          <a:effectRef idx="0">
+            <a:schemeClr val="accent1"/>
+          </a:effectRef>
+          <a:fontRef idx="minor">
+            <a:schemeClr val="tx1"/>
+          </a:fontRef>
+        </p:style>
+      </p:cxnSp>
+      <p:cxnSp>
+        <p:nvCxnSpPr>
+          <p:cNvPr id="33" name="Connector: Elbow 32"/>
+          <p:cNvCxnSpPr>
+            <a:stCxn id="22" idx="2"/>
+            <a:endCxn id="14" idx="2"/>
+          </p:cNvCxnSpPr>
+          <p:nvPr/>
+        </p:nvCxnSpPr>
+        <p:spPr>
+          <a:xfrm rot="16200000" flipH="1">
+            <a:off x="2974991" y="2084738"/>
+            <a:ext cx="260036" cy="3403448"/>
+          </a:xfrm>
+          <a:prstGeom prst="bentConnector2">
+            <a:avLst/>
+          </a:prstGeom>
+          <a:ln w="57150">
+            <a:solidFill>
+              <a:schemeClr val="tx2"/>
+            </a:solidFill>
+            <a:headEnd type="none" w="med" len="med"/>
+            <a:tailEnd type="triangle"/>
+          </a:ln>
+        </p:spPr>
+        <p:style>
+          <a:lnRef idx="1">
+            <a:schemeClr val="accent1"/>
+          </a:lnRef>
+          <a:fillRef idx="0">
+            <a:schemeClr val="accent1"/>
+          </a:fillRef>
+          <a:effectRef idx="0">
+            <a:schemeClr val="accent1"/>
+          </a:effectRef>
+          <a:fontRef idx="minor">
+            <a:schemeClr val="tx1"/>
+          </a:fontRef>
+        </p:style>
+      </p:cxnSp>
+      <p:cxnSp>
+        <p:nvCxnSpPr>
+          <p:cNvPr id="36" name="Connector: Elbow 35"/>
+          <p:cNvCxnSpPr>
+            <a:stCxn id="14" idx="1"/>
+            <a:endCxn id="15" idx="2"/>
+          </p:cNvCxnSpPr>
+          <p:nvPr/>
+        </p:nvCxnSpPr>
+        <p:spPr>
+          <a:xfrm rot="5400000">
+            <a:off x="3718719" y="3489941"/>
+            <a:ext cx="725362" cy="3924999"/>
+          </a:xfrm>
+          <a:prstGeom prst="bentConnector3">
+            <a:avLst>
+              <a:gd name="adj1" fmla="val 137818"/>
+            </a:avLst>
+          </a:prstGeom>
+          <a:ln w="57150">
+            <a:solidFill>
+              <a:schemeClr val="tx2"/>
+            </a:solidFill>
+            <a:headEnd type="none" w="med" len="med"/>
+            <a:tailEnd type="triangle"/>
+          </a:ln>
+        </p:spPr>
+        <p:style>
+          <a:lnRef idx="1">
+            <a:schemeClr val="accent1"/>
+          </a:lnRef>
+          <a:fillRef idx="0">
+            <a:schemeClr val="accent1"/>
+          </a:fillRef>
+          <a:effectRef idx="0">
+            <a:schemeClr val="accent1"/>
+          </a:effectRef>
+          <a:fontRef idx="minor">
+            <a:schemeClr val="tx1"/>
+          </a:fontRef>
+        </p:style>
+      </p:cxnSp>
+    </p:spTree>
+    <p:extLst>
+      <p:ext uri="{BB962C8B-B14F-4D97-AF65-F5344CB8AC3E}">
+        <p14:creationId xmlns:p14="http://schemas.microsoft.com/office/powerpoint/2010/main" val="2098045799"/>
+      </p:ext>
+    </p:extLst>
+  </p:cSld>
+  <p:clrMapOvr>
+    <a:masterClrMapping/>
+  </p:clrMapOvr>
+</p:sld>
+</file>
+
+<file path=ppt/slides/slide11.xml><?xml version="1.0" encoding="utf-8"?>
 <p:sld xmlns:a="http://schemas.openxmlformats.org/drawingml/2006/main" xmlns:r="http://schemas.openxmlformats.org/officeDocument/2006/relationships" xmlns:p="http://schemas.openxmlformats.org/presentationml/2006/main">
   <p:cSld>
     <p:spTree>
@@ -9702,7 +11284,7 @@
 </p:sld>
 </file>
 
-<file path=ppt/slides/slide11.xml><?xml version="1.0" encoding="utf-8"?>
+<file path=ppt/slides/slide12.xml><?xml version="1.0" encoding="utf-8"?>
 <p:sld xmlns:a="http://schemas.openxmlformats.org/drawingml/2006/main" xmlns:r="http://schemas.openxmlformats.org/officeDocument/2006/relationships" xmlns:p="http://schemas.openxmlformats.org/presentationml/2006/main" show="0">
   <p:cSld>
     <p:spTree>
@@ -11291,6 +12873,1528 @@
       </p:grpSpPr>
       <p:sp>
         <p:nvSpPr>
+          <p:cNvPr id="2" name="Title 1">
+            <a:extLst>
+              <a:ext uri="{FF2B5EF4-FFF2-40B4-BE49-F238E27FC236}">
+                <a16:creationId xmlns:a16="http://schemas.microsoft.com/office/drawing/2014/main" id="{C2226B02-D33A-4A27-A7EF-DEFABA68D66B}"/>
+              </a:ext>
+            </a:extLst>
+          </p:cNvPr>
+          <p:cNvSpPr>
+            <a:spLocks noGrp="1"/>
+          </p:cNvSpPr>
+          <p:nvPr>
+            <p:ph type="title"/>
+          </p:nvPr>
+        </p:nvSpPr>
+        <p:spPr/>
+        <p:txBody>
+          <a:bodyPr/>
+          <a:lstStyle/>
+          <a:p>
+            <a:r>
+              <a:rPr lang="en-US" dirty="0"/>
+              <a:t>Labels &amp; Named Ports</a:t>
+            </a:r>
+          </a:p>
+        </p:txBody>
+      </p:sp>
+      <p:sp>
+        <p:nvSpPr>
+          <p:cNvPr id="7" name="Rectangle: Single Corner Snipped 6">
+            <a:extLst>
+              <a:ext uri="{FF2B5EF4-FFF2-40B4-BE49-F238E27FC236}">
+                <a16:creationId xmlns:a16="http://schemas.microsoft.com/office/drawing/2014/main" id="{0A1FF212-16DF-4C0F-A0EF-DC26417C8147}"/>
+              </a:ext>
+            </a:extLst>
+          </p:cNvPr>
+          <p:cNvSpPr/>
+          <p:nvPr/>
+        </p:nvSpPr>
+        <p:spPr bwMode="gray">
+          <a:xfrm>
+            <a:off x="4758707" y="4013187"/>
+            <a:ext cx="2474332" cy="2346559"/>
+          </a:xfrm>
+          <a:prstGeom prst="snip1Rect">
+            <a:avLst/>
+          </a:prstGeom>
+          <a:ln>
+            <a:headEnd/>
+            <a:tailEnd/>
+          </a:ln>
+        </p:spPr>
+        <p:style>
+          <a:lnRef idx="3">
+            <a:schemeClr val="lt1"/>
+          </a:lnRef>
+          <a:fillRef idx="1">
+            <a:schemeClr val="accent2"/>
+          </a:fillRef>
+          <a:effectRef idx="1">
+            <a:schemeClr val="accent2"/>
+          </a:effectRef>
+          <a:fontRef idx="minor">
+            <a:schemeClr val="lt1"/>
+          </a:fontRef>
+        </p:style>
+        <p:txBody>
+          <a:bodyPr lIns="90000" tIns="72000" rIns="90000" bIns="72000" rtlCol="0" anchor="ctr"/>
+          <a:lstStyle/>
+          <a:p>
+            <a:pPr marR="0" algn="ctr" defTabSz="914400" eaLnBrk="1" fontAlgn="base" latinLnBrk="0" hangingPunct="1">
+              <a:lnSpc>
+                <a:spcPct val="100000"/>
+              </a:lnSpc>
+              <a:spcBef>
+                <a:spcPct val="50000"/>
+              </a:spcBef>
+              <a:spcAft>
+                <a:spcPct val="0"/>
+              </a:spcAft>
+              <a:buClr>
+                <a:srgbClr val="F0AB00"/>
+              </a:buClr>
+              <a:buSzPct val="80000"/>
+              <a:tabLst/>
+            </a:pPr>
+            <a:r>
+              <a:rPr kumimoji="0" lang="en-US" sz="1800" b="0" i="0" u="none" strike="noStrike" kern="0" cap="none" spc="0" normalizeH="0" baseline="0" noProof="0" dirty="0">
+                <a:ln>
+                  <a:noFill/>
+                </a:ln>
+                <a:effectLst/>
+                <a:uLnTx/>
+                <a:uFillTx/>
+                <a:ea typeface="Arial Unicode MS" pitchFamily="34" charset="-128"/>
+                <a:cs typeface="Arial Unicode MS" pitchFamily="34" charset="-128"/>
+              </a:rPr>
+              <a:t>Service</a:t>
+            </a:r>
+          </a:p>
+          <a:p>
+            <a:pPr marR="0" algn="ctr" defTabSz="914400" eaLnBrk="1" fontAlgn="base" latinLnBrk="0" hangingPunct="1">
+              <a:lnSpc>
+                <a:spcPct val="100000"/>
+              </a:lnSpc>
+              <a:spcBef>
+                <a:spcPct val="50000"/>
+              </a:spcBef>
+              <a:spcAft>
+                <a:spcPct val="0"/>
+              </a:spcAft>
+              <a:buClr>
+                <a:srgbClr val="F0AB00"/>
+              </a:buClr>
+              <a:buSzPct val="80000"/>
+              <a:tabLst/>
+            </a:pPr>
+            <a:r>
+              <a:rPr lang="en-US" sz="1800" kern="0" dirty="0">
+                <a:ea typeface="Arial Unicode MS" pitchFamily="34" charset="-128"/>
+                <a:cs typeface="Arial Unicode MS" pitchFamily="34" charset="-128"/>
+              </a:rPr>
+              <a:t>Label: app= client</a:t>
+            </a:r>
+            <a:endParaRPr kumimoji="0" lang="en-US" sz="1800" b="0" i="0" u="none" strike="noStrike" kern="0" cap="none" spc="0" normalizeH="0" baseline="0" noProof="0" dirty="0">
+              <a:ln>
+                <a:noFill/>
+              </a:ln>
+              <a:effectLst/>
+              <a:uLnTx/>
+              <a:uFillTx/>
+              <a:ea typeface="Arial Unicode MS" pitchFamily="34" charset="-128"/>
+              <a:cs typeface="Arial Unicode MS" pitchFamily="34" charset="-128"/>
+            </a:endParaRPr>
+          </a:p>
+          <a:p>
+            <a:pPr marL="285750" marR="0" indent="-285750" defTabSz="914400" eaLnBrk="1" fontAlgn="base" latinLnBrk="0" hangingPunct="1">
+              <a:lnSpc>
+                <a:spcPct val="100000"/>
+              </a:lnSpc>
+              <a:spcBef>
+                <a:spcPct val="50000"/>
+              </a:spcBef>
+              <a:spcAft>
+                <a:spcPct val="0"/>
+              </a:spcAft>
+              <a:buClr>
+                <a:srgbClr val="F0AB00"/>
+              </a:buClr>
+              <a:buSzPct val="80000"/>
+              <a:buFontTx/>
+              <a:buChar char="-"/>
+              <a:tabLst/>
+            </a:pPr>
+            <a:r>
+              <a:rPr lang="en-US" sz="1800" kern="0" dirty="0" err="1">
+                <a:ea typeface="Arial Unicode MS" pitchFamily="34" charset="-128"/>
+                <a:cs typeface="Arial Unicode MS" pitchFamily="34" charset="-128"/>
+              </a:rPr>
+              <a:t>TargetPort</a:t>
+            </a:r>
+            <a:r>
+              <a:rPr lang="en-US" sz="1800" kern="0" dirty="0">
+                <a:ea typeface="Arial Unicode MS" pitchFamily="34" charset="-128"/>
+                <a:cs typeface="Arial Unicode MS" pitchFamily="34" charset="-128"/>
+              </a:rPr>
+              <a:t>: </a:t>
+            </a:r>
+            <a:r>
+              <a:rPr lang="en-US" sz="1800" b="1" kern="0" dirty="0">
+                <a:ea typeface="Arial Unicode MS" pitchFamily="34" charset="-128"/>
+                <a:cs typeface="Arial Unicode MS" pitchFamily="34" charset="-128"/>
+              </a:rPr>
+              <a:t>80</a:t>
+            </a:r>
+          </a:p>
+          <a:p>
+            <a:pPr marL="285750" marR="0" indent="-285750" defTabSz="914400" eaLnBrk="1" fontAlgn="base" latinLnBrk="0" hangingPunct="1">
+              <a:lnSpc>
+                <a:spcPct val="100000"/>
+              </a:lnSpc>
+              <a:spcBef>
+                <a:spcPct val="50000"/>
+              </a:spcBef>
+              <a:spcAft>
+                <a:spcPct val="0"/>
+              </a:spcAft>
+              <a:buClr>
+                <a:srgbClr val="F0AB00"/>
+              </a:buClr>
+              <a:buSzPct val="80000"/>
+              <a:buFontTx/>
+              <a:buChar char="-"/>
+              <a:tabLst/>
+            </a:pPr>
+            <a:r>
+              <a:rPr kumimoji="0" lang="en-US" sz="1800" b="0" i="0" u="none" strike="noStrike" kern="0" cap="none" spc="0" normalizeH="0" baseline="0" noProof="0" dirty="0">
+                <a:ln>
+                  <a:noFill/>
+                </a:ln>
+                <a:effectLst/>
+                <a:uLnTx/>
+                <a:uFillTx/>
+                <a:ea typeface="Arial Unicode MS" pitchFamily="34" charset="-128"/>
+                <a:cs typeface="Arial Unicode MS" pitchFamily="34" charset="-128"/>
+              </a:rPr>
+              <a:t>Port: 80</a:t>
+            </a:r>
+          </a:p>
+        </p:txBody>
+      </p:sp>
+      <p:grpSp>
+        <p:nvGrpSpPr>
+          <p:cNvPr id="31" name="Group 30">
+            <a:extLst>
+              <a:ext uri="{FF2B5EF4-FFF2-40B4-BE49-F238E27FC236}">
+                <a16:creationId xmlns:a16="http://schemas.microsoft.com/office/drawing/2014/main" id="{578B2474-3A6B-40A2-862E-6C958D31893F}"/>
+              </a:ext>
+            </a:extLst>
+          </p:cNvPr>
+          <p:cNvGrpSpPr/>
+          <p:nvPr/>
+        </p:nvGrpSpPr>
+        <p:grpSpPr>
+          <a:xfrm>
+            <a:off x="301167" y="2001735"/>
+            <a:ext cx="3731275" cy="2011453"/>
+            <a:chOff x="601205" y="3245257"/>
+            <a:chExt cx="3731275" cy="2011453"/>
+          </a:xfrm>
+        </p:grpSpPr>
+        <p:sp>
+          <p:nvSpPr>
+            <p:cNvPr id="5" name="Rectangle 4">
+              <a:extLst>
+                <a:ext uri="{FF2B5EF4-FFF2-40B4-BE49-F238E27FC236}">
+                  <a16:creationId xmlns:a16="http://schemas.microsoft.com/office/drawing/2014/main" id="{4F713495-D0C7-4536-A47C-ABE85D9862FF}"/>
+                </a:ext>
+              </a:extLst>
+            </p:cNvPr>
+            <p:cNvSpPr/>
+            <p:nvPr/>
+          </p:nvSpPr>
+          <p:spPr bwMode="gray">
+            <a:xfrm>
+              <a:off x="1479724" y="3479388"/>
+              <a:ext cx="1815338" cy="1160859"/>
+            </a:xfrm>
+            <a:prstGeom prst="rect">
+              <a:avLst/>
+            </a:prstGeom>
+            <a:ln>
+              <a:headEnd/>
+              <a:tailEnd/>
+            </a:ln>
+          </p:spPr>
+          <p:style>
+            <a:lnRef idx="2">
+              <a:schemeClr val="accent2">
+                <a:shade val="50000"/>
+              </a:schemeClr>
+            </a:lnRef>
+            <a:fillRef idx="1">
+              <a:schemeClr val="accent2"/>
+            </a:fillRef>
+            <a:effectRef idx="0">
+              <a:schemeClr val="accent2"/>
+            </a:effectRef>
+            <a:fontRef idx="minor">
+              <a:schemeClr val="lt1"/>
+            </a:fontRef>
+          </p:style>
+          <p:txBody>
+            <a:bodyPr lIns="90000" tIns="72000" rIns="90000" bIns="72000" rtlCol="0" anchor="ctr"/>
+            <a:lstStyle/>
+            <a:p>
+              <a:pPr marR="0" algn="ctr" defTabSz="914400" eaLnBrk="1" fontAlgn="base" latinLnBrk="0" hangingPunct="1">
+                <a:lnSpc>
+                  <a:spcPct val="100000"/>
+                </a:lnSpc>
+                <a:spcBef>
+                  <a:spcPct val="50000"/>
+                </a:spcBef>
+                <a:spcAft>
+                  <a:spcPct val="0"/>
+                </a:spcAft>
+                <a:buClr>
+                  <a:srgbClr val="F0AB00"/>
+                </a:buClr>
+                <a:buSzPct val="80000"/>
+                <a:tabLst/>
+              </a:pPr>
+              <a:r>
+                <a:rPr lang="de-DE" sz="1600" b="1" kern="0" noProof="0" dirty="0" err="1">
+                  <a:ea typeface="Arial Unicode MS" pitchFamily="34" charset="-128"/>
+                  <a:cs typeface="Arial Unicode MS" pitchFamily="34" charset="-128"/>
+                </a:rPr>
+                <a:t>Pod</a:t>
+              </a:r>
+              <a:endParaRPr kumimoji="0" lang="de-DE" sz="1600" b="1" i="0" u="none" strike="noStrike" kern="0" cap="none" spc="0" normalizeH="0" baseline="0" noProof="0" dirty="0">
+                <a:ln>
+                  <a:noFill/>
+                </a:ln>
+                <a:effectLst/>
+                <a:uLnTx/>
+                <a:uFillTx/>
+                <a:ea typeface="Arial Unicode MS" pitchFamily="34" charset="-128"/>
+                <a:cs typeface="Arial Unicode MS" pitchFamily="34" charset="-128"/>
+              </a:endParaRPr>
+            </a:p>
+          </p:txBody>
+        </p:sp>
+        <p:sp>
+          <p:nvSpPr>
+            <p:cNvPr id="6" name="Rectangle 5">
+              <a:extLst>
+                <a:ext uri="{FF2B5EF4-FFF2-40B4-BE49-F238E27FC236}">
+                  <a16:creationId xmlns:a16="http://schemas.microsoft.com/office/drawing/2014/main" id="{E5AF0BEF-A5C6-477C-A03D-80DD0C56FEF6}"/>
+                </a:ext>
+              </a:extLst>
+            </p:cNvPr>
+            <p:cNvSpPr/>
+            <p:nvPr/>
+          </p:nvSpPr>
+          <p:spPr bwMode="gray">
+            <a:xfrm>
+              <a:off x="1564433" y="3245257"/>
+              <a:ext cx="1645920" cy="365760"/>
+            </a:xfrm>
+            <a:prstGeom prst="rect">
+              <a:avLst/>
+            </a:prstGeom>
+            <a:ln>
+              <a:headEnd/>
+              <a:tailEnd/>
+            </a:ln>
+          </p:spPr>
+          <p:style>
+            <a:lnRef idx="2">
+              <a:schemeClr val="accent2"/>
+            </a:lnRef>
+            <a:fillRef idx="1">
+              <a:schemeClr val="lt1"/>
+            </a:fillRef>
+            <a:effectRef idx="0">
+              <a:schemeClr val="accent2"/>
+            </a:effectRef>
+            <a:fontRef idx="minor">
+              <a:schemeClr val="dk1"/>
+            </a:fontRef>
+          </p:style>
+          <p:txBody>
+            <a:bodyPr lIns="90000" tIns="72000" rIns="90000" bIns="72000" rtlCol="0" anchor="ctr"/>
+            <a:lstStyle/>
+            <a:p>
+              <a:pPr marR="0" algn="ctr" defTabSz="914400" eaLnBrk="1" fontAlgn="base" latinLnBrk="0" hangingPunct="1">
+                <a:lnSpc>
+                  <a:spcPct val="100000"/>
+                </a:lnSpc>
+                <a:spcBef>
+                  <a:spcPct val="50000"/>
+                </a:spcBef>
+                <a:spcAft>
+                  <a:spcPct val="0"/>
+                </a:spcAft>
+                <a:buClr>
+                  <a:srgbClr val="F0AB00"/>
+                </a:buClr>
+                <a:buSzPct val="80000"/>
+                <a:tabLst/>
+              </a:pPr>
+              <a:r>
+                <a:rPr kumimoji="0" lang="de-DE" sz="1800" b="0" i="0" u="none" strike="noStrike" kern="0" cap="none" spc="0" normalizeH="0" baseline="0" noProof="0" dirty="0">
+                  <a:ln>
+                    <a:noFill/>
+                  </a:ln>
+                  <a:effectLst/>
+                  <a:uLnTx/>
+                  <a:uFillTx/>
+                  <a:ea typeface="Arial Unicode MS" pitchFamily="34" charset="-128"/>
+                  <a:cs typeface="Arial Unicode MS" pitchFamily="34" charset="-128"/>
+                </a:rPr>
+                <a:t>IP: 10.10.10.1</a:t>
+              </a:r>
+            </a:p>
+          </p:txBody>
+        </p:sp>
+        <p:sp>
+          <p:nvSpPr>
+            <p:cNvPr id="8" name="Rectangle 7">
+              <a:extLst>
+                <a:ext uri="{FF2B5EF4-FFF2-40B4-BE49-F238E27FC236}">
+                  <a16:creationId xmlns:a16="http://schemas.microsoft.com/office/drawing/2014/main" id="{2A7326BA-2147-4201-9D76-9DEE3806C186}"/>
+                </a:ext>
+              </a:extLst>
+            </p:cNvPr>
+            <p:cNvSpPr/>
+            <p:nvPr/>
+          </p:nvSpPr>
+          <p:spPr bwMode="gray">
+            <a:xfrm>
+              <a:off x="601205" y="4425955"/>
+              <a:ext cx="1319714" cy="428584"/>
+            </a:xfrm>
+            <a:prstGeom prst="rect">
+              <a:avLst/>
+            </a:prstGeom>
+            <a:solidFill>
+              <a:schemeClr val="accent1">
+                <a:lumMod val="40000"/>
+                <a:lumOff val="60000"/>
+              </a:schemeClr>
+            </a:solidFill>
+            <a:ln>
+              <a:headEnd/>
+              <a:tailEnd/>
+            </a:ln>
+          </p:spPr>
+          <p:style>
+            <a:lnRef idx="2">
+              <a:schemeClr val="accent2"/>
+            </a:lnRef>
+            <a:fillRef idx="1">
+              <a:schemeClr val="lt1"/>
+            </a:fillRef>
+            <a:effectRef idx="0">
+              <a:schemeClr val="accent2"/>
+            </a:effectRef>
+            <a:fontRef idx="minor">
+              <a:schemeClr val="dk1"/>
+            </a:fontRef>
+          </p:style>
+          <p:txBody>
+            <a:bodyPr lIns="90000" tIns="72000" rIns="90000" bIns="72000" rtlCol="0" anchor="ctr"/>
+            <a:lstStyle/>
+            <a:p>
+              <a:pPr marR="0" algn="ctr" defTabSz="914400" eaLnBrk="1" fontAlgn="base" latinLnBrk="0" hangingPunct="1">
+                <a:lnSpc>
+                  <a:spcPct val="100000"/>
+                </a:lnSpc>
+                <a:spcBef>
+                  <a:spcPct val="50000"/>
+                </a:spcBef>
+                <a:spcAft>
+                  <a:spcPct val="0"/>
+                </a:spcAft>
+                <a:buClr>
+                  <a:srgbClr val="F0AB00"/>
+                </a:buClr>
+                <a:buSzPct val="80000"/>
+                <a:tabLst/>
+              </a:pPr>
+              <a:r>
+                <a:rPr lang="de-DE" sz="1800" kern="0" dirty="0">
+                  <a:ea typeface="Arial Unicode MS" pitchFamily="34" charset="-128"/>
+                  <a:cs typeface="Arial Unicode MS" pitchFamily="34" charset="-128"/>
+                </a:rPr>
+                <a:t>a</a:t>
+              </a:r>
+              <a:r>
+                <a:rPr kumimoji="0" lang="de-DE" sz="1800" b="0" i="0" u="none" strike="noStrike" kern="0" cap="none" spc="0" normalizeH="0" baseline="0" noProof="0" dirty="0">
+                  <a:ln>
+                    <a:noFill/>
+                  </a:ln>
+                  <a:effectLst/>
+                  <a:uLnTx/>
+                  <a:uFillTx/>
+                  <a:ea typeface="Arial Unicode MS" pitchFamily="34" charset="-128"/>
+                  <a:cs typeface="Arial Unicode MS" pitchFamily="34" charset="-128"/>
+                </a:rPr>
+                <a:t>pp=</a:t>
+              </a:r>
+              <a:r>
+                <a:rPr kumimoji="0" lang="de-DE" sz="1800" b="0" i="0" u="none" strike="noStrike" kern="0" cap="none" spc="0" normalizeH="0" baseline="0" noProof="0" dirty="0" err="1">
+                  <a:ln>
+                    <a:noFill/>
+                  </a:ln>
+                  <a:effectLst/>
+                  <a:uLnTx/>
+                  <a:uFillTx/>
+                  <a:ea typeface="Arial Unicode MS" pitchFamily="34" charset="-128"/>
+                  <a:cs typeface="Arial Unicode MS" pitchFamily="34" charset="-128"/>
+                </a:rPr>
+                <a:t>nginx</a:t>
+              </a:r>
+              <a:endParaRPr kumimoji="0" lang="de-DE" sz="1800" b="0" i="0" u="none" strike="noStrike" kern="0" cap="none" spc="0" normalizeH="0" baseline="0" noProof="0" dirty="0">
+                <a:ln>
+                  <a:noFill/>
+                </a:ln>
+                <a:effectLst/>
+                <a:uLnTx/>
+                <a:uFillTx/>
+                <a:ea typeface="Arial Unicode MS" pitchFamily="34" charset="-128"/>
+                <a:cs typeface="Arial Unicode MS" pitchFamily="34" charset="-128"/>
+              </a:endParaRPr>
+            </a:p>
+          </p:txBody>
+        </p:sp>
+        <p:sp>
+          <p:nvSpPr>
+            <p:cNvPr id="12" name="Rectangle 11">
+              <a:extLst>
+                <a:ext uri="{FF2B5EF4-FFF2-40B4-BE49-F238E27FC236}">
+                  <a16:creationId xmlns:a16="http://schemas.microsoft.com/office/drawing/2014/main" id="{67BFC906-AFD7-4353-A1E7-A99CA1E80D65}"/>
+                </a:ext>
+              </a:extLst>
+            </p:cNvPr>
+            <p:cNvSpPr/>
+            <p:nvPr/>
+          </p:nvSpPr>
+          <p:spPr bwMode="gray">
+            <a:xfrm>
+              <a:off x="2770539" y="4205839"/>
+              <a:ext cx="1561941" cy="1050871"/>
+            </a:xfrm>
+            <a:prstGeom prst="rect">
+              <a:avLst/>
+            </a:prstGeom>
+            <a:ln>
+              <a:headEnd/>
+              <a:tailEnd/>
+            </a:ln>
+          </p:spPr>
+          <p:style>
+            <a:lnRef idx="2">
+              <a:schemeClr val="accent2"/>
+            </a:lnRef>
+            <a:fillRef idx="1">
+              <a:schemeClr val="lt1"/>
+            </a:fillRef>
+            <a:effectRef idx="0">
+              <a:schemeClr val="accent2"/>
+            </a:effectRef>
+            <a:fontRef idx="minor">
+              <a:schemeClr val="dk1"/>
+            </a:fontRef>
+          </p:style>
+          <p:txBody>
+            <a:bodyPr lIns="90000" tIns="72000" rIns="90000" bIns="72000" rtlCol="0" anchor="ctr"/>
+            <a:lstStyle/>
+            <a:p>
+              <a:pPr marR="0" algn="ctr" defTabSz="914400" eaLnBrk="1" fontAlgn="base" latinLnBrk="0" hangingPunct="1">
+                <a:lnSpc>
+                  <a:spcPct val="100000"/>
+                </a:lnSpc>
+                <a:spcBef>
+                  <a:spcPct val="50000"/>
+                </a:spcBef>
+                <a:spcAft>
+                  <a:spcPct val="0"/>
+                </a:spcAft>
+                <a:buClr>
+                  <a:srgbClr val="F0AB00"/>
+                </a:buClr>
+                <a:buSzPct val="80000"/>
+                <a:tabLst/>
+              </a:pPr>
+              <a:r>
+                <a:rPr lang="de-DE" sz="1800" kern="0" dirty="0">
+                  <a:ea typeface="Arial Unicode MS" pitchFamily="34" charset="-128"/>
+                  <a:cs typeface="Arial Unicode MS" pitchFamily="34" charset="-128"/>
+                </a:rPr>
+                <a:t>Port: 80</a:t>
+              </a:r>
+            </a:p>
+            <a:p>
+              <a:pPr marR="0" algn="ctr" defTabSz="914400" eaLnBrk="1" fontAlgn="base" latinLnBrk="0" hangingPunct="1">
+                <a:lnSpc>
+                  <a:spcPct val="100000"/>
+                </a:lnSpc>
+                <a:spcBef>
+                  <a:spcPct val="50000"/>
+                </a:spcBef>
+                <a:spcAft>
+                  <a:spcPct val="0"/>
+                </a:spcAft>
+                <a:buClr>
+                  <a:srgbClr val="F0AB00"/>
+                </a:buClr>
+                <a:buSzPct val="80000"/>
+                <a:tabLst/>
+              </a:pPr>
+              <a:r>
+                <a:rPr kumimoji="0" lang="de-DE" sz="1800" b="0" i="0" u="none" strike="noStrike" kern="0" cap="none" spc="0" normalizeH="0" baseline="0" noProof="0" dirty="0">
+                  <a:ln>
+                    <a:noFill/>
+                  </a:ln>
+                  <a:effectLst/>
+                  <a:uLnTx/>
+                  <a:uFillTx/>
+                  <a:ea typeface="Arial Unicode MS" pitchFamily="34" charset="-128"/>
+                  <a:cs typeface="Arial Unicode MS" pitchFamily="34" charset="-128"/>
+                </a:rPr>
+                <a:t>Name: </a:t>
+              </a:r>
+              <a:r>
+                <a:rPr kumimoji="0" lang="de-DE" sz="1800" b="1" i="0" u="none" strike="noStrike" kern="0" cap="none" spc="0" normalizeH="0" baseline="0" noProof="0" dirty="0">
+                  <a:ln>
+                    <a:noFill/>
+                  </a:ln>
+                  <a:effectLst/>
+                  <a:uLnTx/>
+                  <a:uFillTx/>
+                  <a:ea typeface="Arial Unicode MS" pitchFamily="34" charset="-128"/>
+                  <a:cs typeface="Arial Unicode MS" pitchFamily="34" charset="-128"/>
+                </a:rPr>
+                <a:t>http</a:t>
+              </a:r>
+            </a:p>
+          </p:txBody>
+        </p:sp>
+      </p:grpSp>
+      <p:grpSp>
+        <p:nvGrpSpPr>
+          <p:cNvPr id="32" name="Group 31">
+            <a:extLst>
+              <a:ext uri="{FF2B5EF4-FFF2-40B4-BE49-F238E27FC236}">
+                <a16:creationId xmlns:a16="http://schemas.microsoft.com/office/drawing/2014/main" id="{8C9BDB52-4DDC-42BB-81A7-4C558F9C56FD}"/>
+              </a:ext>
+            </a:extLst>
+          </p:cNvPr>
+          <p:cNvGrpSpPr/>
+          <p:nvPr/>
+        </p:nvGrpSpPr>
+        <p:grpSpPr>
+          <a:xfrm>
+            <a:off x="8067352" y="2001735"/>
+            <a:ext cx="3440617" cy="1609282"/>
+            <a:chOff x="7208370" y="4205839"/>
+            <a:chExt cx="3440617" cy="1609282"/>
+          </a:xfrm>
+        </p:grpSpPr>
+        <p:sp>
+          <p:nvSpPr>
+            <p:cNvPr id="9" name="Rectangle 8">
+              <a:extLst>
+                <a:ext uri="{FF2B5EF4-FFF2-40B4-BE49-F238E27FC236}">
+                  <a16:creationId xmlns:a16="http://schemas.microsoft.com/office/drawing/2014/main" id="{E0824ACE-C4FA-47B7-B3CD-360612A7B5C4}"/>
+                </a:ext>
+              </a:extLst>
+            </p:cNvPr>
+            <p:cNvSpPr/>
+            <p:nvPr/>
+          </p:nvSpPr>
+          <p:spPr bwMode="gray">
+            <a:xfrm>
+              <a:off x="8045976" y="4446544"/>
+              <a:ext cx="1815338" cy="1160859"/>
+            </a:xfrm>
+            <a:prstGeom prst="rect">
+              <a:avLst/>
+            </a:prstGeom>
+            <a:ln>
+              <a:headEnd/>
+              <a:tailEnd/>
+            </a:ln>
+          </p:spPr>
+          <p:style>
+            <a:lnRef idx="2">
+              <a:schemeClr val="accent2">
+                <a:shade val="50000"/>
+              </a:schemeClr>
+            </a:lnRef>
+            <a:fillRef idx="1">
+              <a:schemeClr val="accent2"/>
+            </a:fillRef>
+            <a:effectRef idx="0">
+              <a:schemeClr val="accent2"/>
+            </a:effectRef>
+            <a:fontRef idx="minor">
+              <a:schemeClr val="lt1"/>
+            </a:fontRef>
+          </p:style>
+          <p:txBody>
+            <a:bodyPr lIns="90000" tIns="72000" rIns="90000" bIns="72000" rtlCol="0" anchor="ctr"/>
+            <a:lstStyle/>
+            <a:p>
+              <a:pPr marR="0" algn="ctr" defTabSz="914400" eaLnBrk="1" fontAlgn="base" latinLnBrk="0" hangingPunct="1">
+                <a:lnSpc>
+                  <a:spcPct val="100000"/>
+                </a:lnSpc>
+                <a:spcBef>
+                  <a:spcPct val="50000"/>
+                </a:spcBef>
+                <a:spcAft>
+                  <a:spcPct val="0"/>
+                </a:spcAft>
+                <a:buClr>
+                  <a:srgbClr val="F0AB00"/>
+                </a:buClr>
+                <a:buSzPct val="80000"/>
+                <a:tabLst/>
+              </a:pPr>
+              <a:r>
+                <a:rPr lang="de-DE" sz="1600" b="1" kern="0" noProof="0" dirty="0" err="1">
+                  <a:ea typeface="Arial Unicode MS" pitchFamily="34" charset="-128"/>
+                  <a:cs typeface="Arial Unicode MS" pitchFamily="34" charset="-128"/>
+                </a:rPr>
+                <a:t>Pod</a:t>
+              </a:r>
+              <a:endParaRPr kumimoji="0" lang="de-DE" sz="1600" b="1" i="0" u="none" strike="noStrike" kern="0" cap="none" spc="0" normalizeH="0" baseline="0" noProof="0" dirty="0">
+                <a:ln>
+                  <a:noFill/>
+                </a:ln>
+                <a:effectLst/>
+                <a:uLnTx/>
+                <a:uFillTx/>
+                <a:ea typeface="Arial Unicode MS" pitchFamily="34" charset="-128"/>
+                <a:cs typeface="Arial Unicode MS" pitchFamily="34" charset="-128"/>
+              </a:endParaRPr>
+            </a:p>
+          </p:txBody>
+        </p:sp>
+        <p:sp>
+          <p:nvSpPr>
+            <p:cNvPr id="10" name="Rectangle 9">
+              <a:extLst>
+                <a:ext uri="{FF2B5EF4-FFF2-40B4-BE49-F238E27FC236}">
+                  <a16:creationId xmlns:a16="http://schemas.microsoft.com/office/drawing/2014/main" id="{543F1C75-A9B3-4B58-9707-3D22A5BE69AE}"/>
+                </a:ext>
+              </a:extLst>
+            </p:cNvPr>
+            <p:cNvSpPr/>
+            <p:nvPr/>
+          </p:nvSpPr>
+          <p:spPr bwMode="gray">
+            <a:xfrm>
+              <a:off x="7208370" y="5386537"/>
+              <a:ext cx="1319714" cy="428584"/>
+            </a:xfrm>
+            <a:prstGeom prst="rect">
+              <a:avLst/>
+            </a:prstGeom>
+            <a:ln>
+              <a:headEnd/>
+              <a:tailEnd/>
+            </a:ln>
+          </p:spPr>
+          <p:style>
+            <a:lnRef idx="2">
+              <a:schemeClr val="accent2"/>
+            </a:lnRef>
+            <a:fillRef idx="1">
+              <a:schemeClr val="lt1"/>
+            </a:fillRef>
+            <a:effectRef idx="0">
+              <a:schemeClr val="accent2"/>
+            </a:effectRef>
+            <a:fontRef idx="minor">
+              <a:schemeClr val="dk1"/>
+            </a:fontRef>
+          </p:style>
+          <p:txBody>
+            <a:bodyPr lIns="90000" tIns="72000" rIns="90000" bIns="72000" rtlCol="0" anchor="ctr"/>
+            <a:lstStyle/>
+            <a:p>
+              <a:pPr marR="0" algn="ctr" defTabSz="914400" eaLnBrk="1" fontAlgn="base" latinLnBrk="0" hangingPunct="1">
+                <a:lnSpc>
+                  <a:spcPct val="100000"/>
+                </a:lnSpc>
+                <a:spcBef>
+                  <a:spcPct val="50000"/>
+                </a:spcBef>
+                <a:spcAft>
+                  <a:spcPct val="0"/>
+                </a:spcAft>
+                <a:buClr>
+                  <a:srgbClr val="F0AB00"/>
+                </a:buClr>
+                <a:buSzPct val="80000"/>
+                <a:tabLst/>
+              </a:pPr>
+              <a:r>
+                <a:rPr lang="de-DE" sz="1800" kern="0" dirty="0">
+                  <a:ea typeface="Arial Unicode MS" pitchFamily="34" charset="-128"/>
+                  <a:cs typeface="Arial Unicode MS" pitchFamily="34" charset="-128"/>
+                </a:rPr>
+                <a:t>a</a:t>
+              </a:r>
+              <a:r>
+                <a:rPr kumimoji="0" lang="de-DE" sz="1800" b="0" i="0" u="none" strike="noStrike" kern="0" cap="none" spc="0" normalizeH="0" baseline="0" noProof="0" dirty="0">
+                  <a:ln>
+                    <a:noFill/>
+                  </a:ln>
+                  <a:effectLst/>
+                  <a:uLnTx/>
+                  <a:uFillTx/>
+                  <a:ea typeface="Arial Unicode MS" pitchFamily="34" charset="-128"/>
+                  <a:cs typeface="Arial Unicode MS" pitchFamily="34" charset="-128"/>
+                </a:rPr>
+                <a:t>pp=</a:t>
+              </a:r>
+              <a:r>
+                <a:rPr kumimoji="0" lang="de-DE" sz="1800" b="0" i="0" u="none" strike="noStrike" kern="0" cap="none" spc="0" normalizeH="0" baseline="0" noProof="0" dirty="0" err="1">
+                  <a:ln>
+                    <a:noFill/>
+                  </a:ln>
+                  <a:effectLst/>
+                  <a:uLnTx/>
+                  <a:uFillTx/>
+                  <a:ea typeface="Arial Unicode MS" pitchFamily="34" charset="-128"/>
+                  <a:cs typeface="Arial Unicode MS" pitchFamily="34" charset="-128"/>
+                </a:rPr>
+                <a:t>client</a:t>
+              </a:r>
+              <a:endParaRPr kumimoji="0" lang="de-DE" sz="1800" b="0" i="0" u="none" strike="noStrike" kern="0" cap="none" spc="0" normalizeH="0" baseline="0" noProof="0" dirty="0">
+                <a:ln>
+                  <a:noFill/>
+                </a:ln>
+                <a:effectLst/>
+                <a:uLnTx/>
+                <a:uFillTx/>
+                <a:ea typeface="Arial Unicode MS" pitchFamily="34" charset="-128"/>
+                <a:cs typeface="Arial Unicode MS" pitchFamily="34" charset="-128"/>
+              </a:endParaRPr>
+            </a:p>
+          </p:txBody>
+        </p:sp>
+        <p:sp>
+          <p:nvSpPr>
+            <p:cNvPr id="11" name="Rectangle 10">
+              <a:extLst>
+                <a:ext uri="{FF2B5EF4-FFF2-40B4-BE49-F238E27FC236}">
+                  <a16:creationId xmlns:a16="http://schemas.microsoft.com/office/drawing/2014/main" id="{9F572E94-DE2F-4584-90F0-B18FA2D59F06}"/>
+                </a:ext>
+              </a:extLst>
+            </p:cNvPr>
+            <p:cNvSpPr/>
+            <p:nvPr/>
+          </p:nvSpPr>
+          <p:spPr bwMode="gray">
+            <a:xfrm>
+              <a:off x="9575331" y="5386537"/>
+              <a:ext cx="1073656" cy="428584"/>
+            </a:xfrm>
+            <a:prstGeom prst="rect">
+              <a:avLst/>
+            </a:prstGeom>
+            <a:ln>
+              <a:headEnd/>
+              <a:tailEnd/>
+            </a:ln>
+          </p:spPr>
+          <p:style>
+            <a:lnRef idx="2">
+              <a:schemeClr val="accent2"/>
+            </a:lnRef>
+            <a:fillRef idx="1">
+              <a:schemeClr val="lt1"/>
+            </a:fillRef>
+            <a:effectRef idx="0">
+              <a:schemeClr val="accent2"/>
+            </a:effectRef>
+            <a:fontRef idx="minor">
+              <a:schemeClr val="dk1"/>
+            </a:fontRef>
+          </p:style>
+          <p:txBody>
+            <a:bodyPr lIns="90000" tIns="72000" rIns="90000" bIns="72000" rtlCol="0" anchor="ctr"/>
+            <a:lstStyle/>
+            <a:p>
+              <a:pPr marR="0" algn="ctr" defTabSz="914400" eaLnBrk="1" fontAlgn="base" latinLnBrk="0" hangingPunct="1">
+                <a:lnSpc>
+                  <a:spcPct val="100000"/>
+                </a:lnSpc>
+                <a:spcBef>
+                  <a:spcPct val="50000"/>
+                </a:spcBef>
+                <a:spcAft>
+                  <a:spcPct val="0"/>
+                </a:spcAft>
+                <a:buClr>
+                  <a:srgbClr val="F0AB00"/>
+                </a:buClr>
+                <a:buSzPct val="80000"/>
+                <a:tabLst/>
+              </a:pPr>
+              <a:r>
+                <a:rPr lang="de-DE" sz="1800" kern="0" dirty="0">
+                  <a:ea typeface="Arial Unicode MS" pitchFamily="34" charset="-128"/>
+                  <a:cs typeface="Arial Unicode MS" pitchFamily="34" charset="-128"/>
+                </a:rPr>
+                <a:t>Port: 80</a:t>
+              </a:r>
+              <a:endParaRPr kumimoji="0" lang="de-DE" sz="1800" b="0" i="0" u="none" strike="noStrike" kern="0" cap="none" spc="0" normalizeH="0" baseline="0" noProof="0" dirty="0">
+                <a:ln>
+                  <a:noFill/>
+                </a:ln>
+                <a:effectLst/>
+                <a:uLnTx/>
+                <a:uFillTx/>
+                <a:ea typeface="Arial Unicode MS" pitchFamily="34" charset="-128"/>
+                <a:cs typeface="Arial Unicode MS" pitchFamily="34" charset="-128"/>
+              </a:endParaRPr>
+            </a:p>
+          </p:txBody>
+        </p:sp>
+        <p:sp>
+          <p:nvSpPr>
+            <p:cNvPr id="13" name="Rectangle 12">
+              <a:extLst>
+                <a:ext uri="{FF2B5EF4-FFF2-40B4-BE49-F238E27FC236}">
+                  <a16:creationId xmlns:a16="http://schemas.microsoft.com/office/drawing/2014/main" id="{91320E9C-3B8A-4B42-A640-2260E1AC8CF2}"/>
+                </a:ext>
+              </a:extLst>
+            </p:cNvPr>
+            <p:cNvSpPr/>
+            <p:nvPr/>
+          </p:nvSpPr>
+          <p:spPr bwMode="gray">
+            <a:xfrm>
+              <a:off x="8130685" y="4205839"/>
+              <a:ext cx="1645920" cy="365760"/>
+            </a:xfrm>
+            <a:prstGeom prst="rect">
+              <a:avLst/>
+            </a:prstGeom>
+            <a:ln>
+              <a:headEnd/>
+              <a:tailEnd/>
+            </a:ln>
+          </p:spPr>
+          <p:style>
+            <a:lnRef idx="2">
+              <a:schemeClr val="accent2"/>
+            </a:lnRef>
+            <a:fillRef idx="1">
+              <a:schemeClr val="lt1"/>
+            </a:fillRef>
+            <a:effectRef idx="0">
+              <a:schemeClr val="accent2"/>
+            </a:effectRef>
+            <a:fontRef idx="minor">
+              <a:schemeClr val="dk1"/>
+            </a:fontRef>
+          </p:style>
+          <p:txBody>
+            <a:bodyPr lIns="90000" tIns="72000" rIns="90000" bIns="72000" rtlCol="0" anchor="ctr"/>
+            <a:lstStyle/>
+            <a:p>
+              <a:pPr marR="0" algn="ctr" defTabSz="914400" eaLnBrk="1" fontAlgn="base" latinLnBrk="0" hangingPunct="1">
+                <a:lnSpc>
+                  <a:spcPct val="100000"/>
+                </a:lnSpc>
+                <a:spcBef>
+                  <a:spcPct val="50000"/>
+                </a:spcBef>
+                <a:spcAft>
+                  <a:spcPct val="0"/>
+                </a:spcAft>
+                <a:buClr>
+                  <a:srgbClr val="F0AB00"/>
+                </a:buClr>
+                <a:buSzPct val="80000"/>
+                <a:tabLst/>
+              </a:pPr>
+              <a:r>
+                <a:rPr kumimoji="0" lang="de-DE" sz="1800" b="0" i="0" u="none" strike="noStrike" kern="0" cap="none" spc="0" normalizeH="0" baseline="0" noProof="0" dirty="0">
+                  <a:ln>
+                    <a:noFill/>
+                  </a:ln>
+                  <a:effectLst/>
+                  <a:uLnTx/>
+                  <a:uFillTx/>
+                  <a:ea typeface="Arial Unicode MS" pitchFamily="34" charset="-128"/>
+                  <a:cs typeface="Arial Unicode MS" pitchFamily="34" charset="-128"/>
+                </a:rPr>
+                <a:t>IP: 10.10.10.3</a:t>
+              </a:r>
+            </a:p>
+          </p:txBody>
+        </p:sp>
+      </p:grpSp>
+      <p:cxnSp>
+        <p:nvCxnSpPr>
+          <p:cNvPr id="16" name="Connector: Elbow 15">
+            <a:extLst>
+              <a:ext uri="{FF2B5EF4-FFF2-40B4-BE49-F238E27FC236}">
+                <a16:creationId xmlns:a16="http://schemas.microsoft.com/office/drawing/2014/main" id="{ADE7A174-FDE3-4744-8B4E-E5B3FEC53F27}"/>
+              </a:ext>
+            </a:extLst>
+          </p:cNvPr>
+          <p:cNvCxnSpPr>
+            <a:cxnSpLocks/>
+            <a:stCxn id="7" idx="0"/>
+            <a:endCxn id="10" idx="2"/>
+          </p:cNvCxnSpPr>
+          <p:nvPr/>
+        </p:nvCxnSpPr>
+        <p:spPr>
+          <a:xfrm flipV="1">
+            <a:off x="7233039" y="3611017"/>
+            <a:ext cx="1494170" cy="1575450"/>
+          </a:xfrm>
+          <a:prstGeom prst="bentConnector2">
+            <a:avLst/>
+          </a:prstGeom>
+          <a:ln w="57150">
+            <a:solidFill>
+              <a:schemeClr val="tx2"/>
+            </a:solidFill>
+            <a:headEnd type="none" w="med" len="med"/>
+            <a:tailEnd type="triangle"/>
+          </a:ln>
+        </p:spPr>
+        <p:style>
+          <a:lnRef idx="1">
+            <a:schemeClr val="accent1"/>
+          </a:lnRef>
+          <a:fillRef idx="0">
+            <a:schemeClr val="accent1"/>
+          </a:fillRef>
+          <a:effectRef idx="0">
+            <a:schemeClr val="accent1"/>
+          </a:effectRef>
+          <a:fontRef idx="minor">
+            <a:schemeClr val="tx1"/>
+          </a:fontRef>
+        </p:style>
+      </p:cxnSp>
+      <p:sp>
+        <p:nvSpPr>
+          <p:cNvPr id="27" name="Rectangle: Single Corner Snipped 26">
+            <a:extLst>
+              <a:ext uri="{FF2B5EF4-FFF2-40B4-BE49-F238E27FC236}">
+                <a16:creationId xmlns:a16="http://schemas.microsoft.com/office/drawing/2014/main" id="{C001CD37-F670-4E91-8ED5-09EA7CCBF5C4}"/>
+              </a:ext>
+            </a:extLst>
+          </p:cNvPr>
+          <p:cNvSpPr/>
+          <p:nvPr/>
+        </p:nvSpPr>
+        <p:spPr bwMode="gray">
+          <a:xfrm>
+            <a:off x="4776946" y="4013188"/>
+            <a:ext cx="2474332" cy="2346559"/>
+          </a:xfrm>
+          <a:prstGeom prst="snip1Rect">
+            <a:avLst/>
+          </a:prstGeom>
+          <a:solidFill>
+            <a:schemeClr val="accent1">
+              <a:lumMod val="40000"/>
+              <a:lumOff val="60000"/>
+            </a:schemeClr>
+          </a:solidFill>
+          <a:ln>
+            <a:headEnd/>
+            <a:tailEnd/>
+          </a:ln>
+        </p:spPr>
+        <p:style>
+          <a:lnRef idx="2">
+            <a:schemeClr val="accent2"/>
+          </a:lnRef>
+          <a:fillRef idx="1">
+            <a:schemeClr val="lt1"/>
+          </a:fillRef>
+          <a:effectRef idx="0">
+            <a:schemeClr val="accent2"/>
+          </a:effectRef>
+          <a:fontRef idx="minor">
+            <a:schemeClr val="dk1"/>
+          </a:fontRef>
+        </p:style>
+        <p:txBody>
+          <a:bodyPr lIns="90000" tIns="72000" rIns="90000" bIns="72000" rtlCol="0" anchor="ctr"/>
+          <a:lstStyle/>
+          <a:p>
+            <a:pPr algn="ctr" defTabSz="914400" fontAlgn="base">
+              <a:spcBef>
+                <a:spcPct val="50000"/>
+              </a:spcBef>
+              <a:spcAft>
+                <a:spcPct val="0"/>
+              </a:spcAft>
+              <a:buClr>
+                <a:srgbClr val="F0AB00"/>
+              </a:buClr>
+              <a:buSzPct val="80000"/>
+            </a:pPr>
+            <a:r>
+              <a:rPr lang="en-US" sz="1800" kern="0" dirty="0">
+                <a:solidFill>
+                  <a:schemeClr val="dk1"/>
+                </a:solidFill>
+                <a:ea typeface="Arial Unicode MS" pitchFamily="34" charset="-128"/>
+              </a:rPr>
+              <a:t>Service</a:t>
+            </a:r>
+          </a:p>
+          <a:p>
+            <a:pPr algn="ctr" defTabSz="914400" fontAlgn="base">
+              <a:spcBef>
+                <a:spcPct val="50000"/>
+              </a:spcBef>
+              <a:spcAft>
+                <a:spcPct val="0"/>
+              </a:spcAft>
+              <a:buClr>
+                <a:srgbClr val="F0AB00"/>
+              </a:buClr>
+              <a:buSzPct val="80000"/>
+            </a:pPr>
+            <a:r>
+              <a:rPr lang="en-US" sz="1800" kern="0" dirty="0">
+                <a:solidFill>
+                  <a:schemeClr val="dk1"/>
+                </a:solidFill>
+                <a:ea typeface="Arial Unicode MS" pitchFamily="34" charset="-128"/>
+              </a:rPr>
+              <a:t>Label: app</a:t>
+            </a:r>
+            <a:r>
+              <a:rPr lang="en-US" sz="1800" kern="0">
+                <a:solidFill>
+                  <a:schemeClr val="dk1"/>
+                </a:solidFill>
+                <a:ea typeface="Arial Unicode MS" pitchFamily="34" charset="-128"/>
+              </a:rPr>
+              <a:t>= nginx</a:t>
+            </a:r>
+            <a:endParaRPr lang="en-US" sz="1800" kern="0" dirty="0">
+              <a:solidFill>
+                <a:schemeClr val="dk1"/>
+              </a:solidFill>
+              <a:ea typeface="Arial Unicode MS" pitchFamily="34" charset="-128"/>
+            </a:endParaRPr>
+          </a:p>
+          <a:p>
+            <a:pPr algn="ctr" defTabSz="914400" fontAlgn="base">
+              <a:spcBef>
+                <a:spcPct val="50000"/>
+              </a:spcBef>
+              <a:spcAft>
+                <a:spcPct val="0"/>
+              </a:spcAft>
+              <a:buClr>
+                <a:srgbClr val="F0AB00"/>
+              </a:buClr>
+              <a:buSzPct val="80000"/>
+            </a:pPr>
+            <a:r>
+              <a:rPr lang="en-US" sz="1800" kern="0" dirty="0">
+                <a:solidFill>
+                  <a:schemeClr val="dk1"/>
+                </a:solidFill>
+                <a:ea typeface="Arial Unicode MS" pitchFamily="34" charset="-128"/>
+              </a:rPr>
+              <a:t>Name</a:t>
+            </a:r>
+            <a:r>
+              <a:rPr lang="en-US" sz="1800" kern="0">
+                <a:solidFill>
+                  <a:schemeClr val="dk1"/>
+                </a:solidFill>
+                <a:ea typeface="Arial Unicode MS" pitchFamily="34" charset="-128"/>
+              </a:rPr>
+              <a:t>: nginx-http</a:t>
+            </a:r>
+            <a:endParaRPr lang="en-US" sz="1800" kern="0" dirty="0">
+              <a:solidFill>
+                <a:schemeClr val="dk1"/>
+              </a:solidFill>
+              <a:ea typeface="Arial Unicode MS" pitchFamily="34" charset="-128"/>
+            </a:endParaRPr>
+          </a:p>
+          <a:p>
+            <a:pPr algn="ctr" defTabSz="914400" fontAlgn="base">
+              <a:spcBef>
+                <a:spcPct val="50000"/>
+              </a:spcBef>
+              <a:spcAft>
+                <a:spcPct val="0"/>
+              </a:spcAft>
+              <a:buClr>
+                <a:srgbClr val="F0AB00"/>
+              </a:buClr>
+              <a:buSzPct val="80000"/>
+            </a:pPr>
+            <a:r>
+              <a:rPr lang="en-US" sz="1800" kern="0">
+                <a:solidFill>
+                  <a:schemeClr val="dk1"/>
+                </a:solidFill>
+                <a:ea typeface="Arial Unicode MS" pitchFamily="34" charset="-128"/>
+              </a:rPr>
+              <a:t>TargetPort: http</a:t>
+            </a:r>
+            <a:endParaRPr lang="en-US" sz="1800" kern="0" dirty="0">
+              <a:solidFill>
+                <a:schemeClr val="dk1"/>
+              </a:solidFill>
+              <a:ea typeface="Arial Unicode MS" pitchFamily="34" charset="-128"/>
+            </a:endParaRPr>
+          </a:p>
+          <a:p>
+            <a:pPr algn="ctr" defTabSz="914400" fontAlgn="base">
+              <a:spcBef>
+                <a:spcPct val="50000"/>
+              </a:spcBef>
+              <a:spcAft>
+                <a:spcPct val="0"/>
+              </a:spcAft>
+              <a:buClr>
+                <a:srgbClr val="F0AB00"/>
+              </a:buClr>
+              <a:buSzPct val="80000"/>
+            </a:pPr>
+            <a:r>
+              <a:rPr lang="en-US" sz="1800" kern="0" dirty="0">
+                <a:solidFill>
+                  <a:schemeClr val="dk1"/>
+                </a:solidFill>
+                <a:ea typeface="Arial Unicode MS" pitchFamily="34" charset="-128"/>
+              </a:rPr>
+              <a:t>Port: 80</a:t>
+            </a:r>
+          </a:p>
+        </p:txBody>
+      </p:sp>
+      <p:cxnSp>
+        <p:nvCxnSpPr>
+          <p:cNvPr id="28" name="Connector: Elbow 27">
+            <a:extLst>
+              <a:ext uri="{FF2B5EF4-FFF2-40B4-BE49-F238E27FC236}">
+                <a16:creationId xmlns:a16="http://schemas.microsoft.com/office/drawing/2014/main" id="{05915C05-8AE8-49E3-B511-9862741B53DB}"/>
+              </a:ext>
+            </a:extLst>
+          </p:cNvPr>
+          <p:cNvCxnSpPr>
+            <a:cxnSpLocks/>
+            <a:stCxn id="27" idx="2"/>
+            <a:endCxn id="8" idx="2"/>
+          </p:cNvCxnSpPr>
+          <p:nvPr/>
+        </p:nvCxnSpPr>
+        <p:spPr>
+          <a:xfrm rot="10800000">
+            <a:off x="961024" y="3611018"/>
+            <a:ext cx="3815922" cy="1575451"/>
+          </a:xfrm>
+          <a:prstGeom prst="bentConnector2">
+            <a:avLst/>
+          </a:prstGeom>
+          <a:ln w="57150">
+            <a:solidFill>
+              <a:schemeClr val="tx2"/>
+            </a:solidFill>
+            <a:headEnd type="none" w="med" len="med"/>
+            <a:tailEnd type="triangle"/>
+          </a:ln>
+        </p:spPr>
+        <p:style>
+          <a:lnRef idx="1">
+            <a:schemeClr val="accent1"/>
+          </a:lnRef>
+          <a:fillRef idx="0">
+            <a:schemeClr val="accent1"/>
+          </a:fillRef>
+          <a:effectRef idx="0">
+            <a:schemeClr val="accent1"/>
+          </a:effectRef>
+          <a:fontRef idx="minor">
+            <a:schemeClr val="tx1"/>
+          </a:fontRef>
+        </p:style>
+      </p:cxnSp>
+    </p:spTree>
+    <p:extLst>
+      <p:ext uri="{BB962C8B-B14F-4D97-AF65-F5344CB8AC3E}">
+        <p14:creationId xmlns:p14="http://schemas.microsoft.com/office/powerpoint/2010/main" val="334388270"/>
+      </p:ext>
+    </p:extLst>
+  </p:cSld>
+  <p:clrMapOvr>
+    <a:masterClrMapping/>
+  </p:clrMapOvr>
+  <p:timing>
+    <p:tnLst>
+      <p:par>
+        <p:cTn id="1" dur="indefinite" restart="never" nodeType="tmRoot">
+          <p:childTnLst>
+            <p:seq concurrent="1" nextAc="seek">
+              <p:cTn id="2" dur="indefinite" nodeType="mainSeq">
+                <p:childTnLst>
+                  <p:par>
+                    <p:cTn id="3" fill="hold">
+                      <p:stCondLst>
+                        <p:cond delay="indefinite"/>
+                      </p:stCondLst>
+                      <p:childTnLst>
+                        <p:par>
+                          <p:cTn id="4" fill="hold">
+                            <p:stCondLst>
+                              <p:cond delay="0"/>
+                            </p:stCondLst>
+                            <p:childTnLst>
+                              <p:par>
+                                <p:cTn id="5" presetID="1" presetClass="exit" presetSubtype="0" fill="hold" grpId="0" nodeType="clickEffect">
+                                  <p:stCondLst>
+                                    <p:cond delay="0"/>
+                                  </p:stCondLst>
+                                  <p:childTnLst>
+                                    <p:set>
+                                      <p:cBhvr>
+                                        <p:cTn id="6" dur="1" fill="hold">
+                                          <p:stCondLst>
+                                            <p:cond delay="0"/>
+                                          </p:stCondLst>
+                                        </p:cTn>
+                                        <p:tgtEl>
+                                          <p:spTgt spid="7"/>
+                                        </p:tgtEl>
+                                        <p:attrNameLst>
+                                          <p:attrName>style.visibility</p:attrName>
+                                        </p:attrNameLst>
+                                      </p:cBhvr>
+                                      <p:to>
+                                        <p:strVal val="hidden"/>
+                                      </p:to>
+                                    </p:set>
+                                  </p:childTnLst>
+                                </p:cTn>
+                              </p:par>
+                              <p:par>
+                                <p:cTn id="7" presetID="1" presetClass="exit" presetSubtype="0" fill="hold" nodeType="withEffect">
+                                  <p:stCondLst>
+                                    <p:cond delay="0"/>
+                                  </p:stCondLst>
+                                  <p:childTnLst>
+                                    <p:set>
+                                      <p:cBhvr>
+                                        <p:cTn id="8" dur="1" fill="hold">
+                                          <p:stCondLst>
+                                            <p:cond delay="0"/>
+                                          </p:stCondLst>
+                                        </p:cTn>
+                                        <p:tgtEl>
+                                          <p:spTgt spid="16"/>
+                                        </p:tgtEl>
+                                        <p:attrNameLst>
+                                          <p:attrName>style.visibility</p:attrName>
+                                        </p:attrNameLst>
+                                      </p:cBhvr>
+                                      <p:to>
+                                        <p:strVal val="hidden"/>
+                                      </p:to>
+                                    </p:set>
+                                  </p:childTnLst>
+                                </p:cTn>
+                              </p:par>
+                            </p:childTnLst>
+                          </p:cTn>
+                        </p:par>
+                      </p:childTnLst>
+                    </p:cTn>
+                  </p:par>
+                  <p:par>
+                    <p:cTn id="9" fill="hold">
+                      <p:stCondLst>
+                        <p:cond delay="indefinite"/>
+                      </p:stCondLst>
+                      <p:childTnLst>
+                        <p:par>
+                          <p:cTn id="10" fill="hold">
+                            <p:stCondLst>
+                              <p:cond delay="0"/>
+                            </p:stCondLst>
+                            <p:childTnLst>
+                              <p:par>
+                                <p:cTn id="11" presetID="1" presetClass="entr" presetSubtype="0" fill="hold" nodeType="clickEffect">
+                                  <p:stCondLst>
+                                    <p:cond delay="0"/>
+                                  </p:stCondLst>
+                                  <p:childTnLst>
+                                    <p:set>
+                                      <p:cBhvr>
+                                        <p:cTn id="12" dur="1" fill="hold">
+                                          <p:stCondLst>
+                                            <p:cond delay="0"/>
+                                          </p:stCondLst>
+                                        </p:cTn>
+                                        <p:tgtEl>
+                                          <p:spTgt spid="31"/>
+                                        </p:tgtEl>
+                                        <p:attrNameLst>
+                                          <p:attrName>style.visibility</p:attrName>
+                                        </p:attrNameLst>
+                                      </p:cBhvr>
+                                      <p:to>
+                                        <p:strVal val="visible"/>
+                                      </p:to>
+                                    </p:set>
+                                  </p:childTnLst>
+                                </p:cTn>
+                              </p:par>
+                            </p:childTnLst>
+                          </p:cTn>
+                        </p:par>
+                      </p:childTnLst>
+                    </p:cTn>
+                  </p:par>
+                  <p:par>
+                    <p:cTn id="13" fill="hold">
+                      <p:stCondLst>
+                        <p:cond delay="indefinite"/>
+                      </p:stCondLst>
+                      <p:childTnLst>
+                        <p:par>
+                          <p:cTn id="14" fill="hold">
+                            <p:stCondLst>
+                              <p:cond delay="0"/>
+                            </p:stCondLst>
+                            <p:childTnLst>
+                              <p:par>
+                                <p:cTn id="15" presetID="1" presetClass="entr" presetSubtype="0" fill="hold" grpId="0" nodeType="clickEffect">
+                                  <p:stCondLst>
+                                    <p:cond delay="0"/>
+                                  </p:stCondLst>
+                                  <p:childTnLst>
+                                    <p:set>
+                                      <p:cBhvr>
+                                        <p:cTn id="16" dur="1" fill="hold">
+                                          <p:stCondLst>
+                                            <p:cond delay="0"/>
+                                          </p:stCondLst>
+                                        </p:cTn>
+                                        <p:tgtEl>
+                                          <p:spTgt spid="27"/>
+                                        </p:tgtEl>
+                                        <p:attrNameLst>
+                                          <p:attrName>style.visibility</p:attrName>
+                                        </p:attrNameLst>
+                                      </p:cBhvr>
+                                      <p:to>
+                                        <p:strVal val="visible"/>
+                                      </p:to>
+                                    </p:set>
+                                  </p:childTnLst>
+                                </p:cTn>
+                              </p:par>
+                              <p:par>
+                                <p:cTn id="17" presetID="1" presetClass="entr" presetSubtype="0" fill="hold" nodeType="withEffect">
+                                  <p:stCondLst>
+                                    <p:cond delay="0"/>
+                                  </p:stCondLst>
+                                  <p:childTnLst>
+                                    <p:set>
+                                      <p:cBhvr>
+                                        <p:cTn id="18" dur="1" fill="hold">
+                                          <p:stCondLst>
+                                            <p:cond delay="0"/>
+                                          </p:stCondLst>
+                                        </p:cTn>
+                                        <p:tgtEl>
+                                          <p:spTgt spid="28"/>
+                                        </p:tgtEl>
+                                        <p:attrNameLst>
+                                          <p:attrName>style.visibility</p:attrName>
+                                        </p:attrNameLst>
+                                      </p:cBhvr>
+                                      <p:to>
+                                        <p:strVal val="visible"/>
+                                      </p:to>
+                                    </p:set>
+                                  </p:childTnLst>
+                                </p:cTn>
+                              </p:par>
+                            </p:childTnLst>
+                          </p:cTn>
+                        </p:par>
+                      </p:childTnLst>
+                    </p:cTn>
+                  </p:par>
+                </p:childTnLst>
+              </p:cTn>
+              <p:prevCondLst>
+                <p:cond evt="onPrev" delay="0">
+                  <p:tgtEl>
+                    <p:sldTgt/>
+                  </p:tgtEl>
+                </p:cond>
+              </p:prevCondLst>
+              <p:nextCondLst>
+                <p:cond evt="onNext" delay="0">
+                  <p:tgtEl>
+                    <p:sldTgt/>
+                  </p:tgtEl>
+                </p:cond>
+              </p:nextCondLst>
+            </p:seq>
+          </p:childTnLst>
+        </p:cTn>
+      </p:par>
+    </p:tnLst>
+    <p:bldLst>
+      <p:bldP spid="7" grpId="0" animBg="1"/>
+      <p:bldP spid="27" grpId="0" animBg="1"/>
+    </p:bldLst>
+  </p:timing>
+</p:sld>
+</file>
+
+<file path=ppt/slides/slide8.xml><?xml version="1.0" encoding="utf-8"?>
+<p:sld xmlns:a="http://schemas.openxmlformats.org/drawingml/2006/main" xmlns:r="http://schemas.openxmlformats.org/officeDocument/2006/relationships" xmlns:p="http://schemas.openxmlformats.org/presentationml/2006/main">
+  <p:cSld>
+    <p:spTree>
+      <p:nvGrpSpPr>
+        <p:cNvPr id="1" name=""/>
+        <p:cNvGrpSpPr/>
+        <p:nvPr/>
+      </p:nvGrpSpPr>
+      <p:grpSpPr>
+        <a:xfrm>
+          <a:off x="0" y="0"/>
+          <a:ext cx="0" cy="0"/>
+          <a:chOff x="0" y="0"/>
+          <a:chExt cx="0" cy="0"/>
+        </a:xfrm>
+      </p:grpSpPr>
+      <p:sp>
+        <p:nvSpPr>
           <p:cNvPr id="2" name="Title 1"/>
           <p:cNvSpPr>
             <a:spLocks noGrp="1"/>
@@ -11508,7 +14612,7 @@
 </p:sld>
 </file>
 
-<file path=ppt/slides/slide8.xml><?xml version="1.0" encoding="utf-8"?>
+<file path=ppt/slides/slide9.xml><?xml version="1.0" encoding="utf-8"?>
 <p:sld xmlns:a="http://schemas.openxmlformats.org/drawingml/2006/main" xmlns:r="http://schemas.openxmlformats.org/officeDocument/2006/relationships" xmlns:p="http://schemas.openxmlformats.org/presentationml/2006/main">
   <p:cSld>
     <p:spTree>
@@ -13329,1487 +16433,6 @@
       <p:bldP spid="52" grpId="0" animBg="1"/>
     </p:bldLst>
   </p:timing>
-</p:sld>
-</file>
-
-<file path=ppt/slides/slide9.xml><?xml version="1.0" encoding="utf-8"?>
-<p:sld xmlns:a="http://schemas.openxmlformats.org/drawingml/2006/main" xmlns:r="http://schemas.openxmlformats.org/officeDocument/2006/relationships" xmlns:p="http://schemas.openxmlformats.org/presentationml/2006/main">
-  <p:cSld>
-    <p:spTree>
-      <p:nvGrpSpPr>
-        <p:cNvPr id="1" name=""/>
-        <p:cNvGrpSpPr/>
-        <p:nvPr/>
-      </p:nvGrpSpPr>
-      <p:grpSpPr>
-        <a:xfrm>
-          <a:off x="0" y="0"/>
-          <a:ext cx="0" cy="0"/>
-          <a:chOff x="0" y="0"/>
-          <a:chExt cx="0" cy="0"/>
-        </a:xfrm>
-      </p:grpSpPr>
-      <p:sp>
-        <p:nvSpPr>
-          <p:cNvPr id="21" name="Rectangle 20"/>
-          <p:cNvSpPr/>
-          <p:nvPr/>
-        </p:nvSpPr>
-        <p:spPr bwMode="gray">
-          <a:xfrm>
-            <a:off x="6141720" y="3390899"/>
-            <a:ext cx="4960620" cy="2865121"/>
-          </a:xfrm>
-          <a:prstGeom prst="rect">
-            <a:avLst/>
-          </a:prstGeom>
-          <a:ln>
-            <a:headEnd/>
-            <a:tailEnd/>
-          </a:ln>
-        </p:spPr>
-        <p:style>
-          <a:lnRef idx="2">
-            <a:schemeClr val="accent2"/>
-          </a:lnRef>
-          <a:fillRef idx="1">
-            <a:schemeClr val="lt1"/>
-          </a:fillRef>
-          <a:effectRef idx="0">
-            <a:schemeClr val="accent2"/>
-          </a:effectRef>
-          <a:fontRef idx="minor">
-            <a:schemeClr val="dk1"/>
-          </a:fontRef>
-        </p:style>
-        <p:txBody>
-          <a:bodyPr lIns="90000" tIns="72000" rIns="90000" bIns="72000" rtlCol="0" anchor="t"/>
-          <a:lstStyle/>
-          <a:p>
-            <a:pPr marR="0" algn="ctr" defTabSz="914400" eaLnBrk="1" fontAlgn="base" latinLnBrk="0" hangingPunct="1">
-              <a:lnSpc>
-                <a:spcPct val="100000"/>
-              </a:lnSpc>
-              <a:spcBef>
-                <a:spcPct val="50000"/>
-              </a:spcBef>
-              <a:spcAft>
-                <a:spcPct val="0"/>
-              </a:spcAft>
-              <a:buClr>
-                <a:srgbClr val="F0AB00"/>
-              </a:buClr>
-              <a:buSzPct val="80000"/>
-              <a:tabLst/>
-            </a:pPr>
-            <a:r>
-              <a:rPr kumimoji="0" lang="en-US" sz="1800" b="1" i="0" u="none" strike="noStrike" kern="0" cap="none" spc="0" normalizeH="0" baseline="0" noProof="0" dirty="0">
-                <a:ln>
-                  <a:noFill/>
-                </a:ln>
-                <a:effectLst/>
-                <a:uLnTx/>
-                <a:uFillTx/>
-                <a:ea typeface="Arial Unicode MS" pitchFamily="34" charset="-128"/>
-                <a:cs typeface="Arial Unicode MS" pitchFamily="34" charset="-128"/>
-              </a:rPr>
-              <a:t>Node B</a:t>
-            </a:r>
-          </a:p>
-        </p:txBody>
-      </p:sp>
-      <p:sp>
-        <p:nvSpPr>
-          <p:cNvPr id="2" name="Title 1"/>
-          <p:cNvSpPr>
-            <a:spLocks noGrp="1"/>
-          </p:cNvSpPr>
-          <p:nvPr>
-            <p:ph type="title"/>
-          </p:nvPr>
-        </p:nvSpPr>
-        <p:spPr/>
-        <p:txBody>
-          <a:bodyPr/>
-          <a:lstStyle/>
-          <a:p>
-            <a:r>
-              <a:rPr lang="en-US" dirty="0"/>
-              <a:t>How </a:t>
-            </a:r>
-            <a:r>
-              <a:rPr lang="en-US" dirty="0" err="1"/>
-              <a:t>NodePorts</a:t>
-            </a:r>
-            <a:r>
-              <a:rPr lang="en-US" dirty="0"/>
-              <a:t> work</a:t>
-            </a:r>
-          </a:p>
-        </p:txBody>
-      </p:sp>
-      <p:sp>
-        <p:nvSpPr>
-          <p:cNvPr id="4" name="Rectangle 3"/>
-          <p:cNvSpPr/>
-          <p:nvPr/>
-        </p:nvSpPr>
-        <p:spPr bwMode="gray">
-          <a:xfrm>
-            <a:off x="952500" y="3390900"/>
-            <a:ext cx="4960620" cy="2865120"/>
-          </a:xfrm>
-          <a:prstGeom prst="rect">
-            <a:avLst/>
-          </a:prstGeom>
-          <a:ln>
-            <a:headEnd/>
-            <a:tailEnd/>
-          </a:ln>
-        </p:spPr>
-        <p:style>
-          <a:lnRef idx="2">
-            <a:schemeClr val="accent2"/>
-          </a:lnRef>
-          <a:fillRef idx="1">
-            <a:schemeClr val="lt1"/>
-          </a:fillRef>
-          <a:effectRef idx="0">
-            <a:schemeClr val="accent2"/>
-          </a:effectRef>
-          <a:fontRef idx="minor">
-            <a:schemeClr val="dk1"/>
-          </a:fontRef>
-        </p:style>
-        <p:txBody>
-          <a:bodyPr lIns="90000" tIns="72000" rIns="90000" bIns="72000" rtlCol="0" anchor="t"/>
-          <a:lstStyle/>
-          <a:p>
-            <a:pPr marR="0" algn="ctr" defTabSz="914400" eaLnBrk="1" fontAlgn="base" latinLnBrk="0" hangingPunct="1">
-              <a:lnSpc>
-                <a:spcPct val="100000"/>
-              </a:lnSpc>
-              <a:spcBef>
-                <a:spcPct val="50000"/>
-              </a:spcBef>
-              <a:spcAft>
-                <a:spcPct val="0"/>
-              </a:spcAft>
-              <a:buClr>
-                <a:srgbClr val="F0AB00"/>
-              </a:buClr>
-              <a:buSzPct val="80000"/>
-              <a:tabLst/>
-            </a:pPr>
-            <a:r>
-              <a:rPr kumimoji="0" lang="en-US" sz="1800" b="1" i="0" u="none" strike="noStrike" kern="0" cap="none" spc="0" normalizeH="0" baseline="0" noProof="0" dirty="0">
-                <a:ln>
-                  <a:noFill/>
-                </a:ln>
-                <a:effectLst/>
-                <a:uLnTx/>
-                <a:uFillTx/>
-                <a:ea typeface="Arial Unicode MS" pitchFamily="34" charset="-128"/>
-                <a:cs typeface="Arial Unicode MS" pitchFamily="34" charset="-128"/>
-              </a:rPr>
-              <a:t>Node A</a:t>
-            </a:r>
-          </a:p>
-        </p:txBody>
-      </p:sp>
-      <p:sp>
-        <p:nvSpPr>
-          <p:cNvPr id="6" name="Rectangle 5"/>
-          <p:cNvSpPr/>
-          <p:nvPr/>
-        </p:nvSpPr>
-        <p:spPr bwMode="gray">
-          <a:xfrm>
-            <a:off x="2337562" y="4439970"/>
-            <a:ext cx="1815338" cy="1160859"/>
-          </a:xfrm>
-          <a:prstGeom prst="rect">
-            <a:avLst/>
-          </a:prstGeom>
-          <a:ln>
-            <a:headEnd/>
-            <a:tailEnd/>
-          </a:ln>
-        </p:spPr>
-        <p:style>
-          <a:lnRef idx="2">
-            <a:schemeClr val="accent2">
-              <a:shade val="50000"/>
-            </a:schemeClr>
-          </a:lnRef>
-          <a:fillRef idx="1">
-            <a:schemeClr val="accent2"/>
-          </a:fillRef>
-          <a:effectRef idx="0">
-            <a:schemeClr val="accent2"/>
-          </a:effectRef>
-          <a:fontRef idx="minor">
-            <a:schemeClr val="lt1"/>
-          </a:fontRef>
-        </p:style>
-        <p:txBody>
-          <a:bodyPr lIns="90000" tIns="72000" rIns="90000" bIns="72000" rtlCol="0" anchor="ctr"/>
-          <a:lstStyle/>
-          <a:p>
-            <a:pPr marR="0" algn="ctr" defTabSz="914400" eaLnBrk="1" fontAlgn="base" latinLnBrk="0" hangingPunct="1">
-              <a:lnSpc>
-                <a:spcPct val="100000"/>
-              </a:lnSpc>
-              <a:spcBef>
-                <a:spcPct val="50000"/>
-              </a:spcBef>
-              <a:spcAft>
-                <a:spcPct val="0"/>
-              </a:spcAft>
-              <a:buClr>
-                <a:srgbClr val="F0AB00"/>
-              </a:buClr>
-              <a:buSzPct val="80000"/>
-              <a:tabLst/>
-            </a:pPr>
-            <a:r>
-              <a:rPr lang="de-DE" sz="1600" b="1" kern="0" noProof="0" dirty="0" err="1">
-                <a:ea typeface="Arial Unicode MS" pitchFamily="34" charset="-128"/>
-                <a:cs typeface="Arial Unicode MS" pitchFamily="34" charset="-128"/>
-              </a:rPr>
-              <a:t>Pod</a:t>
-            </a:r>
-            <a:endParaRPr kumimoji="0" lang="de-DE" sz="1600" b="1" i="0" u="none" strike="noStrike" kern="0" cap="none" spc="0" normalizeH="0" baseline="0" noProof="0" dirty="0">
-              <a:ln>
-                <a:noFill/>
-              </a:ln>
-              <a:effectLst/>
-              <a:uLnTx/>
-              <a:uFillTx/>
-              <a:ea typeface="Arial Unicode MS" pitchFamily="34" charset="-128"/>
-              <a:cs typeface="Arial Unicode MS" pitchFamily="34" charset="-128"/>
-            </a:endParaRPr>
-          </a:p>
-        </p:txBody>
-      </p:sp>
-      <p:sp>
-        <p:nvSpPr>
-          <p:cNvPr id="11" name="Rectangle 10"/>
-          <p:cNvSpPr/>
-          <p:nvPr/>
-        </p:nvSpPr>
-        <p:spPr bwMode="gray">
-          <a:xfrm>
-            <a:off x="2422271" y="4205839"/>
-            <a:ext cx="1645920" cy="365760"/>
-          </a:xfrm>
-          <a:prstGeom prst="rect">
-            <a:avLst/>
-          </a:prstGeom>
-          <a:ln>
-            <a:headEnd/>
-            <a:tailEnd/>
-          </a:ln>
-        </p:spPr>
-        <p:style>
-          <a:lnRef idx="2">
-            <a:schemeClr val="accent2"/>
-          </a:lnRef>
-          <a:fillRef idx="1">
-            <a:schemeClr val="lt1"/>
-          </a:fillRef>
-          <a:effectRef idx="0">
-            <a:schemeClr val="accent2"/>
-          </a:effectRef>
-          <a:fontRef idx="minor">
-            <a:schemeClr val="dk1"/>
-          </a:fontRef>
-        </p:style>
-        <p:txBody>
-          <a:bodyPr lIns="90000" tIns="72000" rIns="90000" bIns="72000" rtlCol="0" anchor="ctr"/>
-          <a:lstStyle/>
-          <a:p>
-            <a:pPr marR="0" algn="ctr" defTabSz="914400" eaLnBrk="1" fontAlgn="base" latinLnBrk="0" hangingPunct="1">
-              <a:lnSpc>
-                <a:spcPct val="100000"/>
-              </a:lnSpc>
-              <a:spcBef>
-                <a:spcPct val="50000"/>
-              </a:spcBef>
-              <a:spcAft>
-                <a:spcPct val="0"/>
-              </a:spcAft>
-              <a:buClr>
-                <a:srgbClr val="F0AB00"/>
-              </a:buClr>
-              <a:buSzPct val="80000"/>
-              <a:tabLst/>
-            </a:pPr>
-            <a:r>
-              <a:rPr kumimoji="0" lang="de-DE" sz="1800" b="0" i="0" u="none" strike="noStrike" kern="0" cap="none" spc="0" normalizeH="0" baseline="0" noProof="0" dirty="0">
-                <a:ln>
-                  <a:noFill/>
-                </a:ln>
-                <a:effectLst/>
-                <a:uLnTx/>
-                <a:uFillTx/>
-                <a:ea typeface="Arial Unicode MS" pitchFamily="34" charset="-128"/>
-                <a:cs typeface="Arial Unicode MS" pitchFamily="34" charset="-128"/>
-              </a:rPr>
-              <a:t>IP: 10.10.10.1</a:t>
-            </a:r>
-          </a:p>
-        </p:txBody>
-      </p:sp>
-      <p:sp>
-        <p:nvSpPr>
-          <p:cNvPr id="14" name="Rectangle: Single Corner Snipped 13"/>
-          <p:cNvSpPr/>
-          <p:nvPr/>
-        </p:nvSpPr>
-        <p:spPr bwMode="gray">
-          <a:xfrm>
-            <a:off x="4806733" y="2743200"/>
-            <a:ext cx="2474332" cy="2346559"/>
-          </a:xfrm>
-          <a:prstGeom prst="snip1Rect">
-            <a:avLst/>
-          </a:prstGeom>
-          <a:ln>
-            <a:headEnd/>
-            <a:tailEnd/>
-          </a:ln>
-        </p:spPr>
-        <p:style>
-          <a:lnRef idx="3">
-            <a:schemeClr val="lt1"/>
-          </a:lnRef>
-          <a:fillRef idx="1">
-            <a:schemeClr val="accent2"/>
-          </a:fillRef>
-          <a:effectRef idx="1">
-            <a:schemeClr val="accent2"/>
-          </a:effectRef>
-          <a:fontRef idx="minor">
-            <a:schemeClr val="lt1"/>
-          </a:fontRef>
-        </p:style>
-        <p:txBody>
-          <a:bodyPr lIns="90000" tIns="72000" rIns="90000" bIns="72000" rtlCol="0" anchor="ctr"/>
-          <a:lstStyle/>
-          <a:p>
-            <a:pPr marR="0" algn="ctr" defTabSz="914400" eaLnBrk="1" fontAlgn="base" latinLnBrk="0" hangingPunct="1">
-              <a:lnSpc>
-                <a:spcPct val="100000"/>
-              </a:lnSpc>
-              <a:spcBef>
-                <a:spcPct val="50000"/>
-              </a:spcBef>
-              <a:spcAft>
-                <a:spcPct val="0"/>
-              </a:spcAft>
-              <a:buClr>
-                <a:srgbClr val="F0AB00"/>
-              </a:buClr>
-              <a:buSzPct val="80000"/>
-              <a:tabLst/>
-            </a:pPr>
-            <a:r>
-              <a:rPr kumimoji="0" lang="en-US" sz="1800" b="0" i="0" u="none" strike="noStrike" kern="0" cap="none" spc="0" normalizeH="0" baseline="0" noProof="0" dirty="0">
-                <a:ln>
-                  <a:noFill/>
-                </a:ln>
-                <a:effectLst/>
-                <a:uLnTx/>
-                <a:uFillTx/>
-                <a:ea typeface="Arial Unicode MS" pitchFamily="34" charset="-128"/>
-                <a:cs typeface="Arial Unicode MS" pitchFamily="34" charset="-128"/>
-              </a:rPr>
-              <a:t>Service</a:t>
-            </a:r>
-          </a:p>
-          <a:p>
-            <a:pPr marR="0" algn="ctr" defTabSz="914400" eaLnBrk="1" fontAlgn="base" latinLnBrk="0" hangingPunct="1">
-              <a:lnSpc>
-                <a:spcPct val="100000"/>
-              </a:lnSpc>
-              <a:spcBef>
-                <a:spcPct val="50000"/>
-              </a:spcBef>
-              <a:spcAft>
-                <a:spcPct val="0"/>
-              </a:spcAft>
-              <a:buClr>
-                <a:srgbClr val="F0AB00"/>
-              </a:buClr>
-              <a:buSzPct val="80000"/>
-              <a:tabLst/>
-            </a:pPr>
-            <a:r>
-              <a:rPr lang="en-US" sz="1800" kern="0" dirty="0">
-                <a:ea typeface="Arial Unicode MS" pitchFamily="34" charset="-128"/>
-                <a:cs typeface="Arial Unicode MS" pitchFamily="34" charset="-128"/>
-              </a:rPr>
-              <a:t>Label: app= </a:t>
-            </a:r>
-            <a:r>
-              <a:rPr lang="en-US" sz="1800" kern="0" dirty="0" err="1">
-                <a:ea typeface="Arial Unicode MS" pitchFamily="34" charset="-128"/>
-                <a:cs typeface="Arial Unicode MS" pitchFamily="34" charset="-128"/>
-              </a:rPr>
-              <a:t>nginx</a:t>
-            </a:r>
-            <a:endParaRPr kumimoji="0" lang="en-US" sz="1800" b="0" i="0" u="none" strike="noStrike" kern="0" cap="none" spc="0" normalizeH="0" baseline="0" noProof="0" dirty="0">
-              <a:ln>
-                <a:noFill/>
-              </a:ln>
-              <a:effectLst/>
-              <a:uLnTx/>
-              <a:uFillTx/>
-              <a:ea typeface="Arial Unicode MS" pitchFamily="34" charset="-128"/>
-              <a:cs typeface="Arial Unicode MS" pitchFamily="34" charset="-128"/>
-            </a:endParaRPr>
-          </a:p>
-          <a:p>
-            <a:pPr marL="285750" marR="0" indent="-285750" defTabSz="914400" eaLnBrk="1" fontAlgn="base" latinLnBrk="0" hangingPunct="1">
-              <a:lnSpc>
-                <a:spcPct val="100000"/>
-              </a:lnSpc>
-              <a:spcBef>
-                <a:spcPct val="50000"/>
-              </a:spcBef>
-              <a:spcAft>
-                <a:spcPct val="0"/>
-              </a:spcAft>
-              <a:buClr>
-                <a:srgbClr val="F0AB00"/>
-              </a:buClr>
-              <a:buSzPct val="80000"/>
-              <a:buFontTx/>
-              <a:buChar char="-"/>
-              <a:tabLst/>
-            </a:pPr>
-            <a:r>
-              <a:rPr lang="en-US" sz="1800" kern="0" dirty="0" err="1">
-                <a:ea typeface="Arial Unicode MS" pitchFamily="34" charset="-128"/>
-                <a:cs typeface="Arial Unicode MS" pitchFamily="34" charset="-128"/>
-              </a:rPr>
-              <a:t>NodePort</a:t>
-            </a:r>
-            <a:r>
-              <a:rPr lang="en-US" sz="1800" kern="0" dirty="0">
-                <a:ea typeface="Arial Unicode MS" pitchFamily="34" charset="-128"/>
-                <a:cs typeface="Arial Unicode MS" pitchFamily="34" charset="-128"/>
-              </a:rPr>
-              <a:t>: 30021</a:t>
-            </a:r>
-          </a:p>
-          <a:p>
-            <a:pPr marL="285750" marR="0" indent="-285750" defTabSz="914400" eaLnBrk="1" fontAlgn="base" latinLnBrk="0" hangingPunct="1">
-              <a:lnSpc>
-                <a:spcPct val="100000"/>
-              </a:lnSpc>
-              <a:spcBef>
-                <a:spcPct val="50000"/>
-              </a:spcBef>
-              <a:spcAft>
-                <a:spcPct val="0"/>
-              </a:spcAft>
-              <a:buClr>
-                <a:srgbClr val="F0AB00"/>
-              </a:buClr>
-              <a:buSzPct val="80000"/>
-              <a:buFontTx/>
-              <a:buChar char="-"/>
-              <a:tabLst/>
-            </a:pPr>
-            <a:r>
-              <a:rPr lang="en-US" sz="1800" kern="0" dirty="0">
-                <a:ea typeface="Arial Unicode MS" pitchFamily="34" charset="-128"/>
-                <a:cs typeface="Arial Unicode MS" pitchFamily="34" charset="-128"/>
-              </a:rPr>
-              <a:t> </a:t>
-            </a:r>
-            <a:r>
-              <a:rPr lang="en-US" sz="1800" kern="0" dirty="0" err="1">
-                <a:ea typeface="Arial Unicode MS" pitchFamily="34" charset="-128"/>
-                <a:cs typeface="Arial Unicode MS" pitchFamily="34" charset="-128"/>
-              </a:rPr>
-              <a:t>TargetPort</a:t>
-            </a:r>
-            <a:r>
-              <a:rPr lang="en-US" sz="1800" kern="0" dirty="0">
-                <a:ea typeface="Arial Unicode MS" pitchFamily="34" charset="-128"/>
-                <a:cs typeface="Arial Unicode MS" pitchFamily="34" charset="-128"/>
-              </a:rPr>
-              <a:t>: 80</a:t>
-            </a:r>
-          </a:p>
-          <a:p>
-            <a:pPr marL="285750" marR="0" indent="-285750" defTabSz="914400" eaLnBrk="1" fontAlgn="base" latinLnBrk="0" hangingPunct="1">
-              <a:lnSpc>
-                <a:spcPct val="100000"/>
-              </a:lnSpc>
-              <a:spcBef>
-                <a:spcPct val="50000"/>
-              </a:spcBef>
-              <a:spcAft>
-                <a:spcPct val="0"/>
-              </a:spcAft>
-              <a:buClr>
-                <a:srgbClr val="F0AB00"/>
-              </a:buClr>
-              <a:buSzPct val="80000"/>
-              <a:buFontTx/>
-              <a:buChar char="-"/>
-              <a:tabLst/>
-            </a:pPr>
-            <a:r>
-              <a:rPr kumimoji="0" lang="en-US" sz="1800" b="0" i="0" u="none" strike="noStrike" kern="0" cap="none" spc="0" normalizeH="0" baseline="0" noProof="0" dirty="0">
-                <a:ln>
-                  <a:noFill/>
-                </a:ln>
-                <a:effectLst/>
-                <a:uLnTx/>
-                <a:uFillTx/>
-                <a:ea typeface="Arial Unicode MS" pitchFamily="34" charset="-128"/>
-                <a:cs typeface="Arial Unicode MS" pitchFamily="34" charset="-128"/>
-              </a:rPr>
-              <a:t>Port: 80</a:t>
-            </a:r>
-          </a:p>
-        </p:txBody>
-      </p:sp>
-      <p:sp>
-        <p:nvSpPr>
-          <p:cNvPr id="15" name="Rectangle 14"/>
-          <p:cNvSpPr/>
-          <p:nvPr/>
-        </p:nvSpPr>
-        <p:spPr bwMode="gray">
-          <a:xfrm>
-            <a:off x="1459043" y="5386537"/>
-            <a:ext cx="1319714" cy="428584"/>
-          </a:xfrm>
-          <a:prstGeom prst="rect">
-            <a:avLst/>
-          </a:prstGeom>
-          <a:solidFill>
-            <a:schemeClr val="accent1">
-              <a:lumMod val="40000"/>
-              <a:lumOff val="60000"/>
-            </a:schemeClr>
-          </a:solidFill>
-          <a:ln>
-            <a:headEnd/>
-            <a:tailEnd/>
-          </a:ln>
-        </p:spPr>
-        <p:style>
-          <a:lnRef idx="2">
-            <a:schemeClr val="accent2"/>
-          </a:lnRef>
-          <a:fillRef idx="1">
-            <a:schemeClr val="lt1"/>
-          </a:fillRef>
-          <a:effectRef idx="0">
-            <a:schemeClr val="accent2"/>
-          </a:effectRef>
-          <a:fontRef idx="minor">
-            <a:schemeClr val="dk1"/>
-          </a:fontRef>
-        </p:style>
-        <p:txBody>
-          <a:bodyPr lIns="90000" tIns="72000" rIns="90000" bIns="72000" rtlCol="0" anchor="ctr"/>
-          <a:lstStyle/>
-          <a:p>
-            <a:pPr marR="0" algn="ctr" defTabSz="914400" eaLnBrk="1" fontAlgn="base" latinLnBrk="0" hangingPunct="1">
-              <a:lnSpc>
-                <a:spcPct val="100000"/>
-              </a:lnSpc>
-              <a:spcBef>
-                <a:spcPct val="50000"/>
-              </a:spcBef>
-              <a:spcAft>
-                <a:spcPct val="0"/>
-              </a:spcAft>
-              <a:buClr>
-                <a:srgbClr val="F0AB00"/>
-              </a:buClr>
-              <a:buSzPct val="80000"/>
-              <a:tabLst/>
-            </a:pPr>
-            <a:r>
-              <a:rPr lang="de-DE" sz="1800" kern="0" dirty="0">
-                <a:ea typeface="Arial Unicode MS" pitchFamily="34" charset="-128"/>
-                <a:cs typeface="Arial Unicode MS" pitchFamily="34" charset="-128"/>
-              </a:rPr>
-              <a:t>a</a:t>
-            </a:r>
-            <a:r>
-              <a:rPr kumimoji="0" lang="de-DE" sz="1800" b="0" i="0" u="none" strike="noStrike" kern="0" cap="none" spc="0" normalizeH="0" baseline="0" noProof="0" dirty="0">
-                <a:ln>
-                  <a:noFill/>
-                </a:ln>
-                <a:effectLst/>
-                <a:uLnTx/>
-                <a:uFillTx/>
-                <a:ea typeface="Arial Unicode MS" pitchFamily="34" charset="-128"/>
-                <a:cs typeface="Arial Unicode MS" pitchFamily="34" charset="-128"/>
-              </a:rPr>
-              <a:t>pp=</a:t>
-            </a:r>
-            <a:r>
-              <a:rPr kumimoji="0" lang="de-DE" sz="1800" b="0" i="0" u="none" strike="noStrike" kern="0" cap="none" spc="0" normalizeH="0" baseline="0" noProof="0" dirty="0" err="1">
-                <a:ln>
-                  <a:noFill/>
-                </a:ln>
-                <a:effectLst/>
-                <a:uLnTx/>
-                <a:uFillTx/>
-                <a:ea typeface="Arial Unicode MS" pitchFamily="34" charset="-128"/>
-                <a:cs typeface="Arial Unicode MS" pitchFamily="34" charset="-128"/>
-              </a:rPr>
-              <a:t>nginx</a:t>
-            </a:r>
-            <a:endParaRPr kumimoji="0" lang="de-DE" sz="1800" b="0" i="0" u="none" strike="noStrike" kern="0" cap="none" spc="0" normalizeH="0" baseline="0" noProof="0" dirty="0">
-              <a:ln>
-                <a:noFill/>
-              </a:ln>
-              <a:effectLst/>
-              <a:uLnTx/>
-              <a:uFillTx/>
-              <a:ea typeface="Arial Unicode MS" pitchFamily="34" charset="-128"/>
-              <a:cs typeface="Arial Unicode MS" pitchFamily="34" charset="-128"/>
-            </a:endParaRPr>
-          </a:p>
-        </p:txBody>
-      </p:sp>
-      <p:sp>
-        <p:nvSpPr>
-          <p:cNvPr id="18" name="Rectangle 17"/>
-          <p:cNvSpPr/>
-          <p:nvPr/>
-        </p:nvSpPr>
-        <p:spPr bwMode="gray">
-          <a:xfrm>
-            <a:off x="8045976" y="4446544"/>
-            <a:ext cx="1815338" cy="1160859"/>
-          </a:xfrm>
-          <a:prstGeom prst="rect">
-            <a:avLst/>
-          </a:prstGeom>
-          <a:ln>
-            <a:headEnd/>
-            <a:tailEnd/>
-          </a:ln>
-        </p:spPr>
-        <p:style>
-          <a:lnRef idx="2">
-            <a:schemeClr val="accent2">
-              <a:shade val="50000"/>
-            </a:schemeClr>
-          </a:lnRef>
-          <a:fillRef idx="1">
-            <a:schemeClr val="accent2"/>
-          </a:fillRef>
-          <a:effectRef idx="0">
-            <a:schemeClr val="accent2"/>
-          </a:effectRef>
-          <a:fontRef idx="minor">
-            <a:schemeClr val="lt1"/>
-          </a:fontRef>
-        </p:style>
-        <p:txBody>
-          <a:bodyPr lIns="90000" tIns="72000" rIns="90000" bIns="72000" rtlCol="0" anchor="ctr"/>
-          <a:lstStyle/>
-          <a:p>
-            <a:pPr marR="0" algn="ctr" defTabSz="914400" eaLnBrk="1" fontAlgn="base" latinLnBrk="0" hangingPunct="1">
-              <a:lnSpc>
-                <a:spcPct val="100000"/>
-              </a:lnSpc>
-              <a:spcBef>
-                <a:spcPct val="50000"/>
-              </a:spcBef>
-              <a:spcAft>
-                <a:spcPct val="0"/>
-              </a:spcAft>
-              <a:buClr>
-                <a:srgbClr val="F0AB00"/>
-              </a:buClr>
-              <a:buSzPct val="80000"/>
-              <a:tabLst/>
-            </a:pPr>
-            <a:r>
-              <a:rPr lang="de-DE" sz="1600" b="1" kern="0" noProof="0" dirty="0" err="1">
-                <a:ea typeface="Arial Unicode MS" pitchFamily="34" charset="-128"/>
-                <a:cs typeface="Arial Unicode MS" pitchFamily="34" charset="-128"/>
-              </a:rPr>
-              <a:t>Pod</a:t>
-            </a:r>
-            <a:endParaRPr kumimoji="0" lang="de-DE" sz="1600" b="1" i="0" u="none" strike="noStrike" kern="0" cap="none" spc="0" normalizeH="0" baseline="0" noProof="0" dirty="0">
-              <a:ln>
-                <a:noFill/>
-              </a:ln>
-              <a:effectLst/>
-              <a:uLnTx/>
-              <a:uFillTx/>
-              <a:ea typeface="Arial Unicode MS" pitchFamily="34" charset="-128"/>
-              <a:cs typeface="Arial Unicode MS" pitchFamily="34" charset="-128"/>
-            </a:endParaRPr>
-          </a:p>
-        </p:txBody>
-      </p:sp>
-      <p:sp>
-        <p:nvSpPr>
-          <p:cNvPr id="19" name="Rectangle 18"/>
-          <p:cNvSpPr/>
-          <p:nvPr/>
-        </p:nvSpPr>
-        <p:spPr bwMode="gray">
-          <a:xfrm>
-            <a:off x="7208370" y="5386537"/>
-            <a:ext cx="1319714" cy="428584"/>
-          </a:xfrm>
-          <a:prstGeom prst="rect">
-            <a:avLst/>
-          </a:prstGeom>
-          <a:ln>
-            <a:headEnd/>
-            <a:tailEnd/>
-          </a:ln>
-        </p:spPr>
-        <p:style>
-          <a:lnRef idx="2">
-            <a:schemeClr val="accent2"/>
-          </a:lnRef>
-          <a:fillRef idx="1">
-            <a:schemeClr val="lt1"/>
-          </a:fillRef>
-          <a:effectRef idx="0">
-            <a:schemeClr val="accent2"/>
-          </a:effectRef>
-          <a:fontRef idx="minor">
-            <a:schemeClr val="dk1"/>
-          </a:fontRef>
-        </p:style>
-        <p:txBody>
-          <a:bodyPr lIns="90000" tIns="72000" rIns="90000" bIns="72000" rtlCol="0" anchor="ctr"/>
-          <a:lstStyle/>
-          <a:p>
-            <a:pPr marR="0" algn="ctr" defTabSz="914400" eaLnBrk="1" fontAlgn="base" latinLnBrk="0" hangingPunct="1">
-              <a:lnSpc>
-                <a:spcPct val="100000"/>
-              </a:lnSpc>
-              <a:spcBef>
-                <a:spcPct val="50000"/>
-              </a:spcBef>
-              <a:spcAft>
-                <a:spcPct val="0"/>
-              </a:spcAft>
-              <a:buClr>
-                <a:srgbClr val="F0AB00"/>
-              </a:buClr>
-              <a:buSzPct val="80000"/>
-              <a:tabLst/>
-            </a:pPr>
-            <a:r>
-              <a:rPr lang="de-DE" sz="1800" kern="0" dirty="0">
-                <a:ea typeface="Arial Unicode MS" pitchFamily="34" charset="-128"/>
-                <a:cs typeface="Arial Unicode MS" pitchFamily="34" charset="-128"/>
-              </a:rPr>
-              <a:t>a</a:t>
-            </a:r>
-            <a:r>
-              <a:rPr kumimoji="0" lang="de-DE" sz="1800" b="0" i="0" u="none" strike="noStrike" kern="0" cap="none" spc="0" normalizeH="0" baseline="0" noProof="0" dirty="0">
-                <a:ln>
-                  <a:noFill/>
-                </a:ln>
-                <a:effectLst/>
-                <a:uLnTx/>
-                <a:uFillTx/>
-                <a:ea typeface="Arial Unicode MS" pitchFamily="34" charset="-128"/>
-                <a:cs typeface="Arial Unicode MS" pitchFamily="34" charset="-128"/>
-              </a:rPr>
-              <a:t>pp=</a:t>
-            </a:r>
-            <a:r>
-              <a:rPr kumimoji="0" lang="de-DE" sz="1800" b="0" i="0" u="none" strike="noStrike" kern="0" cap="none" spc="0" normalizeH="0" baseline="0" noProof="0" dirty="0" err="1">
-                <a:ln>
-                  <a:noFill/>
-                </a:ln>
-                <a:effectLst/>
-                <a:uLnTx/>
-                <a:uFillTx/>
-                <a:ea typeface="Arial Unicode MS" pitchFamily="34" charset="-128"/>
-                <a:cs typeface="Arial Unicode MS" pitchFamily="34" charset="-128"/>
-              </a:rPr>
-              <a:t>client</a:t>
-            </a:r>
-            <a:endParaRPr kumimoji="0" lang="de-DE" sz="1800" b="0" i="0" u="none" strike="noStrike" kern="0" cap="none" spc="0" normalizeH="0" baseline="0" noProof="0" dirty="0">
-              <a:ln>
-                <a:noFill/>
-              </a:ln>
-              <a:effectLst/>
-              <a:uLnTx/>
-              <a:uFillTx/>
-              <a:ea typeface="Arial Unicode MS" pitchFamily="34" charset="-128"/>
-              <a:cs typeface="Arial Unicode MS" pitchFamily="34" charset="-128"/>
-            </a:endParaRPr>
-          </a:p>
-        </p:txBody>
-      </p:sp>
-      <p:sp>
-        <p:nvSpPr>
-          <p:cNvPr id="20" name="Rectangle 19"/>
-          <p:cNvSpPr/>
-          <p:nvPr/>
-        </p:nvSpPr>
-        <p:spPr bwMode="gray">
-          <a:xfrm>
-            <a:off x="9575331" y="5386537"/>
-            <a:ext cx="1073656" cy="428584"/>
-          </a:xfrm>
-          <a:prstGeom prst="rect">
-            <a:avLst/>
-          </a:prstGeom>
-          <a:ln>
-            <a:headEnd/>
-            <a:tailEnd/>
-          </a:ln>
-        </p:spPr>
-        <p:style>
-          <a:lnRef idx="2">
-            <a:schemeClr val="accent2"/>
-          </a:lnRef>
-          <a:fillRef idx="1">
-            <a:schemeClr val="lt1"/>
-          </a:fillRef>
-          <a:effectRef idx="0">
-            <a:schemeClr val="accent2"/>
-          </a:effectRef>
-          <a:fontRef idx="minor">
-            <a:schemeClr val="dk1"/>
-          </a:fontRef>
-        </p:style>
-        <p:txBody>
-          <a:bodyPr lIns="90000" tIns="72000" rIns="90000" bIns="72000" rtlCol="0" anchor="ctr"/>
-          <a:lstStyle/>
-          <a:p>
-            <a:pPr marR="0" algn="ctr" defTabSz="914400" eaLnBrk="1" fontAlgn="base" latinLnBrk="0" hangingPunct="1">
-              <a:lnSpc>
-                <a:spcPct val="100000"/>
-              </a:lnSpc>
-              <a:spcBef>
-                <a:spcPct val="50000"/>
-              </a:spcBef>
-              <a:spcAft>
-                <a:spcPct val="0"/>
-              </a:spcAft>
-              <a:buClr>
-                <a:srgbClr val="F0AB00"/>
-              </a:buClr>
-              <a:buSzPct val="80000"/>
-              <a:tabLst/>
-            </a:pPr>
-            <a:r>
-              <a:rPr lang="de-DE" sz="1800" kern="0" dirty="0">
-                <a:ea typeface="Arial Unicode MS" pitchFamily="34" charset="-128"/>
-                <a:cs typeface="Arial Unicode MS" pitchFamily="34" charset="-128"/>
-              </a:rPr>
-              <a:t>Port: 80</a:t>
-            </a:r>
-            <a:endParaRPr kumimoji="0" lang="de-DE" sz="1800" b="0" i="0" u="none" strike="noStrike" kern="0" cap="none" spc="0" normalizeH="0" baseline="0" noProof="0" dirty="0">
-              <a:ln>
-                <a:noFill/>
-              </a:ln>
-              <a:effectLst/>
-              <a:uLnTx/>
-              <a:uFillTx/>
-              <a:ea typeface="Arial Unicode MS" pitchFamily="34" charset="-128"/>
-              <a:cs typeface="Arial Unicode MS" pitchFamily="34" charset="-128"/>
-            </a:endParaRPr>
-          </a:p>
-        </p:txBody>
-      </p:sp>
-      <p:sp>
-        <p:nvSpPr>
-          <p:cNvPr id="17" name="Rectangle 16"/>
-          <p:cNvSpPr/>
-          <p:nvPr/>
-        </p:nvSpPr>
-        <p:spPr bwMode="gray">
-          <a:xfrm>
-            <a:off x="3826004" y="5386537"/>
-            <a:ext cx="1073656" cy="428584"/>
-          </a:xfrm>
-          <a:prstGeom prst="rect">
-            <a:avLst/>
-          </a:prstGeom>
-          <a:ln>
-            <a:headEnd/>
-            <a:tailEnd/>
-          </a:ln>
-        </p:spPr>
-        <p:style>
-          <a:lnRef idx="2">
-            <a:schemeClr val="accent2"/>
-          </a:lnRef>
-          <a:fillRef idx="1">
-            <a:schemeClr val="lt1"/>
-          </a:fillRef>
-          <a:effectRef idx="0">
-            <a:schemeClr val="accent2"/>
-          </a:effectRef>
-          <a:fontRef idx="minor">
-            <a:schemeClr val="dk1"/>
-          </a:fontRef>
-        </p:style>
-        <p:txBody>
-          <a:bodyPr lIns="90000" tIns="72000" rIns="90000" bIns="72000" rtlCol="0" anchor="ctr"/>
-          <a:lstStyle/>
-          <a:p>
-            <a:pPr marR="0" algn="ctr" defTabSz="914400" eaLnBrk="1" fontAlgn="base" latinLnBrk="0" hangingPunct="1">
-              <a:lnSpc>
-                <a:spcPct val="100000"/>
-              </a:lnSpc>
-              <a:spcBef>
-                <a:spcPct val="50000"/>
-              </a:spcBef>
-              <a:spcAft>
-                <a:spcPct val="0"/>
-              </a:spcAft>
-              <a:buClr>
-                <a:srgbClr val="F0AB00"/>
-              </a:buClr>
-              <a:buSzPct val="80000"/>
-              <a:tabLst/>
-            </a:pPr>
-            <a:r>
-              <a:rPr lang="de-DE" sz="1800" kern="0" dirty="0">
-                <a:ea typeface="Arial Unicode MS" pitchFamily="34" charset="-128"/>
-                <a:cs typeface="Arial Unicode MS" pitchFamily="34" charset="-128"/>
-              </a:rPr>
-              <a:t>Port: 80</a:t>
-            </a:r>
-            <a:endParaRPr kumimoji="0" lang="de-DE" sz="1800" b="0" i="0" u="none" strike="noStrike" kern="0" cap="none" spc="0" normalizeH="0" baseline="0" noProof="0" dirty="0">
-              <a:ln>
-                <a:noFill/>
-              </a:ln>
-              <a:effectLst/>
-              <a:uLnTx/>
-              <a:uFillTx/>
-              <a:ea typeface="Arial Unicode MS" pitchFamily="34" charset="-128"/>
-              <a:cs typeface="Arial Unicode MS" pitchFamily="34" charset="-128"/>
-            </a:endParaRPr>
-          </a:p>
-        </p:txBody>
-      </p:sp>
-      <p:sp>
-        <p:nvSpPr>
-          <p:cNvPr id="13" name="Rectangle 12"/>
-          <p:cNvSpPr/>
-          <p:nvPr/>
-        </p:nvSpPr>
-        <p:spPr bwMode="gray">
-          <a:xfrm>
-            <a:off x="8130685" y="4205839"/>
-            <a:ext cx="1645920" cy="365760"/>
-          </a:xfrm>
-          <a:prstGeom prst="rect">
-            <a:avLst/>
-          </a:prstGeom>
-          <a:ln>
-            <a:headEnd/>
-            <a:tailEnd/>
-          </a:ln>
-        </p:spPr>
-        <p:style>
-          <a:lnRef idx="2">
-            <a:schemeClr val="accent2"/>
-          </a:lnRef>
-          <a:fillRef idx="1">
-            <a:schemeClr val="lt1"/>
-          </a:fillRef>
-          <a:effectRef idx="0">
-            <a:schemeClr val="accent2"/>
-          </a:effectRef>
-          <a:fontRef idx="minor">
-            <a:schemeClr val="dk1"/>
-          </a:fontRef>
-        </p:style>
-        <p:txBody>
-          <a:bodyPr lIns="90000" tIns="72000" rIns="90000" bIns="72000" rtlCol="0" anchor="ctr"/>
-          <a:lstStyle/>
-          <a:p>
-            <a:pPr marR="0" algn="ctr" defTabSz="914400" eaLnBrk="1" fontAlgn="base" latinLnBrk="0" hangingPunct="1">
-              <a:lnSpc>
-                <a:spcPct val="100000"/>
-              </a:lnSpc>
-              <a:spcBef>
-                <a:spcPct val="50000"/>
-              </a:spcBef>
-              <a:spcAft>
-                <a:spcPct val="0"/>
-              </a:spcAft>
-              <a:buClr>
-                <a:srgbClr val="F0AB00"/>
-              </a:buClr>
-              <a:buSzPct val="80000"/>
-              <a:tabLst/>
-            </a:pPr>
-            <a:r>
-              <a:rPr kumimoji="0" lang="de-DE" sz="1800" b="0" i="0" u="none" strike="noStrike" kern="0" cap="none" spc="0" normalizeH="0" baseline="0" noProof="0" dirty="0">
-                <a:ln>
-                  <a:noFill/>
-                </a:ln>
-                <a:effectLst/>
-                <a:uLnTx/>
-                <a:uFillTx/>
-                <a:ea typeface="Arial Unicode MS" pitchFamily="34" charset="-128"/>
-                <a:cs typeface="Arial Unicode MS" pitchFamily="34" charset="-128"/>
-              </a:rPr>
-              <a:t>IP: 10.10.10.3</a:t>
-            </a:r>
-          </a:p>
-        </p:txBody>
-      </p:sp>
-      <p:sp>
-        <p:nvSpPr>
-          <p:cNvPr id="22" name="Rectangle 21"/>
-          <p:cNvSpPr/>
-          <p:nvPr/>
-        </p:nvSpPr>
-        <p:spPr bwMode="gray">
-          <a:xfrm>
-            <a:off x="341121" y="3227860"/>
-            <a:ext cx="2124327" cy="428584"/>
-          </a:xfrm>
-          <a:prstGeom prst="rect">
-            <a:avLst/>
-          </a:prstGeom>
-          <a:ln>
-            <a:headEnd/>
-            <a:tailEnd/>
-          </a:ln>
-        </p:spPr>
-        <p:style>
-          <a:lnRef idx="2">
-            <a:schemeClr val="accent5"/>
-          </a:lnRef>
-          <a:fillRef idx="1">
-            <a:schemeClr val="lt1"/>
-          </a:fillRef>
-          <a:effectRef idx="0">
-            <a:schemeClr val="accent5"/>
-          </a:effectRef>
-          <a:fontRef idx="minor">
-            <a:schemeClr val="dk1"/>
-          </a:fontRef>
-        </p:style>
-        <p:txBody>
-          <a:bodyPr lIns="90000" tIns="72000" rIns="90000" bIns="72000" rtlCol="0" anchor="ctr"/>
-          <a:lstStyle/>
-          <a:p>
-            <a:pPr marR="0" algn="ctr" defTabSz="914400" eaLnBrk="1" fontAlgn="base" latinLnBrk="0" hangingPunct="1">
-              <a:lnSpc>
-                <a:spcPct val="100000"/>
-              </a:lnSpc>
-              <a:spcBef>
-                <a:spcPct val="50000"/>
-              </a:spcBef>
-              <a:spcAft>
-                <a:spcPct val="0"/>
-              </a:spcAft>
-              <a:buClr>
-                <a:srgbClr val="F0AB00"/>
-              </a:buClr>
-              <a:buSzPct val="80000"/>
-              <a:tabLst/>
-            </a:pPr>
-            <a:r>
-              <a:rPr lang="de-DE" sz="1800" kern="0" dirty="0" err="1">
-                <a:ea typeface="Arial Unicode MS" pitchFamily="34" charset="-128"/>
-                <a:cs typeface="Arial Unicode MS" pitchFamily="34" charset="-128"/>
-              </a:rPr>
-              <a:t>NodePort</a:t>
-            </a:r>
-            <a:r>
-              <a:rPr lang="de-DE" sz="1800" kern="0" dirty="0">
-                <a:ea typeface="Arial Unicode MS" pitchFamily="34" charset="-128"/>
-                <a:cs typeface="Arial Unicode MS" pitchFamily="34" charset="-128"/>
-              </a:rPr>
-              <a:t>: 30021</a:t>
-            </a:r>
-            <a:endParaRPr kumimoji="0" lang="de-DE" sz="1800" b="0" i="0" u="none" strike="noStrike" kern="0" cap="none" spc="0" normalizeH="0" baseline="0" noProof="0" dirty="0">
-              <a:ln>
-                <a:noFill/>
-              </a:ln>
-              <a:effectLst/>
-              <a:uLnTx/>
-              <a:uFillTx/>
-              <a:ea typeface="Arial Unicode MS" pitchFamily="34" charset="-128"/>
-              <a:cs typeface="Arial Unicode MS" pitchFamily="34" charset="-128"/>
-            </a:endParaRPr>
-          </a:p>
-        </p:txBody>
-      </p:sp>
-      <p:sp>
-        <p:nvSpPr>
-          <p:cNvPr id="23" name="Rectangle 22"/>
-          <p:cNvSpPr/>
-          <p:nvPr/>
-        </p:nvSpPr>
-        <p:spPr bwMode="gray">
-          <a:xfrm>
-            <a:off x="9566150" y="3227860"/>
-            <a:ext cx="2124327" cy="428584"/>
-          </a:xfrm>
-          <a:prstGeom prst="rect">
-            <a:avLst/>
-          </a:prstGeom>
-          <a:ln>
-            <a:headEnd/>
-            <a:tailEnd/>
-          </a:ln>
-        </p:spPr>
-        <p:style>
-          <a:lnRef idx="2">
-            <a:schemeClr val="accent5"/>
-          </a:lnRef>
-          <a:fillRef idx="1">
-            <a:schemeClr val="lt1"/>
-          </a:fillRef>
-          <a:effectRef idx="0">
-            <a:schemeClr val="accent5"/>
-          </a:effectRef>
-          <a:fontRef idx="minor">
-            <a:schemeClr val="dk1"/>
-          </a:fontRef>
-        </p:style>
-        <p:txBody>
-          <a:bodyPr lIns="90000" tIns="72000" rIns="90000" bIns="72000" rtlCol="0" anchor="ctr"/>
-          <a:lstStyle/>
-          <a:p>
-            <a:pPr marR="0" algn="ctr" defTabSz="914400" eaLnBrk="1" fontAlgn="base" latinLnBrk="0" hangingPunct="1">
-              <a:lnSpc>
-                <a:spcPct val="100000"/>
-              </a:lnSpc>
-              <a:spcBef>
-                <a:spcPct val="50000"/>
-              </a:spcBef>
-              <a:spcAft>
-                <a:spcPct val="0"/>
-              </a:spcAft>
-              <a:buClr>
-                <a:srgbClr val="F0AB00"/>
-              </a:buClr>
-              <a:buSzPct val="80000"/>
-              <a:tabLst/>
-            </a:pPr>
-            <a:r>
-              <a:rPr lang="de-DE" sz="1800" kern="0" dirty="0" err="1">
-                <a:ea typeface="Arial Unicode MS" pitchFamily="34" charset="-128"/>
-                <a:cs typeface="Arial Unicode MS" pitchFamily="34" charset="-128"/>
-              </a:rPr>
-              <a:t>NodePort</a:t>
-            </a:r>
-            <a:r>
-              <a:rPr lang="de-DE" sz="1800" kern="0" dirty="0">
-                <a:ea typeface="Arial Unicode MS" pitchFamily="34" charset="-128"/>
-                <a:cs typeface="Arial Unicode MS" pitchFamily="34" charset="-128"/>
-              </a:rPr>
-              <a:t>: 30021</a:t>
-            </a:r>
-            <a:endParaRPr kumimoji="0" lang="de-DE" sz="1800" b="0" i="0" u="none" strike="noStrike" kern="0" cap="none" spc="0" normalizeH="0" baseline="0" noProof="0" dirty="0">
-              <a:ln>
-                <a:noFill/>
-              </a:ln>
-              <a:effectLst/>
-              <a:uLnTx/>
-              <a:uFillTx/>
-              <a:ea typeface="Arial Unicode MS" pitchFamily="34" charset="-128"/>
-              <a:cs typeface="Arial Unicode MS" pitchFamily="34" charset="-128"/>
-            </a:endParaRPr>
-          </a:p>
-        </p:txBody>
-      </p:sp>
-      <p:sp>
-        <p:nvSpPr>
-          <p:cNvPr id="24" name="Cloud 23"/>
-          <p:cNvSpPr/>
-          <p:nvPr/>
-        </p:nvSpPr>
-        <p:spPr bwMode="gray">
-          <a:xfrm>
-            <a:off x="4348821" y="1057695"/>
-            <a:ext cx="3496836" cy="1074420"/>
-          </a:xfrm>
-          <a:prstGeom prst="cloud">
-            <a:avLst/>
-          </a:prstGeom>
-          <a:solidFill>
-            <a:schemeClr val="accent1"/>
-          </a:solidFill>
-          <a:ln w="6350" algn="ctr">
-            <a:noFill/>
-            <a:miter lim="800000"/>
-            <a:headEnd/>
-            <a:tailEnd/>
-          </a:ln>
-        </p:spPr>
-        <p:txBody>
-          <a:bodyPr lIns="90000" tIns="72000" rIns="90000" bIns="72000" rtlCol="0" anchor="ctr"/>
-          <a:lstStyle/>
-          <a:p>
-            <a:pPr marR="0" algn="ctr" defTabSz="914400" eaLnBrk="1" fontAlgn="base" latinLnBrk="0" hangingPunct="1">
-              <a:lnSpc>
-                <a:spcPct val="100000"/>
-              </a:lnSpc>
-              <a:spcBef>
-                <a:spcPct val="50000"/>
-              </a:spcBef>
-              <a:spcAft>
-                <a:spcPct val="0"/>
-              </a:spcAft>
-              <a:buClr>
-                <a:srgbClr val="F0AB00"/>
-              </a:buClr>
-              <a:buSzPct val="80000"/>
-              <a:tabLst/>
-            </a:pPr>
-            <a:r>
-              <a:rPr lang="en-US" sz="1800" kern="0" dirty="0">
-                <a:ea typeface="Arial Unicode MS" pitchFamily="34" charset="-128"/>
-                <a:cs typeface="Arial Unicode MS" pitchFamily="34" charset="-128"/>
-              </a:rPr>
-              <a:t>GET: nginx:30021</a:t>
-            </a:r>
-            <a:endParaRPr kumimoji="0" lang="en-US" sz="1800" b="0" i="0" u="none" strike="noStrike" kern="0" cap="none" spc="0" normalizeH="0" baseline="0" noProof="0" dirty="0" err="1">
-              <a:ln>
-                <a:noFill/>
-              </a:ln>
-              <a:effectLst/>
-              <a:uLnTx/>
-              <a:uFillTx/>
-              <a:ea typeface="Arial Unicode MS" pitchFamily="34" charset="-128"/>
-              <a:cs typeface="Arial Unicode MS" pitchFamily="34" charset="-128"/>
-            </a:endParaRPr>
-          </a:p>
-        </p:txBody>
-      </p:sp>
-      <p:cxnSp>
-        <p:nvCxnSpPr>
-          <p:cNvPr id="26" name="Connector: Elbow 25"/>
-          <p:cNvCxnSpPr>
-            <a:stCxn id="24" idx="2"/>
-            <a:endCxn id="22" idx="0"/>
-          </p:cNvCxnSpPr>
-          <p:nvPr/>
-        </p:nvCxnSpPr>
-        <p:spPr>
-          <a:xfrm rot="10800000" flipV="1">
-            <a:off x="1403286" y="1594904"/>
-            <a:ext cx="2956383" cy="1632955"/>
-          </a:xfrm>
-          <a:prstGeom prst="bentConnector2">
-            <a:avLst/>
-          </a:prstGeom>
-          <a:ln w="57150">
-            <a:solidFill>
-              <a:schemeClr val="tx2"/>
-            </a:solidFill>
-            <a:headEnd type="none" w="med" len="med"/>
-            <a:tailEnd type="triangle"/>
-          </a:ln>
-        </p:spPr>
-        <p:style>
-          <a:lnRef idx="1">
-            <a:schemeClr val="accent1"/>
-          </a:lnRef>
-          <a:fillRef idx="0">
-            <a:schemeClr val="accent1"/>
-          </a:fillRef>
-          <a:effectRef idx="0">
-            <a:schemeClr val="accent1"/>
-          </a:effectRef>
-          <a:fontRef idx="minor">
-            <a:schemeClr val="tx1"/>
-          </a:fontRef>
-        </p:style>
-      </p:cxnSp>
-      <p:cxnSp>
-        <p:nvCxnSpPr>
-          <p:cNvPr id="27" name="Connector: Elbow 26"/>
-          <p:cNvCxnSpPr>
-            <a:stCxn id="24" idx="0"/>
-            <a:endCxn id="23" idx="0"/>
-          </p:cNvCxnSpPr>
-          <p:nvPr/>
-        </p:nvCxnSpPr>
-        <p:spPr>
-          <a:xfrm>
-            <a:off x="7842743" y="1594905"/>
-            <a:ext cx="2785571" cy="1632955"/>
-          </a:xfrm>
-          <a:prstGeom prst="bentConnector2">
-            <a:avLst/>
-          </a:prstGeom>
-          <a:ln w="57150">
-            <a:solidFill>
-              <a:schemeClr val="tx2"/>
-            </a:solidFill>
-            <a:headEnd type="none" w="med" len="med"/>
-            <a:tailEnd type="triangle"/>
-          </a:ln>
-        </p:spPr>
-        <p:style>
-          <a:lnRef idx="1">
-            <a:schemeClr val="accent1"/>
-          </a:lnRef>
-          <a:fillRef idx="0">
-            <a:schemeClr val="accent1"/>
-          </a:fillRef>
-          <a:effectRef idx="0">
-            <a:schemeClr val="accent1"/>
-          </a:effectRef>
-          <a:fontRef idx="minor">
-            <a:schemeClr val="tx1"/>
-          </a:fontRef>
-        </p:style>
-      </p:cxnSp>
-      <p:cxnSp>
-        <p:nvCxnSpPr>
-          <p:cNvPr id="30" name="Connector: Elbow 29"/>
-          <p:cNvCxnSpPr>
-            <a:stCxn id="23" idx="2"/>
-            <a:endCxn id="14" idx="0"/>
-          </p:cNvCxnSpPr>
-          <p:nvPr/>
-        </p:nvCxnSpPr>
-        <p:spPr>
-          <a:xfrm rot="5400000">
-            <a:off x="8824672" y="2112838"/>
-            <a:ext cx="260036" cy="3347249"/>
-          </a:xfrm>
-          <a:prstGeom prst="bentConnector2">
-            <a:avLst/>
-          </a:prstGeom>
-          <a:ln w="57150">
-            <a:solidFill>
-              <a:schemeClr val="tx2"/>
-            </a:solidFill>
-            <a:headEnd type="none" w="med" len="med"/>
-            <a:tailEnd type="triangle"/>
-          </a:ln>
-        </p:spPr>
-        <p:style>
-          <a:lnRef idx="1">
-            <a:schemeClr val="accent1"/>
-          </a:lnRef>
-          <a:fillRef idx="0">
-            <a:schemeClr val="accent1"/>
-          </a:fillRef>
-          <a:effectRef idx="0">
-            <a:schemeClr val="accent1"/>
-          </a:effectRef>
-          <a:fontRef idx="minor">
-            <a:schemeClr val="tx1"/>
-          </a:fontRef>
-        </p:style>
-      </p:cxnSp>
-      <p:cxnSp>
-        <p:nvCxnSpPr>
-          <p:cNvPr id="33" name="Connector: Elbow 32"/>
-          <p:cNvCxnSpPr>
-            <a:stCxn id="22" idx="2"/>
-            <a:endCxn id="14" idx="2"/>
-          </p:cNvCxnSpPr>
-          <p:nvPr/>
-        </p:nvCxnSpPr>
-        <p:spPr>
-          <a:xfrm rot="16200000" flipH="1">
-            <a:off x="2974991" y="2084738"/>
-            <a:ext cx="260036" cy="3403448"/>
-          </a:xfrm>
-          <a:prstGeom prst="bentConnector2">
-            <a:avLst/>
-          </a:prstGeom>
-          <a:ln w="57150">
-            <a:solidFill>
-              <a:schemeClr val="tx2"/>
-            </a:solidFill>
-            <a:headEnd type="none" w="med" len="med"/>
-            <a:tailEnd type="triangle"/>
-          </a:ln>
-        </p:spPr>
-        <p:style>
-          <a:lnRef idx="1">
-            <a:schemeClr val="accent1"/>
-          </a:lnRef>
-          <a:fillRef idx="0">
-            <a:schemeClr val="accent1"/>
-          </a:fillRef>
-          <a:effectRef idx="0">
-            <a:schemeClr val="accent1"/>
-          </a:effectRef>
-          <a:fontRef idx="minor">
-            <a:schemeClr val="tx1"/>
-          </a:fontRef>
-        </p:style>
-      </p:cxnSp>
-      <p:cxnSp>
-        <p:nvCxnSpPr>
-          <p:cNvPr id="36" name="Connector: Elbow 35"/>
-          <p:cNvCxnSpPr>
-            <a:stCxn id="14" idx="1"/>
-            <a:endCxn id="15" idx="2"/>
-          </p:cNvCxnSpPr>
-          <p:nvPr/>
-        </p:nvCxnSpPr>
-        <p:spPr>
-          <a:xfrm rot="5400000">
-            <a:off x="3718719" y="3489941"/>
-            <a:ext cx="725362" cy="3924999"/>
-          </a:xfrm>
-          <a:prstGeom prst="bentConnector3">
-            <a:avLst>
-              <a:gd name="adj1" fmla="val 137818"/>
-            </a:avLst>
-          </a:prstGeom>
-          <a:ln w="57150">
-            <a:solidFill>
-              <a:schemeClr val="tx2"/>
-            </a:solidFill>
-            <a:headEnd type="none" w="med" len="med"/>
-            <a:tailEnd type="triangle"/>
-          </a:ln>
-        </p:spPr>
-        <p:style>
-          <a:lnRef idx="1">
-            <a:schemeClr val="accent1"/>
-          </a:lnRef>
-          <a:fillRef idx="0">
-            <a:schemeClr val="accent1"/>
-          </a:fillRef>
-          <a:effectRef idx="0">
-            <a:schemeClr val="accent1"/>
-          </a:effectRef>
-          <a:fontRef idx="minor">
-            <a:schemeClr val="tx1"/>
-          </a:fontRef>
-        </p:style>
-      </p:cxnSp>
-    </p:spTree>
-    <p:extLst>
-      <p:ext uri="{BB962C8B-B14F-4D97-AF65-F5344CB8AC3E}">
-        <p14:creationId xmlns:p14="http://schemas.microsoft.com/office/powerpoint/2010/main" val="2098045799"/>
-      </p:ext>
-    </p:extLst>
-  </p:cSld>
-  <p:clrMapOvr>
-    <a:masterClrMapping/>
-  </p:clrMapOvr>
 </p:sld>
 </file>
 

</xml_diff>

<commit_message>
fix for busybox run cmd in notes
</commit_message>
<xml_diff>
--- a/kubernetes/04_networking_services.pptx
+++ b/kubernetes/04_networking_services.pptx
@@ -1089,7 +1089,15 @@
             </a:r>
             <a:r>
               <a:rPr lang="en-US" baseline="0" dirty="0"/>
-              <a:t> run --</a:t>
+              <a:t> run </a:t>
+            </a:r>
+            <a:r>
+              <a:rPr lang="en-US" baseline="0" dirty="0" err="1"/>
+              <a:t>dns</a:t>
+            </a:r>
+            <a:r>
+              <a:rPr lang="en-US" baseline="0" dirty="0"/>
+              <a:t>-test --</a:t>
             </a:r>
             <a:r>
               <a:rPr lang="en-US" baseline="0" dirty="0" err="1"/>
@@ -1117,7 +1125,7 @@
             </a:r>
             <a:r>
               <a:rPr lang="en-US" baseline="0"/>
-              <a:t>bin/sh</a:t>
+              <a:t>bin/ash</a:t>
             </a:r>
             <a:r>
               <a:rPr lang="en-US" baseline="0" dirty="0"/>

</xml_diff>

<commit_message>
Added some slides for LoadBalancers.
</commit_message>
<xml_diff>
--- a/kubernetes/04_networking_services.pptx
+++ b/kubernetes/04_networking_services.pptx
@@ -5,10 +5,10 @@
     <p:sldMasterId id="2147483733" r:id="rId1"/>
   </p:sldMasterIdLst>
   <p:notesMasterIdLst>
-    <p:notesMasterId r:id="rId14"/>
+    <p:notesMasterId r:id="rId16"/>
   </p:notesMasterIdLst>
   <p:handoutMasterIdLst>
-    <p:handoutMasterId r:id="rId15"/>
+    <p:handoutMasterId r:id="rId17"/>
   </p:handoutMasterIdLst>
   <p:sldIdLst>
     <p:sldId id="433" r:id="rId2"/>
@@ -21,8 +21,10 @@
     <p:sldId id="448" r:id="rId9"/>
     <p:sldId id="452" r:id="rId10"/>
     <p:sldId id="450" r:id="rId11"/>
-    <p:sldId id="451" r:id="rId12"/>
-    <p:sldId id="265" r:id="rId13"/>
+    <p:sldId id="455" r:id="rId12"/>
+    <p:sldId id="456" r:id="rId13"/>
+    <p:sldId id="451" r:id="rId14"/>
+    <p:sldId id="265" r:id="rId15"/>
   </p:sldIdLst>
   <p:sldSz cx="12195175" cy="6858000"/>
   <p:notesSz cx="6858000" cy="9144000"/>
@@ -633,6 +635,98 @@
 </p:notes>
 </file>
 
+<file path=ppt/notesSlides/notesSlide10.xml><?xml version="1.0" encoding="utf-8"?>
+<p:notes xmlns:a="http://schemas.openxmlformats.org/drawingml/2006/main" xmlns:r="http://schemas.openxmlformats.org/officeDocument/2006/relationships" xmlns:p="http://schemas.openxmlformats.org/presentationml/2006/main">
+  <p:cSld>
+    <p:spTree>
+      <p:nvGrpSpPr>
+        <p:cNvPr id="1" name=""/>
+        <p:cNvGrpSpPr/>
+        <p:nvPr/>
+      </p:nvGrpSpPr>
+      <p:grpSpPr>
+        <a:xfrm>
+          <a:off x="0" y="0"/>
+          <a:ext cx="0" cy="0"/>
+          <a:chOff x="0" y="0"/>
+          <a:chExt cx="0" cy="0"/>
+        </a:xfrm>
+      </p:grpSpPr>
+      <p:sp>
+        <p:nvSpPr>
+          <p:cNvPr id="4" name="Slide Number Placeholder 3"/>
+          <p:cNvSpPr>
+            <a:spLocks noGrp="1"/>
+          </p:cNvSpPr>
+          <p:nvPr>
+            <p:ph type="sldNum" sz="quarter" idx="10"/>
+          </p:nvPr>
+        </p:nvSpPr>
+        <p:spPr/>
+        <p:txBody>
+          <a:bodyPr/>
+          <a:lstStyle/>
+          <a:p>
+            <a:fld id="{7D8C2C35-2B8A-446E-BEC0-FD36716C29AC}" type="slidenum">
+              <a:rPr lang="de-DE" smtClean="0"/>
+              <a:pPr/>
+              <a:t>14</a:t>
+            </a:fld>
+            <a:endParaRPr lang="de-DE" dirty="0"/>
+          </a:p>
+        </p:txBody>
+      </p:sp>
+      <p:sp>
+        <p:nvSpPr>
+          <p:cNvPr id="6" name="Slide Image Placeholder 5"/>
+          <p:cNvSpPr>
+            <a:spLocks noGrp="1" noRot="1" noChangeAspect="1"/>
+          </p:cNvSpPr>
+          <p:nvPr>
+            <p:ph type="sldImg"/>
+          </p:nvPr>
+        </p:nvSpPr>
+        <p:spPr>
+          <a:xfrm>
+            <a:off x="547688" y="612775"/>
+            <a:ext cx="5762625" cy="3241675"/>
+          </a:xfrm>
+        </p:spPr>
+      </p:sp>
+      <p:sp>
+        <p:nvSpPr>
+          <p:cNvPr id="7" name="Notes Placeholder 6"/>
+          <p:cNvSpPr>
+            <a:spLocks noGrp="1"/>
+          </p:cNvSpPr>
+          <p:nvPr>
+            <p:ph type="body" idx="1"/>
+          </p:nvPr>
+        </p:nvSpPr>
+        <p:spPr/>
+        <p:txBody>
+          <a:bodyPr>
+            <a:normAutofit/>
+          </a:bodyPr>
+          <a:lstStyle/>
+          <a:p>
+            <a:endParaRPr lang="en-US"/>
+          </a:p>
+        </p:txBody>
+      </p:sp>
+    </p:spTree>
+    <p:extLst>
+      <p:ext uri="{BB962C8B-B14F-4D97-AF65-F5344CB8AC3E}">
+        <p14:creationId xmlns:p14="http://schemas.microsoft.com/office/powerpoint/2010/main" val="2544264309"/>
+      </p:ext>
+    </p:extLst>
+  </p:cSld>
+  <p:clrMapOvr>
+    <a:masterClrMapping/>
+  </p:clrMapOvr>
+</p:notes>
+</file>
+
 <file path=ppt/notesSlides/notesSlide2.xml><?xml version="1.0" encoding="utf-8"?>
 <p:notes xmlns:a="http://schemas.openxmlformats.org/drawingml/2006/main" xmlns:r="http://schemas.openxmlformats.org/officeDocument/2006/relationships" xmlns:p="http://schemas.openxmlformats.org/presentationml/2006/main">
   <p:cSld>
@@ -767,23 +861,7 @@
           <a:p>
             <a:r>
               <a:rPr lang="en-US" dirty="0"/>
-              <a:t>Services serve as static endpoints to one or many pods. They get an internal IP address as well but also their name becomes a routable, cluster-internal DNS entry. So instead of calling 10.10.0.5, “</a:t>
-            </a:r>
-            <a:r>
-              <a:rPr lang="en-US" dirty="0" err="1"/>
-              <a:t>nginx</a:t>
-            </a:r>
-            <a:r>
-              <a:rPr lang="en-US" dirty="0"/>
-              <a:t>” could be valid as well (assuming the service is called </a:t>
-            </a:r>
-            <a:r>
-              <a:rPr lang="en-US" dirty="0" err="1"/>
-              <a:t>nginx</a:t>
-            </a:r>
-            <a:r>
-              <a:rPr lang="en-US" dirty="0"/>
-              <a:t>)</a:t>
+              <a:t>Services serve as static endpoints to one or many pods. They get an internal IP address as well but also their name becomes a routable, cluster-internal DNS entry. So instead of calling 10.10.0.5, “nginx” could be valid as well (assuming the service is called nginx)</a:t>
             </a:r>
           </a:p>
           <a:p>
@@ -1121,15 +1199,7 @@
             </a:r>
             <a:r>
               <a:rPr lang="en-US" baseline="0" dirty="0"/>
-              <a:t> /</a:t>
-            </a:r>
-            <a:r>
-              <a:rPr lang="en-US" baseline="0"/>
-              <a:t>bin/ash</a:t>
-            </a:r>
-            <a:r>
-              <a:rPr lang="en-US" baseline="0" dirty="0"/>
-              <a:t>”; use the DNS name of a service to download an index.html (i.e. “</a:t>
+              <a:t> /bin/ash”; use the DNS name of a service to download an index.html (i.e. “</a:t>
             </a:r>
             <a:r>
               <a:rPr lang="en-US" baseline="0" dirty="0" err="1"/>
@@ -1137,15 +1207,7 @@
             </a:r>
             <a:r>
               <a:rPr lang="en-US" baseline="0" dirty="0"/>
-              <a:t> </a:t>
-            </a:r>
-            <a:r>
-              <a:rPr lang="en-US" baseline="0" dirty="0" err="1"/>
-              <a:t>nginx</a:t>
-            </a:r>
-            <a:r>
-              <a:rPr lang="en-US" baseline="0" dirty="0"/>
-              <a:t>”)</a:t>
+              <a:t> nginx”)</a:t>
             </a:r>
             <a:endParaRPr lang="en-US" dirty="0"/>
           </a:p>
@@ -1250,13 +1312,8 @@
             </a:r>
             <a:r>
               <a:rPr lang="en-US" dirty="0"/>
-              <a:t> will be routed to the corresponding service. From there it will be forwarded to service’s pods, regardless on which node it they </a:t>
-            </a:r>
-            <a:r>
-              <a:rPr lang="en-US"/>
-              <a:t>actually run.</a:t>
-            </a:r>
-            <a:endParaRPr lang="en-US" dirty="0"/>
+              <a:t> will be routed to the corresponding service. From there it will be forwarded to service’s pods, regardless on which node it they actually run.</a:t>
+            </a:r>
           </a:p>
         </p:txBody>
       </p:sp>
@@ -1316,6 +1373,46 @@
       </p:grpSpPr>
       <p:sp>
         <p:nvSpPr>
+          <p:cNvPr id="2" name="Slide Image Placeholder 1"/>
+          <p:cNvSpPr>
+            <a:spLocks noGrp="1" noRot="1" noChangeAspect="1"/>
+          </p:cNvSpPr>
+          <p:nvPr>
+            <p:ph type="sldImg"/>
+          </p:nvPr>
+        </p:nvSpPr>
+        <p:spPr/>
+      </p:sp>
+      <p:sp>
+        <p:nvSpPr>
+          <p:cNvPr id="3" name="Notes Placeholder 2"/>
+          <p:cNvSpPr>
+            <a:spLocks noGrp="1"/>
+          </p:cNvSpPr>
+          <p:nvPr>
+            <p:ph type="body" idx="1"/>
+          </p:nvPr>
+        </p:nvSpPr>
+        <p:spPr/>
+        <p:txBody>
+          <a:bodyPr/>
+          <a:lstStyle/>
+          <a:p>
+            <a:r>
+              <a:rPr lang="en-US" dirty="0"/>
+              <a:t>A LoadBalancer is a single network endpoint with a unique IP which will be associated with a service. Incoming traffic to this IP on the service port will be forwarded through the service to the pods matching the labels specified in the service description.</a:t>
+            </a:r>
+          </a:p>
+          <a:p>
+            <a:r>
+              <a:rPr lang="en-US" dirty="0"/>
+              <a:t>LoadBalancers are an external entity provided to the cluster by Cloud Providers and their actual implementation varies among the different cloud platforms (GCP, Azure, AWS, OpenStack). If your cluster runs in an environment that does not support LoadBalancers, you can still try to create them but their state will remain “Pending” without ever getting an IP.</a:t>
+            </a:r>
+          </a:p>
+        </p:txBody>
+      </p:sp>
+      <p:sp>
+        <p:nvSpPr>
           <p:cNvPr id="4" name="Slide Number Placeholder 3"/>
           <p:cNvSpPr>
             <a:spLocks noGrp="1"/>
@@ -1332,15 +1429,45 @@
             <a:fld id="{7D8C2C35-2B8A-446E-BEC0-FD36716C29AC}" type="slidenum">
               <a:rPr lang="de-DE" smtClean="0"/>
               <a:pPr/>
-              <a:t>12</a:t>
+              <a:t>11</a:t>
             </a:fld>
             <a:endParaRPr lang="de-DE" dirty="0"/>
           </a:p>
         </p:txBody>
       </p:sp>
+    </p:spTree>
+    <p:extLst>
+      <p:ext uri="{BB962C8B-B14F-4D97-AF65-F5344CB8AC3E}">
+        <p14:creationId xmlns:p14="http://schemas.microsoft.com/office/powerpoint/2010/main" val="382709494"/>
+      </p:ext>
+    </p:extLst>
+  </p:cSld>
+  <p:clrMapOvr>
+    <a:masterClrMapping/>
+  </p:clrMapOvr>
+</p:notes>
+</file>
+
+<file path=ppt/notesSlides/notesSlide9.xml><?xml version="1.0" encoding="utf-8"?>
+<p:notes xmlns:a="http://schemas.openxmlformats.org/drawingml/2006/main" xmlns:r="http://schemas.openxmlformats.org/officeDocument/2006/relationships" xmlns:p="http://schemas.openxmlformats.org/presentationml/2006/main">
+  <p:cSld>
+    <p:spTree>
+      <p:nvGrpSpPr>
+        <p:cNvPr id="1" name=""/>
+        <p:cNvGrpSpPr/>
+        <p:nvPr/>
+      </p:nvGrpSpPr>
+      <p:grpSpPr>
+        <a:xfrm>
+          <a:off x="0" y="0"/>
+          <a:ext cx="0" cy="0"/>
+          <a:chOff x="0" y="0"/>
+          <a:chExt cx="0" cy="0"/>
+        </a:xfrm>
+      </p:grpSpPr>
       <p:sp>
         <p:nvSpPr>
-          <p:cNvPr id="6" name="Slide Image Placeholder 5"/>
+          <p:cNvPr id="2" name="Slide Image Placeholder 1"/>
           <p:cNvSpPr>
             <a:spLocks noGrp="1" noRot="1" noChangeAspect="1"/>
           </p:cNvSpPr>
@@ -1348,16 +1475,11 @@
             <p:ph type="sldImg"/>
           </p:nvPr>
         </p:nvSpPr>
-        <p:spPr>
-          <a:xfrm>
-            <a:off x="547688" y="612775"/>
-            <a:ext cx="5762625" cy="3241675"/>
-          </a:xfrm>
-        </p:spPr>
+        <p:spPr/>
       </p:sp>
       <p:sp>
         <p:nvSpPr>
-          <p:cNvPr id="7" name="Notes Placeholder 6"/>
+          <p:cNvPr id="3" name="Notes Placeholder 2"/>
           <p:cNvSpPr>
             <a:spLocks noGrp="1"/>
           </p:cNvSpPr>
@@ -1367,19 +1489,47 @@
         </p:nvSpPr>
         <p:spPr/>
         <p:txBody>
-          <a:bodyPr>
-            <a:normAutofit/>
-          </a:bodyPr>
+          <a:bodyPr/>
           <a:lstStyle/>
           <a:p>
-            <a:endParaRPr lang="en-US"/>
+            <a:r>
+              <a:rPr lang="en-US" dirty="0"/>
+              <a:t>A LoadBalancer is a single network endpoint with a unique IP which will be associated with a service. Incoming traffic to this IP on the service port will be forwarded through the NodePorts and the service to the pods matching the labels specified in the service description.</a:t>
+            </a:r>
+          </a:p>
+          <a:p>
+            <a:endParaRPr lang="en-US" dirty="0"/>
+          </a:p>
+        </p:txBody>
+      </p:sp>
+      <p:sp>
+        <p:nvSpPr>
+          <p:cNvPr id="4" name="Slide Number Placeholder 3"/>
+          <p:cNvSpPr>
+            <a:spLocks noGrp="1"/>
+          </p:cNvSpPr>
+          <p:nvPr>
+            <p:ph type="sldNum" sz="quarter" idx="10"/>
+          </p:nvPr>
+        </p:nvSpPr>
+        <p:spPr/>
+        <p:txBody>
+          <a:bodyPr/>
+          <a:lstStyle/>
+          <a:p>
+            <a:fld id="{7D8C2C35-2B8A-446E-BEC0-FD36716C29AC}" type="slidenum">
+              <a:rPr lang="de-DE" smtClean="0"/>
+              <a:pPr/>
+              <a:t>12</a:t>
+            </a:fld>
+            <a:endParaRPr lang="de-DE" dirty="0"/>
           </a:p>
         </p:txBody>
       </p:sp>
     </p:spTree>
     <p:extLst>
       <p:ext uri="{BB962C8B-B14F-4D97-AF65-F5344CB8AC3E}">
-        <p14:creationId xmlns:p14="http://schemas.microsoft.com/office/powerpoint/2010/main" val="2544264309"/>
+        <p14:creationId xmlns:p14="http://schemas.microsoft.com/office/powerpoint/2010/main" val="58219664"/>
       </p:ext>
     </p:extLst>
   </p:cSld>
@@ -9126,15 +9276,7 @@
           <a:p>
             <a:r>
               <a:rPr lang="en-US" dirty="0"/>
-              <a:t>How </a:t>
-            </a:r>
-            <a:r>
-              <a:rPr lang="en-US" dirty="0" err="1"/>
-              <a:t>NodePorts</a:t>
-            </a:r>
-            <a:r>
-              <a:rPr lang="en-US" dirty="0"/>
-              <a:t> work</a:t>
+              <a:t>How NodePorts work</a:t>
             </a:r>
           </a:p>
         </p:txBody>
@@ -9348,225 +9490,6 @@
                 <a:cs typeface="Arial Unicode MS" pitchFamily="34" charset="-128"/>
               </a:rPr>
               <a:t>IP: 10.10.10.1</a:t>
-            </a:r>
-          </a:p>
-        </p:txBody>
-      </p:sp>
-      <p:sp>
-        <p:nvSpPr>
-          <p:cNvPr id="14" name="Rectangle: Single Corner Snipped 13"/>
-          <p:cNvSpPr/>
-          <p:nvPr/>
-        </p:nvSpPr>
-        <p:spPr bwMode="gray">
-          <a:xfrm>
-            <a:off x="4806733" y="2743200"/>
-            <a:ext cx="2474332" cy="2346559"/>
-          </a:xfrm>
-          <a:prstGeom prst="snip1Rect">
-            <a:avLst/>
-          </a:prstGeom>
-          <a:ln>
-            <a:headEnd/>
-            <a:tailEnd/>
-          </a:ln>
-        </p:spPr>
-        <p:style>
-          <a:lnRef idx="3">
-            <a:schemeClr val="lt1"/>
-          </a:lnRef>
-          <a:fillRef idx="1">
-            <a:schemeClr val="accent2"/>
-          </a:fillRef>
-          <a:effectRef idx="1">
-            <a:schemeClr val="accent2"/>
-          </a:effectRef>
-          <a:fontRef idx="minor">
-            <a:schemeClr val="lt1"/>
-          </a:fontRef>
-        </p:style>
-        <p:txBody>
-          <a:bodyPr lIns="90000" tIns="72000" rIns="90000" bIns="72000" rtlCol="0" anchor="ctr"/>
-          <a:lstStyle/>
-          <a:p>
-            <a:pPr marR="0" algn="ctr" defTabSz="914400" eaLnBrk="1" fontAlgn="base" latinLnBrk="0" hangingPunct="1">
-              <a:lnSpc>
-                <a:spcPct val="100000"/>
-              </a:lnSpc>
-              <a:spcBef>
-                <a:spcPct val="50000"/>
-              </a:spcBef>
-              <a:spcAft>
-                <a:spcPct val="0"/>
-              </a:spcAft>
-              <a:buClr>
-                <a:srgbClr val="F0AB00"/>
-              </a:buClr>
-              <a:buSzPct val="80000"/>
-              <a:tabLst/>
-            </a:pPr>
-            <a:r>
-              <a:rPr kumimoji="0" lang="en-US" sz="1800" b="0" i="0" u="none" strike="noStrike" kern="0" cap="none" spc="0" normalizeH="0" baseline="0" noProof="0" dirty="0">
-                <a:ln>
-                  <a:noFill/>
-                </a:ln>
-                <a:effectLst/>
-                <a:uLnTx/>
-                <a:uFillTx/>
-                <a:ea typeface="Arial Unicode MS" pitchFamily="34" charset="-128"/>
-                <a:cs typeface="Arial Unicode MS" pitchFamily="34" charset="-128"/>
-              </a:rPr>
-              <a:t>Service</a:t>
-            </a:r>
-          </a:p>
-          <a:p>
-            <a:pPr marR="0" algn="ctr" defTabSz="914400" eaLnBrk="1" fontAlgn="base" latinLnBrk="0" hangingPunct="1">
-              <a:lnSpc>
-                <a:spcPct val="100000"/>
-              </a:lnSpc>
-              <a:spcBef>
-                <a:spcPct val="50000"/>
-              </a:spcBef>
-              <a:spcAft>
-                <a:spcPct val="0"/>
-              </a:spcAft>
-              <a:buClr>
-                <a:srgbClr val="F0AB00"/>
-              </a:buClr>
-              <a:buSzPct val="80000"/>
-              <a:tabLst/>
-            </a:pPr>
-            <a:r>
-              <a:rPr lang="en-US" sz="1800" kern="0" dirty="0">
-                <a:ea typeface="Arial Unicode MS" pitchFamily="34" charset="-128"/>
-                <a:cs typeface="Arial Unicode MS" pitchFamily="34" charset="-128"/>
-              </a:rPr>
-              <a:t>Label: app= </a:t>
-            </a:r>
-            <a:r>
-              <a:rPr lang="en-US" sz="1800" kern="0" dirty="0" err="1">
-                <a:ea typeface="Arial Unicode MS" pitchFamily="34" charset="-128"/>
-                <a:cs typeface="Arial Unicode MS" pitchFamily="34" charset="-128"/>
-              </a:rPr>
-              <a:t>nginx</a:t>
-            </a:r>
-            <a:endParaRPr kumimoji="0" lang="en-US" sz="1800" b="0" i="0" u="none" strike="noStrike" kern="0" cap="none" spc="0" normalizeH="0" baseline="0" noProof="0" dirty="0">
-              <a:ln>
-                <a:noFill/>
-              </a:ln>
-              <a:effectLst/>
-              <a:uLnTx/>
-              <a:uFillTx/>
-              <a:ea typeface="Arial Unicode MS" pitchFamily="34" charset="-128"/>
-              <a:cs typeface="Arial Unicode MS" pitchFamily="34" charset="-128"/>
-            </a:endParaRPr>
-          </a:p>
-          <a:p>
-            <a:pPr marL="285750" marR="0" indent="-285750" defTabSz="914400" eaLnBrk="1" fontAlgn="base" latinLnBrk="0" hangingPunct="1">
-              <a:lnSpc>
-                <a:spcPct val="100000"/>
-              </a:lnSpc>
-              <a:spcBef>
-                <a:spcPct val="50000"/>
-              </a:spcBef>
-              <a:spcAft>
-                <a:spcPct val="0"/>
-              </a:spcAft>
-              <a:buClr>
-                <a:srgbClr val="F0AB00"/>
-              </a:buClr>
-              <a:buSzPct val="80000"/>
-              <a:buFontTx/>
-              <a:buChar char="-"/>
-              <a:tabLst/>
-            </a:pPr>
-            <a:r>
-              <a:rPr lang="en-US" sz="1800" kern="0" dirty="0" err="1">
-                <a:ea typeface="Arial Unicode MS" pitchFamily="34" charset="-128"/>
-                <a:cs typeface="Arial Unicode MS" pitchFamily="34" charset="-128"/>
-              </a:rPr>
-              <a:t>NodePort</a:t>
-            </a:r>
-            <a:r>
-              <a:rPr lang="en-US" sz="1800" kern="0" dirty="0">
-                <a:ea typeface="Arial Unicode MS" pitchFamily="34" charset="-128"/>
-                <a:cs typeface="Arial Unicode MS" pitchFamily="34" charset="-128"/>
-              </a:rPr>
-              <a:t>: 30021</a:t>
-            </a:r>
-          </a:p>
-          <a:p>
-            <a:pPr marL="285750" marR="0" indent="-285750" defTabSz="914400" eaLnBrk="1" fontAlgn="base" latinLnBrk="0" hangingPunct="1">
-              <a:lnSpc>
-                <a:spcPct val="100000"/>
-              </a:lnSpc>
-              <a:spcBef>
-                <a:spcPct val="50000"/>
-              </a:spcBef>
-              <a:spcAft>
-                <a:spcPct val="0"/>
-              </a:spcAft>
-              <a:buClr>
-                <a:srgbClr val="F0AB00"/>
-              </a:buClr>
-              <a:buSzPct val="80000"/>
-              <a:buFontTx/>
-              <a:buChar char="-"/>
-              <a:tabLst/>
-            </a:pPr>
-            <a:r>
-              <a:rPr lang="en-US" sz="1800" kern="0" dirty="0">
-                <a:ea typeface="Arial Unicode MS" pitchFamily="34" charset="-128"/>
-                <a:cs typeface="Arial Unicode MS" pitchFamily="34" charset="-128"/>
-              </a:rPr>
-              <a:t> </a:t>
-            </a:r>
-            <a:r>
-              <a:rPr lang="en-US" sz="1800" kern="0" dirty="0" err="1">
-                <a:ea typeface="Arial Unicode MS" pitchFamily="34" charset="-128"/>
-                <a:cs typeface="Arial Unicode MS" pitchFamily="34" charset="-128"/>
-              </a:rPr>
-              <a:t>TargetPort</a:t>
-            </a:r>
-            <a:r>
-              <a:rPr lang="en-US" sz="1800" kern="0" dirty="0">
-                <a:ea typeface="Arial Unicode MS" pitchFamily="34" charset="-128"/>
-                <a:cs typeface="Arial Unicode MS" pitchFamily="34" charset="-128"/>
-              </a:rPr>
-              <a:t>: 80</a:t>
-            </a:r>
-          </a:p>
-          <a:p>
-            <a:pPr marL="285750" marR="0" indent="-285750" defTabSz="914400" eaLnBrk="1" fontAlgn="base" latinLnBrk="0" hangingPunct="1">
-              <a:lnSpc>
-                <a:spcPct val="100000"/>
-              </a:lnSpc>
-              <a:spcBef>
-                <a:spcPct val="50000"/>
-              </a:spcBef>
-              <a:spcAft>
-                <a:spcPct val="0"/>
-              </a:spcAft>
-              <a:buClr>
-                <a:srgbClr val="F0AB00"/>
-              </a:buClr>
-              <a:buSzPct val="80000"/>
-              <a:buFontTx/>
-              <a:buChar char="-"/>
-              <a:tabLst/>
-            </a:pPr>
-            <a:r>
-              <a:rPr kumimoji="0" lang="en-US" sz="1800" b="0" i="0" u="none" strike="noStrike" kern="0" cap="none" spc="0" normalizeH="0" baseline="0" noProof="0" dirty="0">
-                <a:ln>
-                  <a:noFill/>
-                </a:ln>
-                <a:effectLst/>
-                <a:uLnTx/>
-                <a:uFillTx/>
-                <a:ea typeface="Arial Unicode MS" pitchFamily="34" charset="-128"/>
-                <a:cs typeface="Arial Unicode MS" pitchFamily="34" charset="-128"/>
-              </a:rPr>
-              <a:t>Port: 80</a:t>
             </a:r>
           </a:p>
         </p:txBody>
@@ -10119,18 +10042,11 @@
               <a:tabLst/>
             </a:pPr>
             <a:r>
-              <a:rPr lang="de-DE" sz="1800" kern="0" dirty="0" err="1">
-                <a:ea typeface="Arial Unicode MS" pitchFamily="34" charset="-128"/>
-                <a:cs typeface="Arial Unicode MS" pitchFamily="34" charset="-128"/>
-              </a:rPr>
-              <a:t>NodePort</a:t>
-            </a:r>
-            <a:r>
               <a:rPr lang="de-DE" sz="1800" kern="0" dirty="0">
                 <a:ea typeface="Arial Unicode MS" pitchFamily="34" charset="-128"/>
                 <a:cs typeface="Arial Unicode MS" pitchFamily="34" charset="-128"/>
               </a:rPr>
-              <a:t>: 30021</a:t>
+              <a:t>NodePort: 30021</a:t>
             </a:r>
             <a:endParaRPr kumimoji="0" lang="de-DE" sz="1800" b="0" i="0" u="none" strike="noStrike" kern="0" cap="none" spc="0" normalizeH="0" baseline="0" noProof="0" dirty="0">
               <a:ln>
@@ -10199,18 +10115,11 @@
               <a:tabLst/>
             </a:pPr>
             <a:r>
-              <a:rPr lang="de-DE" sz="1800" kern="0" dirty="0" err="1">
-                <a:ea typeface="Arial Unicode MS" pitchFamily="34" charset="-128"/>
-                <a:cs typeface="Arial Unicode MS" pitchFamily="34" charset="-128"/>
-              </a:rPr>
-              <a:t>NodePort</a:t>
-            </a:r>
-            <a:r>
               <a:rPr lang="de-DE" sz="1800" kern="0" dirty="0">
                 <a:ea typeface="Arial Unicode MS" pitchFamily="34" charset="-128"/>
                 <a:cs typeface="Arial Unicode MS" pitchFamily="34" charset="-128"/>
               </a:rPr>
-              <a:t>: 30021</a:t>
+              <a:t>NodePort: 30021</a:t>
             </a:r>
             <a:endParaRPr kumimoji="0" lang="de-DE" sz="1800" b="0" i="0" u="none" strike="noStrike" kern="0" cap="none" spc="0" normalizeH="0" baseline="0" noProof="0" dirty="0">
               <a:ln>
@@ -10371,17 +10280,61 @@
       </p:cxnSp>
       <p:cxnSp>
         <p:nvCxnSpPr>
-          <p:cNvPr id="30" name="Connector: Elbow 29"/>
+          <p:cNvPr id="36" name="Connector: Elbow 35"/>
           <p:cNvCxnSpPr>
-            <a:stCxn id="23" idx="2"/>
-            <a:endCxn id="14" idx="0"/>
+            <a:cxnSpLocks/>
+            <a:stCxn id="31" idx="1"/>
+            <a:endCxn id="15" idx="2"/>
           </p:cNvCxnSpPr>
           <p:nvPr/>
         </p:nvCxnSpPr>
         <p:spPr>
           <a:xfrm rot="5400000">
-            <a:off x="8824672" y="2112838"/>
-            <a:ext cx="260036" cy="3347249"/>
+            <a:off x="3594206" y="3379499"/>
+            <a:ext cx="960317" cy="3910927"/>
+          </a:xfrm>
+          <a:prstGeom prst="bentConnector3">
+            <a:avLst>
+              <a:gd name="adj1" fmla="val 123805"/>
+            </a:avLst>
+          </a:prstGeom>
+          <a:ln w="57150">
+            <a:solidFill>
+              <a:schemeClr val="tx2"/>
+            </a:solidFill>
+            <a:headEnd type="none" w="med" len="med"/>
+            <a:tailEnd type="triangle"/>
+          </a:ln>
+        </p:spPr>
+        <p:style>
+          <a:lnRef idx="1">
+            <a:schemeClr val="accent1"/>
+          </a:lnRef>
+          <a:fillRef idx="0">
+            <a:schemeClr val="accent1"/>
+          </a:fillRef>
+          <a:effectRef idx="0">
+            <a:schemeClr val="accent1"/>
+          </a:effectRef>
+          <a:fontRef idx="minor">
+            <a:schemeClr val="tx1"/>
+          </a:fontRef>
+        </p:style>
+      </p:cxnSp>
+      <p:cxnSp>
+        <p:nvCxnSpPr>
+          <p:cNvPr id="30" name="Connector: Elbow 29"/>
+          <p:cNvCxnSpPr>
+            <a:cxnSpLocks/>
+            <a:stCxn id="23" idx="2"/>
+            <a:endCxn id="31" idx="0"/>
+          </p:cNvCxnSpPr>
+          <p:nvPr/>
+        </p:nvCxnSpPr>
+        <p:spPr>
+          <a:xfrm rot="5400000">
+            <a:off x="8792393" y="2131045"/>
+            <a:ext cx="310522" cy="3361321"/>
           </a:xfrm>
           <a:prstGeom prst="bentConnector2">
             <a:avLst/>
@@ -10413,15 +10366,1350 @@
         <p:nvCxnSpPr>
           <p:cNvPr id="33" name="Connector: Elbow 32"/>
           <p:cNvCxnSpPr>
+            <a:cxnSpLocks/>
             <a:stCxn id="22" idx="2"/>
-            <a:endCxn id="14" idx="2"/>
+            <a:endCxn id="31" idx="2"/>
           </p:cNvCxnSpPr>
           <p:nvPr/>
         </p:nvCxnSpPr>
         <p:spPr>
           <a:xfrm rot="16200000" flipH="1">
-            <a:off x="2974991" y="2084738"/>
-            <a:ext cx="260036" cy="3403448"/>
+            <a:off x="2942712" y="2117017"/>
+            <a:ext cx="310522" cy="3389376"/>
+          </a:xfrm>
+          <a:prstGeom prst="bentConnector2">
+            <a:avLst/>
+          </a:prstGeom>
+          <a:ln w="57150">
+            <a:solidFill>
+              <a:schemeClr val="tx2"/>
+            </a:solidFill>
+            <a:headEnd type="none" w="med" len="med"/>
+            <a:tailEnd type="triangle"/>
+          </a:ln>
+        </p:spPr>
+        <p:style>
+          <a:lnRef idx="1">
+            <a:schemeClr val="accent1"/>
+          </a:lnRef>
+          <a:fillRef idx="0">
+            <a:schemeClr val="accent1"/>
+          </a:fillRef>
+          <a:effectRef idx="0">
+            <a:schemeClr val="accent1"/>
+          </a:effectRef>
+          <a:fontRef idx="minor">
+            <a:schemeClr val="tx1"/>
+          </a:fontRef>
+        </p:style>
+      </p:cxnSp>
+      <p:sp>
+        <p:nvSpPr>
+          <p:cNvPr id="31" name="Rectangle: Single Corner Snipped 30">
+            <a:extLst>
+              <a:ext uri="{FF2B5EF4-FFF2-40B4-BE49-F238E27FC236}">
+                <a16:creationId xmlns:a16="http://schemas.microsoft.com/office/drawing/2014/main" id="{8C332021-E2C8-40F3-9F1A-E060F1384DF3}"/>
+              </a:ext>
+            </a:extLst>
+          </p:cNvPr>
+          <p:cNvSpPr/>
+          <p:nvPr/>
+        </p:nvSpPr>
+        <p:spPr bwMode="gray">
+          <a:xfrm>
+            <a:off x="4792661" y="3079127"/>
+            <a:ext cx="2474332" cy="1775677"/>
+          </a:xfrm>
+          <a:prstGeom prst="snip1Rect">
+            <a:avLst/>
+          </a:prstGeom>
+          <a:ln w="38100" cmpd="sng">
+            <a:headEnd/>
+            <a:tailEnd/>
+          </a:ln>
+          <a:effectLst>
+            <a:outerShdw blurRad="50800" dist="38100" dir="2700000" algn="tl" rotWithShape="0">
+              <a:prstClr val="black">
+                <a:alpha val="40000"/>
+              </a:prstClr>
+            </a:outerShdw>
+          </a:effectLst>
+        </p:spPr>
+        <p:style>
+          <a:lnRef idx="3">
+            <a:schemeClr val="lt1"/>
+          </a:lnRef>
+          <a:fillRef idx="1">
+            <a:schemeClr val="accent2"/>
+          </a:fillRef>
+          <a:effectRef idx="1">
+            <a:schemeClr val="accent2"/>
+          </a:effectRef>
+          <a:fontRef idx="minor">
+            <a:schemeClr val="lt1"/>
+          </a:fontRef>
+        </p:style>
+        <p:txBody>
+          <a:bodyPr wrap="none" lIns="90000" tIns="0" rIns="90000" bIns="0" rtlCol="0" anchor="t"/>
+          <a:lstStyle/>
+          <a:p>
+            <a:pPr marR="0" algn="ctr" defTabSz="914400" eaLnBrk="1" fontAlgn="base" latinLnBrk="0" hangingPunct="1">
+              <a:lnSpc>
+                <a:spcPct val="100000"/>
+              </a:lnSpc>
+              <a:spcAft>
+                <a:spcPts val="600"/>
+              </a:spcAft>
+              <a:buClr>
+                <a:srgbClr val="F0AB00"/>
+              </a:buClr>
+              <a:buSzPct val="80000"/>
+              <a:tabLst/>
+            </a:pPr>
+            <a:r>
+              <a:rPr kumimoji="0" lang="en-US" sz="1600" b="1" i="0" u="none" strike="noStrike" kern="0" cap="none" spc="0" normalizeH="0" baseline="0" noProof="0" dirty="0">
+                <a:ln>
+                  <a:noFill/>
+                </a:ln>
+                <a:effectLst/>
+                <a:uLnTx/>
+                <a:uFillTx/>
+                <a:ea typeface="Arial Unicode MS" pitchFamily="34" charset="-128"/>
+                <a:cs typeface="Arial Unicode MS" pitchFamily="34" charset="-128"/>
+              </a:rPr>
+              <a:t>Service</a:t>
+            </a:r>
+          </a:p>
+          <a:p>
+            <a:pPr marL="285750" marR="0" indent="-285750" defTabSz="914400" eaLnBrk="1" fontAlgn="base" latinLnBrk="0" hangingPunct="1">
+              <a:lnSpc>
+                <a:spcPct val="100000"/>
+              </a:lnSpc>
+              <a:spcBef>
+                <a:spcPts val="600"/>
+              </a:spcBef>
+              <a:spcAft>
+                <a:spcPct val="0"/>
+              </a:spcAft>
+              <a:buClr>
+                <a:srgbClr val="F0AB00"/>
+              </a:buClr>
+              <a:buSzPct val="80000"/>
+              <a:buFont typeface="Arial" panose="020B0604020202020204" pitchFamily="34" charset="0"/>
+              <a:buChar char="•"/>
+              <a:tabLst/>
+            </a:pPr>
+            <a:r>
+              <a:rPr lang="en-US" sz="1600" kern="0" dirty="0">
+                <a:ea typeface="Arial Unicode MS" pitchFamily="34" charset="-128"/>
+                <a:cs typeface="Arial Unicode MS" pitchFamily="34" charset="-128"/>
+              </a:rPr>
+              <a:t>Label: app=nginx</a:t>
+            </a:r>
+            <a:endParaRPr kumimoji="0" lang="en-US" sz="1600" b="0" i="0" u="none" strike="noStrike" kern="0" cap="none" spc="0" normalizeH="0" baseline="0" noProof="0" dirty="0">
+              <a:ln>
+                <a:noFill/>
+              </a:ln>
+              <a:effectLst/>
+              <a:uLnTx/>
+              <a:uFillTx/>
+              <a:ea typeface="Arial Unicode MS" pitchFamily="34" charset="-128"/>
+              <a:cs typeface="Arial Unicode MS" pitchFamily="34" charset="-128"/>
+            </a:endParaRPr>
+          </a:p>
+          <a:p>
+            <a:pPr marL="285750" marR="0" indent="-285750" defTabSz="914400" eaLnBrk="1" fontAlgn="base" latinLnBrk="0" hangingPunct="1">
+              <a:lnSpc>
+                <a:spcPct val="100000"/>
+              </a:lnSpc>
+              <a:spcBef>
+                <a:spcPts val="600"/>
+              </a:spcBef>
+              <a:spcAft>
+                <a:spcPct val="0"/>
+              </a:spcAft>
+              <a:buClr>
+                <a:srgbClr val="F0AB00"/>
+              </a:buClr>
+              <a:buSzPct val="80000"/>
+              <a:buFont typeface="Arial" panose="020B0604020202020204" pitchFamily="34" charset="0"/>
+              <a:buChar char="•"/>
+              <a:tabLst/>
+            </a:pPr>
+            <a:r>
+              <a:rPr lang="en-US" sz="1600" kern="0" dirty="0">
+                <a:ea typeface="Arial Unicode MS" pitchFamily="34" charset="-128"/>
+                <a:cs typeface="Arial Unicode MS" pitchFamily="34" charset="-128"/>
+              </a:rPr>
+              <a:t>NodePort: 30021</a:t>
+            </a:r>
+          </a:p>
+          <a:p>
+            <a:pPr marL="285750" marR="0" indent="-285750" defTabSz="914400" eaLnBrk="1" fontAlgn="base" latinLnBrk="0" hangingPunct="1">
+              <a:lnSpc>
+                <a:spcPct val="100000"/>
+              </a:lnSpc>
+              <a:spcBef>
+                <a:spcPts val="600"/>
+              </a:spcBef>
+              <a:spcAft>
+                <a:spcPct val="0"/>
+              </a:spcAft>
+              <a:buClr>
+                <a:srgbClr val="F0AB00"/>
+              </a:buClr>
+              <a:buSzPct val="80000"/>
+              <a:buFont typeface="Arial" panose="020B0604020202020204" pitchFamily="34" charset="0"/>
+              <a:buChar char="•"/>
+              <a:tabLst/>
+            </a:pPr>
+            <a:r>
+              <a:rPr lang="en-US" sz="1600" kern="0" dirty="0">
+                <a:ea typeface="Arial Unicode MS" pitchFamily="34" charset="-128"/>
+                <a:cs typeface="Arial Unicode MS" pitchFamily="34" charset="-128"/>
+              </a:rPr>
+              <a:t>TargetPort: 80</a:t>
+            </a:r>
+          </a:p>
+          <a:p>
+            <a:pPr marL="285750" marR="0" indent="-285750" defTabSz="914400" eaLnBrk="1" fontAlgn="base" latinLnBrk="0" hangingPunct="1">
+              <a:lnSpc>
+                <a:spcPct val="100000"/>
+              </a:lnSpc>
+              <a:spcBef>
+                <a:spcPts val="600"/>
+              </a:spcBef>
+              <a:spcAft>
+                <a:spcPct val="0"/>
+              </a:spcAft>
+              <a:buClr>
+                <a:srgbClr val="F0AB00"/>
+              </a:buClr>
+              <a:buSzPct val="80000"/>
+              <a:buFont typeface="Arial" panose="020B0604020202020204" pitchFamily="34" charset="0"/>
+              <a:buChar char="•"/>
+              <a:tabLst/>
+            </a:pPr>
+            <a:r>
+              <a:rPr kumimoji="0" lang="en-US" sz="1600" b="0" i="0" u="none" strike="noStrike" kern="0" cap="none" spc="0" normalizeH="0" baseline="0" noProof="0" dirty="0">
+                <a:ln>
+                  <a:noFill/>
+                </a:ln>
+                <a:effectLst/>
+                <a:uLnTx/>
+                <a:uFillTx/>
+                <a:ea typeface="Arial Unicode MS" pitchFamily="34" charset="-128"/>
+                <a:cs typeface="Arial Unicode MS" pitchFamily="34" charset="-128"/>
+              </a:rPr>
+              <a:t>Port: 80</a:t>
+            </a:r>
+          </a:p>
+        </p:txBody>
+      </p:sp>
+      <p:sp>
+        <p:nvSpPr>
+          <p:cNvPr id="29" name="Rectangle 28">
+            <a:extLst>
+              <a:ext uri="{FF2B5EF4-FFF2-40B4-BE49-F238E27FC236}">
+                <a16:creationId xmlns:a16="http://schemas.microsoft.com/office/drawing/2014/main" id="{965DBE36-9899-405C-9A72-452A2D084CD9}"/>
+              </a:ext>
+            </a:extLst>
+          </p:cNvPr>
+          <p:cNvSpPr/>
+          <p:nvPr/>
+        </p:nvSpPr>
+        <p:spPr bwMode="gray">
+          <a:xfrm>
+            <a:off x="5197191" y="2922464"/>
+            <a:ext cx="1665273" cy="289387"/>
+          </a:xfrm>
+          <a:prstGeom prst="rect">
+            <a:avLst/>
+          </a:prstGeom>
+          <a:ln>
+            <a:headEnd/>
+            <a:tailEnd/>
+          </a:ln>
+        </p:spPr>
+        <p:style>
+          <a:lnRef idx="2">
+            <a:schemeClr val="accent2"/>
+          </a:lnRef>
+          <a:fillRef idx="1">
+            <a:schemeClr val="lt1"/>
+          </a:fillRef>
+          <a:effectRef idx="0">
+            <a:schemeClr val="accent2"/>
+          </a:effectRef>
+          <a:fontRef idx="minor">
+            <a:schemeClr val="dk1"/>
+          </a:fontRef>
+        </p:style>
+        <p:txBody>
+          <a:bodyPr lIns="90000" tIns="72000" rIns="90000" bIns="72000" rtlCol="0" anchor="ctr"/>
+          <a:lstStyle/>
+          <a:p>
+            <a:pPr marR="0" algn="ctr" defTabSz="914400" eaLnBrk="1" fontAlgn="base" latinLnBrk="0" hangingPunct="1">
+              <a:lnSpc>
+                <a:spcPct val="100000"/>
+              </a:lnSpc>
+              <a:spcBef>
+                <a:spcPct val="50000"/>
+              </a:spcBef>
+              <a:spcAft>
+                <a:spcPct val="0"/>
+              </a:spcAft>
+              <a:buClr>
+                <a:srgbClr val="F0AB00"/>
+              </a:buClr>
+              <a:buSzPct val="80000"/>
+              <a:tabLst/>
+            </a:pPr>
+            <a:r>
+              <a:rPr kumimoji="0" lang="de-DE" sz="1600" b="0" i="0" u="none" strike="noStrike" kern="0" cap="none" spc="0" normalizeH="0" baseline="0" noProof="0" dirty="0">
+                <a:ln>
+                  <a:noFill/>
+                </a:ln>
+                <a:effectLst/>
+                <a:uLnTx/>
+                <a:uFillTx/>
+                <a:ea typeface="Arial Unicode MS" pitchFamily="34" charset="-128"/>
+                <a:cs typeface="Arial Unicode MS" pitchFamily="34" charset="-128"/>
+              </a:rPr>
+              <a:t>IP: 10.10.10.4</a:t>
+            </a:r>
+          </a:p>
+        </p:txBody>
+      </p:sp>
+    </p:spTree>
+    <p:extLst>
+      <p:ext uri="{BB962C8B-B14F-4D97-AF65-F5344CB8AC3E}">
+        <p14:creationId xmlns:p14="http://schemas.microsoft.com/office/powerpoint/2010/main" val="2098045799"/>
+      </p:ext>
+    </p:extLst>
+  </p:cSld>
+  <p:clrMapOvr>
+    <a:masterClrMapping/>
+  </p:clrMapOvr>
+</p:sld>
+</file>
+
+<file path=ppt/slides/slide11.xml><?xml version="1.0" encoding="utf-8"?>
+<p:sld xmlns:a="http://schemas.openxmlformats.org/drawingml/2006/main" xmlns:r="http://schemas.openxmlformats.org/officeDocument/2006/relationships" xmlns:p="http://schemas.openxmlformats.org/presentationml/2006/main">
+  <p:cSld>
+    <p:spTree>
+      <p:nvGrpSpPr>
+        <p:cNvPr id="1" name=""/>
+        <p:cNvGrpSpPr/>
+        <p:nvPr/>
+      </p:nvGrpSpPr>
+      <p:grpSpPr>
+        <a:xfrm>
+          <a:off x="0" y="0"/>
+          <a:ext cx="0" cy="0"/>
+          <a:chOff x="0" y="0"/>
+          <a:chExt cx="0" cy="0"/>
+        </a:xfrm>
+      </p:grpSpPr>
+      <p:sp>
+        <p:nvSpPr>
+          <p:cNvPr id="21" name="Rectangle 20"/>
+          <p:cNvSpPr/>
+          <p:nvPr/>
+        </p:nvSpPr>
+        <p:spPr bwMode="gray">
+          <a:xfrm>
+            <a:off x="6141720" y="3390899"/>
+            <a:ext cx="4960620" cy="2865121"/>
+          </a:xfrm>
+          <a:prstGeom prst="rect">
+            <a:avLst/>
+          </a:prstGeom>
+          <a:ln>
+            <a:headEnd/>
+            <a:tailEnd/>
+          </a:ln>
+        </p:spPr>
+        <p:style>
+          <a:lnRef idx="2">
+            <a:schemeClr val="accent2"/>
+          </a:lnRef>
+          <a:fillRef idx="1">
+            <a:schemeClr val="lt1"/>
+          </a:fillRef>
+          <a:effectRef idx="0">
+            <a:schemeClr val="accent2"/>
+          </a:effectRef>
+          <a:fontRef idx="minor">
+            <a:schemeClr val="dk1"/>
+          </a:fontRef>
+        </p:style>
+        <p:txBody>
+          <a:bodyPr lIns="90000" tIns="72000" rIns="90000" bIns="72000" rtlCol="0" anchor="t"/>
+          <a:lstStyle/>
+          <a:p>
+            <a:pPr marR="0" algn="ctr" defTabSz="914400" eaLnBrk="1" fontAlgn="base" latinLnBrk="0" hangingPunct="1">
+              <a:lnSpc>
+                <a:spcPct val="100000"/>
+              </a:lnSpc>
+              <a:spcBef>
+                <a:spcPct val="50000"/>
+              </a:spcBef>
+              <a:spcAft>
+                <a:spcPct val="0"/>
+              </a:spcAft>
+              <a:buClr>
+                <a:srgbClr val="F0AB00"/>
+              </a:buClr>
+              <a:buSzPct val="80000"/>
+              <a:tabLst/>
+            </a:pPr>
+            <a:r>
+              <a:rPr kumimoji="0" lang="en-US" sz="1800" b="1" i="0" u="none" strike="noStrike" kern="0" cap="none" spc="0" normalizeH="0" baseline="0" noProof="0" dirty="0">
+                <a:ln>
+                  <a:noFill/>
+                </a:ln>
+                <a:effectLst/>
+                <a:uLnTx/>
+                <a:uFillTx/>
+                <a:ea typeface="Arial Unicode MS" pitchFamily="34" charset="-128"/>
+                <a:cs typeface="Arial Unicode MS" pitchFamily="34" charset="-128"/>
+              </a:rPr>
+              <a:t>Node B</a:t>
+            </a:r>
+          </a:p>
+        </p:txBody>
+      </p:sp>
+      <p:sp>
+        <p:nvSpPr>
+          <p:cNvPr id="2" name="Title 1"/>
+          <p:cNvSpPr>
+            <a:spLocks noGrp="1"/>
+          </p:cNvSpPr>
+          <p:nvPr>
+            <p:ph type="title"/>
+          </p:nvPr>
+        </p:nvSpPr>
+        <p:spPr/>
+        <p:txBody>
+          <a:bodyPr/>
+          <a:lstStyle/>
+          <a:p>
+            <a:r>
+              <a:rPr lang="en-US" dirty="0"/>
+              <a:t>Introducing LoadBalancers</a:t>
+            </a:r>
+          </a:p>
+        </p:txBody>
+      </p:sp>
+      <p:sp>
+        <p:nvSpPr>
+          <p:cNvPr id="4" name="Rectangle 3"/>
+          <p:cNvSpPr/>
+          <p:nvPr/>
+        </p:nvSpPr>
+        <p:spPr bwMode="gray">
+          <a:xfrm>
+            <a:off x="952500" y="3390900"/>
+            <a:ext cx="4960620" cy="2865120"/>
+          </a:xfrm>
+          <a:prstGeom prst="rect">
+            <a:avLst/>
+          </a:prstGeom>
+          <a:ln>
+            <a:headEnd/>
+            <a:tailEnd/>
+          </a:ln>
+        </p:spPr>
+        <p:style>
+          <a:lnRef idx="2">
+            <a:schemeClr val="accent2"/>
+          </a:lnRef>
+          <a:fillRef idx="1">
+            <a:schemeClr val="lt1"/>
+          </a:fillRef>
+          <a:effectRef idx="0">
+            <a:schemeClr val="accent2"/>
+          </a:effectRef>
+          <a:fontRef idx="minor">
+            <a:schemeClr val="dk1"/>
+          </a:fontRef>
+        </p:style>
+        <p:txBody>
+          <a:bodyPr lIns="90000" tIns="72000" rIns="90000" bIns="72000" rtlCol="0" anchor="t"/>
+          <a:lstStyle/>
+          <a:p>
+            <a:pPr marR="0" algn="ctr" defTabSz="914400" eaLnBrk="1" fontAlgn="base" latinLnBrk="0" hangingPunct="1">
+              <a:lnSpc>
+                <a:spcPct val="100000"/>
+              </a:lnSpc>
+              <a:spcBef>
+                <a:spcPct val="50000"/>
+              </a:spcBef>
+              <a:spcAft>
+                <a:spcPct val="0"/>
+              </a:spcAft>
+              <a:buClr>
+                <a:srgbClr val="F0AB00"/>
+              </a:buClr>
+              <a:buSzPct val="80000"/>
+              <a:tabLst/>
+            </a:pPr>
+            <a:r>
+              <a:rPr kumimoji="0" lang="en-US" sz="1800" b="1" i="0" u="none" strike="noStrike" kern="0" cap="none" spc="0" normalizeH="0" baseline="0" noProof="0" dirty="0">
+                <a:ln>
+                  <a:noFill/>
+                </a:ln>
+                <a:effectLst/>
+                <a:uLnTx/>
+                <a:uFillTx/>
+                <a:ea typeface="Arial Unicode MS" pitchFamily="34" charset="-128"/>
+                <a:cs typeface="Arial Unicode MS" pitchFamily="34" charset="-128"/>
+              </a:rPr>
+              <a:t>Node A</a:t>
+            </a:r>
+          </a:p>
+        </p:txBody>
+      </p:sp>
+      <p:sp>
+        <p:nvSpPr>
+          <p:cNvPr id="6" name="Rectangle 5"/>
+          <p:cNvSpPr/>
+          <p:nvPr/>
+        </p:nvSpPr>
+        <p:spPr bwMode="gray">
+          <a:xfrm>
+            <a:off x="2337562" y="4439970"/>
+            <a:ext cx="1815338" cy="1160859"/>
+          </a:xfrm>
+          <a:prstGeom prst="rect">
+            <a:avLst/>
+          </a:prstGeom>
+          <a:ln>
+            <a:headEnd/>
+            <a:tailEnd/>
+          </a:ln>
+        </p:spPr>
+        <p:style>
+          <a:lnRef idx="2">
+            <a:schemeClr val="accent2">
+              <a:shade val="50000"/>
+            </a:schemeClr>
+          </a:lnRef>
+          <a:fillRef idx="1">
+            <a:schemeClr val="accent2"/>
+          </a:fillRef>
+          <a:effectRef idx="0">
+            <a:schemeClr val="accent2"/>
+          </a:effectRef>
+          <a:fontRef idx="minor">
+            <a:schemeClr val="lt1"/>
+          </a:fontRef>
+        </p:style>
+        <p:txBody>
+          <a:bodyPr lIns="90000" tIns="72000" rIns="90000" bIns="72000" rtlCol="0" anchor="ctr"/>
+          <a:lstStyle/>
+          <a:p>
+            <a:pPr marR="0" algn="ctr" defTabSz="914400" eaLnBrk="1" fontAlgn="base" latinLnBrk="0" hangingPunct="1">
+              <a:lnSpc>
+                <a:spcPct val="100000"/>
+              </a:lnSpc>
+              <a:spcBef>
+                <a:spcPct val="50000"/>
+              </a:spcBef>
+              <a:spcAft>
+                <a:spcPct val="0"/>
+              </a:spcAft>
+              <a:buClr>
+                <a:srgbClr val="F0AB00"/>
+              </a:buClr>
+              <a:buSzPct val="80000"/>
+              <a:tabLst/>
+            </a:pPr>
+            <a:r>
+              <a:rPr lang="de-DE" sz="1600" b="1" kern="0" noProof="0" dirty="0" err="1">
+                <a:ea typeface="Arial Unicode MS" pitchFamily="34" charset="-128"/>
+                <a:cs typeface="Arial Unicode MS" pitchFamily="34" charset="-128"/>
+              </a:rPr>
+              <a:t>Pod</a:t>
+            </a:r>
+            <a:endParaRPr kumimoji="0" lang="de-DE" sz="1600" b="1" i="0" u="none" strike="noStrike" kern="0" cap="none" spc="0" normalizeH="0" baseline="0" noProof="0" dirty="0">
+              <a:ln>
+                <a:noFill/>
+              </a:ln>
+              <a:effectLst/>
+              <a:uLnTx/>
+              <a:uFillTx/>
+              <a:ea typeface="Arial Unicode MS" pitchFamily="34" charset="-128"/>
+              <a:cs typeface="Arial Unicode MS" pitchFamily="34" charset="-128"/>
+            </a:endParaRPr>
+          </a:p>
+        </p:txBody>
+      </p:sp>
+      <p:sp>
+        <p:nvSpPr>
+          <p:cNvPr id="11" name="Rectangle 10"/>
+          <p:cNvSpPr/>
+          <p:nvPr/>
+        </p:nvSpPr>
+        <p:spPr bwMode="gray">
+          <a:xfrm>
+            <a:off x="2422271" y="4205839"/>
+            <a:ext cx="1645920" cy="365760"/>
+          </a:xfrm>
+          <a:prstGeom prst="rect">
+            <a:avLst/>
+          </a:prstGeom>
+          <a:ln>
+            <a:headEnd/>
+            <a:tailEnd/>
+          </a:ln>
+        </p:spPr>
+        <p:style>
+          <a:lnRef idx="2">
+            <a:schemeClr val="accent2"/>
+          </a:lnRef>
+          <a:fillRef idx="1">
+            <a:schemeClr val="lt1"/>
+          </a:fillRef>
+          <a:effectRef idx="0">
+            <a:schemeClr val="accent2"/>
+          </a:effectRef>
+          <a:fontRef idx="minor">
+            <a:schemeClr val="dk1"/>
+          </a:fontRef>
+        </p:style>
+        <p:txBody>
+          <a:bodyPr lIns="90000" tIns="72000" rIns="90000" bIns="72000" rtlCol="0" anchor="ctr"/>
+          <a:lstStyle/>
+          <a:p>
+            <a:pPr marR="0" algn="ctr" defTabSz="914400" eaLnBrk="1" fontAlgn="base" latinLnBrk="0" hangingPunct="1">
+              <a:lnSpc>
+                <a:spcPct val="100000"/>
+              </a:lnSpc>
+              <a:spcBef>
+                <a:spcPct val="50000"/>
+              </a:spcBef>
+              <a:spcAft>
+                <a:spcPct val="0"/>
+              </a:spcAft>
+              <a:buClr>
+                <a:srgbClr val="F0AB00"/>
+              </a:buClr>
+              <a:buSzPct val="80000"/>
+              <a:tabLst/>
+            </a:pPr>
+            <a:r>
+              <a:rPr kumimoji="0" lang="de-DE" sz="1800" b="0" i="0" u="none" strike="noStrike" kern="0" cap="none" spc="0" normalizeH="0" baseline="0" noProof="0" dirty="0">
+                <a:ln>
+                  <a:noFill/>
+                </a:ln>
+                <a:effectLst/>
+                <a:uLnTx/>
+                <a:uFillTx/>
+                <a:ea typeface="Arial Unicode MS" pitchFamily="34" charset="-128"/>
+                <a:cs typeface="Arial Unicode MS" pitchFamily="34" charset="-128"/>
+              </a:rPr>
+              <a:t>IP: 10.10.10.1</a:t>
+            </a:r>
+          </a:p>
+        </p:txBody>
+      </p:sp>
+      <p:sp>
+        <p:nvSpPr>
+          <p:cNvPr id="15" name="Rectangle 14"/>
+          <p:cNvSpPr/>
+          <p:nvPr/>
+        </p:nvSpPr>
+        <p:spPr bwMode="gray">
+          <a:xfrm>
+            <a:off x="1459043" y="5386537"/>
+            <a:ext cx="1319714" cy="428584"/>
+          </a:xfrm>
+          <a:prstGeom prst="rect">
+            <a:avLst/>
+          </a:prstGeom>
+          <a:solidFill>
+            <a:schemeClr val="accent1">
+              <a:lumMod val="40000"/>
+              <a:lumOff val="60000"/>
+            </a:schemeClr>
+          </a:solidFill>
+          <a:ln>
+            <a:headEnd/>
+            <a:tailEnd/>
+          </a:ln>
+        </p:spPr>
+        <p:style>
+          <a:lnRef idx="2">
+            <a:schemeClr val="accent2"/>
+          </a:lnRef>
+          <a:fillRef idx="1">
+            <a:schemeClr val="lt1"/>
+          </a:fillRef>
+          <a:effectRef idx="0">
+            <a:schemeClr val="accent2"/>
+          </a:effectRef>
+          <a:fontRef idx="minor">
+            <a:schemeClr val="dk1"/>
+          </a:fontRef>
+        </p:style>
+        <p:txBody>
+          <a:bodyPr lIns="90000" tIns="72000" rIns="90000" bIns="72000" rtlCol="0" anchor="ctr"/>
+          <a:lstStyle/>
+          <a:p>
+            <a:pPr marR="0" algn="ctr" defTabSz="914400" eaLnBrk="1" fontAlgn="base" latinLnBrk="0" hangingPunct="1">
+              <a:lnSpc>
+                <a:spcPct val="100000"/>
+              </a:lnSpc>
+              <a:spcBef>
+                <a:spcPct val="50000"/>
+              </a:spcBef>
+              <a:spcAft>
+                <a:spcPct val="0"/>
+              </a:spcAft>
+              <a:buClr>
+                <a:srgbClr val="F0AB00"/>
+              </a:buClr>
+              <a:buSzPct val="80000"/>
+              <a:tabLst/>
+            </a:pPr>
+            <a:r>
+              <a:rPr lang="de-DE" sz="1800" kern="0" dirty="0">
+                <a:ea typeface="Arial Unicode MS" pitchFamily="34" charset="-128"/>
+                <a:cs typeface="Arial Unicode MS" pitchFamily="34" charset="-128"/>
+              </a:rPr>
+              <a:t>a</a:t>
+            </a:r>
+            <a:r>
+              <a:rPr kumimoji="0" lang="de-DE" sz="1800" b="0" i="0" u="none" strike="noStrike" kern="0" cap="none" spc="0" normalizeH="0" baseline="0" noProof="0" dirty="0">
+                <a:ln>
+                  <a:noFill/>
+                </a:ln>
+                <a:effectLst/>
+                <a:uLnTx/>
+                <a:uFillTx/>
+                <a:ea typeface="Arial Unicode MS" pitchFamily="34" charset="-128"/>
+                <a:cs typeface="Arial Unicode MS" pitchFamily="34" charset="-128"/>
+              </a:rPr>
+              <a:t>pp=</a:t>
+            </a:r>
+            <a:r>
+              <a:rPr kumimoji="0" lang="de-DE" sz="1800" b="0" i="0" u="none" strike="noStrike" kern="0" cap="none" spc="0" normalizeH="0" baseline="0" noProof="0" dirty="0" err="1">
+                <a:ln>
+                  <a:noFill/>
+                </a:ln>
+                <a:effectLst/>
+                <a:uLnTx/>
+                <a:uFillTx/>
+                <a:ea typeface="Arial Unicode MS" pitchFamily="34" charset="-128"/>
+                <a:cs typeface="Arial Unicode MS" pitchFamily="34" charset="-128"/>
+              </a:rPr>
+              <a:t>nginx</a:t>
+            </a:r>
+            <a:endParaRPr kumimoji="0" lang="de-DE" sz="1800" b="0" i="0" u="none" strike="noStrike" kern="0" cap="none" spc="0" normalizeH="0" baseline="0" noProof="0" dirty="0">
+              <a:ln>
+                <a:noFill/>
+              </a:ln>
+              <a:effectLst/>
+              <a:uLnTx/>
+              <a:uFillTx/>
+              <a:ea typeface="Arial Unicode MS" pitchFamily="34" charset="-128"/>
+              <a:cs typeface="Arial Unicode MS" pitchFamily="34" charset="-128"/>
+            </a:endParaRPr>
+          </a:p>
+        </p:txBody>
+      </p:sp>
+      <p:sp>
+        <p:nvSpPr>
+          <p:cNvPr id="18" name="Rectangle 17"/>
+          <p:cNvSpPr/>
+          <p:nvPr/>
+        </p:nvSpPr>
+        <p:spPr bwMode="gray">
+          <a:xfrm>
+            <a:off x="8045976" y="4446544"/>
+            <a:ext cx="1815338" cy="1160859"/>
+          </a:xfrm>
+          <a:prstGeom prst="rect">
+            <a:avLst/>
+          </a:prstGeom>
+          <a:ln>
+            <a:headEnd/>
+            <a:tailEnd/>
+          </a:ln>
+        </p:spPr>
+        <p:style>
+          <a:lnRef idx="2">
+            <a:schemeClr val="accent2">
+              <a:shade val="50000"/>
+            </a:schemeClr>
+          </a:lnRef>
+          <a:fillRef idx="1">
+            <a:schemeClr val="accent2"/>
+          </a:fillRef>
+          <a:effectRef idx="0">
+            <a:schemeClr val="accent2"/>
+          </a:effectRef>
+          <a:fontRef idx="minor">
+            <a:schemeClr val="lt1"/>
+          </a:fontRef>
+        </p:style>
+        <p:txBody>
+          <a:bodyPr lIns="90000" tIns="72000" rIns="90000" bIns="72000" rtlCol="0" anchor="ctr"/>
+          <a:lstStyle/>
+          <a:p>
+            <a:pPr marR="0" algn="ctr" defTabSz="914400" eaLnBrk="1" fontAlgn="base" latinLnBrk="0" hangingPunct="1">
+              <a:lnSpc>
+                <a:spcPct val="100000"/>
+              </a:lnSpc>
+              <a:spcBef>
+                <a:spcPct val="50000"/>
+              </a:spcBef>
+              <a:spcAft>
+                <a:spcPct val="0"/>
+              </a:spcAft>
+              <a:buClr>
+                <a:srgbClr val="F0AB00"/>
+              </a:buClr>
+              <a:buSzPct val="80000"/>
+              <a:tabLst/>
+            </a:pPr>
+            <a:r>
+              <a:rPr lang="de-DE" sz="1600" b="1" kern="0" noProof="0" dirty="0" err="1">
+                <a:ea typeface="Arial Unicode MS" pitchFamily="34" charset="-128"/>
+                <a:cs typeface="Arial Unicode MS" pitchFamily="34" charset="-128"/>
+              </a:rPr>
+              <a:t>Pod</a:t>
+            </a:r>
+            <a:endParaRPr kumimoji="0" lang="de-DE" sz="1600" b="1" i="0" u="none" strike="noStrike" kern="0" cap="none" spc="0" normalizeH="0" baseline="0" noProof="0" dirty="0">
+              <a:ln>
+                <a:noFill/>
+              </a:ln>
+              <a:effectLst/>
+              <a:uLnTx/>
+              <a:uFillTx/>
+              <a:ea typeface="Arial Unicode MS" pitchFamily="34" charset="-128"/>
+              <a:cs typeface="Arial Unicode MS" pitchFamily="34" charset="-128"/>
+            </a:endParaRPr>
+          </a:p>
+        </p:txBody>
+      </p:sp>
+      <p:sp>
+        <p:nvSpPr>
+          <p:cNvPr id="19" name="Rectangle 18"/>
+          <p:cNvSpPr/>
+          <p:nvPr/>
+        </p:nvSpPr>
+        <p:spPr bwMode="gray">
+          <a:xfrm>
+            <a:off x="7208370" y="5386537"/>
+            <a:ext cx="1319714" cy="428584"/>
+          </a:xfrm>
+          <a:prstGeom prst="rect">
+            <a:avLst/>
+          </a:prstGeom>
+          <a:ln>
+            <a:headEnd/>
+            <a:tailEnd/>
+          </a:ln>
+        </p:spPr>
+        <p:style>
+          <a:lnRef idx="2">
+            <a:schemeClr val="accent2"/>
+          </a:lnRef>
+          <a:fillRef idx="1">
+            <a:schemeClr val="lt1"/>
+          </a:fillRef>
+          <a:effectRef idx="0">
+            <a:schemeClr val="accent2"/>
+          </a:effectRef>
+          <a:fontRef idx="minor">
+            <a:schemeClr val="dk1"/>
+          </a:fontRef>
+        </p:style>
+        <p:txBody>
+          <a:bodyPr lIns="90000" tIns="72000" rIns="90000" bIns="72000" rtlCol="0" anchor="ctr"/>
+          <a:lstStyle/>
+          <a:p>
+            <a:pPr marR="0" algn="ctr" defTabSz="914400" eaLnBrk="1" fontAlgn="base" latinLnBrk="0" hangingPunct="1">
+              <a:lnSpc>
+                <a:spcPct val="100000"/>
+              </a:lnSpc>
+              <a:spcBef>
+                <a:spcPct val="50000"/>
+              </a:spcBef>
+              <a:spcAft>
+                <a:spcPct val="0"/>
+              </a:spcAft>
+              <a:buClr>
+                <a:srgbClr val="F0AB00"/>
+              </a:buClr>
+              <a:buSzPct val="80000"/>
+              <a:tabLst/>
+            </a:pPr>
+            <a:r>
+              <a:rPr lang="de-DE" sz="1800" kern="0" dirty="0">
+                <a:ea typeface="Arial Unicode MS" pitchFamily="34" charset="-128"/>
+                <a:cs typeface="Arial Unicode MS" pitchFamily="34" charset="-128"/>
+              </a:rPr>
+              <a:t>a</a:t>
+            </a:r>
+            <a:r>
+              <a:rPr kumimoji="0" lang="de-DE" sz="1800" b="0" i="0" u="none" strike="noStrike" kern="0" cap="none" spc="0" normalizeH="0" baseline="0" noProof="0" dirty="0">
+                <a:ln>
+                  <a:noFill/>
+                </a:ln>
+                <a:effectLst/>
+                <a:uLnTx/>
+                <a:uFillTx/>
+                <a:ea typeface="Arial Unicode MS" pitchFamily="34" charset="-128"/>
+                <a:cs typeface="Arial Unicode MS" pitchFamily="34" charset="-128"/>
+              </a:rPr>
+              <a:t>pp=</a:t>
+            </a:r>
+            <a:r>
+              <a:rPr kumimoji="0" lang="de-DE" sz="1800" b="0" i="0" u="none" strike="noStrike" kern="0" cap="none" spc="0" normalizeH="0" baseline="0" noProof="0" dirty="0" err="1">
+                <a:ln>
+                  <a:noFill/>
+                </a:ln>
+                <a:effectLst/>
+                <a:uLnTx/>
+                <a:uFillTx/>
+                <a:ea typeface="Arial Unicode MS" pitchFamily="34" charset="-128"/>
+                <a:cs typeface="Arial Unicode MS" pitchFamily="34" charset="-128"/>
+              </a:rPr>
+              <a:t>client</a:t>
+            </a:r>
+            <a:endParaRPr kumimoji="0" lang="de-DE" sz="1800" b="0" i="0" u="none" strike="noStrike" kern="0" cap="none" spc="0" normalizeH="0" baseline="0" noProof="0" dirty="0">
+              <a:ln>
+                <a:noFill/>
+              </a:ln>
+              <a:effectLst/>
+              <a:uLnTx/>
+              <a:uFillTx/>
+              <a:ea typeface="Arial Unicode MS" pitchFamily="34" charset="-128"/>
+              <a:cs typeface="Arial Unicode MS" pitchFamily="34" charset="-128"/>
+            </a:endParaRPr>
+          </a:p>
+        </p:txBody>
+      </p:sp>
+      <p:sp>
+        <p:nvSpPr>
+          <p:cNvPr id="20" name="Rectangle 19"/>
+          <p:cNvSpPr/>
+          <p:nvPr/>
+        </p:nvSpPr>
+        <p:spPr bwMode="gray">
+          <a:xfrm>
+            <a:off x="9575331" y="5386537"/>
+            <a:ext cx="1073656" cy="428584"/>
+          </a:xfrm>
+          <a:prstGeom prst="rect">
+            <a:avLst/>
+          </a:prstGeom>
+          <a:ln>
+            <a:headEnd/>
+            <a:tailEnd/>
+          </a:ln>
+        </p:spPr>
+        <p:style>
+          <a:lnRef idx="2">
+            <a:schemeClr val="accent2"/>
+          </a:lnRef>
+          <a:fillRef idx="1">
+            <a:schemeClr val="lt1"/>
+          </a:fillRef>
+          <a:effectRef idx="0">
+            <a:schemeClr val="accent2"/>
+          </a:effectRef>
+          <a:fontRef idx="minor">
+            <a:schemeClr val="dk1"/>
+          </a:fontRef>
+        </p:style>
+        <p:txBody>
+          <a:bodyPr lIns="90000" tIns="72000" rIns="90000" bIns="72000" rtlCol="0" anchor="ctr"/>
+          <a:lstStyle/>
+          <a:p>
+            <a:pPr marR="0" algn="ctr" defTabSz="914400" eaLnBrk="1" fontAlgn="base" latinLnBrk="0" hangingPunct="1">
+              <a:lnSpc>
+                <a:spcPct val="100000"/>
+              </a:lnSpc>
+              <a:spcBef>
+                <a:spcPct val="50000"/>
+              </a:spcBef>
+              <a:spcAft>
+                <a:spcPct val="0"/>
+              </a:spcAft>
+              <a:buClr>
+                <a:srgbClr val="F0AB00"/>
+              </a:buClr>
+              <a:buSzPct val="80000"/>
+              <a:tabLst/>
+            </a:pPr>
+            <a:r>
+              <a:rPr lang="de-DE" sz="1800" kern="0" dirty="0">
+                <a:ea typeface="Arial Unicode MS" pitchFamily="34" charset="-128"/>
+                <a:cs typeface="Arial Unicode MS" pitchFamily="34" charset="-128"/>
+              </a:rPr>
+              <a:t>Port: 80</a:t>
+            </a:r>
+            <a:endParaRPr kumimoji="0" lang="de-DE" sz="1800" b="0" i="0" u="none" strike="noStrike" kern="0" cap="none" spc="0" normalizeH="0" baseline="0" noProof="0" dirty="0">
+              <a:ln>
+                <a:noFill/>
+              </a:ln>
+              <a:effectLst/>
+              <a:uLnTx/>
+              <a:uFillTx/>
+              <a:ea typeface="Arial Unicode MS" pitchFamily="34" charset="-128"/>
+              <a:cs typeface="Arial Unicode MS" pitchFamily="34" charset="-128"/>
+            </a:endParaRPr>
+          </a:p>
+        </p:txBody>
+      </p:sp>
+      <p:sp>
+        <p:nvSpPr>
+          <p:cNvPr id="17" name="Rectangle 16"/>
+          <p:cNvSpPr/>
+          <p:nvPr/>
+        </p:nvSpPr>
+        <p:spPr bwMode="gray">
+          <a:xfrm>
+            <a:off x="3826004" y="5386537"/>
+            <a:ext cx="1073656" cy="428584"/>
+          </a:xfrm>
+          <a:prstGeom prst="rect">
+            <a:avLst/>
+          </a:prstGeom>
+          <a:ln>
+            <a:headEnd/>
+            <a:tailEnd/>
+          </a:ln>
+        </p:spPr>
+        <p:style>
+          <a:lnRef idx="2">
+            <a:schemeClr val="accent2"/>
+          </a:lnRef>
+          <a:fillRef idx="1">
+            <a:schemeClr val="lt1"/>
+          </a:fillRef>
+          <a:effectRef idx="0">
+            <a:schemeClr val="accent2"/>
+          </a:effectRef>
+          <a:fontRef idx="minor">
+            <a:schemeClr val="dk1"/>
+          </a:fontRef>
+        </p:style>
+        <p:txBody>
+          <a:bodyPr lIns="90000" tIns="72000" rIns="90000" bIns="72000" rtlCol="0" anchor="ctr"/>
+          <a:lstStyle/>
+          <a:p>
+            <a:pPr marR="0" algn="ctr" defTabSz="914400" eaLnBrk="1" fontAlgn="base" latinLnBrk="0" hangingPunct="1">
+              <a:lnSpc>
+                <a:spcPct val="100000"/>
+              </a:lnSpc>
+              <a:spcBef>
+                <a:spcPct val="50000"/>
+              </a:spcBef>
+              <a:spcAft>
+                <a:spcPct val="0"/>
+              </a:spcAft>
+              <a:buClr>
+                <a:srgbClr val="F0AB00"/>
+              </a:buClr>
+              <a:buSzPct val="80000"/>
+              <a:tabLst/>
+            </a:pPr>
+            <a:r>
+              <a:rPr lang="de-DE" sz="1800" kern="0" dirty="0">
+                <a:ea typeface="Arial Unicode MS" pitchFamily="34" charset="-128"/>
+                <a:cs typeface="Arial Unicode MS" pitchFamily="34" charset="-128"/>
+              </a:rPr>
+              <a:t>Port: 80</a:t>
+            </a:r>
+            <a:endParaRPr kumimoji="0" lang="de-DE" sz="1800" b="0" i="0" u="none" strike="noStrike" kern="0" cap="none" spc="0" normalizeH="0" baseline="0" noProof="0" dirty="0">
+              <a:ln>
+                <a:noFill/>
+              </a:ln>
+              <a:effectLst/>
+              <a:uLnTx/>
+              <a:uFillTx/>
+              <a:ea typeface="Arial Unicode MS" pitchFamily="34" charset="-128"/>
+              <a:cs typeface="Arial Unicode MS" pitchFamily="34" charset="-128"/>
+            </a:endParaRPr>
+          </a:p>
+        </p:txBody>
+      </p:sp>
+      <p:sp>
+        <p:nvSpPr>
+          <p:cNvPr id="13" name="Rectangle 12"/>
+          <p:cNvSpPr/>
+          <p:nvPr/>
+        </p:nvSpPr>
+        <p:spPr bwMode="gray">
+          <a:xfrm>
+            <a:off x="8130685" y="4205839"/>
+            <a:ext cx="1645920" cy="365760"/>
+          </a:xfrm>
+          <a:prstGeom prst="rect">
+            <a:avLst/>
+          </a:prstGeom>
+          <a:ln>
+            <a:headEnd/>
+            <a:tailEnd/>
+          </a:ln>
+        </p:spPr>
+        <p:style>
+          <a:lnRef idx="2">
+            <a:schemeClr val="accent2"/>
+          </a:lnRef>
+          <a:fillRef idx="1">
+            <a:schemeClr val="lt1"/>
+          </a:fillRef>
+          <a:effectRef idx="0">
+            <a:schemeClr val="accent2"/>
+          </a:effectRef>
+          <a:fontRef idx="minor">
+            <a:schemeClr val="dk1"/>
+          </a:fontRef>
+        </p:style>
+        <p:txBody>
+          <a:bodyPr lIns="90000" tIns="72000" rIns="90000" bIns="72000" rtlCol="0" anchor="ctr"/>
+          <a:lstStyle/>
+          <a:p>
+            <a:pPr marR="0" algn="ctr" defTabSz="914400" eaLnBrk="1" fontAlgn="base" latinLnBrk="0" hangingPunct="1">
+              <a:lnSpc>
+                <a:spcPct val="100000"/>
+              </a:lnSpc>
+              <a:spcBef>
+                <a:spcPct val="50000"/>
+              </a:spcBef>
+              <a:spcAft>
+                <a:spcPct val="0"/>
+              </a:spcAft>
+              <a:buClr>
+                <a:srgbClr val="F0AB00"/>
+              </a:buClr>
+              <a:buSzPct val="80000"/>
+              <a:tabLst/>
+            </a:pPr>
+            <a:r>
+              <a:rPr kumimoji="0" lang="de-DE" sz="1800" b="0" i="0" u="none" strike="noStrike" kern="0" cap="none" spc="0" normalizeH="0" baseline="0" noProof="0" dirty="0">
+                <a:ln>
+                  <a:noFill/>
+                </a:ln>
+                <a:effectLst/>
+                <a:uLnTx/>
+                <a:uFillTx/>
+                <a:ea typeface="Arial Unicode MS" pitchFamily="34" charset="-128"/>
+                <a:cs typeface="Arial Unicode MS" pitchFamily="34" charset="-128"/>
+              </a:rPr>
+              <a:t>IP: 10.10.10.3</a:t>
+            </a:r>
+          </a:p>
+        </p:txBody>
+      </p:sp>
+      <p:sp>
+        <p:nvSpPr>
+          <p:cNvPr id="22" name="Rectangle 21"/>
+          <p:cNvSpPr/>
+          <p:nvPr/>
+        </p:nvSpPr>
+        <p:spPr bwMode="gray">
+          <a:xfrm>
+            <a:off x="341121" y="3227860"/>
+            <a:ext cx="2124327" cy="428584"/>
+          </a:xfrm>
+          <a:prstGeom prst="rect">
+            <a:avLst/>
+          </a:prstGeom>
+          <a:ln>
+            <a:headEnd/>
+            <a:tailEnd/>
+          </a:ln>
+        </p:spPr>
+        <p:style>
+          <a:lnRef idx="2">
+            <a:schemeClr val="accent5"/>
+          </a:lnRef>
+          <a:fillRef idx="1">
+            <a:schemeClr val="lt1"/>
+          </a:fillRef>
+          <a:effectRef idx="0">
+            <a:schemeClr val="accent5"/>
+          </a:effectRef>
+          <a:fontRef idx="minor">
+            <a:schemeClr val="dk1"/>
+          </a:fontRef>
+        </p:style>
+        <p:txBody>
+          <a:bodyPr lIns="90000" tIns="72000" rIns="90000" bIns="72000" rtlCol="0" anchor="ctr"/>
+          <a:lstStyle/>
+          <a:p>
+            <a:pPr marR="0" algn="ctr" defTabSz="914400" eaLnBrk="1" fontAlgn="base" latinLnBrk="0" hangingPunct="1">
+              <a:lnSpc>
+                <a:spcPct val="100000"/>
+              </a:lnSpc>
+              <a:spcBef>
+                <a:spcPct val="50000"/>
+              </a:spcBef>
+              <a:spcAft>
+                <a:spcPct val="0"/>
+              </a:spcAft>
+              <a:buClr>
+                <a:srgbClr val="F0AB00"/>
+              </a:buClr>
+              <a:buSzPct val="80000"/>
+              <a:tabLst/>
+            </a:pPr>
+            <a:r>
+              <a:rPr lang="de-DE" sz="1800" kern="0" dirty="0">
+                <a:ea typeface="Arial Unicode MS" pitchFamily="34" charset="-128"/>
+                <a:cs typeface="Arial Unicode MS" pitchFamily="34" charset="-128"/>
+              </a:rPr>
+              <a:t>NodePort: 30021</a:t>
+            </a:r>
+            <a:endParaRPr kumimoji="0" lang="de-DE" sz="1800" b="0" i="0" u="none" strike="noStrike" kern="0" cap="none" spc="0" normalizeH="0" baseline="0" noProof="0" dirty="0">
+              <a:ln>
+                <a:noFill/>
+              </a:ln>
+              <a:effectLst/>
+              <a:uLnTx/>
+              <a:uFillTx/>
+              <a:ea typeface="Arial Unicode MS" pitchFamily="34" charset="-128"/>
+              <a:cs typeface="Arial Unicode MS" pitchFamily="34" charset="-128"/>
+            </a:endParaRPr>
+          </a:p>
+        </p:txBody>
+      </p:sp>
+      <p:sp>
+        <p:nvSpPr>
+          <p:cNvPr id="23" name="Rectangle 22"/>
+          <p:cNvSpPr/>
+          <p:nvPr/>
+        </p:nvSpPr>
+        <p:spPr bwMode="gray">
+          <a:xfrm>
+            <a:off x="9566150" y="3227860"/>
+            <a:ext cx="2124327" cy="428584"/>
+          </a:xfrm>
+          <a:prstGeom prst="rect">
+            <a:avLst/>
+          </a:prstGeom>
+          <a:ln>
+            <a:headEnd/>
+            <a:tailEnd/>
+          </a:ln>
+        </p:spPr>
+        <p:style>
+          <a:lnRef idx="2">
+            <a:schemeClr val="accent5"/>
+          </a:lnRef>
+          <a:fillRef idx="1">
+            <a:schemeClr val="lt1"/>
+          </a:fillRef>
+          <a:effectRef idx="0">
+            <a:schemeClr val="accent5"/>
+          </a:effectRef>
+          <a:fontRef idx="minor">
+            <a:schemeClr val="dk1"/>
+          </a:fontRef>
+        </p:style>
+        <p:txBody>
+          <a:bodyPr lIns="90000" tIns="72000" rIns="90000" bIns="72000" rtlCol="0" anchor="ctr"/>
+          <a:lstStyle/>
+          <a:p>
+            <a:pPr marR="0" algn="ctr" defTabSz="914400" eaLnBrk="1" fontAlgn="base" latinLnBrk="0" hangingPunct="1">
+              <a:lnSpc>
+                <a:spcPct val="100000"/>
+              </a:lnSpc>
+              <a:spcBef>
+                <a:spcPct val="50000"/>
+              </a:spcBef>
+              <a:spcAft>
+                <a:spcPct val="0"/>
+              </a:spcAft>
+              <a:buClr>
+                <a:srgbClr val="F0AB00"/>
+              </a:buClr>
+              <a:buSzPct val="80000"/>
+              <a:tabLst/>
+            </a:pPr>
+            <a:r>
+              <a:rPr lang="de-DE" sz="1800" kern="0" dirty="0">
+                <a:ea typeface="Arial Unicode MS" pitchFamily="34" charset="-128"/>
+                <a:cs typeface="Arial Unicode MS" pitchFamily="34" charset="-128"/>
+              </a:rPr>
+              <a:t>NodePort: 30021</a:t>
+            </a:r>
+            <a:endParaRPr kumimoji="0" lang="de-DE" sz="1800" b="0" i="0" u="none" strike="noStrike" kern="0" cap="none" spc="0" normalizeH="0" baseline="0" noProof="0" dirty="0">
+              <a:ln>
+                <a:noFill/>
+              </a:ln>
+              <a:effectLst/>
+              <a:uLnTx/>
+              <a:uFillTx/>
+              <a:ea typeface="Arial Unicode MS" pitchFamily="34" charset="-128"/>
+              <a:cs typeface="Arial Unicode MS" pitchFamily="34" charset="-128"/>
+            </a:endParaRPr>
+          </a:p>
+        </p:txBody>
+      </p:sp>
+      <p:cxnSp>
+        <p:nvCxnSpPr>
+          <p:cNvPr id="26" name="Connector: Elbow 25"/>
+          <p:cNvCxnSpPr>
+            <a:cxnSpLocks/>
+            <a:stCxn id="25" idx="1"/>
+            <a:endCxn id="22" idx="0"/>
+          </p:cNvCxnSpPr>
+          <p:nvPr/>
+        </p:nvCxnSpPr>
+        <p:spPr>
+          <a:xfrm rot="10800000" flipV="1">
+            <a:off x="1403286" y="2334304"/>
+            <a:ext cx="1614611" cy="893555"/>
+          </a:xfrm>
+          <a:prstGeom prst="bentConnector2">
+            <a:avLst/>
+          </a:prstGeom>
+          <a:ln w="57150">
+            <a:solidFill>
+              <a:schemeClr val="tx2"/>
+            </a:solidFill>
+            <a:headEnd type="none" w="med" len="med"/>
+            <a:tailEnd type="triangle"/>
+          </a:ln>
+        </p:spPr>
+        <p:style>
+          <a:lnRef idx="1">
+            <a:schemeClr val="accent1"/>
+          </a:lnRef>
+          <a:fillRef idx="0">
+            <a:schemeClr val="accent1"/>
+          </a:fillRef>
+          <a:effectRef idx="0">
+            <a:schemeClr val="accent1"/>
+          </a:effectRef>
+          <a:fontRef idx="minor">
+            <a:schemeClr val="tx1"/>
+          </a:fontRef>
+        </p:style>
+      </p:cxnSp>
+      <p:cxnSp>
+        <p:nvCxnSpPr>
+          <p:cNvPr id="27" name="Connector: Elbow 26"/>
+          <p:cNvCxnSpPr>
+            <a:cxnSpLocks/>
+            <a:stCxn id="25" idx="3"/>
+            <a:endCxn id="23" idx="0"/>
+          </p:cNvCxnSpPr>
+          <p:nvPr/>
+        </p:nvCxnSpPr>
+        <p:spPr>
+          <a:xfrm>
+            <a:off x="9069904" y="2334305"/>
+            <a:ext cx="1558410" cy="893555"/>
           </a:xfrm>
           <a:prstGeom prst="bentConnector2">
             <a:avLst/>
@@ -10453,19 +11741,20 @@
         <p:nvCxnSpPr>
           <p:cNvPr id="36" name="Connector: Elbow 35"/>
           <p:cNvCxnSpPr>
-            <a:stCxn id="14" idx="1"/>
+            <a:cxnSpLocks/>
+            <a:stCxn id="46" idx="1"/>
             <a:endCxn id="15" idx="2"/>
           </p:cNvCxnSpPr>
           <p:nvPr/>
         </p:nvCxnSpPr>
         <p:spPr>
           <a:xfrm rot="5400000">
-            <a:off x="3718719" y="3489941"/>
-            <a:ext cx="725362" cy="3924999"/>
+            <a:off x="3594206" y="3379499"/>
+            <a:ext cx="960317" cy="3910927"/>
           </a:xfrm>
           <a:prstGeom prst="bentConnector3">
             <a:avLst>
-              <a:gd name="adj1" fmla="val 137818"/>
+              <a:gd name="adj1" fmla="val 123805"/>
             </a:avLst>
           </a:prstGeom>
           <a:ln w="57150">
@@ -10491,10 +11780,728 @@
           </a:fontRef>
         </p:style>
       </p:cxnSp>
+      <p:sp>
+        <p:nvSpPr>
+          <p:cNvPr id="31" name="Cloud 30">
+            <a:extLst>
+              <a:ext uri="{FF2B5EF4-FFF2-40B4-BE49-F238E27FC236}">
+                <a16:creationId xmlns:a16="http://schemas.microsoft.com/office/drawing/2014/main" id="{650B88C5-9391-410D-AD5A-D43BDA2A1C53}"/>
+              </a:ext>
+            </a:extLst>
+          </p:cNvPr>
+          <p:cNvSpPr/>
+          <p:nvPr/>
+        </p:nvSpPr>
+        <p:spPr bwMode="gray">
+          <a:xfrm>
+            <a:off x="6382267" y="432611"/>
+            <a:ext cx="3496836" cy="1074420"/>
+          </a:xfrm>
+          <a:prstGeom prst="cloud">
+            <a:avLst/>
+          </a:prstGeom>
+          <a:solidFill>
+            <a:schemeClr val="accent1"/>
+          </a:solidFill>
+          <a:ln w="6350" algn="ctr">
+            <a:noFill/>
+            <a:miter lim="800000"/>
+            <a:headEnd/>
+            <a:tailEnd/>
+          </a:ln>
+        </p:spPr>
+        <p:txBody>
+          <a:bodyPr lIns="90000" tIns="72000" rIns="90000" bIns="72000" rtlCol="0" anchor="ctr"/>
+          <a:lstStyle/>
+          <a:p>
+            <a:pPr marR="0" algn="ctr" defTabSz="914400" eaLnBrk="1" fontAlgn="base" latinLnBrk="0" hangingPunct="1">
+              <a:lnSpc>
+                <a:spcPct val="100000"/>
+              </a:lnSpc>
+              <a:spcBef>
+                <a:spcPct val="50000"/>
+              </a:spcBef>
+              <a:spcAft>
+                <a:spcPct val="0"/>
+              </a:spcAft>
+              <a:buClr>
+                <a:srgbClr val="F0AB00"/>
+              </a:buClr>
+              <a:buSzPct val="80000"/>
+              <a:tabLst/>
+            </a:pPr>
+            <a:r>
+              <a:rPr lang="en-US" sz="1800" kern="0" dirty="0">
+                <a:ea typeface="Arial Unicode MS" pitchFamily="34" charset="-128"/>
+                <a:cs typeface="Arial Unicode MS" pitchFamily="34" charset="-128"/>
+              </a:rPr>
+              <a:t>GET: nginx:80</a:t>
+            </a:r>
+            <a:endParaRPr kumimoji="0" lang="en-US" sz="1800" b="0" i="0" u="none" strike="noStrike" kern="0" cap="none" spc="0" normalizeH="0" baseline="0" noProof="0" dirty="0" err="1">
+              <a:ln>
+                <a:noFill/>
+              </a:ln>
+              <a:effectLst/>
+              <a:uLnTx/>
+              <a:uFillTx/>
+              <a:ea typeface="Arial Unicode MS" pitchFamily="34" charset="-128"/>
+              <a:cs typeface="Arial Unicode MS" pitchFamily="34" charset="-128"/>
+            </a:endParaRPr>
+          </a:p>
+        </p:txBody>
+      </p:sp>
+      <p:cxnSp>
+        <p:nvCxnSpPr>
+          <p:cNvPr id="44" name="Straight Arrow Connector 43">
+            <a:extLst>
+              <a:ext uri="{FF2B5EF4-FFF2-40B4-BE49-F238E27FC236}">
+                <a16:creationId xmlns:a16="http://schemas.microsoft.com/office/drawing/2014/main" id="{6064095C-8499-4385-AEBA-C1A6BFE16CEF}"/>
+              </a:ext>
+            </a:extLst>
+          </p:cNvPr>
+          <p:cNvCxnSpPr>
+            <a:cxnSpLocks/>
+            <a:stCxn id="31" idx="1"/>
+            <a:endCxn id="39" idx="0"/>
+          </p:cNvCxnSpPr>
+          <p:nvPr/>
+        </p:nvCxnSpPr>
+        <p:spPr>
+          <a:xfrm>
+            <a:off x="8130685" y="1505887"/>
+            <a:ext cx="0" cy="313921"/>
+          </a:xfrm>
+          <a:prstGeom prst="straightConnector1">
+            <a:avLst/>
+          </a:prstGeom>
+          <a:ln w="57150">
+            <a:solidFill>
+              <a:schemeClr val="tx2"/>
+            </a:solidFill>
+            <a:headEnd type="none" w="med" len="med"/>
+            <a:tailEnd type="triangle"/>
+          </a:ln>
+        </p:spPr>
+        <p:style>
+          <a:lnRef idx="1">
+            <a:schemeClr val="accent1"/>
+          </a:lnRef>
+          <a:fillRef idx="0">
+            <a:schemeClr val="accent1"/>
+          </a:fillRef>
+          <a:effectRef idx="0">
+            <a:schemeClr val="accent1"/>
+          </a:effectRef>
+          <a:fontRef idx="minor">
+            <a:schemeClr val="tx1"/>
+          </a:fontRef>
+        </p:style>
+      </p:cxnSp>
+      <p:grpSp>
+        <p:nvGrpSpPr>
+          <p:cNvPr id="54" name="Group 53">
+            <a:extLst>
+              <a:ext uri="{FF2B5EF4-FFF2-40B4-BE49-F238E27FC236}">
+                <a16:creationId xmlns:a16="http://schemas.microsoft.com/office/drawing/2014/main" id="{A93DF1A8-4868-459A-AF50-9326D5A976E1}"/>
+              </a:ext>
+            </a:extLst>
+          </p:cNvPr>
+          <p:cNvGrpSpPr/>
+          <p:nvPr/>
+        </p:nvGrpSpPr>
+        <p:grpSpPr>
+          <a:xfrm>
+            <a:off x="3017896" y="1819808"/>
+            <a:ext cx="6052008" cy="821276"/>
+            <a:chOff x="3017896" y="1876370"/>
+            <a:chExt cx="6052008" cy="821276"/>
+          </a:xfrm>
+        </p:grpSpPr>
+        <p:sp>
+          <p:nvSpPr>
+            <p:cNvPr id="25" name="Rectangle 24">
+              <a:extLst>
+                <a:ext uri="{FF2B5EF4-FFF2-40B4-BE49-F238E27FC236}">
+                  <a16:creationId xmlns:a16="http://schemas.microsoft.com/office/drawing/2014/main" id="{10B7A041-D1B3-4694-9454-55B5F757C84F}"/>
+                </a:ext>
+              </a:extLst>
+            </p:cNvPr>
+            <p:cNvSpPr/>
+            <p:nvPr/>
+          </p:nvSpPr>
+          <p:spPr bwMode="gray">
+            <a:xfrm>
+              <a:off x="3017896" y="2084088"/>
+              <a:ext cx="6052008" cy="613558"/>
+            </a:xfrm>
+            <a:prstGeom prst="rect">
+              <a:avLst/>
+            </a:prstGeom>
+            <a:solidFill>
+              <a:srgbClr val="0070C0"/>
+            </a:solidFill>
+            <a:ln w="6350" algn="ctr">
+              <a:noFill/>
+              <a:miter lim="800000"/>
+              <a:headEnd/>
+              <a:tailEnd/>
+            </a:ln>
+          </p:spPr>
+          <p:txBody>
+            <a:bodyPr lIns="90000" tIns="72000" rIns="90000" bIns="72000" rtlCol="0" anchor="ctr"/>
+            <a:lstStyle/>
+            <a:p>
+              <a:pPr marR="0" algn="ctr" defTabSz="914400" eaLnBrk="1" fontAlgn="base" latinLnBrk="0" hangingPunct="1">
+                <a:lnSpc>
+                  <a:spcPct val="100000"/>
+                </a:lnSpc>
+                <a:spcBef>
+                  <a:spcPct val="50000"/>
+                </a:spcBef>
+                <a:spcAft>
+                  <a:spcPct val="0"/>
+                </a:spcAft>
+                <a:buClr>
+                  <a:srgbClr val="F0AB00"/>
+                </a:buClr>
+                <a:buSzPct val="80000"/>
+                <a:tabLst/>
+              </a:pPr>
+              <a:r>
+                <a:rPr kumimoji="0" lang="en-US" sz="1800" b="0" i="0" u="none" strike="noStrike" kern="0" cap="none" spc="0" normalizeH="0" baseline="0" noProof="0" dirty="0">
+                  <a:ln>
+                    <a:noFill/>
+                  </a:ln>
+                  <a:effectLst/>
+                  <a:uLnTx/>
+                  <a:uFillTx/>
+                  <a:ea typeface="Arial Unicode MS" pitchFamily="34" charset="-128"/>
+                  <a:cs typeface="Arial Unicode MS" pitchFamily="34" charset="-128"/>
+                </a:rPr>
+                <a:t>LoadBalancer</a:t>
+              </a:r>
+            </a:p>
+          </p:txBody>
+        </p:sp>
+        <p:sp>
+          <p:nvSpPr>
+            <p:cNvPr id="39" name="Rectangle 38">
+              <a:extLst>
+                <a:ext uri="{FF2B5EF4-FFF2-40B4-BE49-F238E27FC236}">
+                  <a16:creationId xmlns:a16="http://schemas.microsoft.com/office/drawing/2014/main" id="{D644CA9C-6739-4EBF-8649-AE590DFF8E16}"/>
+                </a:ext>
+              </a:extLst>
+            </p:cNvPr>
+            <p:cNvSpPr/>
+            <p:nvPr/>
+          </p:nvSpPr>
+          <p:spPr bwMode="gray">
+            <a:xfrm>
+              <a:off x="7593857" y="1876370"/>
+              <a:ext cx="1073656" cy="369931"/>
+            </a:xfrm>
+            <a:prstGeom prst="rect">
+              <a:avLst/>
+            </a:prstGeom>
+            <a:ln>
+              <a:headEnd/>
+              <a:tailEnd/>
+            </a:ln>
+          </p:spPr>
+          <p:style>
+            <a:lnRef idx="2">
+              <a:schemeClr val="accent2"/>
+            </a:lnRef>
+            <a:fillRef idx="1">
+              <a:schemeClr val="lt1"/>
+            </a:fillRef>
+            <a:effectRef idx="0">
+              <a:schemeClr val="accent2"/>
+            </a:effectRef>
+            <a:fontRef idx="minor">
+              <a:schemeClr val="dk1"/>
+            </a:fontRef>
+          </p:style>
+          <p:txBody>
+            <a:bodyPr lIns="90000" tIns="72000" rIns="90000" bIns="72000" rtlCol="0" anchor="ctr"/>
+            <a:lstStyle/>
+            <a:p>
+              <a:pPr marR="0" algn="ctr" defTabSz="914400" eaLnBrk="1" fontAlgn="base" latinLnBrk="0" hangingPunct="1">
+                <a:lnSpc>
+                  <a:spcPct val="100000"/>
+                </a:lnSpc>
+                <a:spcBef>
+                  <a:spcPct val="50000"/>
+                </a:spcBef>
+                <a:spcAft>
+                  <a:spcPct val="0"/>
+                </a:spcAft>
+                <a:buClr>
+                  <a:srgbClr val="F0AB00"/>
+                </a:buClr>
+                <a:buSzPct val="80000"/>
+                <a:tabLst/>
+              </a:pPr>
+              <a:r>
+                <a:rPr lang="de-DE" sz="1800" kern="0" dirty="0">
+                  <a:ea typeface="Arial Unicode MS" pitchFamily="34" charset="-128"/>
+                  <a:cs typeface="Arial Unicode MS" pitchFamily="34" charset="-128"/>
+                </a:rPr>
+                <a:t>Port: 80</a:t>
+              </a:r>
+              <a:endParaRPr kumimoji="0" lang="de-DE" sz="1800" b="0" i="0" u="none" strike="noStrike" kern="0" cap="none" spc="0" normalizeH="0" baseline="0" noProof="0" dirty="0">
+                <a:ln>
+                  <a:noFill/>
+                </a:ln>
+                <a:effectLst/>
+                <a:uLnTx/>
+                <a:uFillTx/>
+                <a:ea typeface="Arial Unicode MS" pitchFamily="34" charset="-128"/>
+                <a:cs typeface="Arial Unicode MS" pitchFamily="34" charset="-128"/>
+              </a:endParaRPr>
+            </a:p>
+          </p:txBody>
+        </p:sp>
+        <p:sp>
+          <p:nvSpPr>
+            <p:cNvPr id="45" name="Rectangle 44">
+              <a:extLst>
+                <a:ext uri="{FF2B5EF4-FFF2-40B4-BE49-F238E27FC236}">
+                  <a16:creationId xmlns:a16="http://schemas.microsoft.com/office/drawing/2014/main" id="{54F544F5-461B-4475-AC4A-B14AC1B5D1B3}"/>
+                </a:ext>
+              </a:extLst>
+            </p:cNvPr>
+            <p:cNvSpPr/>
+            <p:nvPr/>
+          </p:nvSpPr>
+          <p:spPr bwMode="gray">
+            <a:xfrm>
+              <a:off x="3184074" y="1880541"/>
+              <a:ext cx="1794651" cy="365760"/>
+            </a:xfrm>
+            <a:prstGeom prst="rect">
+              <a:avLst/>
+            </a:prstGeom>
+            <a:ln>
+              <a:headEnd/>
+              <a:tailEnd/>
+            </a:ln>
+          </p:spPr>
+          <p:style>
+            <a:lnRef idx="2">
+              <a:schemeClr val="accent2"/>
+            </a:lnRef>
+            <a:fillRef idx="1">
+              <a:schemeClr val="lt1"/>
+            </a:fillRef>
+            <a:effectRef idx="0">
+              <a:schemeClr val="accent2"/>
+            </a:effectRef>
+            <a:fontRef idx="minor">
+              <a:schemeClr val="dk1"/>
+            </a:fontRef>
+          </p:style>
+          <p:txBody>
+            <a:bodyPr lIns="90000" tIns="72000" rIns="90000" bIns="72000" rtlCol="0" anchor="ctr"/>
+            <a:lstStyle/>
+            <a:p>
+              <a:pPr marR="0" algn="ctr" defTabSz="914400" eaLnBrk="1" fontAlgn="base" latinLnBrk="0" hangingPunct="1">
+                <a:lnSpc>
+                  <a:spcPct val="100000"/>
+                </a:lnSpc>
+                <a:spcBef>
+                  <a:spcPct val="50000"/>
+                </a:spcBef>
+                <a:spcAft>
+                  <a:spcPct val="0"/>
+                </a:spcAft>
+                <a:buClr>
+                  <a:srgbClr val="F0AB00"/>
+                </a:buClr>
+                <a:buSzPct val="80000"/>
+                <a:tabLst/>
+              </a:pPr>
+              <a:r>
+                <a:rPr kumimoji="0" lang="de-DE" sz="1800" b="0" i="0" u="none" strike="noStrike" kern="0" cap="none" spc="0" normalizeH="0" baseline="0" noProof="0" dirty="0">
+                  <a:ln>
+                    <a:noFill/>
+                  </a:ln>
+                  <a:effectLst/>
+                  <a:uLnTx/>
+                  <a:uFillTx/>
+                  <a:ea typeface="Arial Unicode MS" pitchFamily="34" charset="-128"/>
+                  <a:cs typeface="Arial Unicode MS" pitchFamily="34" charset="-128"/>
+                </a:rPr>
+                <a:t>IP: 35.65.257.1</a:t>
+              </a:r>
+            </a:p>
+          </p:txBody>
+        </p:sp>
+      </p:grpSp>
+      <p:sp>
+        <p:nvSpPr>
+          <p:cNvPr id="46" name="Rectangle: Single Corner Snipped 45">
+            <a:extLst>
+              <a:ext uri="{FF2B5EF4-FFF2-40B4-BE49-F238E27FC236}">
+                <a16:creationId xmlns:a16="http://schemas.microsoft.com/office/drawing/2014/main" id="{5E9FCBC4-82E3-4A8A-AD31-E51BA1D4CAB8}"/>
+              </a:ext>
+            </a:extLst>
+          </p:cNvPr>
+          <p:cNvSpPr/>
+          <p:nvPr/>
+        </p:nvSpPr>
+        <p:spPr bwMode="gray">
+          <a:xfrm>
+            <a:off x="4792661" y="3079127"/>
+            <a:ext cx="2474332" cy="1775677"/>
+          </a:xfrm>
+          <a:prstGeom prst="snip1Rect">
+            <a:avLst/>
+          </a:prstGeom>
+          <a:ln w="38100" cmpd="sng">
+            <a:headEnd/>
+            <a:tailEnd/>
+          </a:ln>
+          <a:effectLst>
+            <a:outerShdw blurRad="50800" dist="38100" dir="2700000" algn="tl" rotWithShape="0">
+              <a:prstClr val="black">
+                <a:alpha val="40000"/>
+              </a:prstClr>
+            </a:outerShdw>
+          </a:effectLst>
+        </p:spPr>
+        <p:style>
+          <a:lnRef idx="3">
+            <a:schemeClr val="lt1"/>
+          </a:lnRef>
+          <a:fillRef idx="1">
+            <a:schemeClr val="accent2"/>
+          </a:fillRef>
+          <a:effectRef idx="1">
+            <a:schemeClr val="accent2"/>
+          </a:effectRef>
+          <a:fontRef idx="minor">
+            <a:schemeClr val="lt1"/>
+          </a:fontRef>
+        </p:style>
+        <p:txBody>
+          <a:bodyPr wrap="none" lIns="90000" tIns="0" rIns="90000" bIns="0" rtlCol="0" anchor="t"/>
+          <a:lstStyle/>
+          <a:p>
+            <a:pPr marR="0" algn="ctr" defTabSz="914400" eaLnBrk="1" fontAlgn="base" latinLnBrk="0" hangingPunct="1">
+              <a:lnSpc>
+                <a:spcPct val="100000"/>
+              </a:lnSpc>
+              <a:spcAft>
+                <a:spcPts val="600"/>
+              </a:spcAft>
+              <a:buClr>
+                <a:srgbClr val="F0AB00"/>
+              </a:buClr>
+              <a:buSzPct val="80000"/>
+              <a:tabLst/>
+            </a:pPr>
+            <a:r>
+              <a:rPr kumimoji="0" lang="en-US" sz="1600" b="1" i="0" u="none" strike="noStrike" kern="0" cap="none" spc="0" normalizeH="0" baseline="0" noProof="0" dirty="0">
+                <a:ln>
+                  <a:noFill/>
+                </a:ln>
+                <a:effectLst/>
+                <a:uLnTx/>
+                <a:uFillTx/>
+                <a:ea typeface="Arial Unicode MS" pitchFamily="34" charset="-128"/>
+                <a:cs typeface="Arial Unicode MS" pitchFamily="34" charset="-128"/>
+              </a:rPr>
+              <a:t>Service</a:t>
+            </a:r>
+          </a:p>
+          <a:p>
+            <a:pPr marL="285750" marR="0" indent="-285750" defTabSz="914400" eaLnBrk="1" fontAlgn="base" latinLnBrk="0" hangingPunct="1">
+              <a:lnSpc>
+                <a:spcPct val="100000"/>
+              </a:lnSpc>
+              <a:spcBef>
+                <a:spcPts val="600"/>
+              </a:spcBef>
+              <a:spcAft>
+                <a:spcPct val="0"/>
+              </a:spcAft>
+              <a:buClr>
+                <a:srgbClr val="F0AB00"/>
+              </a:buClr>
+              <a:buSzPct val="80000"/>
+              <a:buFont typeface="Arial" panose="020B0604020202020204" pitchFamily="34" charset="0"/>
+              <a:buChar char="•"/>
+              <a:tabLst/>
+            </a:pPr>
+            <a:r>
+              <a:rPr lang="en-US" sz="1600" kern="0" dirty="0">
+                <a:ea typeface="Arial Unicode MS" pitchFamily="34" charset="-128"/>
+                <a:cs typeface="Arial Unicode MS" pitchFamily="34" charset="-128"/>
+              </a:rPr>
+              <a:t>Label: app=nginx</a:t>
+            </a:r>
+            <a:endParaRPr kumimoji="0" lang="en-US" sz="1600" b="0" i="0" u="none" strike="noStrike" kern="0" cap="none" spc="0" normalizeH="0" baseline="0" noProof="0" dirty="0">
+              <a:ln>
+                <a:noFill/>
+              </a:ln>
+              <a:effectLst/>
+              <a:uLnTx/>
+              <a:uFillTx/>
+              <a:ea typeface="Arial Unicode MS" pitchFamily="34" charset="-128"/>
+              <a:cs typeface="Arial Unicode MS" pitchFamily="34" charset="-128"/>
+            </a:endParaRPr>
+          </a:p>
+          <a:p>
+            <a:pPr marL="285750" marR="0" indent="-285750" defTabSz="914400" eaLnBrk="1" fontAlgn="base" latinLnBrk="0" hangingPunct="1">
+              <a:lnSpc>
+                <a:spcPct val="100000"/>
+              </a:lnSpc>
+              <a:spcBef>
+                <a:spcPts val="600"/>
+              </a:spcBef>
+              <a:spcAft>
+                <a:spcPct val="0"/>
+              </a:spcAft>
+              <a:buClr>
+                <a:srgbClr val="F0AB00"/>
+              </a:buClr>
+              <a:buSzPct val="80000"/>
+              <a:buFont typeface="Arial" panose="020B0604020202020204" pitchFamily="34" charset="0"/>
+              <a:buChar char="•"/>
+              <a:tabLst/>
+            </a:pPr>
+            <a:r>
+              <a:rPr lang="en-US" sz="1600" kern="0" dirty="0">
+                <a:ea typeface="Arial Unicode MS" pitchFamily="34" charset="-128"/>
+                <a:cs typeface="Arial Unicode MS" pitchFamily="34" charset="-128"/>
+              </a:rPr>
+              <a:t>Type: LoadBalancer</a:t>
+            </a:r>
+          </a:p>
+          <a:p>
+            <a:pPr marL="285750" marR="0" indent="-285750" defTabSz="914400" eaLnBrk="1" fontAlgn="base" latinLnBrk="0" hangingPunct="1">
+              <a:lnSpc>
+                <a:spcPct val="100000"/>
+              </a:lnSpc>
+              <a:spcBef>
+                <a:spcPts val="600"/>
+              </a:spcBef>
+              <a:spcAft>
+                <a:spcPct val="0"/>
+              </a:spcAft>
+              <a:buClr>
+                <a:srgbClr val="F0AB00"/>
+              </a:buClr>
+              <a:buSzPct val="80000"/>
+              <a:buFont typeface="Arial" panose="020B0604020202020204" pitchFamily="34" charset="0"/>
+              <a:buChar char="•"/>
+              <a:tabLst/>
+            </a:pPr>
+            <a:r>
+              <a:rPr lang="en-US" sz="1600" kern="0" dirty="0">
+                <a:ea typeface="Arial Unicode MS" pitchFamily="34" charset="-128"/>
+                <a:cs typeface="Arial Unicode MS" pitchFamily="34" charset="-128"/>
+              </a:rPr>
+              <a:t>TargetPort: 80</a:t>
+            </a:r>
+          </a:p>
+          <a:p>
+            <a:pPr marL="285750" marR="0" indent="-285750" defTabSz="914400" eaLnBrk="1" fontAlgn="base" latinLnBrk="0" hangingPunct="1">
+              <a:lnSpc>
+                <a:spcPct val="100000"/>
+              </a:lnSpc>
+              <a:spcBef>
+                <a:spcPts val="600"/>
+              </a:spcBef>
+              <a:spcAft>
+                <a:spcPct val="0"/>
+              </a:spcAft>
+              <a:buClr>
+                <a:srgbClr val="F0AB00"/>
+              </a:buClr>
+              <a:buSzPct val="80000"/>
+              <a:buFont typeface="Arial" panose="020B0604020202020204" pitchFamily="34" charset="0"/>
+              <a:buChar char="•"/>
+              <a:tabLst/>
+            </a:pPr>
+            <a:r>
+              <a:rPr kumimoji="0" lang="en-US" sz="1600" b="0" i="0" u="none" strike="noStrike" kern="0" cap="none" spc="0" normalizeH="0" baseline="0" noProof="0" dirty="0">
+                <a:ln>
+                  <a:noFill/>
+                </a:ln>
+                <a:effectLst/>
+                <a:uLnTx/>
+                <a:uFillTx/>
+                <a:ea typeface="Arial Unicode MS" pitchFamily="34" charset="-128"/>
+                <a:cs typeface="Arial Unicode MS" pitchFamily="34" charset="-128"/>
+              </a:rPr>
+              <a:t>Port: 80</a:t>
+            </a:r>
+          </a:p>
+        </p:txBody>
+      </p:sp>
+      <p:cxnSp>
+        <p:nvCxnSpPr>
+          <p:cNvPr id="33" name="Connector: Elbow 32"/>
+          <p:cNvCxnSpPr>
+            <a:cxnSpLocks/>
+            <a:stCxn id="22" idx="2"/>
+            <a:endCxn id="46" idx="2"/>
+          </p:cNvCxnSpPr>
+          <p:nvPr/>
+        </p:nvCxnSpPr>
+        <p:spPr>
+          <a:xfrm rot="16200000" flipH="1">
+            <a:off x="2942712" y="2117017"/>
+            <a:ext cx="310522" cy="3389376"/>
+          </a:xfrm>
+          <a:prstGeom prst="bentConnector2">
+            <a:avLst/>
+          </a:prstGeom>
+          <a:ln w="57150">
+            <a:solidFill>
+              <a:schemeClr val="tx2"/>
+            </a:solidFill>
+            <a:headEnd type="none" w="med" len="med"/>
+            <a:tailEnd type="triangle"/>
+          </a:ln>
+        </p:spPr>
+        <p:style>
+          <a:lnRef idx="1">
+            <a:schemeClr val="accent1"/>
+          </a:lnRef>
+          <a:fillRef idx="0">
+            <a:schemeClr val="accent1"/>
+          </a:fillRef>
+          <a:effectRef idx="0">
+            <a:schemeClr val="accent1"/>
+          </a:effectRef>
+          <a:fontRef idx="minor">
+            <a:schemeClr val="tx1"/>
+          </a:fontRef>
+        </p:style>
+      </p:cxnSp>
+      <p:cxnSp>
+        <p:nvCxnSpPr>
+          <p:cNvPr id="30" name="Connector: Elbow 29"/>
+          <p:cNvCxnSpPr>
+            <a:cxnSpLocks/>
+            <a:stCxn id="23" idx="2"/>
+            <a:endCxn id="46" idx="0"/>
+          </p:cNvCxnSpPr>
+          <p:nvPr/>
+        </p:nvCxnSpPr>
+        <p:spPr>
+          <a:xfrm rot="5400000">
+            <a:off x="8792393" y="2131045"/>
+            <a:ext cx="310522" cy="3361321"/>
+          </a:xfrm>
+          <a:prstGeom prst="bentConnector2">
+            <a:avLst/>
+          </a:prstGeom>
+          <a:ln w="57150">
+            <a:solidFill>
+              <a:schemeClr val="tx2"/>
+            </a:solidFill>
+            <a:headEnd type="none" w="med" len="med"/>
+            <a:tailEnd type="triangle"/>
+          </a:ln>
+        </p:spPr>
+        <p:style>
+          <a:lnRef idx="1">
+            <a:schemeClr val="accent1"/>
+          </a:lnRef>
+          <a:fillRef idx="0">
+            <a:schemeClr val="accent1"/>
+          </a:fillRef>
+          <a:effectRef idx="0">
+            <a:schemeClr val="accent1"/>
+          </a:effectRef>
+          <a:fontRef idx="minor">
+            <a:schemeClr val="tx1"/>
+          </a:fontRef>
+        </p:style>
+      </p:cxnSp>
+      <p:sp>
+        <p:nvSpPr>
+          <p:cNvPr id="53" name="Rectangle 52">
+            <a:extLst>
+              <a:ext uri="{FF2B5EF4-FFF2-40B4-BE49-F238E27FC236}">
+                <a16:creationId xmlns:a16="http://schemas.microsoft.com/office/drawing/2014/main" id="{504562E7-00A7-4A86-943E-8EBA6759839C}"/>
+              </a:ext>
+            </a:extLst>
+          </p:cNvPr>
+          <p:cNvSpPr/>
+          <p:nvPr/>
+        </p:nvSpPr>
+        <p:spPr bwMode="gray">
+          <a:xfrm>
+            <a:off x="5197190" y="2922326"/>
+            <a:ext cx="1665273" cy="289387"/>
+          </a:xfrm>
+          <a:prstGeom prst="rect">
+            <a:avLst/>
+          </a:prstGeom>
+          <a:ln>
+            <a:headEnd/>
+            <a:tailEnd/>
+          </a:ln>
+        </p:spPr>
+        <p:style>
+          <a:lnRef idx="2">
+            <a:schemeClr val="accent2"/>
+          </a:lnRef>
+          <a:fillRef idx="1">
+            <a:schemeClr val="lt1"/>
+          </a:fillRef>
+          <a:effectRef idx="0">
+            <a:schemeClr val="accent2"/>
+          </a:effectRef>
+          <a:fontRef idx="minor">
+            <a:schemeClr val="dk1"/>
+          </a:fontRef>
+        </p:style>
+        <p:txBody>
+          <a:bodyPr lIns="90000" tIns="72000" rIns="90000" bIns="72000" rtlCol="0" anchor="ctr"/>
+          <a:lstStyle/>
+          <a:p>
+            <a:pPr marR="0" algn="ctr" defTabSz="914400" eaLnBrk="1" fontAlgn="base" latinLnBrk="0" hangingPunct="1">
+              <a:lnSpc>
+                <a:spcPct val="100000"/>
+              </a:lnSpc>
+              <a:spcBef>
+                <a:spcPct val="50000"/>
+              </a:spcBef>
+              <a:spcAft>
+                <a:spcPct val="0"/>
+              </a:spcAft>
+              <a:buClr>
+                <a:srgbClr val="F0AB00"/>
+              </a:buClr>
+              <a:buSzPct val="80000"/>
+              <a:tabLst/>
+            </a:pPr>
+            <a:r>
+              <a:rPr kumimoji="0" lang="de-DE" sz="1600" b="0" i="0" u="none" strike="noStrike" kern="0" cap="none" spc="0" normalizeH="0" baseline="0" noProof="0" dirty="0">
+                <a:ln>
+                  <a:noFill/>
+                </a:ln>
+                <a:effectLst/>
+                <a:uLnTx/>
+                <a:uFillTx/>
+                <a:ea typeface="Arial Unicode MS" pitchFamily="34" charset="-128"/>
+                <a:cs typeface="Arial Unicode MS" pitchFamily="34" charset="-128"/>
+              </a:rPr>
+              <a:t>IP: 10.10.10.4</a:t>
+            </a:r>
+          </a:p>
+        </p:txBody>
+      </p:sp>
     </p:spTree>
     <p:extLst>
       <p:ext uri="{BB962C8B-B14F-4D97-AF65-F5344CB8AC3E}">
-        <p14:creationId xmlns:p14="http://schemas.microsoft.com/office/powerpoint/2010/main" val="2098045799"/>
+        <p14:creationId xmlns:p14="http://schemas.microsoft.com/office/powerpoint/2010/main" val="13675535"/>
       </p:ext>
     </p:extLst>
   </p:cSld>
@@ -10504,7 +12511,1675 @@
 </p:sld>
 </file>
 
-<file path=ppt/slides/slide11.xml><?xml version="1.0" encoding="utf-8"?>
+<file path=ppt/slides/slide12.xml><?xml version="1.0" encoding="utf-8"?>
+<p:sld xmlns:a="http://schemas.openxmlformats.org/drawingml/2006/main" xmlns:r="http://schemas.openxmlformats.org/officeDocument/2006/relationships" xmlns:p="http://schemas.openxmlformats.org/presentationml/2006/main">
+  <p:cSld>
+    <p:spTree>
+      <p:nvGrpSpPr>
+        <p:cNvPr id="1" name=""/>
+        <p:cNvGrpSpPr/>
+        <p:nvPr/>
+      </p:nvGrpSpPr>
+      <p:grpSpPr>
+        <a:xfrm>
+          <a:off x="0" y="0"/>
+          <a:ext cx="0" cy="0"/>
+          <a:chOff x="0" y="0"/>
+          <a:chExt cx="0" cy="0"/>
+        </a:xfrm>
+      </p:grpSpPr>
+      <p:sp>
+        <p:nvSpPr>
+          <p:cNvPr id="21" name="Rectangle 20"/>
+          <p:cNvSpPr/>
+          <p:nvPr/>
+        </p:nvSpPr>
+        <p:spPr bwMode="gray">
+          <a:xfrm>
+            <a:off x="6141720" y="3390899"/>
+            <a:ext cx="4960620" cy="2865121"/>
+          </a:xfrm>
+          <a:prstGeom prst="rect">
+            <a:avLst/>
+          </a:prstGeom>
+          <a:ln>
+            <a:headEnd/>
+            <a:tailEnd/>
+          </a:ln>
+        </p:spPr>
+        <p:style>
+          <a:lnRef idx="2">
+            <a:schemeClr val="accent2"/>
+          </a:lnRef>
+          <a:fillRef idx="1">
+            <a:schemeClr val="lt1"/>
+          </a:fillRef>
+          <a:effectRef idx="0">
+            <a:schemeClr val="accent2"/>
+          </a:effectRef>
+          <a:fontRef idx="minor">
+            <a:schemeClr val="dk1"/>
+          </a:fontRef>
+        </p:style>
+        <p:txBody>
+          <a:bodyPr lIns="90000" tIns="72000" rIns="90000" bIns="72000" rtlCol="0" anchor="t"/>
+          <a:lstStyle/>
+          <a:p>
+            <a:pPr marR="0" algn="ctr" defTabSz="914400" eaLnBrk="1" fontAlgn="base" latinLnBrk="0" hangingPunct="1">
+              <a:lnSpc>
+                <a:spcPct val="100000"/>
+              </a:lnSpc>
+              <a:spcBef>
+                <a:spcPct val="50000"/>
+              </a:spcBef>
+              <a:spcAft>
+                <a:spcPct val="0"/>
+              </a:spcAft>
+              <a:buClr>
+                <a:srgbClr val="F0AB00"/>
+              </a:buClr>
+              <a:buSzPct val="80000"/>
+              <a:tabLst/>
+            </a:pPr>
+            <a:r>
+              <a:rPr kumimoji="0" lang="en-US" sz="1800" b="1" i="0" u="none" strike="noStrike" kern="0" cap="none" spc="0" normalizeH="0" baseline="0" noProof="0" dirty="0">
+                <a:ln>
+                  <a:noFill/>
+                </a:ln>
+                <a:effectLst/>
+                <a:uLnTx/>
+                <a:uFillTx/>
+                <a:ea typeface="Arial Unicode MS" pitchFamily="34" charset="-128"/>
+                <a:cs typeface="Arial Unicode MS" pitchFamily="34" charset="-128"/>
+              </a:rPr>
+              <a:t>Node B</a:t>
+            </a:r>
+          </a:p>
+        </p:txBody>
+      </p:sp>
+      <p:sp>
+        <p:nvSpPr>
+          <p:cNvPr id="2" name="Title 1"/>
+          <p:cNvSpPr>
+            <a:spLocks noGrp="1"/>
+          </p:cNvSpPr>
+          <p:nvPr>
+            <p:ph type="title"/>
+          </p:nvPr>
+        </p:nvSpPr>
+        <p:spPr/>
+        <p:txBody>
+          <a:bodyPr/>
+          <a:lstStyle/>
+          <a:p>
+            <a:r>
+              <a:rPr lang="en-US" dirty="0"/>
+              <a:t>So </a:t>
+            </a:r>
+            <a:r>
+              <a:rPr lang="en-US"/>
+              <a:t>many different ports</a:t>
+            </a:r>
+            <a:r>
+              <a:rPr lang="en-US" dirty="0"/>
+              <a:t>…</a:t>
+            </a:r>
+          </a:p>
+        </p:txBody>
+      </p:sp>
+      <p:sp>
+        <p:nvSpPr>
+          <p:cNvPr id="18" name="Rectangle 17"/>
+          <p:cNvSpPr/>
+          <p:nvPr/>
+        </p:nvSpPr>
+        <p:spPr bwMode="gray">
+          <a:xfrm>
+            <a:off x="8045976" y="4446544"/>
+            <a:ext cx="1815338" cy="1160859"/>
+          </a:xfrm>
+          <a:prstGeom prst="rect">
+            <a:avLst/>
+          </a:prstGeom>
+          <a:ln>
+            <a:headEnd/>
+            <a:tailEnd/>
+          </a:ln>
+        </p:spPr>
+        <p:style>
+          <a:lnRef idx="2">
+            <a:schemeClr val="accent2">
+              <a:shade val="50000"/>
+            </a:schemeClr>
+          </a:lnRef>
+          <a:fillRef idx="1">
+            <a:schemeClr val="accent2"/>
+          </a:fillRef>
+          <a:effectRef idx="0">
+            <a:schemeClr val="accent2"/>
+          </a:effectRef>
+          <a:fontRef idx="minor">
+            <a:schemeClr val="lt1"/>
+          </a:fontRef>
+        </p:style>
+        <p:txBody>
+          <a:bodyPr lIns="90000" tIns="72000" rIns="90000" bIns="72000" rtlCol="0" anchor="ctr"/>
+          <a:lstStyle/>
+          <a:p>
+            <a:pPr marR="0" algn="ctr" defTabSz="914400" eaLnBrk="1" fontAlgn="base" latinLnBrk="0" hangingPunct="1">
+              <a:lnSpc>
+                <a:spcPct val="100000"/>
+              </a:lnSpc>
+              <a:spcBef>
+                <a:spcPct val="50000"/>
+              </a:spcBef>
+              <a:spcAft>
+                <a:spcPct val="0"/>
+              </a:spcAft>
+              <a:buClr>
+                <a:srgbClr val="F0AB00"/>
+              </a:buClr>
+              <a:buSzPct val="80000"/>
+              <a:tabLst/>
+            </a:pPr>
+            <a:r>
+              <a:rPr lang="de-DE" sz="1600" b="1" kern="0" noProof="0" dirty="0" err="1">
+                <a:ea typeface="Arial Unicode MS" pitchFamily="34" charset="-128"/>
+                <a:cs typeface="Arial Unicode MS" pitchFamily="34" charset="-128"/>
+              </a:rPr>
+              <a:t>Pod</a:t>
+            </a:r>
+            <a:endParaRPr kumimoji="0" lang="de-DE" sz="1600" b="1" i="0" u="none" strike="noStrike" kern="0" cap="none" spc="0" normalizeH="0" baseline="0" noProof="0" dirty="0">
+              <a:ln>
+                <a:noFill/>
+              </a:ln>
+              <a:effectLst/>
+              <a:uLnTx/>
+              <a:uFillTx/>
+              <a:ea typeface="Arial Unicode MS" pitchFamily="34" charset="-128"/>
+              <a:cs typeface="Arial Unicode MS" pitchFamily="34" charset="-128"/>
+            </a:endParaRPr>
+          </a:p>
+        </p:txBody>
+      </p:sp>
+      <p:sp>
+        <p:nvSpPr>
+          <p:cNvPr id="20" name="Rectangle 19"/>
+          <p:cNvSpPr/>
+          <p:nvPr/>
+        </p:nvSpPr>
+        <p:spPr bwMode="gray">
+          <a:xfrm>
+            <a:off x="9575331" y="5386537"/>
+            <a:ext cx="1073656" cy="428584"/>
+          </a:xfrm>
+          <a:prstGeom prst="rect">
+            <a:avLst/>
+          </a:prstGeom>
+          <a:ln>
+            <a:headEnd/>
+            <a:tailEnd/>
+          </a:ln>
+        </p:spPr>
+        <p:style>
+          <a:lnRef idx="2">
+            <a:schemeClr val="accent2"/>
+          </a:lnRef>
+          <a:fillRef idx="1">
+            <a:schemeClr val="lt1"/>
+          </a:fillRef>
+          <a:effectRef idx="0">
+            <a:schemeClr val="accent2"/>
+          </a:effectRef>
+          <a:fontRef idx="minor">
+            <a:schemeClr val="dk1"/>
+          </a:fontRef>
+        </p:style>
+        <p:txBody>
+          <a:bodyPr lIns="90000" tIns="72000" rIns="90000" bIns="72000" rtlCol="0" anchor="ctr"/>
+          <a:lstStyle/>
+          <a:p>
+            <a:pPr marR="0" algn="ctr" defTabSz="914400" eaLnBrk="1" fontAlgn="base" latinLnBrk="0" hangingPunct="1">
+              <a:lnSpc>
+                <a:spcPct val="100000"/>
+              </a:lnSpc>
+              <a:spcBef>
+                <a:spcPct val="50000"/>
+              </a:spcBef>
+              <a:spcAft>
+                <a:spcPct val="0"/>
+              </a:spcAft>
+              <a:buClr>
+                <a:srgbClr val="F0AB00"/>
+              </a:buClr>
+              <a:buSzPct val="80000"/>
+              <a:tabLst/>
+            </a:pPr>
+            <a:r>
+              <a:rPr lang="de-DE" sz="1800" kern="0" dirty="0">
+                <a:ea typeface="Arial Unicode MS" pitchFamily="34" charset="-128"/>
+                <a:cs typeface="Arial Unicode MS" pitchFamily="34" charset="-128"/>
+              </a:rPr>
+              <a:t>Port: 80</a:t>
+            </a:r>
+            <a:endParaRPr kumimoji="0" lang="de-DE" sz="1800" b="0" i="0" u="none" strike="noStrike" kern="0" cap="none" spc="0" normalizeH="0" baseline="0" noProof="0" dirty="0">
+              <a:ln>
+                <a:noFill/>
+              </a:ln>
+              <a:effectLst/>
+              <a:uLnTx/>
+              <a:uFillTx/>
+              <a:ea typeface="Arial Unicode MS" pitchFamily="34" charset="-128"/>
+              <a:cs typeface="Arial Unicode MS" pitchFamily="34" charset="-128"/>
+            </a:endParaRPr>
+          </a:p>
+        </p:txBody>
+      </p:sp>
+      <p:sp>
+        <p:nvSpPr>
+          <p:cNvPr id="13" name="Rectangle 12"/>
+          <p:cNvSpPr/>
+          <p:nvPr/>
+        </p:nvSpPr>
+        <p:spPr bwMode="gray">
+          <a:xfrm>
+            <a:off x="8130685" y="4205839"/>
+            <a:ext cx="1645920" cy="365760"/>
+          </a:xfrm>
+          <a:prstGeom prst="rect">
+            <a:avLst/>
+          </a:prstGeom>
+          <a:ln>
+            <a:headEnd/>
+            <a:tailEnd/>
+          </a:ln>
+        </p:spPr>
+        <p:style>
+          <a:lnRef idx="2">
+            <a:schemeClr val="accent2"/>
+          </a:lnRef>
+          <a:fillRef idx="1">
+            <a:schemeClr val="lt1"/>
+          </a:fillRef>
+          <a:effectRef idx="0">
+            <a:schemeClr val="accent2"/>
+          </a:effectRef>
+          <a:fontRef idx="minor">
+            <a:schemeClr val="dk1"/>
+          </a:fontRef>
+        </p:style>
+        <p:txBody>
+          <a:bodyPr lIns="90000" tIns="72000" rIns="90000" bIns="72000" rtlCol="0" anchor="ctr"/>
+          <a:lstStyle/>
+          <a:p>
+            <a:pPr marR="0" algn="ctr" defTabSz="914400" eaLnBrk="1" fontAlgn="base" latinLnBrk="0" hangingPunct="1">
+              <a:lnSpc>
+                <a:spcPct val="100000"/>
+              </a:lnSpc>
+              <a:spcBef>
+                <a:spcPct val="50000"/>
+              </a:spcBef>
+              <a:spcAft>
+                <a:spcPct val="0"/>
+              </a:spcAft>
+              <a:buClr>
+                <a:srgbClr val="F0AB00"/>
+              </a:buClr>
+              <a:buSzPct val="80000"/>
+              <a:tabLst/>
+            </a:pPr>
+            <a:r>
+              <a:rPr kumimoji="0" lang="de-DE" sz="1800" b="0" i="0" u="none" strike="noStrike" kern="0" cap="none" spc="0" normalizeH="0" baseline="0" noProof="0" dirty="0">
+                <a:ln>
+                  <a:noFill/>
+                </a:ln>
+                <a:effectLst/>
+                <a:uLnTx/>
+                <a:uFillTx/>
+                <a:ea typeface="Arial Unicode MS" pitchFamily="34" charset="-128"/>
+                <a:cs typeface="Arial Unicode MS" pitchFamily="34" charset="-128"/>
+              </a:rPr>
+              <a:t>IP: 10.10.10.3</a:t>
+            </a:r>
+          </a:p>
+        </p:txBody>
+      </p:sp>
+      <p:sp>
+        <p:nvSpPr>
+          <p:cNvPr id="23" name="Rectangle 22"/>
+          <p:cNvSpPr/>
+          <p:nvPr/>
+        </p:nvSpPr>
+        <p:spPr bwMode="gray">
+          <a:xfrm>
+            <a:off x="9566150" y="3227860"/>
+            <a:ext cx="2124327" cy="428584"/>
+          </a:xfrm>
+          <a:prstGeom prst="rect">
+            <a:avLst/>
+          </a:prstGeom>
+          <a:ln>
+            <a:headEnd/>
+            <a:tailEnd/>
+          </a:ln>
+        </p:spPr>
+        <p:style>
+          <a:lnRef idx="2">
+            <a:schemeClr val="accent5"/>
+          </a:lnRef>
+          <a:fillRef idx="1">
+            <a:schemeClr val="lt1"/>
+          </a:fillRef>
+          <a:effectRef idx="0">
+            <a:schemeClr val="accent5"/>
+          </a:effectRef>
+          <a:fontRef idx="minor">
+            <a:schemeClr val="dk1"/>
+          </a:fontRef>
+        </p:style>
+        <p:txBody>
+          <a:bodyPr lIns="90000" tIns="72000" rIns="90000" bIns="72000" rtlCol="0" anchor="ctr"/>
+          <a:lstStyle/>
+          <a:p>
+            <a:pPr marR="0" algn="ctr" defTabSz="914400" eaLnBrk="1" fontAlgn="base" latinLnBrk="0" hangingPunct="1">
+              <a:lnSpc>
+                <a:spcPct val="100000"/>
+              </a:lnSpc>
+              <a:spcBef>
+                <a:spcPct val="50000"/>
+              </a:spcBef>
+              <a:spcAft>
+                <a:spcPct val="0"/>
+              </a:spcAft>
+              <a:buClr>
+                <a:srgbClr val="F0AB00"/>
+              </a:buClr>
+              <a:buSzPct val="80000"/>
+              <a:tabLst/>
+            </a:pPr>
+            <a:r>
+              <a:rPr lang="de-DE" sz="1800" kern="0" dirty="0">
+                <a:ea typeface="Arial Unicode MS" pitchFamily="34" charset="-128"/>
+                <a:cs typeface="Arial Unicode MS" pitchFamily="34" charset="-128"/>
+              </a:rPr>
+              <a:t>NodePort: 30021</a:t>
+            </a:r>
+            <a:endParaRPr kumimoji="0" lang="de-DE" sz="1800" b="0" i="0" u="none" strike="noStrike" kern="0" cap="none" spc="0" normalizeH="0" baseline="0" noProof="0" dirty="0">
+              <a:ln>
+                <a:noFill/>
+              </a:ln>
+              <a:effectLst/>
+              <a:uLnTx/>
+              <a:uFillTx/>
+              <a:ea typeface="Arial Unicode MS" pitchFamily="34" charset="-128"/>
+              <a:cs typeface="Arial Unicode MS" pitchFamily="34" charset="-128"/>
+            </a:endParaRPr>
+          </a:p>
+        </p:txBody>
+      </p:sp>
+      <p:cxnSp>
+        <p:nvCxnSpPr>
+          <p:cNvPr id="27" name="Connector: Elbow 26"/>
+          <p:cNvCxnSpPr>
+            <a:cxnSpLocks/>
+            <a:stCxn id="25" idx="3"/>
+            <a:endCxn id="23" idx="0"/>
+          </p:cNvCxnSpPr>
+          <p:nvPr/>
+        </p:nvCxnSpPr>
+        <p:spPr>
+          <a:xfrm>
+            <a:off x="9069903" y="2390867"/>
+            <a:ext cx="1558411" cy="836993"/>
+          </a:xfrm>
+          <a:prstGeom prst="bentConnector2">
+            <a:avLst/>
+          </a:prstGeom>
+          <a:ln w="57150">
+            <a:solidFill>
+              <a:schemeClr val="tx2"/>
+            </a:solidFill>
+            <a:headEnd type="none" w="med" len="med"/>
+            <a:tailEnd type="triangle"/>
+          </a:ln>
+        </p:spPr>
+        <p:style>
+          <a:lnRef idx="1">
+            <a:schemeClr val="accent1"/>
+          </a:lnRef>
+          <a:fillRef idx="0">
+            <a:schemeClr val="accent1"/>
+          </a:fillRef>
+          <a:effectRef idx="0">
+            <a:schemeClr val="accent1"/>
+          </a:effectRef>
+          <a:fontRef idx="minor">
+            <a:schemeClr val="tx1"/>
+          </a:fontRef>
+        </p:style>
+      </p:cxnSp>
+      <p:cxnSp>
+        <p:nvCxnSpPr>
+          <p:cNvPr id="30" name="Connector: Elbow 29"/>
+          <p:cNvCxnSpPr>
+            <a:cxnSpLocks/>
+            <a:stCxn id="23" idx="2"/>
+            <a:endCxn id="57" idx="0"/>
+          </p:cNvCxnSpPr>
+          <p:nvPr/>
+        </p:nvCxnSpPr>
+        <p:spPr>
+          <a:xfrm rot="5400000">
+            <a:off x="8792393" y="2131045"/>
+            <a:ext cx="310522" cy="3361321"/>
+          </a:xfrm>
+          <a:prstGeom prst="bentConnector2">
+            <a:avLst/>
+          </a:prstGeom>
+          <a:ln w="57150">
+            <a:solidFill>
+              <a:schemeClr val="tx2"/>
+            </a:solidFill>
+            <a:headEnd type="none" w="med" len="med"/>
+            <a:tailEnd type="triangle"/>
+          </a:ln>
+        </p:spPr>
+        <p:style>
+          <a:lnRef idx="1">
+            <a:schemeClr val="accent1"/>
+          </a:lnRef>
+          <a:fillRef idx="0">
+            <a:schemeClr val="accent1"/>
+          </a:fillRef>
+          <a:effectRef idx="0">
+            <a:schemeClr val="accent1"/>
+          </a:effectRef>
+          <a:fontRef idx="minor">
+            <a:schemeClr val="tx1"/>
+          </a:fontRef>
+        </p:style>
+      </p:cxnSp>
+      <p:cxnSp>
+        <p:nvCxnSpPr>
+          <p:cNvPr id="36" name="Connector: Elbow 35"/>
+          <p:cNvCxnSpPr>
+            <a:cxnSpLocks/>
+            <a:stCxn id="57" idx="1"/>
+            <a:endCxn id="15" idx="2"/>
+          </p:cNvCxnSpPr>
+          <p:nvPr/>
+        </p:nvCxnSpPr>
+        <p:spPr>
+          <a:xfrm rot="16200000" flipH="1">
+            <a:off x="6478895" y="4432863"/>
+            <a:ext cx="957690" cy="1801572"/>
+          </a:xfrm>
+          <a:prstGeom prst="bentConnector3">
+            <a:avLst>
+              <a:gd name="adj1" fmla="val 123870"/>
+            </a:avLst>
+          </a:prstGeom>
+          <a:ln w="57150">
+            <a:solidFill>
+              <a:schemeClr val="tx2"/>
+            </a:solidFill>
+            <a:headEnd type="none" w="med" len="med"/>
+            <a:tailEnd type="triangle"/>
+          </a:ln>
+        </p:spPr>
+        <p:style>
+          <a:lnRef idx="1">
+            <a:schemeClr val="accent1"/>
+          </a:lnRef>
+          <a:fillRef idx="0">
+            <a:schemeClr val="accent1"/>
+          </a:fillRef>
+          <a:effectRef idx="0">
+            <a:schemeClr val="accent1"/>
+          </a:effectRef>
+          <a:fontRef idx="minor">
+            <a:schemeClr val="tx1"/>
+          </a:fontRef>
+        </p:style>
+      </p:cxnSp>
+      <p:sp>
+        <p:nvSpPr>
+          <p:cNvPr id="25" name="Rectangle 24">
+            <a:extLst>
+              <a:ext uri="{FF2B5EF4-FFF2-40B4-BE49-F238E27FC236}">
+                <a16:creationId xmlns:a16="http://schemas.microsoft.com/office/drawing/2014/main" id="{10B7A041-D1B3-4694-9454-55B5F757C84F}"/>
+              </a:ext>
+            </a:extLst>
+          </p:cNvPr>
+          <p:cNvSpPr/>
+          <p:nvPr/>
+        </p:nvSpPr>
+        <p:spPr bwMode="gray">
+          <a:xfrm>
+            <a:off x="4806732" y="2084088"/>
+            <a:ext cx="4263171" cy="613558"/>
+          </a:xfrm>
+          <a:prstGeom prst="rect">
+            <a:avLst/>
+          </a:prstGeom>
+          <a:solidFill>
+            <a:srgbClr val="0070C0"/>
+          </a:solidFill>
+          <a:ln w="6350" algn="ctr">
+            <a:noFill/>
+            <a:miter lim="800000"/>
+            <a:headEnd/>
+            <a:tailEnd/>
+          </a:ln>
+        </p:spPr>
+        <p:txBody>
+          <a:bodyPr lIns="90000" tIns="72000" rIns="90000" bIns="72000" rtlCol="0" anchor="ctr"/>
+          <a:lstStyle/>
+          <a:p>
+            <a:pPr marR="0" algn="ctr" defTabSz="914400" eaLnBrk="1" fontAlgn="base" latinLnBrk="0" hangingPunct="1">
+              <a:lnSpc>
+                <a:spcPct val="100000"/>
+              </a:lnSpc>
+              <a:spcBef>
+                <a:spcPct val="50000"/>
+              </a:spcBef>
+              <a:spcAft>
+                <a:spcPct val="0"/>
+              </a:spcAft>
+              <a:buClr>
+                <a:srgbClr val="F0AB00"/>
+              </a:buClr>
+              <a:buSzPct val="80000"/>
+              <a:tabLst/>
+            </a:pPr>
+            <a:r>
+              <a:rPr kumimoji="0" lang="en-US" sz="1800" b="0" i="0" u="none" strike="noStrike" kern="0" cap="none" spc="0" normalizeH="0" baseline="0" noProof="0" dirty="0">
+                <a:ln>
+                  <a:noFill/>
+                </a:ln>
+                <a:effectLst/>
+                <a:uLnTx/>
+                <a:uFillTx/>
+                <a:ea typeface="Arial Unicode MS" pitchFamily="34" charset="-128"/>
+                <a:cs typeface="Arial Unicode MS" pitchFamily="34" charset="-128"/>
+              </a:rPr>
+              <a:t>LoadBalancer</a:t>
+            </a:r>
+          </a:p>
+        </p:txBody>
+      </p:sp>
+      <p:sp>
+        <p:nvSpPr>
+          <p:cNvPr id="31" name="Cloud 30">
+            <a:extLst>
+              <a:ext uri="{FF2B5EF4-FFF2-40B4-BE49-F238E27FC236}">
+                <a16:creationId xmlns:a16="http://schemas.microsoft.com/office/drawing/2014/main" id="{650B88C5-9391-410D-AD5A-D43BDA2A1C53}"/>
+              </a:ext>
+            </a:extLst>
+          </p:cNvPr>
+          <p:cNvSpPr/>
+          <p:nvPr/>
+        </p:nvSpPr>
+        <p:spPr bwMode="gray">
+          <a:xfrm>
+            <a:off x="6382267" y="432611"/>
+            <a:ext cx="3496836" cy="1074420"/>
+          </a:xfrm>
+          <a:prstGeom prst="cloud">
+            <a:avLst/>
+          </a:prstGeom>
+          <a:solidFill>
+            <a:schemeClr val="accent1"/>
+          </a:solidFill>
+          <a:ln w="6350" algn="ctr">
+            <a:noFill/>
+            <a:miter lim="800000"/>
+            <a:headEnd/>
+            <a:tailEnd/>
+          </a:ln>
+        </p:spPr>
+        <p:txBody>
+          <a:bodyPr lIns="90000" tIns="72000" rIns="90000" bIns="72000" rtlCol="0" anchor="ctr"/>
+          <a:lstStyle/>
+          <a:p>
+            <a:pPr marR="0" algn="ctr" defTabSz="914400" eaLnBrk="1" fontAlgn="base" latinLnBrk="0" hangingPunct="1">
+              <a:lnSpc>
+                <a:spcPct val="100000"/>
+              </a:lnSpc>
+              <a:spcBef>
+                <a:spcPct val="50000"/>
+              </a:spcBef>
+              <a:spcAft>
+                <a:spcPct val="0"/>
+              </a:spcAft>
+              <a:buClr>
+                <a:srgbClr val="F0AB00"/>
+              </a:buClr>
+              <a:buSzPct val="80000"/>
+              <a:tabLst/>
+            </a:pPr>
+            <a:r>
+              <a:rPr lang="en-US" sz="1800" kern="0" dirty="0">
+                <a:ea typeface="Arial Unicode MS" pitchFamily="34" charset="-128"/>
+                <a:cs typeface="Arial Unicode MS" pitchFamily="34" charset="-128"/>
+              </a:rPr>
+              <a:t>GET: nginx:80</a:t>
+            </a:r>
+            <a:endParaRPr kumimoji="0" lang="en-US" sz="1800" b="0" i="0" u="none" strike="noStrike" kern="0" cap="none" spc="0" normalizeH="0" baseline="0" noProof="0" dirty="0" err="1">
+              <a:ln>
+                <a:noFill/>
+              </a:ln>
+              <a:effectLst/>
+              <a:uLnTx/>
+              <a:uFillTx/>
+              <a:ea typeface="Arial Unicode MS" pitchFamily="34" charset="-128"/>
+              <a:cs typeface="Arial Unicode MS" pitchFamily="34" charset="-128"/>
+            </a:endParaRPr>
+          </a:p>
+        </p:txBody>
+      </p:sp>
+      <p:sp>
+        <p:nvSpPr>
+          <p:cNvPr id="39" name="Rectangle 38">
+            <a:extLst>
+              <a:ext uri="{FF2B5EF4-FFF2-40B4-BE49-F238E27FC236}">
+                <a16:creationId xmlns:a16="http://schemas.microsoft.com/office/drawing/2014/main" id="{D644CA9C-6739-4EBF-8649-AE590DFF8E16}"/>
+              </a:ext>
+            </a:extLst>
+          </p:cNvPr>
+          <p:cNvSpPr/>
+          <p:nvPr/>
+        </p:nvSpPr>
+        <p:spPr bwMode="gray">
+          <a:xfrm>
+            <a:off x="7593857" y="1852866"/>
+            <a:ext cx="1073656" cy="428584"/>
+          </a:xfrm>
+          <a:prstGeom prst="rect">
+            <a:avLst/>
+          </a:prstGeom>
+          <a:ln>
+            <a:headEnd/>
+            <a:tailEnd/>
+          </a:ln>
+        </p:spPr>
+        <p:style>
+          <a:lnRef idx="2">
+            <a:schemeClr val="accent2"/>
+          </a:lnRef>
+          <a:fillRef idx="1">
+            <a:schemeClr val="lt1"/>
+          </a:fillRef>
+          <a:effectRef idx="0">
+            <a:schemeClr val="accent2"/>
+          </a:effectRef>
+          <a:fontRef idx="minor">
+            <a:schemeClr val="dk1"/>
+          </a:fontRef>
+        </p:style>
+        <p:txBody>
+          <a:bodyPr lIns="90000" tIns="72000" rIns="90000" bIns="72000" rtlCol="0" anchor="ctr"/>
+          <a:lstStyle/>
+          <a:p>
+            <a:pPr marR="0" algn="ctr" defTabSz="914400" eaLnBrk="1" fontAlgn="base" latinLnBrk="0" hangingPunct="1">
+              <a:lnSpc>
+                <a:spcPct val="100000"/>
+              </a:lnSpc>
+              <a:spcBef>
+                <a:spcPct val="50000"/>
+              </a:spcBef>
+              <a:spcAft>
+                <a:spcPct val="0"/>
+              </a:spcAft>
+              <a:buClr>
+                <a:srgbClr val="F0AB00"/>
+              </a:buClr>
+              <a:buSzPct val="80000"/>
+              <a:tabLst/>
+            </a:pPr>
+            <a:r>
+              <a:rPr lang="de-DE" sz="1800" kern="0" dirty="0">
+                <a:ea typeface="Arial Unicode MS" pitchFamily="34" charset="-128"/>
+                <a:cs typeface="Arial Unicode MS" pitchFamily="34" charset="-128"/>
+              </a:rPr>
+              <a:t>Port: 80</a:t>
+            </a:r>
+            <a:endParaRPr kumimoji="0" lang="de-DE" sz="1800" b="0" i="0" u="none" strike="noStrike" kern="0" cap="none" spc="0" normalizeH="0" baseline="0" noProof="0" dirty="0">
+              <a:ln>
+                <a:noFill/>
+              </a:ln>
+              <a:effectLst/>
+              <a:uLnTx/>
+              <a:uFillTx/>
+              <a:ea typeface="Arial Unicode MS" pitchFamily="34" charset="-128"/>
+              <a:cs typeface="Arial Unicode MS" pitchFamily="34" charset="-128"/>
+            </a:endParaRPr>
+          </a:p>
+        </p:txBody>
+      </p:sp>
+      <p:cxnSp>
+        <p:nvCxnSpPr>
+          <p:cNvPr id="44" name="Straight Arrow Connector 43">
+            <a:extLst>
+              <a:ext uri="{FF2B5EF4-FFF2-40B4-BE49-F238E27FC236}">
+                <a16:creationId xmlns:a16="http://schemas.microsoft.com/office/drawing/2014/main" id="{6064095C-8499-4385-AEBA-C1A6BFE16CEF}"/>
+              </a:ext>
+            </a:extLst>
+          </p:cNvPr>
+          <p:cNvCxnSpPr>
+            <a:stCxn id="31" idx="1"/>
+            <a:endCxn id="39" idx="0"/>
+          </p:cNvCxnSpPr>
+          <p:nvPr/>
+        </p:nvCxnSpPr>
+        <p:spPr>
+          <a:xfrm>
+            <a:off x="8130685" y="1505887"/>
+            <a:ext cx="0" cy="346979"/>
+          </a:xfrm>
+          <a:prstGeom prst="straightConnector1">
+            <a:avLst/>
+          </a:prstGeom>
+          <a:ln w="57150">
+            <a:solidFill>
+              <a:schemeClr val="tx2"/>
+            </a:solidFill>
+            <a:headEnd type="none" w="med" len="med"/>
+            <a:tailEnd type="triangle"/>
+          </a:ln>
+        </p:spPr>
+        <p:style>
+          <a:lnRef idx="1">
+            <a:schemeClr val="accent1"/>
+          </a:lnRef>
+          <a:fillRef idx="0">
+            <a:schemeClr val="accent1"/>
+          </a:fillRef>
+          <a:effectRef idx="0">
+            <a:schemeClr val="accent1"/>
+          </a:effectRef>
+          <a:fontRef idx="minor">
+            <a:schemeClr val="tx1"/>
+          </a:fontRef>
+        </p:style>
+      </p:cxnSp>
+      <p:sp>
+        <p:nvSpPr>
+          <p:cNvPr id="15" name="Rectangle 14"/>
+          <p:cNvSpPr/>
+          <p:nvPr/>
+        </p:nvSpPr>
+        <p:spPr bwMode="gray">
+          <a:xfrm>
+            <a:off x="7198669" y="5383910"/>
+            <a:ext cx="1319714" cy="428584"/>
+          </a:xfrm>
+          <a:prstGeom prst="rect">
+            <a:avLst/>
+          </a:prstGeom>
+          <a:solidFill>
+            <a:schemeClr val="accent1">
+              <a:lumMod val="40000"/>
+              <a:lumOff val="60000"/>
+            </a:schemeClr>
+          </a:solidFill>
+          <a:ln>
+            <a:headEnd/>
+            <a:tailEnd/>
+          </a:ln>
+        </p:spPr>
+        <p:style>
+          <a:lnRef idx="2">
+            <a:schemeClr val="accent2"/>
+          </a:lnRef>
+          <a:fillRef idx="1">
+            <a:schemeClr val="lt1"/>
+          </a:fillRef>
+          <a:effectRef idx="0">
+            <a:schemeClr val="accent2"/>
+          </a:effectRef>
+          <a:fontRef idx="minor">
+            <a:schemeClr val="dk1"/>
+          </a:fontRef>
+        </p:style>
+        <p:txBody>
+          <a:bodyPr lIns="90000" tIns="72000" rIns="90000" bIns="72000" rtlCol="0" anchor="ctr"/>
+          <a:lstStyle/>
+          <a:p>
+            <a:pPr marR="0" algn="ctr" defTabSz="914400" eaLnBrk="1" fontAlgn="base" latinLnBrk="0" hangingPunct="1">
+              <a:lnSpc>
+                <a:spcPct val="100000"/>
+              </a:lnSpc>
+              <a:spcBef>
+                <a:spcPct val="50000"/>
+              </a:spcBef>
+              <a:spcAft>
+                <a:spcPct val="0"/>
+              </a:spcAft>
+              <a:buClr>
+                <a:srgbClr val="F0AB00"/>
+              </a:buClr>
+              <a:buSzPct val="80000"/>
+              <a:tabLst/>
+            </a:pPr>
+            <a:r>
+              <a:rPr lang="de-DE" sz="1800" kern="0" dirty="0">
+                <a:ea typeface="Arial Unicode MS" pitchFamily="34" charset="-128"/>
+                <a:cs typeface="Arial Unicode MS" pitchFamily="34" charset="-128"/>
+              </a:rPr>
+              <a:t>a</a:t>
+            </a:r>
+            <a:r>
+              <a:rPr kumimoji="0" lang="de-DE" sz="1800" b="0" i="0" u="none" strike="noStrike" kern="0" cap="none" spc="0" normalizeH="0" baseline="0" noProof="0" dirty="0">
+                <a:ln>
+                  <a:noFill/>
+                </a:ln>
+                <a:effectLst/>
+                <a:uLnTx/>
+                <a:uFillTx/>
+                <a:ea typeface="Arial Unicode MS" pitchFamily="34" charset="-128"/>
+                <a:cs typeface="Arial Unicode MS" pitchFamily="34" charset="-128"/>
+              </a:rPr>
+              <a:t>pp=</a:t>
+            </a:r>
+            <a:r>
+              <a:rPr kumimoji="0" lang="de-DE" sz="1800" b="0" i="0" u="none" strike="noStrike" kern="0" cap="none" spc="0" normalizeH="0" baseline="0" noProof="0" dirty="0" err="1">
+                <a:ln>
+                  <a:noFill/>
+                </a:ln>
+                <a:effectLst/>
+                <a:uLnTx/>
+                <a:uFillTx/>
+                <a:ea typeface="Arial Unicode MS" pitchFamily="34" charset="-128"/>
+                <a:cs typeface="Arial Unicode MS" pitchFamily="34" charset="-128"/>
+              </a:rPr>
+              <a:t>nginx</a:t>
+            </a:r>
+            <a:endParaRPr kumimoji="0" lang="de-DE" sz="1800" b="0" i="0" u="none" strike="noStrike" kern="0" cap="none" spc="0" normalizeH="0" baseline="0" noProof="0" dirty="0">
+              <a:ln>
+                <a:noFill/>
+              </a:ln>
+              <a:effectLst/>
+              <a:uLnTx/>
+              <a:uFillTx/>
+              <a:ea typeface="Arial Unicode MS" pitchFamily="34" charset="-128"/>
+              <a:cs typeface="Arial Unicode MS" pitchFamily="34" charset="-128"/>
+            </a:endParaRPr>
+          </a:p>
+        </p:txBody>
+      </p:sp>
+      <p:pic>
+        <p:nvPicPr>
+          <p:cNvPr id="29" name="Picture 28">
+            <a:extLst>
+              <a:ext uri="{FF2B5EF4-FFF2-40B4-BE49-F238E27FC236}">
+                <a16:creationId xmlns:a16="http://schemas.microsoft.com/office/drawing/2014/main" id="{F08B04CC-B4D7-438C-9B05-EE0BDB5E902C}"/>
+              </a:ext>
+            </a:extLst>
+          </p:cNvPr>
+          <p:cNvPicPr>
+            <a:picLocks noChangeAspect="1"/>
+          </p:cNvPicPr>
+          <p:nvPr/>
+        </p:nvPicPr>
+        <p:blipFill>
+          <a:blip r:embed="rId3"/>
+          <a:stretch>
+            <a:fillRect/>
+          </a:stretch>
+        </p:blipFill>
+        <p:spPr>
+          <a:xfrm>
+            <a:off x="790680" y="1226795"/>
+            <a:ext cx="2580189" cy="4585699"/>
+          </a:xfrm>
+          <a:prstGeom prst="rect">
+            <a:avLst/>
+          </a:prstGeom>
+        </p:spPr>
+      </p:pic>
+      <p:cxnSp>
+        <p:nvCxnSpPr>
+          <p:cNvPr id="37" name="Connector: Elbow 36">
+            <a:extLst>
+              <a:ext uri="{FF2B5EF4-FFF2-40B4-BE49-F238E27FC236}">
+                <a16:creationId xmlns:a16="http://schemas.microsoft.com/office/drawing/2014/main" id="{A1F6945B-3CC4-4A5B-8F84-7DC5CC6F54A9}"/>
+              </a:ext>
+            </a:extLst>
+          </p:cNvPr>
+          <p:cNvCxnSpPr>
+            <a:cxnSpLocks/>
+            <a:endCxn id="20" idx="2"/>
+          </p:cNvCxnSpPr>
+          <p:nvPr/>
+        </p:nvCxnSpPr>
+        <p:spPr>
+          <a:xfrm>
+            <a:off x="3066714" y="4637523"/>
+            <a:ext cx="7045445" cy="1177598"/>
+          </a:xfrm>
+          <a:prstGeom prst="bentConnector4">
+            <a:avLst>
+              <a:gd name="adj1" fmla="val 8860"/>
+              <a:gd name="adj2" fmla="val 151432"/>
+            </a:avLst>
+          </a:prstGeom>
+          <a:ln w="101600">
+            <a:solidFill>
+              <a:srgbClr val="FF0000"/>
+            </a:solidFill>
+            <a:headEnd type="none" w="med" len="med"/>
+            <a:tailEnd type="triangle"/>
+          </a:ln>
+        </p:spPr>
+        <p:style>
+          <a:lnRef idx="1">
+            <a:schemeClr val="accent1"/>
+          </a:lnRef>
+          <a:fillRef idx="0">
+            <a:schemeClr val="accent1"/>
+          </a:fillRef>
+          <a:effectRef idx="0">
+            <a:schemeClr val="accent1"/>
+          </a:effectRef>
+          <a:fontRef idx="minor">
+            <a:schemeClr val="tx1"/>
+          </a:fontRef>
+        </p:style>
+      </p:cxnSp>
+      <p:sp>
+        <p:nvSpPr>
+          <p:cNvPr id="38" name="Speech Bubble: Rectangle 37">
+            <a:extLst>
+              <a:ext uri="{FF2B5EF4-FFF2-40B4-BE49-F238E27FC236}">
+                <a16:creationId xmlns:a16="http://schemas.microsoft.com/office/drawing/2014/main" id="{E855FA4F-FE92-4572-9B89-39B46442B4EE}"/>
+              </a:ext>
+            </a:extLst>
+          </p:cNvPr>
+          <p:cNvSpPr/>
+          <p:nvPr/>
+        </p:nvSpPr>
+        <p:spPr bwMode="gray">
+          <a:xfrm>
+            <a:off x="10284643" y="1679376"/>
+            <a:ext cx="1648753" cy="482047"/>
+          </a:xfrm>
+          <a:prstGeom prst="wedgeRectCallout">
+            <a:avLst>
+              <a:gd name="adj1" fmla="val 1972"/>
+              <a:gd name="adj2" fmla="val 259334"/>
+            </a:avLst>
+          </a:prstGeom>
+          <a:solidFill>
+            <a:srgbClr val="FF0000"/>
+          </a:solidFill>
+          <a:ln w="6350" algn="ctr">
+            <a:noFill/>
+            <a:miter lim="800000"/>
+            <a:headEnd/>
+            <a:tailEnd/>
+          </a:ln>
+        </p:spPr>
+        <p:txBody>
+          <a:bodyPr lIns="90000" tIns="72000" rIns="90000" bIns="72000" rtlCol="0" anchor="ctr"/>
+          <a:lstStyle/>
+          <a:p>
+            <a:pPr marR="0" algn="ctr" defTabSz="914400" eaLnBrk="1" fontAlgn="base" latinLnBrk="0" hangingPunct="1">
+              <a:lnSpc>
+                <a:spcPct val="100000"/>
+              </a:lnSpc>
+              <a:spcBef>
+                <a:spcPct val="50000"/>
+              </a:spcBef>
+              <a:spcAft>
+                <a:spcPct val="0"/>
+              </a:spcAft>
+              <a:buClr>
+                <a:srgbClr val="F0AB00"/>
+              </a:buClr>
+              <a:buSzPct val="80000"/>
+              <a:tabLst/>
+            </a:pPr>
+            <a:r>
+              <a:rPr kumimoji="0" lang="en-US" sz="1400" b="0" i="0" u="none" strike="noStrike" kern="0" cap="none" spc="0" normalizeH="0" baseline="0" noProof="0" dirty="0">
+                <a:ln>
+                  <a:noFill/>
+                </a:ln>
+                <a:effectLst/>
+                <a:uLnTx/>
+                <a:uFillTx/>
+                <a:ea typeface="Arial Unicode MS" pitchFamily="34" charset="-128"/>
+                <a:cs typeface="Arial Unicode MS" pitchFamily="34" charset="-128"/>
+              </a:rPr>
+              <a:t>Chosen at random</a:t>
+            </a:r>
+          </a:p>
+        </p:txBody>
+      </p:sp>
+      <p:sp>
+        <p:nvSpPr>
+          <p:cNvPr id="57" name="Rectangle: Single Corner Snipped 56">
+            <a:extLst>
+              <a:ext uri="{FF2B5EF4-FFF2-40B4-BE49-F238E27FC236}">
+                <a16:creationId xmlns:a16="http://schemas.microsoft.com/office/drawing/2014/main" id="{DAF516E3-9AF4-402E-A9A8-2D2A63535036}"/>
+              </a:ext>
+            </a:extLst>
+          </p:cNvPr>
+          <p:cNvSpPr/>
+          <p:nvPr/>
+        </p:nvSpPr>
+        <p:spPr bwMode="gray">
+          <a:xfrm>
+            <a:off x="4846915" y="3079127"/>
+            <a:ext cx="2420078" cy="1775677"/>
+          </a:xfrm>
+          <a:prstGeom prst="snip1Rect">
+            <a:avLst/>
+          </a:prstGeom>
+          <a:ln w="38100" cmpd="sng">
+            <a:headEnd/>
+            <a:tailEnd/>
+          </a:ln>
+          <a:effectLst>
+            <a:outerShdw blurRad="50800" dist="38100" dir="2700000" algn="tl" rotWithShape="0">
+              <a:prstClr val="black">
+                <a:alpha val="40000"/>
+              </a:prstClr>
+            </a:outerShdw>
+          </a:effectLst>
+        </p:spPr>
+        <p:style>
+          <a:lnRef idx="3">
+            <a:schemeClr val="lt1"/>
+          </a:lnRef>
+          <a:fillRef idx="1">
+            <a:schemeClr val="accent2"/>
+          </a:fillRef>
+          <a:effectRef idx="1">
+            <a:schemeClr val="accent2"/>
+          </a:effectRef>
+          <a:fontRef idx="minor">
+            <a:schemeClr val="lt1"/>
+          </a:fontRef>
+        </p:style>
+        <p:txBody>
+          <a:bodyPr wrap="none" lIns="90000" tIns="0" rIns="90000" bIns="0" rtlCol="0" anchor="t"/>
+          <a:lstStyle/>
+          <a:p>
+            <a:pPr marR="0" algn="ctr" defTabSz="914400" eaLnBrk="1" fontAlgn="base" latinLnBrk="0" hangingPunct="1">
+              <a:lnSpc>
+                <a:spcPct val="100000"/>
+              </a:lnSpc>
+              <a:spcAft>
+                <a:spcPts val="600"/>
+              </a:spcAft>
+              <a:buClr>
+                <a:srgbClr val="F0AB00"/>
+              </a:buClr>
+              <a:buSzPct val="80000"/>
+              <a:tabLst/>
+            </a:pPr>
+            <a:r>
+              <a:rPr kumimoji="0" lang="en-US" sz="1600" b="1" i="0" u="none" strike="noStrike" kern="0" cap="none" spc="0" normalizeH="0" baseline="0" noProof="0" dirty="0">
+                <a:ln>
+                  <a:noFill/>
+                </a:ln>
+                <a:effectLst/>
+                <a:uLnTx/>
+                <a:uFillTx/>
+                <a:ea typeface="Arial Unicode MS" pitchFamily="34" charset="-128"/>
+                <a:cs typeface="Arial Unicode MS" pitchFamily="34" charset="-128"/>
+              </a:rPr>
+              <a:t>Service</a:t>
+            </a:r>
+          </a:p>
+          <a:p>
+            <a:pPr marL="285750" marR="0" indent="-285750" defTabSz="914400" eaLnBrk="1" fontAlgn="base" latinLnBrk="0" hangingPunct="1">
+              <a:lnSpc>
+                <a:spcPct val="100000"/>
+              </a:lnSpc>
+              <a:spcBef>
+                <a:spcPts val="600"/>
+              </a:spcBef>
+              <a:spcAft>
+                <a:spcPct val="0"/>
+              </a:spcAft>
+              <a:buClr>
+                <a:srgbClr val="F0AB00"/>
+              </a:buClr>
+              <a:buSzPct val="80000"/>
+              <a:buFont typeface="Arial" panose="020B0604020202020204" pitchFamily="34" charset="0"/>
+              <a:buChar char="•"/>
+              <a:tabLst/>
+            </a:pPr>
+            <a:r>
+              <a:rPr lang="en-US" sz="1600" kern="0" dirty="0">
+                <a:ea typeface="Arial Unicode MS" pitchFamily="34" charset="-128"/>
+                <a:cs typeface="Arial Unicode MS" pitchFamily="34" charset="-128"/>
+              </a:rPr>
+              <a:t>Label: app=nginx</a:t>
+            </a:r>
+          </a:p>
+          <a:p>
+            <a:pPr marL="285750" marR="0" indent="-285750" defTabSz="914400" eaLnBrk="1" fontAlgn="base" latinLnBrk="0" hangingPunct="1">
+              <a:lnSpc>
+                <a:spcPct val="100000"/>
+              </a:lnSpc>
+              <a:spcBef>
+                <a:spcPts val="600"/>
+              </a:spcBef>
+              <a:spcAft>
+                <a:spcPct val="0"/>
+              </a:spcAft>
+              <a:buClr>
+                <a:srgbClr val="F0AB00"/>
+              </a:buClr>
+              <a:buSzPct val="80000"/>
+              <a:buFont typeface="Arial" panose="020B0604020202020204" pitchFamily="34" charset="0"/>
+              <a:buChar char="•"/>
+              <a:tabLst/>
+            </a:pPr>
+            <a:r>
+              <a:rPr kumimoji="0" lang="en-US" sz="1600" b="0" i="0" u="none" strike="noStrike" kern="0" cap="none" spc="0" normalizeH="0" baseline="0" noProof="0" dirty="0">
+                <a:ln>
+                  <a:noFill/>
+                </a:ln>
+                <a:effectLst/>
+                <a:uLnTx/>
+                <a:uFillTx/>
+                <a:ea typeface="Arial Unicode MS" pitchFamily="34" charset="-128"/>
+                <a:cs typeface="Arial Unicode MS" pitchFamily="34" charset="-128"/>
+              </a:rPr>
+              <a:t>Type: LoadBalancer</a:t>
+            </a:r>
+          </a:p>
+          <a:p>
+            <a:pPr marL="285750" marR="0" indent="-285750" defTabSz="914400" eaLnBrk="1" fontAlgn="base" latinLnBrk="0" hangingPunct="1">
+              <a:lnSpc>
+                <a:spcPct val="100000"/>
+              </a:lnSpc>
+              <a:spcBef>
+                <a:spcPts val="600"/>
+              </a:spcBef>
+              <a:spcAft>
+                <a:spcPct val="0"/>
+              </a:spcAft>
+              <a:buClr>
+                <a:srgbClr val="F0AB00"/>
+              </a:buClr>
+              <a:buSzPct val="80000"/>
+              <a:buFont typeface="Arial" panose="020B0604020202020204" pitchFamily="34" charset="0"/>
+              <a:buChar char="•"/>
+              <a:tabLst/>
+            </a:pPr>
+            <a:r>
+              <a:rPr lang="en-US" sz="1600" kern="0" dirty="0">
+                <a:ea typeface="Arial Unicode MS" pitchFamily="34" charset="-128"/>
+                <a:cs typeface="Arial Unicode MS" pitchFamily="34" charset="-128"/>
+              </a:rPr>
+              <a:t>TargetPort: 80</a:t>
+            </a:r>
+          </a:p>
+          <a:p>
+            <a:pPr marL="285750" marR="0" indent="-285750" defTabSz="914400" eaLnBrk="1" fontAlgn="base" latinLnBrk="0" hangingPunct="1">
+              <a:lnSpc>
+                <a:spcPct val="100000"/>
+              </a:lnSpc>
+              <a:spcBef>
+                <a:spcPts val="600"/>
+              </a:spcBef>
+              <a:spcAft>
+                <a:spcPct val="0"/>
+              </a:spcAft>
+              <a:buClr>
+                <a:srgbClr val="F0AB00"/>
+              </a:buClr>
+              <a:buSzPct val="80000"/>
+              <a:buFont typeface="Arial" panose="020B0604020202020204" pitchFamily="34" charset="0"/>
+              <a:buChar char="•"/>
+              <a:tabLst/>
+            </a:pPr>
+            <a:r>
+              <a:rPr kumimoji="0" lang="en-US" sz="1600" b="0" i="0" u="none" strike="noStrike" kern="0" cap="none" spc="0" normalizeH="0" baseline="0" noProof="0" dirty="0">
+                <a:ln>
+                  <a:noFill/>
+                </a:ln>
+                <a:effectLst/>
+                <a:uLnTx/>
+                <a:uFillTx/>
+                <a:ea typeface="Arial Unicode MS" pitchFamily="34" charset="-128"/>
+                <a:cs typeface="Arial Unicode MS" pitchFamily="34" charset="-128"/>
+              </a:rPr>
+              <a:t>Port: 80</a:t>
+            </a:r>
+          </a:p>
+        </p:txBody>
+      </p:sp>
+      <p:sp>
+        <p:nvSpPr>
+          <p:cNvPr id="64" name="Rectangle 63">
+            <a:extLst>
+              <a:ext uri="{FF2B5EF4-FFF2-40B4-BE49-F238E27FC236}">
+                <a16:creationId xmlns:a16="http://schemas.microsoft.com/office/drawing/2014/main" id="{97293F6F-4DF5-437A-9417-D5496CC658F9}"/>
+              </a:ext>
+            </a:extLst>
+          </p:cNvPr>
+          <p:cNvSpPr/>
+          <p:nvPr/>
+        </p:nvSpPr>
+        <p:spPr bwMode="gray">
+          <a:xfrm>
+            <a:off x="6097239" y="2890429"/>
+            <a:ext cx="803182" cy="325740"/>
+          </a:xfrm>
+          <a:prstGeom prst="rect">
+            <a:avLst/>
+          </a:prstGeom>
+          <a:ln>
+            <a:headEnd/>
+            <a:tailEnd/>
+          </a:ln>
+        </p:spPr>
+        <p:style>
+          <a:lnRef idx="2">
+            <a:schemeClr val="accent2"/>
+          </a:lnRef>
+          <a:fillRef idx="1">
+            <a:schemeClr val="lt1"/>
+          </a:fillRef>
+          <a:effectRef idx="0">
+            <a:schemeClr val="accent2"/>
+          </a:effectRef>
+          <a:fontRef idx="minor">
+            <a:schemeClr val="dk1"/>
+          </a:fontRef>
+        </p:style>
+        <p:txBody>
+          <a:bodyPr lIns="90000" tIns="72000" rIns="90000" bIns="72000" rtlCol="0" anchor="ctr"/>
+          <a:lstStyle/>
+          <a:p>
+            <a:pPr marR="0" algn="ctr" defTabSz="914400" eaLnBrk="1" fontAlgn="base" latinLnBrk="0" hangingPunct="1">
+              <a:lnSpc>
+                <a:spcPct val="100000"/>
+              </a:lnSpc>
+              <a:spcBef>
+                <a:spcPct val="50000"/>
+              </a:spcBef>
+              <a:spcAft>
+                <a:spcPct val="0"/>
+              </a:spcAft>
+              <a:buClr>
+                <a:srgbClr val="F0AB00"/>
+              </a:buClr>
+              <a:buSzPct val="80000"/>
+              <a:tabLst/>
+            </a:pPr>
+            <a:r>
+              <a:rPr lang="de-DE" sz="1400" kern="0" dirty="0">
+                <a:ea typeface="Arial Unicode MS" pitchFamily="34" charset="-128"/>
+                <a:cs typeface="Arial Unicode MS" pitchFamily="34" charset="-128"/>
+              </a:rPr>
+              <a:t>Port: 80</a:t>
+            </a:r>
+            <a:endParaRPr kumimoji="0" lang="de-DE" sz="1400" b="0" i="0" u="none" strike="noStrike" kern="0" cap="none" spc="0" normalizeH="0" baseline="0" noProof="0" dirty="0">
+              <a:ln>
+                <a:noFill/>
+              </a:ln>
+              <a:effectLst/>
+              <a:uLnTx/>
+              <a:uFillTx/>
+              <a:ea typeface="Arial Unicode MS" pitchFamily="34" charset="-128"/>
+              <a:cs typeface="Arial Unicode MS" pitchFamily="34" charset="-128"/>
+            </a:endParaRPr>
+          </a:p>
+        </p:txBody>
+      </p:sp>
+      <p:grpSp>
+        <p:nvGrpSpPr>
+          <p:cNvPr id="72" name="Group 71">
+            <a:extLst>
+              <a:ext uri="{FF2B5EF4-FFF2-40B4-BE49-F238E27FC236}">
+                <a16:creationId xmlns:a16="http://schemas.microsoft.com/office/drawing/2014/main" id="{A78C8562-3BB2-459D-9F61-CA18CD4420BF}"/>
+              </a:ext>
+            </a:extLst>
+          </p:cNvPr>
+          <p:cNvGrpSpPr/>
+          <p:nvPr/>
+        </p:nvGrpSpPr>
+        <p:grpSpPr>
+          <a:xfrm>
+            <a:off x="2479249" y="2067158"/>
+            <a:ext cx="5114608" cy="2640037"/>
+            <a:chOff x="2479249" y="2067158"/>
+            <a:chExt cx="5114608" cy="2640037"/>
+          </a:xfrm>
+        </p:grpSpPr>
+        <p:cxnSp>
+          <p:nvCxnSpPr>
+            <p:cNvPr id="12" name="Connector: Elbow 11">
+              <a:extLst>
+                <a:ext uri="{FF2B5EF4-FFF2-40B4-BE49-F238E27FC236}">
+                  <a16:creationId xmlns:a16="http://schemas.microsoft.com/office/drawing/2014/main" id="{2EE11602-31B0-45B6-9197-973EB3DBA5CA}"/>
+                </a:ext>
+              </a:extLst>
+            </p:cNvPr>
+            <p:cNvCxnSpPr>
+              <a:cxnSpLocks/>
+              <a:endCxn id="39" idx="1"/>
+            </p:cNvCxnSpPr>
+            <p:nvPr/>
+          </p:nvCxnSpPr>
+          <p:spPr>
+            <a:xfrm flipV="1">
+              <a:off x="2479249" y="2067158"/>
+              <a:ext cx="5114608" cy="1976942"/>
+            </a:xfrm>
+            <a:prstGeom prst="bentConnector3">
+              <a:avLst>
+                <a:gd name="adj1" fmla="val 32306"/>
+              </a:avLst>
+            </a:prstGeom>
+            <a:ln w="101600">
+              <a:solidFill>
+                <a:srgbClr val="FF0000"/>
+              </a:solidFill>
+              <a:headEnd type="none" w="med" len="med"/>
+              <a:tailEnd type="triangle"/>
+            </a:ln>
+          </p:spPr>
+          <p:style>
+            <a:lnRef idx="1">
+              <a:schemeClr val="accent1"/>
+            </a:lnRef>
+            <a:fillRef idx="0">
+              <a:schemeClr val="accent1"/>
+            </a:fillRef>
+            <a:effectRef idx="0">
+              <a:schemeClr val="accent1"/>
+            </a:effectRef>
+            <a:fontRef idx="minor">
+              <a:schemeClr val="tx1"/>
+            </a:fontRef>
+          </p:style>
+        </p:cxnSp>
+        <p:cxnSp>
+          <p:nvCxnSpPr>
+            <p:cNvPr id="46" name="Connector: Elbow 45">
+              <a:extLst>
+                <a:ext uri="{FF2B5EF4-FFF2-40B4-BE49-F238E27FC236}">
+                  <a16:creationId xmlns:a16="http://schemas.microsoft.com/office/drawing/2014/main" id="{671DACFA-F495-47A4-91BC-AEADDC20E789}"/>
+                </a:ext>
+              </a:extLst>
+            </p:cNvPr>
+            <p:cNvCxnSpPr>
+              <a:cxnSpLocks/>
+              <a:endCxn id="64" idx="1"/>
+            </p:cNvCxnSpPr>
+            <p:nvPr/>
+          </p:nvCxnSpPr>
+          <p:spPr>
+            <a:xfrm flipV="1">
+              <a:off x="2479249" y="3053299"/>
+              <a:ext cx="3617990" cy="983340"/>
+            </a:xfrm>
+            <a:prstGeom prst="bentConnector3">
+              <a:avLst>
+                <a:gd name="adj1" fmla="val 45832"/>
+              </a:avLst>
+            </a:prstGeom>
+            <a:ln w="101600">
+              <a:solidFill>
+                <a:srgbClr val="FF0000"/>
+              </a:solidFill>
+              <a:headEnd type="none" w="med" len="med"/>
+              <a:tailEnd type="triangle"/>
+            </a:ln>
+          </p:spPr>
+          <p:style>
+            <a:lnRef idx="1">
+              <a:schemeClr val="accent1"/>
+            </a:lnRef>
+            <a:fillRef idx="0">
+              <a:schemeClr val="accent1"/>
+            </a:fillRef>
+            <a:effectRef idx="0">
+              <a:schemeClr val="accent1"/>
+            </a:effectRef>
+            <a:fontRef idx="minor">
+              <a:schemeClr val="tx1"/>
+            </a:fontRef>
+          </p:style>
+        </p:cxnSp>
+        <p:cxnSp>
+          <p:nvCxnSpPr>
+            <p:cNvPr id="67" name="Connector: Elbow 66">
+              <a:extLst>
+                <a:ext uri="{FF2B5EF4-FFF2-40B4-BE49-F238E27FC236}">
+                  <a16:creationId xmlns:a16="http://schemas.microsoft.com/office/drawing/2014/main" id="{A4A8741F-1EB5-49DE-AABB-C32933988FC3}"/>
+                </a:ext>
+              </a:extLst>
+            </p:cNvPr>
+            <p:cNvCxnSpPr>
+              <a:cxnSpLocks/>
+            </p:cNvCxnSpPr>
+            <p:nvPr/>
+          </p:nvCxnSpPr>
+          <p:spPr>
+            <a:xfrm>
+              <a:off x="2482560" y="4047491"/>
+              <a:ext cx="2683329" cy="659704"/>
+            </a:xfrm>
+            <a:prstGeom prst="bentConnector3">
+              <a:avLst>
+                <a:gd name="adj1" fmla="val 61944"/>
+              </a:avLst>
+            </a:prstGeom>
+            <a:ln w="101600">
+              <a:solidFill>
+                <a:srgbClr val="FF0000"/>
+              </a:solidFill>
+              <a:headEnd type="none" w="med" len="med"/>
+              <a:tailEnd type="triangle"/>
+            </a:ln>
+          </p:spPr>
+          <p:style>
+            <a:lnRef idx="1">
+              <a:schemeClr val="accent1"/>
+            </a:lnRef>
+            <a:fillRef idx="0">
+              <a:schemeClr val="accent1"/>
+            </a:fillRef>
+            <a:effectRef idx="0">
+              <a:schemeClr val="accent1"/>
+            </a:effectRef>
+            <a:fontRef idx="minor">
+              <a:schemeClr val="tx1"/>
+            </a:fontRef>
+          </p:style>
+        </p:cxnSp>
+      </p:grpSp>
+    </p:spTree>
+    <p:extLst>
+      <p:ext uri="{BB962C8B-B14F-4D97-AF65-F5344CB8AC3E}">
+        <p14:creationId xmlns:p14="http://schemas.microsoft.com/office/powerpoint/2010/main" val="776560749"/>
+      </p:ext>
+    </p:extLst>
+  </p:cSld>
+  <p:clrMapOvr>
+    <a:masterClrMapping/>
+  </p:clrMapOvr>
+  <p:timing>
+    <p:tnLst>
+      <p:par>
+        <p:cTn id="1" dur="indefinite" restart="never" nodeType="tmRoot">
+          <p:childTnLst>
+            <p:seq concurrent="1" nextAc="seek">
+              <p:cTn id="2" dur="indefinite" nodeType="mainSeq">
+                <p:childTnLst>
+                  <p:par>
+                    <p:cTn id="3" fill="hold">
+                      <p:stCondLst>
+                        <p:cond delay="indefinite"/>
+                      </p:stCondLst>
+                      <p:childTnLst>
+                        <p:par>
+                          <p:cTn id="4" fill="hold">
+                            <p:stCondLst>
+                              <p:cond delay="0"/>
+                            </p:stCondLst>
+                            <p:childTnLst>
+                              <p:par>
+                                <p:cTn id="5" presetID="1" presetClass="entr" presetSubtype="0" fill="hold" nodeType="clickEffect">
+                                  <p:stCondLst>
+                                    <p:cond delay="0"/>
+                                  </p:stCondLst>
+                                  <p:childTnLst>
+                                    <p:set>
+                                      <p:cBhvr>
+                                        <p:cTn id="6" dur="1" fill="hold">
+                                          <p:stCondLst>
+                                            <p:cond delay="0"/>
+                                          </p:stCondLst>
+                                        </p:cTn>
+                                        <p:tgtEl>
+                                          <p:spTgt spid="72"/>
+                                        </p:tgtEl>
+                                        <p:attrNameLst>
+                                          <p:attrName>style.visibility</p:attrName>
+                                        </p:attrNameLst>
+                                      </p:cBhvr>
+                                      <p:to>
+                                        <p:strVal val="visible"/>
+                                      </p:to>
+                                    </p:set>
+                                  </p:childTnLst>
+                                </p:cTn>
+                              </p:par>
+                            </p:childTnLst>
+                          </p:cTn>
+                        </p:par>
+                      </p:childTnLst>
+                    </p:cTn>
+                  </p:par>
+                  <p:par>
+                    <p:cTn id="7" fill="hold">
+                      <p:stCondLst>
+                        <p:cond delay="indefinite"/>
+                      </p:stCondLst>
+                      <p:childTnLst>
+                        <p:par>
+                          <p:cTn id="8" fill="hold">
+                            <p:stCondLst>
+                              <p:cond delay="0"/>
+                            </p:stCondLst>
+                            <p:childTnLst>
+                              <p:par>
+                                <p:cTn id="9" presetID="1" presetClass="entr" presetSubtype="0" fill="hold" grpId="0" nodeType="clickEffect">
+                                  <p:stCondLst>
+                                    <p:cond delay="0"/>
+                                  </p:stCondLst>
+                                  <p:childTnLst>
+                                    <p:set>
+                                      <p:cBhvr>
+                                        <p:cTn id="10" dur="1" fill="hold">
+                                          <p:stCondLst>
+                                            <p:cond delay="0"/>
+                                          </p:stCondLst>
+                                        </p:cTn>
+                                        <p:tgtEl>
+                                          <p:spTgt spid="38"/>
+                                        </p:tgtEl>
+                                        <p:attrNameLst>
+                                          <p:attrName>style.visibility</p:attrName>
+                                        </p:attrNameLst>
+                                      </p:cBhvr>
+                                      <p:to>
+                                        <p:strVal val="visible"/>
+                                      </p:to>
+                                    </p:set>
+                                  </p:childTnLst>
+                                </p:cTn>
+                              </p:par>
+                            </p:childTnLst>
+                          </p:cTn>
+                        </p:par>
+                      </p:childTnLst>
+                    </p:cTn>
+                  </p:par>
+                  <p:par>
+                    <p:cTn id="11" fill="hold">
+                      <p:stCondLst>
+                        <p:cond delay="indefinite"/>
+                      </p:stCondLst>
+                      <p:childTnLst>
+                        <p:par>
+                          <p:cTn id="12" fill="hold">
+                            <p:stCondLst>
+                              <p:cond delay="0"/>
+                            </p:stCondLst>
+                            <p:childTnLst>
+                              <p:par>
+                                <p:cTn id="13" presetID="1" presetClass="entr" presetSubtype="0" fill="hold" nodeType="clickEffect">
+                                  <p:stCondLst>
+                                    <p:cond delay="0"/>
+                                  </p:stCondLst>
+                                  <p:childTnLst>
+                                    <p:set>
+                                      <p:cBhvr>
+                                        <p:cTn id="14" dur="1" fill="hold">
+                                          <p:stCondLst>
+                                            <p:cond delay="0"/>
+                                          </p:stCondLst>
+                                        </p:cTn>
+                                        <p:tgtEl>
+                                          <p:spTgt spid="37"/>
+                                        </p:tgtEl>
+                                        <p:attrNameLst>
+                                          <p:attrName>style.visibility</p:attrName>
+                                        </p:attrNameLst>
+                                      </p:cBhvr>
+                                      <p:to>
+                                        <p:strVal val="visible"/>
+                                      </p:to>
+                                    </p:set>
+                                  </p:childTnLst>
+                                </p:cTn>
+                              </p:par>
+                            </p:childTnLst>
+                          </p:cTn>
+                        </p:par>
+                      </p:childTnLst>
+                    </p:cTn>
+                  </p:par>
+                </p:childTnLst>
+              </p:cTn>
+              <p:prevCondLst>
+                <p:cond evt="onPrev" delay="0">
+                  <p:tgtEl>
+                    <p:sldTgt/>
+                  </p:tgtEl>
+                </p:cond>
+              </p:prevCondLst>
+              <p:nextCondLst>
+                <p:cond evt="onNext" delay="0">
+                  <p:tgtEl>
+                    <p:sldTgt/>
+                  </p:tgtEl>
+                </p:cond>
+              </p:nextCondLst>
+            </p:seq>
+          </p:childTnLst>
+        </p:cTn>
+      </p:par>
+    </p:tnLst>
+    <p:bldLst>
+      <p:bldP spid="38" grpId="0" animBg="1"/>
+    </p:bldLst>
+  </p:timing>
+</p:sld>
+</file>
+
+<file path=ppt/slides/slide13.xml><?xml version="1.0" encoding="utf-8"?>
 <p:sld xmlns:a="http://schemas.openxmlformats.org/drawingml/2006/main" xmlns:r="http://schemas.openxmlformats.org/officeDocument/2006/relationships" xmlns:p="http://schemas.openxmlformats.org/presentationml/2006/main">
   <p:cSld>
     <p:spTree>
@@ -11352,7 +15027,7 @@
 </p:sld>
 </file>
 
-<file path=ppt/slides/slide12.xml><?xml version="1.0" encoding="utf-8"?>
+<file path=ppt/slides/slide14.xml><?xml version="1.0" encoding="utf-8"?>
 <p:sld xmlns:a="http://schemas.openxmlformats.org/drawingml/2006/main" xmlns:r="http://schemas.openxmlformats.org/officeDocument/2006/relationships" xmlns:p="http://schemas.openxmlformats.org/presentationml/2006/main" show="0">
   <p:cSld>
     <p:spTree>
@@ -12883,29 +16558,8 @@
               <a:rPr lang="en-US" dirty="0">
                 <a:sym typeface="Wingdings" panose="05000000000000000000" pitchFamily="2" charset="2"/>
               </a:rPr>
-              <a:t>To expose a service externally either create allocate a </a:t>
-            </a:r>
-            <a:r>
-              <a:rPr lang="en-US" dirty="0" err="1">
-                <a:sym typeface="Wingdings" panose="05000000000000000000" pitchFamily="2" charset="2"/>
-              </a:rPr>
-              <a:t>NodePort</a:t>
-            </a:r>
-            <a:r>
-              <a:rPr lang="en-US" dirty="0">
-                <a:sym typeface="Wingdings" panose="05000000000000000000" pitchFamily="2" charset="2"/>
-              </a:rPr>
-              <a:t> or use a </a:t>
-            </a:r>
-            <a:r>
-              <a:rPr lang="en-US" dirty="0" err="1">
-                <a:sym typeface="Wingdings" panose="05000000000000000000" pitchFamily="2" charset="2"/>
-              </a:rPr>
-              <a:t>LoadBalancer</a:t>
-            </a:r>
-            <a:endParaRPr lang="en-US" dirty="0">
-              <a:sym typeface="Wingdings" panose="05000000000000000000" pitchFamily="2" charset="2"/>
-            </a:endParaRPr>
+              <a:t>To expose a service externally either create allocate a NodePort or use a LoadBalancer</a:t>
+            </a:r>
           </a:p>
         </p:txBody>
       </p:sp>
@@ -13095,18 +16749,11 @@
               <a:tabLst/>
             </a:pPr>
             <a:r>
-              <a:rPr lang="en-US" sz="1800" kern="0" dirty="0" err="1">
-                <a:ea typeface="Arial Unicode MS" pitchFamily="34" charset="-128"/>
-                <a:cs typeface="Arial Unicode MS" pitchFamily="34" charset="-128"/>
-              </a:rPr>
-              <a:t>TargetPort</a:t>
-            </a:r>
-            <a:r>
               <a:rPr lang="en-US" sz="1800" kern="0" dirty="0">
                 <a:ea typeface="Arial Unicode MS" pitchFamily="34" charset="-128"/>
                 <a:cs typeface="Arial Unicode MS" pitchFamily="34" charset="-128"/>
               </a:rPr>
-              <a:t>: </a:t>
+              <a:t>TargetPort: </a:t>
             </a:r>
             <a:r>
               <a:rPr lang="en-US" sz="1800" b="1" kern="0" dirty="0">
@@ -14051,23 +17698,8 @@
                 </a:solidFill>
                 <a:ea typeface="Arial Unicode MS" pitchFamily="34" charset="-128"/>
               </a:rPr>
-              <a:t>Label: app</a:t>
-            </a:r>
-            <a:r>
-              <a:rPr lang="en-US" sz="1800" kern="0">
-                <a:solidFill>
-                  <a:schemeClr val="dk1"/>
-                </a:solidFill>
-                <a:ea typeface="Arial Unicode MS" pitchFamily="34" charset="-128"/>
-              </a:rPr>
-              <a:t>= nginx</a:t>
-            </a:r>
-            <a:endParaRPr lang="en-US" sz="1800" kern="0" dirty="0">
-              <a:solidFill>
-                <a:schemeClr val="dk1"/>
-              </a:solidFill>
-              <a:ea typeface="Arial Unicode MS" pitchFamily="34" charset="-128"/>
-            </a:endParaRPr>
+              <a:t>Label: app= nginx</a:t>
+            </a:r>
           </a:p>
           <a:p>
             <a:pPr algn="ctr" defTabSz="914400" fontAlgn="base">
@@ -14089,23 +17721,8 @@
                 </a:solidFill>
                 <a:ea typeface="Arial Unicode MS" pitchFamily="34" charset="-128"/>
               </a:rPr>
-              <a:t>Name</a:t>
-            </a:r>
-            <a:r>
-              <a:rPr lang="en-US" sz="1800" kern="0">
-                <a:solidFill>
-                  <a:schemeClr val="dk1"/>
-                </a:solidFill>
-                <a:ea typeface="Arial Unicode MS" pitchFamily="34" charset="-128"/>
-              </a:rPr>
-              <a:t>: nginx-http</a:t>
-            </a:r>
-            <a:endParaRPr lang="en-US" sz="1800" kern="0" dirty="0">
-              <a:solidFill>
-                <a:schemeClr val="dk1"/>
-              </a:solidFill>
-              <a:ea typeface="Arial Unicode MS" pitchFamily="34" charset="-128"/>
-            </a:endParaRPr>
+              <a:t>Name: nginx-http</a:t>
+            </a:r>
           </a:p>
           <a:p>
             <a:pPr algn="ctr" defTabSz="914400" fontAlgn="base">
@@ -14121,7 +17738,7 @@
               <a:buSzPct val="80000"/>
             </a:pPr>
             <a:r>
-              <a:rPr lang="en-US" sz="1800" kern="0">
+              <a:rPr lang="en-US" sz="1800" kern="0" dirty="0">
                 <a:solidFill>
                   <a:schemeClr val="dk1"/>
                 </a:solidFill>
@@ -14129,12 +17746,6 @@
               </a:rPr>
               <a:t>TargetPort: http</a:t>
             </a:r>
-            <a:endParaRPr lang="en-US" sz="1800" kern="0" dirty="0">
-              <a:solidFill>
-                <a:schemeClr val="dk1"/>
-              </a:solidFill>
-              <a:ea typeface="Arial Unicode MS" pitchFamily="34" charset="-128"/>
-            </a:endParaRPr>
           </a:p>
           <a:p>
             <a:pPr algn="ctr" defTabSz="914400" fontAlgn="base">
@@ -14478,15 +18089,7 @@
           <a:p>
             <a:r>
               <a:rPr lang="en-US" dirty="0"/>
-              <a:t>Service types: Cluster IP, </a:t>
-            </a:r>
-            <a:r>
-              <a:rPr lang="en-US" dirty="0" err="1"/>
-              <a:t>NodePort</a:t>
-            </a:r>
-            <a:r>
-              <a:rPr lang="en-US" dirty="0"/>
-              <a:t>, </a:t>
+              <a:t>Service types: Cluster IP, NodePort, </a:t>
             </a:r>
             <a:r>
               <a:rPr lang="en-US" dirty="0" err="1"/>
@@ -14573,14 +18176,11 @@
               <a:buChar char="§"/>
             </a:pPr>
             <a:r>
-              <a:rPr lang="en-US" dirty="0" err="1">
+              <a:rPr lang="en-US" dirty="0">
                 <a:sym typeface="Wingdings" panose="05000000000000000000" pitchFamily="2" charset="2"/>
               </a:rPr>
               <a:t>LoadBalancer</a:t>
             </a:r>
-            <a:endParaRPr lang="en-US" dirty="0">
-              <a:sym typeface="Wingdings" panose="05000000000000000000" pitchFamily="2" charset="2"/>
-            </a:endParaRPr>
           </a:p>
           <a:p>
             <a:pPr marL="887288" lvl="1" indent="-342900">
@@ -14618,14 +18218,11 @@
               <a:buChar char="§"/>
             </a:pPr>
             <a:r>
-              <a:rPr lang="en-US" dirty="0" err="1">
+              <a:rPr lang="en-US" dirty="0">
                 <a:sym typeface="Wingdings" panose="05000000000000000000" pitchFamily="2" charset="2"/>
               </a:rPr>
               <a:t>NodePort</a:t>
             </a:r>
-            <a:endParaRPr lang="en-US" dirty="0">
-              <a:sym typeface="Wingdings" panose="05000000000000000000" pitchFamily="2" charset="2"/>
-            </a:endParaRPr>
           </a:p>
           <a:p>
             <a:pPr marL="887288" lvl="1" indent="-342900">

</xml_diff>

<commit_message>
minor: use port != 80 once and clarification
Using 8080 for target port instead of 80 everywhere makes one of the
slides easier to understand IMO.
</commit_message>
<xml_diff>
--- a/kubernetes/04_networking_services.pptx
+++ b/kubernetes/04_networking_services.pptx
@@ -9603,6 +9603,91 @@
       </p:grpSpPr>
       <p:sp>
         <p:nvSpPr>
+          <p:cNvPr id="2" name="Slide Image Placeholder 1"/>
+          <p:cNvSpPr>
+            <a:spLocks noGrp="1" noRot="1" noChangeAspect="1"/>
+          </p:cNvSpPr>
+          <p:nvPr>
+            <p:ph type="sldImg"/>
+          </p:nvPr>
+        </p:nvSpPr>
+        <p:spPr/>
+      </p:sp>
+      <p:sp>
+        <p:nvSpPr>
+          <p:cNvPr id="3" name="Notes Placeholder 2"/>
+          <p:cNvSpPr>
+            <a:spLocks noGrp="1"/>
+          </p:cNvSpPr>
+          <p:nvPr>
+            <p:ph type="body" idx="1"/>
+          </p:nvPr>
+        </p:nvSpPr>
+        <p:spPr/>
+        <p:txBody>
+          <a:bodyPr/>
+          <a:lstStyle/>
+          <a:p>
+            <a:endParaRPr lang="de-DE" dirty="0"/>
+          </a:p>
+        </p:txBody>
+      </p:sp>
+      <p:sp>
+        <p:nvSpPr>
+          <p:cNvPr id="4" name="Slide Number Placeholder 3"/>
+          <p:cNvSpPr>
+            <a:spLocks noGrp="1"/>
+          </p:cNvSpPr>
+          <p:nvPr>
+            <p:ph type="sldNum" sz="quarter" idx="10"/>
+          </p:nvPr>
+        </p:nvSpPr>
+        <p:spPr/>
+        <p:txBody>
+          <a:bodyPr/>
+          <a:lstStyle/>
+          <a:p>
+            <a:fld id="{7D8C2C35-2B8A-446E-BEC0-FD36716C29AC}" type="slidenum">
+              <a:rPr lang="de-DE" smtClean="0"/>
+              <a:pPr/>
+              <a:t>17</a:t>
+            </a:fld>
+            <a:endParaRPr lang="de-DE" dirty="0"/>
+          </a:p>
+        </p:txBody>
+      </p:sp>
+    </p:spTree>
+    <p:extLst>
+      <p:ext uri="{BB962C8B-B14F-4D97-AF65-F5344CB8AC3E}">
+        <p14:creationId xmlns:p14="http://schemas.microsoft.com/office/powerpoint/2010/main" val="3704696196"/>
+      </p:ext>
+    </p:extLst>
+  </p:cSld>
+  <p:clrMapOvr>
+    <a:masterClrMapping/>
+  </p:clrMapOvr>
+</p:notes>
+</file>
+
+<file path=ppt/notesSlides/notesSlide16.xml><?xml version="1.0" encoding="utf-8"?>
+<p:notes xmlns:a="http://schemas.openxmlformats.org/drawingml/2006/main" xmlns:r="http://schemas.openxmlformats.org/officeDocument/2006/relationships" xmlns:p="http://schemas.openxmlformats.org/presentationml/2006/main">
+  <p:cSld>
+    <p:spTree>
+      <p:nvGrpSpPr>
+        <p:cNvPr id="1" name=""/>
+        <p:cNvGrpSpPr/>
+        <p:nvPr/>
+      </p:nvGrpSpPr>
+      <p:grpSpPr>
+        <a:xfrm>
+          <a:off x="0" y="0"/>
+          <a:ext cx="0" cy="0"/>
+          <a:chOff x="0" y="0"/>
+          <a:chExt cx="0" cy="0"/>
+        </a:xfrm>
+      </p:grpSpPr>
+      <p:sp>
+        <p:nvSpPr>
           <p:cNvPr id="4" name="Slide Number Placeholder 3"/>
           <p:cNvSpPr>
             <a:spLocks noGrp="1"/>
@@ -10297,7 +10382,7 @@
           <a:p>
             <a:r>
               <a:rPr lang="en-US" dirty="0"/>
-              <a:t>K8s offers to give a (DNS) name to any port on container &amp; service level. The DNS name is available cluster internally only, as the cluster DNS usually does not connect with an external DNS server.</a:t>
+              <a:t>K8s offers to give a (DNS compatible) name to any port on container &amp; service level. The DNS name is available cluster internally only, as the cluster DNS usually does not connect with an external DNS server.</a:t>
             </a:r>
           </a:p>
           <a:p>
@@ -28968,8 +29053,8 @@
           </p:nvSpPr>
           <p:spPr bwMode="gray">
             <a:xfrm>
-              <a:off x="9575331" y="5386537"/>
-              <a:ext cx="1073656" cy="428584"/>
+              <a:off x="9540077" y="5166421"/>
+              <a:ext cx="1108910" cy="648700"/>
             </a:xfrm>
             <a:prstGeom prst="rect">
               <a:avLst/>
@@ -29018,7 +29103,7 @@
                   <a:ea typeface="Arial Unicode MS" pitchFamily="34" charset="-128"/>
                   <a:cs typeface="Arial Unicode MS" pitchFamily="34" charset="-128"/>
                 </a:rPr>
-                <a:t>Port: 80</a:t>
+                <a:t>Port: 8080</a:t>
               </a:r>
               <a:endParaRPr kumimoji="0" lang="de-DE" sz="1800" b="0" i="0" u="none" strike="noStrike" kern="0" cap="none" spc="0" normalizeH="0" baseline="0" noProof="0" dirty="0">
                 <a:ln>
@@ -29316,7 +29401,7 @@
                 </a:solidFill>
                 <a:ea typeface="Arial Unicode MS" pitchFamily="34" charset="-128"/>
               </a:rPr>
-              <a:t>Port: 80</a:t>
+              <a:t>Port: 8080</a:t>
             </a:r>
           </a:p>
         </p:txBody>

</xml_diff>

<commit_message>
fix port numbers in slide deck
</commit_message>
<xml_diff>
--- a/kubernetes/04_networking_services.pptx
+++ b/kubernetes/04_networking_services.pptx
@@ -28229,34 +28229,6 @@
       </p:grpSpPr>
       <p:sp>
         <p:nvSpPr>
-          <p:cNvPr id="2" name="Title 1">
-            <a:extLst>
-              <a:ext uri="{FF2B5EF4-FFF2-40B4-BE49-F238E27FC236}">
-                <a16:creationId xmlns:a16="http://schemas.microsoft.com/office/drawing/2014/main" id="{C2226B02-D33A-4A27-A7EF-DEFABA68D66B}"/>
-              </a:ext>
-            </a:extLst>
-          </p:cNvPr>
-          <p:cNvSpPr>
-            <a:spLocks noGrp="1"/>
-          </p:cNvSpPr>
-          <p:nvPr>
-            <p:ph type="title"/>
-          </p:nvPr>
-        </p:nvSpPr>
-        <p:spPr/>
-        <p:txBody>
-          <a:bodyPr/>
-          <a:lstStyle/>
-          <a:p>
-            <a:r>
-              <a:rPr lang="en-US" dirty="0"/>
-              <a:t>Labels &amp; Named Ports</a:t>
-            </a:r>
-          </a:p>
-        </p:txBody>
-      </p:sp>
-      <p:sp>
-        <p:nvSpPr>
           <p:cNvPr id="7" name="Rectangle: Single Corner Snipped 6">
             <a:extLst>
               <a:ext uri="{FF2B5EF4-FFF2-40B4-BE49-F238E27FC236}">
@@ -28394,7 +28366,7 @@
                 <a:ea typeface="Arial Unicode MS" pitchFamily="34" charset="-128"/>
                 <a:cs typeface="Arial Unicode MS" pitchFamily="34" charset="-128"/>
               </a:rPr>
-              <a:t>80</a:t>
+              <a:t>8080</a:t>
             </a:r>
           </a:p>
           <a:p>
@@ -28428,6 +28400,199 @@
                 <a:cs typeface="Arial Unicode MS" pitchFamily="34" charset="-128"/>
               </a:rPr>
               <a:t>Port: 80</a:t>
+            </a:r>
+          </a:p>
+        </p:txBody>
+      </p:sp>
+      <p:sp>
+        <p:nvSpPr>
+          <p:cNvPr id="27" name="Rectangle: Single Corner Snipped 26">
+            <a:extLst>
+              <a:ext uri="{FF2B5EF4-FFF2-40B4-BE49-F238E27FC236}">
+                <a16:creationId xmlns:a16="http://schemas.microsoft.com/office/drawing/2014/main" id="{C001CD37-F670-4E91-8ED5-09EA7CCBF5C4}"/>
+              </a:ext>
+            </a:extLst>
+          </p:cNvPr>
+          <p:cNvSpPr/>
+          <p:nvPr/>
+        </p:nvSpPr>
+        <p:spPr bwMode="gray">
+          <a:xfrm>
+            <a:off x="4776946" y="4013188"/>
+            <a:ext cx="2474332" cy="2346559"/>
+          </a:xfrm>
+          <a:prstGeom prst="snip1Rect">
+            <a:avLst/>
+          </a:prstGeom>
+          <a:solidFill>
+            <a:schemeClr val="accent1">
+              <a:lumMod val="40000"/>
+              <a:lumOff val="60000"/>
+            </a:schemeClr>
+          </a:solidFill>
+          <a:ln>
+            <a:headEnd/>
+            <a:tailEnd/>
+          </a:ln>
+        </p:spPr>
+        <p:style>
+          <a:lnRef idx="2">
+            <a:schemeClr val="accent2"/>
+          </a:lnRef>
+          <a:fillRef idx="1">
+            <a:schemeClr val="lt1"/>
+          </a:fillRef>
+          <a:effectRef idx="0">
+            <a:schemeClr val="accent2"/>
+          </a:effectRef>
+          <a:fontRef idx="minor">
+            <a:schemeClr val="dk1"/>
+          </a:fontRef>
+        </p:style>
+        <p:txBody>
+          <a:bodyPr lIns="90000" tIns="72000" rIns="90000" bIns="72000" rtlCol="0" anchor="ctr"/>
+          <a:lstStyle/>
+          <a:p>
+            <a:pPr algn="ctr" defTabSz="914400" fontAlgn="base">
+              <a:spcBef>
+                <a:spcPct val="50000"/>
+              </a:spcBef>
+              <a:spcAft>
+                <a:spcPct val="0"/>
+              </a:spcAft>
+              <a:buClr>
+                <a:srgbClr val="F0AB00"/>
+              </a:buClr>
+              <a:buSzPct val="80000"/>
+            </a:pPr>
+            <a:r>
+              <a:rPr lang="en-US" sz="1800" kern="0" dirty="0">
+                <a:solidFill>
+                  <a:schemeClr val="dk1"/>
+                </a:solidFill>
+                <a:ea typeface="Arial Unicode MS" pitchFamily="34" charset="-128"/>
+              </a:rPr>
+              <a:t>Service</a:t>
+            </a:r>
+          </a:p>
+          <a:p>
+            <a:pPr algn="ctr" defTabSz="914400" fontAlgn="base">
+              <a:spcBef>
+                <a:spcPct val="50000"/>
+              </a:spcBef>
+              <a:spcAft>
+                <a:spcPct val="0"/>
+              </a:spcAft>
+              <a:buClr>
+                <a:srgbClr val="F0AB00"/>
+              </a:buClr>
+              <a:buSzPct val="80000"/>
+            </a:pPr>
+            <a:r>
+              <a:rPr lang="en-US" sz="1800" kern="0" dirty="0">
+                <a:solidFill>
+                  <a:schemeClr val="dk1"/>
+                </a:solidFill>
+                <a:ea typeface="Arial Unicode MS" pitchFamily="34" charset="-128"/>
+              </a:rPr>
+              <a:t>Label: app= nginx</a:t>
+            </a:r>
+          </a:p>
+          <a:p>
+            <a:pPr algn="ctr" defTabSz="914400" fontAlgn="base">
+              <a:spcBef>
+                <a:spcPct val="50000"/>
+              </a:spcBef>
+              <a:spcAft>
+                <a:spcPct val="0"/>
+              </a:spcAft>
+              <a:buClr>
+                <a:srgbClr val="F0AB00"/>
+              </a:buClr>
+              <a:buSzPct val="80000"/>
+            </a:pPr>
+            <a:r>
+              <a:rPr lang="en-US" sz="1800" kern="0" dirty="0">
+                <a:solidFill>
+                  <a:schemeClr val="dk1"/>
+                </a:solidFill>
+                <a:ea typeface="Arial Unicode MS" pitchFamily="34" charset="-128"/>
+              </a:rPr>
+              <a:t>Name: nginx-http</a:t>
+            </a:r>
+          </a:p>
+          <a:p>
+            <a:pPr algn="ctr" defTabSz="914400" fontAlgn="base">
+              <a:spcBef>
+                <a:spcPct val="50000"/>
+              </a:spcBef>
+              <a:spcAft>
+                <a:spcPct val="0"/>
+              </a:spcAft>
+              <a:buClr>
+                <a:srgbClr val="F0AB00"/>
+              </a:buClr>
+              <a:buSzPct val="80000"/>
+            </a:pPr>
+            <a:r>
+              <a:rPr lang="en-US" sz="1800" kern="0" dirty="0">
+                <a:solidFill>
+                  <a:schemeClr val="dk1"/>
+                </a:solidFill>
+                <a:ea typeface="Arial Unicode MS" pitchFamily="34" charset="-128"/>
+              </a:rPr>
+              <a:t>TargetPort: http</a:t>
+            </a:r>
+          </a:p>
+          <a:p>
+            <a:pPr algn="ctr" defTabSz="914400" fontAlgn="base">
+              <a:spcBef>
+                <a:spcPct val="50000"/>
+              </a:spcBef>
+              <a:spcAft>
+                <a:spcPct val="0"/>
+              </a:spcAft>
+              <a:buClr>
+                <a:srgbClr val="F0AB00"/>
+              </a:buClr>
+              <a:buSzPct val="80000"/>
+            </a:pPr>
+            <a:r>
+              <a:rPr lang="en-US" sz="1800" kern="0" dirty="0">
+                <a:solidFill>
+                  <a:schemeClr val="dk1"/>
+                </a:solidFill>
+                <a:ea typeface="Arial Unicode MS" pitchFamily="34" charset="-128"/>
+              </a:rPr>
+              <a:t>Port: 80</a:t>
+            </a:r>
+          </a:p>
+        </p:txBody>
+      </p:sp>
+      <p:sp>
+        <p:nvSpPr>
+          <p:cNvPr id="2" name="Title 1">
+            <a:extLst>
+              <a:ext uri="{FF2B5EF4-FFF2-40B4-BE49-F238E27FC236}">
+                <a16:creationId xmlns:a16="http://schemas.microsoft.com/office/drawing/2014/main" id="{C2226B02-D33A-4A27-A7EF-DEFABA68D66B}"/>
+              </a:ext>
+            </a:extLst>
+          </p:cNvPr>
+          <p:cNvSpPr>
+            <a:spLocks noGrp="1"/>
+          </p:cNvSpPr>
+          <p:nvPr>
+            <p:ph type="title"/>
+          </p:nvPr>
+        </p:nvSpPr>
+        <p:spPr/>
+        <p:txBody>
+          <a:bodyPr/>
+          <a:lstStyle/>
+          <a:p>
+            <a:r>
+              <a:rPr lang="en-US" dirty="0"/>
+              <a:t>Labels &amp; Named Ports</a:t>
             </a:r>
           </a:p>
         </p:txBody>
@@ -29241,171 +29406,6 @@
           </a:fontRef>
         </p:style>
       </p:cxnSp>
-      <p:sp>
-        <p:nvSpPr>
-          <p:cNvPr id="27" name="Rectangle: Single Corner Snipped 26">
-            <a:extLst>
-              <a:ext uri="{FF2B5EF4-FFF2-40B4-BE49-F238E27FC236}">
-                <a16:creationId xmlns:a16="http://schemas.microsoft.com/office/drawing/2014/main" id="{C001CD37-F670-4E91-8ED5-09EA7CCBF5C4}"/>
-              </a:ext>
-            </a:extLst>
-          </p:cNvPr>
-          <p:cNvSpPr/>
-          <p:nvPr/>
-        </p:nvSpPr>
-        <p:spPr bwMode="gray">
-          <a:xfrm>
-            <a:off x="4776946" y="4013188"/>
-            <a:ext cx="2474332" cy="2346559"/>
-          </a:xfrm>
-          <a:prstGeom prst="snip1Rect">
-            <a:avLst/>
-          </a:prstGeom>
-          <a:solidFill>
-            <a:schemeClr val="accent1">
-              <a:lumMod val="40000"/>
-              <a:lumOff val="60000"/>
-            </a:schemeClr>
-          </a:solidFill>
-          <a:ln>
-            <a:headEnd/>
-            <a:tailEnd/>
-          </a:ln>
-        </p:spPr>
-        <p:style>
-          <a:lnRef idx="2">
-            <a:schemeClr val="accent2"/>
-          </a:lnRef>
-          <a:fillRef idx="1">
-            <a:schemeClr val="lt1"/>
-          </a:fillRef>
-          <a:effectRef idx="0">
-            <a:schemeClr val="accent2"/>
-          </a:effectRef>
-          <a:fontRef idx="minor">
-            <a:schemeClr val="dk1"/>
-          </a:fontRef>
-        </p:style>
-        <p:txBody>
-          <a:bodyPr lIns="90000" tIns="72000" rIns="90000" bIns="72000" rtlCol="0" anchor="ctr"/>
-          <a:lstStyle/>
-          <a:p>
-            <a:pPr algn="ctr" defTabSz="914400" fontAlgn="base">
-              <a:spcBef>
-                <a:spcPct val="50000"/>
-              </a:spcBef>
-              <a:spcAft>
-                <a:spcPct val="0"/>
-              </a:spcAft>
-              <a:buClr>
-                <a:srgbClr val="F0AB00"/>
-              </a:buClr>
-              <a:buSzPct val="80000"/>
-            </a:pPr>
-            <a:r>
-              <a:rPr lang="en-US" sz="1800" kern="0" dirty="0">
-                <a:solidFill>
-                  <a:schemeClr val="dk1"/>
-                </a:solidFill>
-                <a:ea typeface="Arial Unicode MS" pitchFamily="34" charset="-128"/>
-              </a:rPr>
-              <a:t>Service</a:t>
-            </a:r>
-          </a:p>
-          <a:p>
-            <a:pPr algn="ctr" defTabSz="914400" fontAlgn="base">
-              <a:spcBef>
-                <a:spcPct val="50000"/>
-              </a:spcBef>
-              <a:spcAft>
-                <a:spcPct val="0"/>
-              </a:spcAft>
-              <a:buClr>
-                <a:srgbClr val="F0AB00"/>
-              </a:buClr>
-              <a:buSzPct val="80000"/>
-            </a:pPr>
-            <a:r>
-              <a:rPr lang="en-US" sz="1800" kern="0" dirty="0">
-                <a:solidFill>
-                  <a:schemeClr val="dk1"/>
-                </a:solidFill>
-                <a:ea typeface="Arial Unicode MS" pitchFamily="34" charset="-128"/>
-              </a:rPr>
-              <a:t>Label: app= nginx</a:t>
-            </a:r>
-          </a:p>
-          <a:p>
-            <a:pPr algn="ctr" defTabSz="914400" fontAlgn="base">
-              <a:spcBef>
-                <a:spcPct val="50000"/>
-              </a:spcBef>
-              <a:spcAft>
-                <a:spcPct val="0"/>
-              </a:spcAft>
-              <a:buClr>
-                <a:srgbClr val="F0AB00"/>
-              </a:buClr>
-              <a:buSzPct val="80000"/>
-            </a:pPr>
-            <a:r>
-              <a:rPr lang="en-US" sz="1800" kern="0" dirty="0">
-                <a:solidFill>
-                  <a:schemeClr val="dk1"/>
-                </a:solidFill>
-                <a:ea typeface="Arial Unicode MS" pitchFamily="34" charset="-128"/>
-              </a:rPr>
-              <a:t>Name: nginx-http</a:t>
-            </a:r>
-          </a:p>
-          <a:p>
-            <a:pPr algn="ctr" defTabSz="914400" fontAlgn="base">
-              <a:spcBef>
-                <a:spcPct val="50000"/>
-              </a:spcBef>
-              <a:spcAft>
-                <a:spcPct val="0"/>
-              </a:spcAft>
-              <a:buClr>
-                <a:srgbClr val="F0AB00"/>
-              </a:buClr>
-              <a:buSzPct val="80000"/>
-            </a:pPr>
-            <a:r>
-              <a:rPr lang="en-US" sz="1800" kern="0" dirty="0">
-                <a:solidFill>
-                  <a:schemeClr val="dk1"/>
-                </a:solidFill>
-                <a:ea typeface="Arial Unicode MS" pitchFamily="34" charset="-128"/>
-              </a:rPr>
-              <a:t>TargetPort: http</a:t>
-            </a:r>
-          </a:p>
-          <a:p>
-            <a:pPr algn="ctr" defTabSz="914400" fontAlgn="base">
-              <a:spcBef>
-                <a:spcPct val="50000"/>
-              </a:spcBef>
-              <a:spcAft>
-                <a:spcPct val="0"/>
-              </a:spcAft>
-              <a:buClr>
-                <a:srgbClr val="F0AB00"/>
-              </a:buClr>
-              <a:buSzPct val="80000"/>
-            </a:pPr>
-            <a:r>
-              <a:rPr lang="en-US" sz="1800" kern="0" dirty="0">
-                <a:solidFill>
-                  <a:schemeClr val="dk1"/>
-                </a:solidFill>
-                <a:ea typeface="Arial Unicode MS" pitchFamily="34" charset="-128"/>
-              </a:rPr>
-              <a:t>Port: 8080</a:t>
-            </a:r>
-          </a:p>
-        </p:txBody>
-      </p:sp>
       <p:cxnSp>
         <p:nvCxnSpPr>
           <p:cNvPr id="28" name="Connector: Elbow 27">

</xml_diff>

<commit_message>
fix wording in slides
</commit_message>
<xml_diff>
--- a/kubernetes/04_networking_services.pptx
+++ b/kubernetes/04_networking_services.pptx
@@ -21866,7 +21866,7 @@
                 <a:ea typeface="Arial Unicode MS" pitchFamily="34" charset="-128"/>
                 <a:cs typeface="Arial Unicode MS" pitchFamily="34" charset="-128"/>
               </a:rPr>
-              <a:t>Label: app=nginx</a:t>
+              <a:t>Selector: app=nginx</a:t>
             </a:r>
             <a:endParaRPr kumimoji="0" lang="en-US" sz="1600" b="0" i="0" u="none" strike="noStrike" kern="0" cap="none" spc="0" normalizeH="0" baseline="0" noProof="0" dirty="0">
               <a:ln>
@@ -23683,7 +23683,7 @@
                 <a:ea typeface="Arial Unicode MS" pitchFamily="34" charset="-128"/>
                 <a:cs typeface="Arial Unicode MS" pitchFamily="34" charset="-128"/>
               </a:rPr>
-              <a:t>Label: app=nginx</a:t>
+              <a:t>Selector: app=nginx</a:t>
             </a:r>
             <a:endParaRPr kumimoji="0" lang="en-US" sz="1600" b="0" i="0" u="none" strike="noStrike" kern="0" cap="none" spc="0" normalizeH="0" baseline="0" noProof="0" dirty="0">
               <a:ln>
@@ -25183,7 +25183,7 @@
                 <a:ea typeface="Arial Unicode MS" pitchFamily="34" charset="-128"/>
                 <a:cs typeface="Arial Unicode MS" pitchFamily="34" charset="-128"/>
               </a:rPr>
-              <a:t>Label: app=nginx</a:t>
+              <a:t>Selector: app=nginx</a:t>
             </a:r>
           </a:p>
           <a:p>
@@ -28322,7 +28322,7 @@
                 <a:ea typeface="Arial Unicode MS" pitchFamily="34" charset="-128"/>
                 <a:cs typeface="Arial Unicode MS" pitchFamily="34" charset="-128"/>
               </a:rPr>
-              <a:t>Label: app= client</a:t>
+              <a:t>Selector: app= client</a:t>
             </a:r>
             <a:endParaRPr kumimoji="0" lang="en-US" sz="1800" b="0" i="0" u="none" strike="noStrike" kern="0" cap="none" spc="0" normalizeH="0" baseline="0" noProof="0" dirty="0">
               <a:ln>
@@ -28418,7 +28418,7 @@
         </p:nvSpPr>
         <p:spPr bwMode="gray">
           <a:xfrm>
-            <a:off x="4776946" y="4013188"/>
+            <a:off x="4758707" y="4003070"/>
             <a:ext cx="2474332" cy="2346559"/>
           </a:xfrm>
           <a:prstGeom prst="snip1Rect">
@@ -28495,7 +28495,7 @@
                 </a:solidFill>
                 <a:ea typeface="Arial Unicode MS" pitchFamily="34" charset="-128"/>
               </a:rPr>
-              <a:t>Label: app= nginx</a:t>
+              <a:t>Selector: app= nginx</a:t>
             </a:r>
           </a:p>
           <a:p>
@@ -29424,8 +29424,8 @@
         </p:nvCxnSpPr>
         <p:spPr>
           <a:xfrm rot="10800000">
-            <a:off x="961024" y="3611018"/>
-            <a:ext cx="3815922" cy="1575451"/>
+            <a:off x="961025" y="3611018"/>
+            <a:ext cx="3797683" cy="1565333"/>
           </a:xfrm>
           <a:prstGeom prst="bentConnector2">
             <a:avLst/>

</xml_diff>

<commit_message>
now different subnets for pods/networks/nodes
</commit_message>
<xml_diff>
--- a/kubernetes/04_networking_services.pptx
+++ b/kubernetes/04_networking_services.pptx
@@ -19792,7 +19792,7 @@
                 <a:ea typeface="Arial Unicode MS" pitchFamily="34" charset="-128"/>
                 <a:cs typeface="Arial Unicode MS" pitchFamily="34" charset="-128"/>
               </a:rPr>
-              <a:t>IP: 10.10.10.3</a:t>
+              <a:t>IP: 10.10.20.1</a:t>
             </a:r>
           </a:p>
         </p:txBody>
@@ -19861,7 +19861,7 @@
                 <a:ea typeface="Arial Unicode MS" pitchFamily="34" charset="-128"/>
                 <a:cs typeface="Arial Unicode MS" pitchFamily="34" charset="-128"/>
               </a:rPr>
-              <a:t>IP: 10.10.24.1</a:t>
+              <a:t>IP: 10.10.20.2</a:t>
             </a:r>
           </a:p>
         </p:txBody>
@@ -19930,7 +19930,7 @@
                 <a:ea typeface="Arial Unicode MS" pitchFamily="34" charset="-128"/>
                 <a:cs typeface="Arial Unicode MS" pitchFamily="34" charset="-128"/>
               </a:rPr>
-              <a:t>IP: 10.10.10.4</a:t>
+              <a:t>IP: 10.20.10.1</a:t>
             </a:r>
           </a:p>
         </p:txBody>
@@ -21461,7 +21461,7 @@
                 <a:ea typeface="Arial Unicode MS" pitchFamily="34" charset="-128"/>
                 <a:cs typeface="Arial Unicode MS" pitchFamily="34" charset="-128"/>
               </a:rPr>
-              <a:t>IP: 10.10.10.3</a:t>
+              <a:t>IP: 10.10.20.1</a:t>
             </a:r>
           </a:p>
         </p:txBody>
@@ -22175,7 +22175,7 @@
                 <a:ea typeface="Arial Unicode MS" pitchFamily="34" charset="-128"/>
                 <a:cs typeface="Arial Unicode MS" pitchFamily="34" charset="-128"/>
               </a:rPr>
-              <a:t>IP: 10.10.10.4</a:t>
+              <a:t>IP: 10.20.10.1</a:t>
             </a:r>
           </a:p>
         </p:txBody>
@@ -23103,7 +23103,7 @@
                 <a:ea typeface="Arial Unicode MS" pitchFamily="34" charset="-128"/>
                 <a:cs typeface="Arial Unicode MS" pitchFamily="34" charset="-128"/>
               </a:rPr>
-              <a:t>IP: 10.10.10.3</a:t>
+              <a:t>IP: 10.10.20.1</a:t>
             </a:r>
           </a:p>
         </p:txBody>
@@ -24119,7 +24119,7 @@
                 <a:ea typeface="Arial Unicode MS" pitchFamily="34" charset="-128"/>
                 <a:cs typeface="Arial Unicode MS" pitchFamily="34" charset="-128"/>
               </a:rPr>
-              <a:t>IP: 10.10.10.4</a:t>
+              <a:t>IP: 10.20.10.1</a:t>
             </a:r>
           </a:p>
         </p:txBody>
@@ -24591,7 +24591,7 @@
                 <a:ea typeface="Arial Unicode MS" pitchFamily="34" charset="-128"/>
                 <a:cs typeface="Arial Unicode MS" pitchFamily="34" charset="-128"/>
               </a:rPr>
-              <a:t>IP: 10.10.10.3</a:t>
+              <a:t>IP: 10.10.10.1</a:t>
             </a:r>
           </a:p>
         </p:txBody>
@@ -27889,7 +27889,7 @@
                 <a:ea typeface="Arial Unicode MS" pitchFamily="34" charset="-128"/>
                 <a:cs typeface="Arial Unicode MS" pitchFamily="34" charset="-128"/>
               </a:rPr>
-              <a:t>IP: 10.10.10.3</a:t>
+              <a:t>IP: 10.10.20.1</a:t>
             </a:r>
           </a:p>
         </p:txBody>

</xml_diff>

<commit_message>
silde 12, change headline to NodePorts (instead of loadbalancers)
</commit_message>
<xml_diff>
--- a/kubernetes/04_networking_services.pptx
+++ b/kubernetes/04_networking_services.pptx
@@ -21175,8 +21175,13 @@
           <a:p>
             <a:r>
               <a:rPr lang="en-US" dirty="0"/>
-              <a:t>Introducing LoadBalancers</a:t>
-            </a:r>
+              <a:t>Introducing </a:t>
+            </a:r>
+            <a:r>
+              <a:rPr lang="en-US" dirty="0" err="1"/>
+              <a:t>NodePorts</a:t>
+            </a:r>
+            <a:endParaRPr lang="en-US" dirty="0"/>
           </a:p>
         </p:txBody>
       </p:sp>

</xml_diff>